<commit_message>
Added interfaces slide, modified ideal query formatting.
</commit_message>
<xml_diff>
--- a/presentations/Method5.pptx
+++ b/presentations/Method5.pptx
@@ -5,10 +5,10 @@
     <p:sldMasterId id="2147483648" r:id="rId1"/>
   </p:sldMasterIdLst>
   <p:notesMasterIdLst>
-    <p:notesMasterId r:id="rId17"/>
+    <p:notesMasterId r:id="rId18"/>
   </p:notesMasterIdLst>
   <p:handoutMasterIdLst>
-    <p:handoutMasterId r:id="rId18"/>
+    <p:handoutMasterId r:id="rId19"/>
   </p:handoutMasterIdLst>
   <p:sldIdLst>
     <p:sldId id="256" r:id="rId2"/>
@@ -18,14 +18,15 @@
     <p:sldId id="258" r:id="rId6"/>
     <p:sldId id="259" r:id="rId7"/>
     <p:sldId id="262" r:id="rId8"/>
-    <p:sldId id="263" r:id="rId9"/>
-    <p:sldId id="261" r:id="rId10"/>
-    <p:sldId id="270" r:id="rId11"/>
-    <p:sldId id="264" r:id="rId12"/>
-    <p:sldId id="265" r:id="rId13"/>
-    <p:sldId id="266" r:id="rId14"/>
-    <p:sldId id="267" r:id="rId15"/>
-    <p:sldId id="268" r:id="rId16"/>
+    <p:sldId id="271" r:id="rId9"/>
+    <p:sldId id="263" r:id="rId10"/>
+    <p:sldId id="261" r:id="rId11"/>
+    <p:sldId id="270" r:id="rId12"/>
+    <p:sldId id="264" r:id="rId13"/>
+    <p:sldId id="265" r:id="rId14"/>
+    <p:sldId id="266" r:id="rId15"/>
+    <p:sldId id="267" r:id="rId16"/>
+    <p:sldId id="268" r:id="rId17"/>
   </p:sldIdLst>
   <p:sldSz cx="9144000" cy="6858000" type="screen4x3"/>
   <p:notesSz cx="6858000" cy="9144000"/>
@@ -209,7 +210,7 @@
           <a:p>
             <a:fld id="{E8184847-EC06-4734-8E30-343A2DA340C9}" type="datetimeFigureOut">
               <a:rPr lang="en-US" smtClean="0"/>
-              <a:t>2017-01-04</a:t>
+              <a:t>2017-01-12</a:t>
             </a:fld>
             <a:endParaRPr lang="en-US"/>
           </a:p>
@@ -374,7 +375,7 @@
           <a:p>
             <a:fld id="{DC284B00-8F05-4CB2-A4E6-4A642AFA915E}" type="datetimeFigureOut">
               <a:rPr lang="en-US" smtClean="0"/>
-              <a:t>2017-01-04</a:t>
+              <a:t>2017-01-12</a:t>
             </a:fld>
             <a:endParaRPr lang="en-US"/>
           </a:p>
@@ -774,38 +775,64 @@
               <a:buNone/>
             </a:pPr>
             <a:r>
-              <a:rPr lang="en-US" dirty="0" smtClean="0"/>
-              <a:t>1. Like</a:t>
+              <a:rPr lang="en-US" b="1" dirty="0" smtClean="0"/>
+              <a:t>1. </a:t>
+            </a:r>
+            <a:r>
+              <a:rPr lang="en-US" b="1" dirty="0" smtClean="0"/>
+              <a:t>Tables -</a:t>
+            </a:r>
+            <a:r>
+              <a:rPr lang="en-US" dirty="0" smtClean="0"/>
+              <a:t> Every execution</a:t>
             </a:r>
             <a:r>
               <a:rPr lang="en-US" baseline="0" dirty="0" smtClean="0"/>
-              <a:t> any good database solution, the heavy-lifting is done with SQL statements glued together with PL/SQL.  The dynamic code is nested several levels deep.  To avoid the typical concatenation-hell, the alternative quoting mechanism and REPLACE are used.  This simple trick makes dynamic code drastically more readable.</a:t>
-            </a:r>
+              <a:t> automatically generates three tables.  The tables are given default names if none are specified.  The tables contain the data, the metadata, and the errors.</a:t>
+            </a:r>
+            <a:endParaRPr lang="en-US" dirty="0" smtClean="0"/>
           </a:p>
           <a:p>
             <a:pPr marL="0" indent="0">
               <a:buNone/>
             </a:pPr>
             <a:r>
+              <a:rPr lang="en-US" b="1" dirty="0" smtClean="0"/>
+              <a:t>2. </a:t>
+            </a:r>
+            <a:r>
+              <a:rPr lang="en-US" b="1" dirty="0" smtClean="0"/>
+              <a:t>Views -</a:t>
+            </a:r>
+            <a:r>
+              <a:rPr lang="en-US" dirty="0" smtClean="0"/>
+              <a:t> Since you may not know or remember the table names used, three</a:t>
+            </a:r>
+            <a:r>
               <a:rPr lang="en-US" baseline="0" dirty="0" smtClean="0"/>
-              <a:t>2. Database links are what ties everything together.  Database links have gotten a bad reputation.  Yes, many people make horrible mistakes with them, but when used right it makes inter-database communication incredibly simple.</a:t>
-            </a:r>
+              <a:t> views are created in your schema.  These views always reference the last run.  They are M5_RESULTS, M5_METADATA, and M5_ERRORS.</a:t>
+            </a:r>
+            <a:endParaRPr lang="en-US" dirty="0" smtClean="0"/>
           </a:p>
           <a:p>
             <a:pPr marL="0" indent="0">
               <a:buNone/>
             </a:pPr>
             <a:r>
+              <a:rPr lang="en-US" b="1" dirty="0" smtClean="0"/>
+              <a:t>3.</a:t>
+            </a:r>
+            <a:r>
+              <a:rPr lang="en-US" b="1" baseline="0" dirty="0" smtClean="0"/>
+              <a:t> </a:t>
+            </a:r>
+            <a:r>
+              <a:rPr lang="en-US" b="1" baseline="0" dirty="0" smtClean="0"/>
+              <a:t>M5_ links - </a:t>
+            </a:r>
+            <a:r>
               <a:rPr lang="en-US" baseline="0" dirty="0" smtClean="0"/>
-              <a:t>3. 99% of all Oracle SQL code parsing or code transformation  programs are fundamentally broken.  Things like statement classification and terminator removal are often handled with simple  regular expressions.  SQL and PL/SQL are insanely complicated languages, with over 2,000 keywords and 30 years of syntax history.  A proper </a:t>
-            </a:r>
-            <a:r>
-              <a:rPr lang="en-US" baseline="0" dirty="0" err="1" smtClean="0"/>
-              <a:t>lexer</a:t>
-            </a:r>
-            <a:r>
-              <a:rPr lang="en-US" baseline="0" dirty="0" smtClean="0"/>
-              <a:t> is a requirement to build a robust system that can handle any code.</a:t>
+              <a:t>Database links are automatically copied and synchronized to your schema.  This can be useful for many ad hoc tasks.  Simply use @M5_$DBNAME in queries or through DBMS_UTILTY.EXECUTE_DDL_STATEMENT.</a:t>
             </a:r>
           </a:p>
           <a:p>
@@ -813,8 +840,16 @@
               <a:buNone/>
             </a:pPr>
             <a:r>
+              <a:rPr lang="en-US" b="1" baseline="0" dirty="0" smtClean="0"/>
+              <a:t>4. </a:t>
+            </a:r>
+            <a:r>
+              <a:rPr lang="en-US" b="1" baseline="0" dirty="0" smtClean="0"/>
+              <a:t>Global Data Dictionary - </a:t>
+            </a:r>
+            <a:r>
               <a:rPr lang="en-US" baseline="0" dirty="0" smtClean="0"/>
-              <a:t>4. Scheduler and pipes work together to enable parallelism and asynchronous processing.</a:t>
+              <a:t>Every night Method5 gathers some common data into tables such as M5_DBA_TABLES, M5_USER$, M5_DBA_ROLE_PRIVS, M5_DBA_SYS_PRIVS, and M5_DBA_TAB_PRIVS.  Having this data instantly available makes some tasks much simpler, such as finding out where a user exists, or where an object is granted.</a:t>
             </a:r>
           </a:p>
           <a:p>
@@ -822,17 +857,16 @@
               <a:buNone/>
             </a:pPr>
             <a:r>
+              <a:rPr lang="en-US" b="1" baseline="0" dirty="0" smtClean="0"/>
+              <a:t>5. </a:t>
+            </a:r>
+            <a:r>
+              <a:rPr lang="en-US" b="1" baseline="0" dirty="0" smtClean="0"/>
+              <a:t>Limits - </a:t>
+            </a:r>
+            <a:r>
               <a:rPr lang="en-US" baseline="0" dirty="0" smtClean="0"/>
-              <a:t>5. Everything is configured in tables.  You don't have to worry about XML configuration files or agent parameter files.</a:t>
-            </a:r>
-          </a:p>
-          <a:p>
-            <a:pPr marL="0" indent="0">
-              <a:buNone/>
-            </a:pPr>
-            <a:r>
-              <a:rPr lang="en-US" baseline="0" dirty="0" smtClean="0"/>
-              <a:t>6. Oracle Data Cartridge is the magic (or at least cryptic) piece that allows Method5 to extend Oracle SQL.  It provides the ability to return "anything", dynamically, in a SQL context.  Running dynamic SQL in SQL is much harder than it sounds.</a:t>
+              <a:t>Method5 currently only runs SQL and PL/SQL statements.  It does not (yet) run operating system commands or SQL*Plus scripts.  It also (currently) only runs as DBA so you cannot perform tasks as SYSDBA.</a:t>
             </a:r>
             <a:endParaRPr lang="en-US" dirty="0"/>
           </a:p>
@@ -864,7 +898,7 @@
     </p:spTree>
     <p:extLst>
       <p:ext uri="{BB962C8B-B14F-4D97-AF65-F5344CB8AC3E}">
-        <p14:creationId xmlns:p14="http://schemas.microsoft.com/office/powerpoint/2010/main" val="1500454840"/>
+        <p14:creationId xmlns:p14="http://schemas.microsoft.com/office/powerpoint/2010/main" val="2408283472"/>
       </p:ext>
     </p:extLst>
   </p:cSld>
@@ -918,68 +952,69 @@
           <a:bodyPr/>
           <a:lstStyle/>
           <a:p>
-            <a:r>
-              <a:rPr lang="en-US" dirty="0" smtClean="0"/>
-              <a:t>1. Requirements - You must have a central</a:t>
+            <a:pPr marL="0" indent="0">
+              <a:buNone/>
+            </a:pPr>
+            <a:r>
+              <a:rPr lang="en-US" dirty="0" smtClean="0"/>
+              <a:t>1. Like</a:t>
             </a:r>
             <a:r>
               <a:rPr lang="en-US" baseline="0" dirty="0" smtClean="0"/>
-              <a:t> management database that can communicate with all other database.  You must have SYSDBA to install, and DBA privileges to use.  Any currently-supported platform, version, or edition will work.  (And probably some unsupported ones also.)</a:t>
-            </a:r>
-          </a:p>
-          <a:p>
-            <a:r>
-              <a:rPr lang="en-US" dirty="0" smtClean="0"/>
-              <a:t>2. Only one person needs to install and administer it.  The configuration is automatically applied to other users.</a:t>
-            </a:r>
-          </a:p>
-          <a:p>
-            <a:r>
-              <a:rPr lang="en-US" dirty="0" smtClean="0"/>
-              <a:t>3. Download the free, open source code from GitHub and follow the instructions.</a:t>
-            </a:r>
-          </a:p>
-          <a:p>
-            <a:r>
-              <a:rPr lang="en-US" dirty="0" smtClean="0"/>
-              <a:t>4. The code is 100% inside the database - there are no agents, plugins, websites, configuration files, etc.</a:t>
-            </a:r>
-          </a:p>
-          <a:p>
-            <a:r>
-              <a:rPr lang="en-US" dirty="0" smtClean="0"/>
-              <a:t>5. The</a:t>
-            </a:r>
+              <a:t> any good database solution, the heavy-lifting is done with SQL statements glued together with PL/SQL.  The dynamic code is nested several levels deep.  To avoid the typical concatenation-hell, the alternative quoting mechanism and REPLACE are used.  This simple trick makes dynamic code drastically more readable.</a:t>
+            </a:r>
+          </a:p>
+          <a:p>
+            <a:pPr marL="0" indent="0">
+              <a:buNone/>
+            </a:pPr>
             <a:r>
               <a:rPr lang="en-US" baseline="0" dirty="0" smtClean="0"/>
-              <a:t> level of effort can vary widely depending on how standardized your environment is.  1000 perfectly-standardized databases will be easier than 10 databases all with different platforms, versions, and configurations.  One of the nice side-effects of Method5 is that it really drives home how useful standardization can be.  You may want to work on one environment at a time; you don't need to get every database working in order to use this.</a:t>
-            </a:r>
-          </a:p>
-          <a:p>
+              <a:t>2. Database links are what ties everything together.  Database links have gotten a bad reputation.  Yes, many people make horrible mistakes with them, but when used right it makes inter-database communication incredibly simple.</a:t>
+            </a:r>
+          </a:p>
+          <a:p>
+            <a:pPr marL="0" indent="0">
+              <a:buNone/>
+            </a:pPr>
             <a:r>
               <a:rPr lang="en-US" baseline="0" dirty="0" smtClean="0"/>
-              <a:t>6. If you encounter any problems you can create a GitHub issue on the repository or you can email Jon Heller at either hjon@ventechsolutions.com or jon@jonheller.org.</a:t>
-            </a:r>
-          </a:p>
-          <a:p>
-            <a:endParaRPr lang="en-US" baseline="0" dirty="0" smtClean="0"/>
-          </a:p>
-          <a:p>
-            <a:r>
-              <a:rPr lang="en-US" dirty="0" smtClean="0"/>
-              <a:t>Most DBAs have everything they need to get started in about</a:t>
+              <a:t>3. 99% of all Oracle SQL code parsing or code transformation  programs are fundamentally broken.  Things like statement classification and terminator removal are often handled with simple  regular expressions.  SQL and PL/SQL are insanely complicated languages, with over 2,000 keywords and 30 years of syntax history.  A proper </a:t>
+            </a:r>
+            <a:r>
+              <a:rPr lang="en-US" baseline="0" dirty="0" err="1" smtClean="0"/>
+              <a:t>lexer</a:t>
             </a:r>
             <a:r>
               <a:rPr lang="en-US" baseline="0" dirty="0" smtClean="0"/>
-              <a:t> an hour.</a:t>
-            </a:r>
-            <a:r>
-              <a:rPr lang="en-US" dirty="0" smtClean="0"/>
-              <a:t>  You don't need to buy anything, sign up for anything, or install any operating system binaries.  The installation and</a:t>
-            </a:r>
+              <a:t> is a requirement to build a robust system that can handle any code.</a:t>
+            </a:r>
+          </a:p>
+          <a:p>
+            <a:pPr marL="0" indent="0">
+              <a:buNone/>
+            </a:pPr>
             <a:r>
               <a:rPr lang="en-US" baseline="0" dirty="0" smtClean="0"/>
-              <a:t> administration tasks aren't that different from what you do on a day-to-day basis.</a:t>
+              <a:t>4. Scheduler and pipes work together to enable parallelism and asynchronous processing.</a:t>
+            </a:r>
+          </a:p>
+          <a:p>
+            <a:pPr marL="0" indent="0">
+              <a:buNone/>
+            </a:pPr>
+            <a:r>
+              <a:rPr lang="en-US" baseline="0" dirty="0" smtClean="0"/>
+              <a:t>5. Everything is configured in tables.  You don't have to worry about XML configuration files or agent parameter files.</a:t>
+            </a:r>
+          </a:p>
+          <a:p>
+            <a:pPr marL="0" indent="0">
+              <a:buNone/>
+            </a:pPr>
+            <a:r>
+              <a:rPr lang="en-US" baseline="0" dirty="0" smtClean="0"/>
+              <a:t>6. Oracle Data Cartridge is the magic (or at least cryptic) piece that allows Method5 to extend Oracle SQL.  It provides the ability to return "anything", dynamically, in a SQL context.  Running dynamic SQL in SQL is much harder than it sounds.</a:t>
             </a:r>
             <a:endParaRPr lang="en-US" dirty="0"/>
           </a:p>
@@ -1011,7 +1046,7 @@
     </p:spTree>
     <p:extLst>
       <p:ext uri="{BB962C8B-B14F-4D97-AF65-F5344CB8AC3E}">
-        <p14:creationId xmlns:p14="http://schemas.microsoft.com/office/powerpoint/2010/main" val="489585203"/>
+        <p14:creationId xmlns:p14="http://schemas.microsoft.com/office/powerpoint/2010/main" val="1500454840"/>
       </p:ext>
     </p:extLst>
   </p:cSld>
@@ -1065,6 +1100,69 @@
           <a:bodyPr/>
           <a:lstStyle/>
           <a:p>
+            <a:r>
+              <a:rPr lang="en-US" dirty="0" smtClean="0"/>
+              <a:t>1. Requirements - You must have a central</a:t>
+            </a:r>
+            <a:r>
+              <a:rPr lang="en-US" baseline="0" dirty="0" smtClean="0"/>
+              <a:t> management database that can communicate with all other database.  You must have SYSDBA to install, and DBA privileges to use.  Any currently-supported platform, version, or edition will work.  (And probably some unsupported ones also.)</a:t>
+            </a:r>
+          </a:p>
+          <a:p>
+            <a:r>
+              <a:rPr lang="en-US" dirty="0" smtClean="0"/>
+              <a:t>2. Only one person needs to install and administer it.  The configuration is automatically applied to other users.</a:t>
+            </a:r>
+          </a:p>
+          <a:p>
+            <a:r>
+              <a:rPr lang="en-US" dirty="0" smtClean="0"/>
+              <a:t>3. Download the free, open source code from GitHub and follow the instructions.</a:t>
+            </a:r>
+          </a:p>
+          <a:p>
+            <a:r>
+              <a:rPr lang="en-US" dirty="0" smtClean="0"/>
+              <a:t>4. The code is 100% inside the database - there are no agents, plugins, websites, configuration files, etc.</a:t>
+            </a:r>
+          </a:p>
+          <a:p>
+            <a:r>
+              <a:rPr lang="en-US" dirty="0" smtClean="0"/>
+              <a:t>5. The</a:t>
+            </a:r>
+            <a:r>
+              <a:rPr lang="en-US" baseline="0" dirty="0" smtClean="0"/>
+              <a:t> level of effort can vary widely depending on how standardized your environment is.  1000 perfectly-standardized databases will be easier than 10 databases all with different platforms, versions, and configurations.  One of the nice side-effects of Method5 is that it really drives home how useful standardization can be.  You may want to work on one environment at a time; you don't need to get every database working in order to use this.</a:t>
+            </a:r>
+          </a:p>
+          <a:p>
+            <a:r>
+              <a:rPr lang="en-US" baseline="0" dirty="0" smtClean="0"/>
+              <a:t>6. If you encounter any problems you can create a GitHub issue on the repository or you can email Jon Heller at either hjon@ventechsolutions.com or jon@jonheller.org.</a:t>
+            </a:r>
+          </a:p>
+          <a:p>
+            <a:endParaRPr lang="en-US" baseline="0" dirty="0" smtClean="0"/>
+          </a:p>
+          <a:p>
+            <a:r>
+              <a:rPr lang="en-US" dirty="0" smtClean="0"/>
+              <a:t>Most DBAs have everything they need to get started in about</a:t>
+            </a:r>
+            <a:r>
+              <a:rPr lang="en-US" baseline="0" dirty="0" smtClean="0"/>
+              <a:t> an hour.</a:t>
+            </a:r>
+            <a:r>
+              <a:rPr lang="en-US" dirty="0" smtClean="0"/>
+              <a:t>  You don't need to buy anything, sign up for anything, or install any operating system binaries.  The installation and</a:t>
+            </a:r>
+            <a:r>
+              <a:rPr lang="en-US" baseline="0" dirty="0" smtClean="0"/>
+              <a:t> administration tasks aren't that different from what you do on a day-to-day basis.</a:t>
+            </a:r>
             <a:endParaRPr lang="en-US" dirty="0"/>
           </a:p>
         </p:txBody>
@@ -1086,7 +1184,7 @@
           <a:p>
             <a:fld id="{72AE7ADF-BF07-437B-AD5B-68C1A8D7189D}" type="slidenum">
               <a:rPr lang="en-US" smtClean="0"/>
-              <a:t>14</a:t>
+              <a:t>13</a:t>
             </a:fld>
             <a:endParaRPr lang="en-US"/>
           </a:p>
@@ -1095,7 +1193,7 @@
     </p:spTree>
     <p:extLst>
       <p:ext uri="{BB962C8B-B14F-4D97-AF65-F5344CB8AC3E}">
-        <p14:creationId xmlns:p14="http://schemas.microsoft.com/office/powerpoint/2010/main" val="2277858703"/>
+        <p14:creationId xmlns:p14="http://schemas.microsoft.com/office/powerpoint/2010/main" val="489585203"/>
       </p:ext>
     </p:extLst>
   </p:cSld>
@@ -1149,6 +1247,90 @@
           <a:bodyPr/>
           <a:lstStyle/>
           <a:p>
+            <a:endParaRPr lang="en-US" dirty="0"/>
+          </a:p>
+        </p:txBody>
+      </p:sp>
+      <p:sp>
+        <p:nvSpPr>
+          <p:cNvPr id="4" name="Slide Number Placeholder 3"/>
+          <p:cNvSpPr>
+            <a:spLocks noGrp="1"/>
+          </p:cNvSpPr>
+          <p:nvPr>
+            <p:ph type="sldNum" sz="quarter" idx="10"/>
+          </p:nvPr>
+        </p:nvSpPr>
+        <p:spPr/>
+        <p:txBody>
+          <a:bodyPr/>
+          <a:lstStyle/>
+          <a:p>
+            <a:fld id="{72AE7ADF-BF07-437B-AD5B-68C1A8D7189D}" type="slidenum">
+              <a:rPr lang="en-US" smtClean="0"/>
+              <a:t>15</a:t>
+            </a:fld>
+            <a:endParaRPr lang="en-US"/>
+          </a:p>
+        </p:txBody>
+      </p:sp>
+    </p:spTree>
+    <p:extLst>
+      <p:ext uri="{BB962C8B-B14F-4D97-AF65-F5344CB8AC3E}">
+        <p14:creationId xmlns:p14="http://schemas.microsoft.com/office/powerpoint/2010/main" val="2277858703"/>
+      </p:ext>
+    </p:extLst>
+  </p:cSld>
+  <p:clrMapOvr>
+    <a:masterClrMapping/>
+  </p:clrMapOvr>
+</p:notes>
+</file>
+
+<file path=ppt/notesSlides/notesSlide14.xml><?xml version="1.0" encoding="utf-8"?>
+<p:notes xmlns:a="http://schemas.openxmlformats.org/drawingml/2006/main" xmlns:r="http://schemas.openxmlformats.org/officeDocument/2006/relationships" xmlns:p="http://schemas.openxmlformats.org/presentationml/2006/main">
+  <p:cSld>
+    <p:spTree>
+      <p:nvGrpSpPr>
+        <p:cNvPr id="1" name=""/>
+        <p:cNvGrpSpPr/>
+        <p:nvPr/>
+      </p:nvGrpSpPr>
+      <p:grpSpPr>
+        <a:xfrm>
+          <a:off x="0" y="0"/>
+          <a:ext cx="0" cy="0"/>
+          <a:chOff x="0" y="0"/>
+          <a:chExt cx="0" cy="0"/>
+        </a:xfrm>
+      </p:grpSpPr>
+      <p:sp>
+        <p:nvSpPr>
+          <p:cNvPr id="2" name="Slide Image Placeholder 1"/>
+          <p:cNvSpPr>
+            <a:spLocks noGrp="1" noRot="1" noChangeAspect="1"/>
+          </p:cNvSpPr>
+          <p:nvPr>
+            <p:ph type="sldImg"/>
+          </p:nvPr>
+        </p:nvSpPr>
+        <p:spPr/>
+      </p:sp>
+      <p:sp>
+        <p:nvSpPr>
+          <p:cNvPr id="3" name="Notes Placeholder 2"/>
+          <p:cNvSpPr>
+            <a:spLocks noGrp="1"/>
+          </p:cNvSpPr>
+          <p:nvPr>
+            <p:ph type="body" idx="1"/>
+          </p:nvPr>
+        </p:nvSpPr>
+        <p:spPr/>
+        <p:txBody>
+          <a:bodyPr/>
+          <a:lstStyle/>
+          <a:p>
             <a:r>
               <a:rPr lang="en-US" dirty="0" smtClean="0"/>
               <a:t>1. Method5 isn't simply faster than the alternatives.</a:t>
@@ -1230,7 +1412,7 @@
           <a:p>
             <a:fld id="{72AE7ADF-BF07-437B-AD5B-68C1A8D7189D}" type="slidenum">
               <a:rPr lang="en-US" smtClean="0"/>
-              <a:t>15</a:t>
+              <a:t>16</a:t>
             </a:fld>
             <a:endParaRPr lang="en-US"/>
           </a:p>
@@ -1379,23 +1561,7 @@
           <a:p>
             <a:r>
               <a:rPr lang="en-US" dirty="0" smtClean="0"/>
-              <a:t>1</a:t>
-            </a:r>
-            <a:r>
-              <a:rPr lang="en-US" dirty="0" smtClean="0"/>
-              <a:t>. </a:t>
-            </a:r>
-            <a:r>
-              <a:rPr lang="en-US" dirty="0" smtClean="0"/>
-              <a:t>DBAs spend </a:t>
-            </a:r>
-            <a:r>
-              <a:rPr lang="en-US" dirty="0" smtClean="0"/>
-              <a:t>too much time fixing the same problems again and again on different databases</a:t>
-            </a:r>
-            <a:r>
-              <a:rPr lang="en-US" dirty="0" smtClean="0"/>
-              <a:t>.  When you find a rare problem they won't spend the time</a:t>
+              <a:t>1. DBAs spend too much time fixing the same problems again and again on different databases.  When you find a rare problem they won't spend the time</a:t>
             </a:r>
             <a:r>
               <a:rPr lang="en-US" baseline="0" dirty="0" smtClean="0"/>
@@ -1406,30 +1572,13 @@
           <a:p>
             <a:r>
               <a:rPr lang="en-US" dirty="0" smtClean="0"/>
-              <a:t>2. You can't </a:t>
-            </a:r>
-            <a:r>
-              <a:rPr lang="en-US" dirty="0" smtClean="0"/>
-              <a:t>perform simple tasks or answer </a:t>
-            </a:r>
-            <a:r>
-              <a:rPr lang="en-US" dirty="0" smtClean="0"/>
-              <a:t>simple questions </a:t>
-            </a:r>
-            <a:r>
-              <a:rPr lang="en-US" dirty="0" smtClean="0"/>
-              <a:t>across all your databases.</a:t>
-            </a:r>
-            <a:endParaRPr lang="en-US" dirty="0" smtClean="0"/>
-          </a:p>
-          <a:p>
-            <a:r>
-              <a:rPr lang="en-US" dirty="0" smtClean="0"/>
-              <a:t>3. You have tools to automate common, predefined tasks like cloning, installing, patching, and deployments</a:t>
-            </a:r>
-            <a:r>
-              <a:rPr lang="en-US" dirty="0" smtClean="0"/>
-              <a:t>.  But</a:t>
+              <a:t>2. You can't perform simple tasks or answer simple questions across all your databases.</a:t>
+            </a:r>
+          </a:p>
+          <a:p>
+            <a:r>
+              <a:rPr lang="en-US" dirty="0" smtClean="0"/>
+              <a:t>3. You have tools to automate common, predefined tasks like cloning, installing, patching, and deployments.  But</a:t>
             </a:r>
             <a:r>
               <a:rPr lang="en-US" baseline="0" dirty="0" smtClean="0"/>
@@ -1440,35 +1589,14 @@
           <a:p>
             <a:r>
               <a:rPr lang="en-US" dirty="0" smtClean="0"/>
-              <a:t>4. </a:t>
-            </a:r>
-            <a:r>
-              <a:rPr lang="en-US" dirty="0" smtClean="0"/>
-              <a:t>Your environment has unique challenges.  How do you automate the "other" problems that take up so much time?</a:t>
-            </a:r>
-          </a:p>
-          <a:p>
-            <a:r>
-              <a:rPr lang="en-US" dirty="0" smtClean="0"/>
-              <a:t>5</a:t>
-            </a:r>
-            <a:r>
-              <a:rPr lang="en-US" dirty="0" smtClean="0"/>
-              <a:t>. SQL, PL/SQL, and the relational model help solve many of these problems, but they are stuck inside a single </a:t>
-            </a:r>
-            <a:r>
-              <a:rPr lang="en-US" dirty="0" smtClean="0"/>
-              <a:t>database.  Why </a:t>
-            </a:r>
-            <a:r>
-              <a:rPr lang="en-US" dirty="0" smtClean="0"/>
-              <a:t>can't you treat all of your databases as a single </a:t>
-            </a:r>
-            <a:r>
-              <a:rPr lang="en-US" dirty="0" smtClean="0"/>
-              <a:t>entity?</a:t>
-            </a:r>
-            <a:endParaRPr lang="en-US" dirty="0" smtClean="0"/>
+              <a:t>4. Your environment has unique challenges.  How do you automate the "other" problems that take up so much time?</a:t>
+            </a:r>
+          </a:p>
+          <a:p>
+            <a:r>
+              <a:rPr lang="en-US" dirty="0" smtClean="0"/>
+              <a:t>5. SQL, PL/SQL, and the relational model help solve many of these problems, but they are stuck inside a single database.  Why can't you treat all of your databases as a single entity?</a:t>
+            </a:r>
           </a:p>
         </p:txBody>
       </p:sp>
@@ -1568,15 +1696,7 @@
           <a:p>
             <a:r>
               <a:rPr lang="en-US" dirty="0" smtClean="0"/>
-              <a:t>1</a:t>
-            </a:r>
-            <a:r>
-              <a:rPr lang="en-US" dirty="0" smtClean="0"/>
-              <a:t>. Existing tools and processes are not nearly good enough to transform the way you work</a:t>
-            </a:r>
-            <a:r>
-              <a:rPr lang="en-US" dirty="0" smtClean="0"/>
-              <a:t>. If you don't use these automation tools multiple times a day then they have failed to significantly help your organization.  Programs like </a:t>
+              <a:t>1. Existing tools and processes are not nearly good enough to transform the way you work. If you don't use these automation tools multiple times a day then they have failed to significantly help your organization.  Programs like </a:t>
             </a:r>
             <a:r>
               <a:rPr lang="en-US" dirty="0" err="1" smtClean="0"/>
@@ -1601,11 +1721,7 @@
           <a:p>
             <a:r>
               <a:rPr lang="en-US" dirty="0" smtClean="0"/>
-              <a:t>3. </a:t>
-            </a:r>
-            <a:r>
-              <a:rPr lang="en-US" dirty="0" smtClean="0"/>
-              <a:t>We don't need more IDEs, plugins, websites, and agents. Good DBAs and developers will not give up their favorite IDE; you'll</a:t>
+              <a:t>3. We don't need more IDEs, plugins, websites, and agents. Good DBAs and developers will not give up their favorite IDE; you'll</a:t>
             </a:r>
             <a:r>
               <a:rPr lang="en-US" baseline="0" dirty="0" smtClean="0"/>
@@ -1640,11 +1756,7 @@
           <a:p>
             <a:r>
               <a:rPr lang="en-US" dirty="0" smtClean="0"/>
-              <a:t>5. </a:t>
-            </a:r>
-            <a:r>
-              <a:rPr lang="en-US" dirty="0" smtClean="0"/>
-              <a:t>Most importantly, none of</a:t>
+              <a:t>5. Most importantly, none of</a:t>
             </a:r>
             <a:r>
               <a:rPr lang="en-US" baseline="0" dirty="0" smtClean="0"/>
@@ -1785,49 +1897,8 @@
             </a:pPr>
             <a:r>
               <a:rPr lang="en-US" dirty="0" smtClean="0"/>
-              <a:t>2.  Dynamic </a:t>
-            </a:r>
-            <a:r>
-              <a:rPr lang="en-US" dirty="0" smtClean="0"/>
-              <a:t>SQL is sometimes classified as Method 1, 2, 3, or </a:t>
-            </a:r>
-            <a:r>
-              <a:rPr lang="en-US" dirty="0" smtClean="0"/>
-              <a:t>4.  Method </a:t>
-            </a:r>
-            <a:r>
-              <a:rPr lang="en-US" dirty="0" smtClean="0"/>
-              <a:t>1 is static, and Method 4 is so dynamic that even the select list is a </a:t>
-            </a:r>
-            <a:r>
-              <a:rPr lang="en-US" dirty="0" smtClean="0"/>
-              <a:t>variable.  You need </a:t>
-            </a:r>
-            <a:r>
-              <a:rPr lang="en-US" dirty="0" smtClean="0"/>
-              <a:t>a new type of dynamic SQL, a Method 5, where even the location is a </a:t>
-            </a:r>
-            <a:r>
-              <a:rPr lang="en-US" dirty="0" smtClean="0"/>
-              <a:t>variable.  This </a:t>
-            </a:r>
-            <a:r>
-              <a:rPr lang="en-US" dirty="0" smtClean="0"/>
-              <a:t>allows </a:t>
-            </a:r>
-            <a:r>
-              <a:rPr lang="en-US" dirty="0" smtClean="0"/>
-              <a:t>you to </a:t>
-            </a:r>
-            <a:r>
-              <a:rPr lang="en-US" dirty="0" smtClean="0"/>
-              <a:t>programmatically control both what to run and where to run it</a:t>
-            </a:r>
-            <a:r>
-              <a:rPr lang="en-US" dirty="0" smtClean="0"/>
-              <a:t>. It should run anywhere SQL can run and should not require anything other than an Oracle database.</a:t>
-            </a:r>
-            <a:endParaRPr lang="en-US" dirty="0" smtClean="0"/>
+              <a:t>2.  Dynamic SQL is sometimes classified as Method 1, 2, 3, or 4.  Method 1 is static, and Method 4 is so dynamic that even the select list is a variable.  You need a new type of dynamic SQL, a Method 5, where even the location is a variable.  This allows you to programmatically control both what to run and where to run it. It should run anywhere SQL can run and should not require anything other than an Oracle database.</a:t>
+            </a:r>
           </a:p>
           <a:p>
             <a:pPr marL="0" marR="0" indent="0" algn="l" defTabSz="914400" rtl="0" eaLnBrk="1" fontAlgn="auto" latinLnBrk="0" hangingPunct="1">
@@ -1946,50 +2017,13 @@
           <a:p>
             <a:r>
               <a:rPr lang="en-US" dirty="0" smtClean="0"/>
-              <a:t>1</a:t>
-            </a:r>
-            <a:r>
-              <a:rPr lang="en-US" dirty="0" smtClean="0"/>
-              <a:t>. </a:t>
-            </a:r>
-            <a:r>
-              <a:rPr lang="en-US" dirty="0" smtClean="0"/>
-              <a:t>You've probably seen this problem </a:t>
-            </a:r>
-            <a:r>
-              <a:rPr lang="en-US" dirty="0" smtClean="0"/>
-              <a:t>solved poorly many times before, you </a:t>
-            </a:r>
-            <a:r>
-              <a:rPr lang="en-US" dirty="0" smtClean="0"/>
-              <a:t>should be </a:t>
-            </a:r>
-            <a:r>
-              <a:rPr lang="en-US" dirty="0" smtClean="0"/>
-              <a:t>skeptical</a:t>
-            </a:r>
-            <a:r>
-              <a:rPr lang="en-US" dirty="0" smtClean="0"/>
-              <a:t>.  There are a lot of horrible ways to do this.</a:t>
-            </a:r>
-            <a:endParaRPr lang="en-US" dirty="0" smtClean="0"/>
-          </a:p>
-          <a:p>
-            <a:r>
-              <a:rPr lang="en-US" dirty="0" smtClean="0"/>
-              <a:t>2. </a:t>
-            </a:r>
-            <a:r>
-              <a:rPr lang="en-US" dirty="0" smtClean="0"/>
-              <a:t>Method5 has been </a:t>
-            </a:r>
-            <a:r>
-              <a:rPr lang="en-US" dirty="0" smtClean="0"/>
-              <a:t>used in production for 2 years to help manage the largest healthcare data center in the </a:t>
-            </a:r>
-            <a:r>
-              <a:rPr lang="en-US" dirty="0" smtClean="0"/>
-              <a:t>world.</a:t>
+              <a:t>1. You've probably seen this problem solved poorly many times before, you should be skeptical.  There are a lot of horrible ways to do this.</a:t>
+            </a:r>
+          </a:p>
+          <a:p>
+            <a:r>
+              <a:rPr lang="en-US" dirty="0" smtClean="0"/>
+              <a:t>2. Method5 has been used in production for 2 years to help manage the largest healthcare data center in the world.</a:t>
             </a:r>
           </a:p>
           <a:p>
@@ -2005,42 +2039,17 @@
               <a:rPr lang="en-US" dirty="0" smtClean="0"/>
               <a:t>We frequently run it against hundreds of databases with over a petabyte of SAN.</a:t>
             </a:r>
-            <a:endParaRPr lang="en-US" dirty="0" smtClean="0"/>
-          </a:p>
-          <a:p>
-            <a:r>
-              <a:rPr lang="en-US" dirty="0" smtClean="0"/>
-              <a:t>4. </a:t>
-            </a:r>
-            <a:r>
-              <a:rPr lang="en-US" dirty="0" smtClean="0"/>
-              <a:t>It's </a:t>
-            </a:r>
-            <a:r>
-              <a:rPr lang="en-US" dirty="0" smtClean="0"/>
-              <a:t>ran over 8 </a:t>
-            </a:r>
-            <a:r>
-              <a:rPr lang="en-US" dirty="0" smtClean="0"/>
-              <a:t>million queries internally</a:t>
-            </a:r>
-            <a:r>
-              <a:rPr lang="en-US" dirty="0" smtClean="0"/>
-              <a:t>.  It contains 1800 automated tests.</a:t>
-            </a:r>
-          </a:p>
-          <a:p>
-            <a:r>
-              <a:rPr lang="en-US" dirty="0" smtClean="0"/>
-              <a:t>5. </a:t>
-            </a:r>
-            <a:r>
-              <a:rPr lang="en-US" dirty="0" smtClean="0"/>
-              <a:t>Security has always been a primary concern</a:t>
-            </a:r>
-            <a:r>
-              <a:rPr lang="en-US" dirty="0" smtClean="0"/>
-              <a:t>.  We've</a:t>
+          </a:p>
+          <a:p>
+            <a:r>
+              <a:rPr lang="en-US" dirty="0" smtClean="0"/>
+              <a:t>4. It's ran over 8 million queries internally.  It contains 1800 automated tests.</a:t>
+            </a:r>
+          </a:p>
+          <a:p>
+            <a:r>
+              <a:rPr lang="en-US" dirty="0" smtClean="0"/>
+              <a:t>5. Security has always been a primary concern.  We've</a:t>
             </a:r>
             <a:r>
               <a:rPr lang="en-US" baseline="0" dirty="0" smtClean="0"/>
@@ -2048,11 +2057,7 @@
             </a:r>
             <a:r>
               <a:rPr lang="en-US" dirty="0" smtClean="0"/>
-              <a:t>All </a:t>
-            </a:r>
-            <a:r>
-              <a:rPr lang="en-US" dirty="0" smtClean="0"/>
-              <a:t>the code is online, you can look at it yourself.</a:t>
+              <a:t>All the code is online, you can look at it yourself.</a:t>
             </a:r>
           </a:p>
           <a:p>
@@ -2145,80 +2150,51 @@
           <a:p>
             <a:r>
               <a:rPr lang="en-US" b="0" dirty="0" smtClean="0"/>
-              <a:t>Most</a:t>
+              <a:t>Method5</a:t>
             </a:r>
             <a:r>
               <a:rPr lang="en-US" b="0" baseline="0" dirty="0" smtClean="0"/>
-              <a:t> of the features of Method5 happen in the background and aren't obvious at first.</a:t>
-            </a:r>
-          </a:p>
-          <a:p>
-            <a:r>
-              <a:rPr lang="en-US" b="1" dirty="0" smtClean="0"/>
-              <a:t>1. Performance -</a:t>
-            </a:r>
-            <a:r>
-              <a:rPr lang="en-US" dirty="0" smtClean="0"/>
-              <a:t> Asynchronous processing and parallelism make Method5 more responsive and orders of magnitude faster than other tools.</a:t>
-            </a:r>
-          </a:p>
-          <a:p>
-            <a:r>
-              <a:rPr lang="en-US" b="1" dirty="0" smtClean="0"/>
-              <a:t>2. Simple interface -</a:t>
-            </a:r>
-            <a:r>
-              <a:rPr lang="en-US" dirty="0" smtClean="0"/>
-              <a:t> The PL/SQL API makes it easy to create and automate tasks. No need to learn a new GUI or IDE, Method5 seamlessly integrates with your existing tools.</a:t>
-            </a:r>
-          </a:p>
-          <a:p>
-            <a:r>
-              <a:rPr lang="en-US" b="1" dirty="0" smtClean="0"/>
-              <a:t>3.</a:t>
+              <a:t> can be run as either a function or a procedure.  Both of them let you specify </a:t>
             </a:r>
             <a:r>
               <a:rPr lang="en-US" b="1" baseline="0" dirty="0" smtClean="0"/>
-              <a:t> </a:t>
-            </a:r>
-            <a:r>
-              <a:rPr lang="en-US" b="1" dirty="0" smtClean="0"/>
-              <a:t>Relational storage -</a:t>
-            </a:r>
-            <a:r>
-              <a:rPr lang="en-US" dirty="0" smtClean="0"/>
-              <a:t> Everything about the database is stored in the database, making it easier to analyze, save, and share results.</a:t>
-            </a:r>
-          </a:p>
-          <a:p>
-            <a:r>
-              <a:rPr lang="en-US" b="1" dirty="0" smtClean="0"/>
-              <a:t>4. Easy administration -</a:t>
-            </a:r>
-            <a:r>
-              <a:rPr lang="en-US" dirty="0" smtClean="0"/>
-              <a:t> Method5 is agentless. Free and open source software only needs to be installed on one central management database. Users do not need to install custom software, manage connections, or modify configuration files. One administrator can configure Method5 and that configuration automatically applies to all users.</a:t>
-            </a:r>
-          </a:p>
-          <a:p>
-            <a:r>
-              <a:rPr lang="en-US" b="1" dirty="0" smtClean="0"/>
-              <a:t>5. Security -</a:t>
-            </a:r>
-            <a:r>
-              <a:rPr lang="en-US" dirty="0" smtClean="0"/>
-              <a:t> Method5 has been thoroughly hardened to avoid the typical security problems with multi-database tools. For example, there are no public database links or shared passwords. See the Security section in the user guide for details.</a:t>
-            </a:r>
-          </a:p>
-          <a:p>
-            <a:r>
-              <a:rPr lang="en-US" b="1" dirty="0" smtClean="0"/>
-              <a:t>6. Exception handling and metadata -</a:t>
-            </a:r>
-            <a:r>
-              <a:rPr lang="en-US" dirty="0" smtClean="0"/>
-              <a:t> Exceptions and metadata are stored in tables and do not stop other targets from processing. Hung jobs are automatically stopped based on a timeout parameter. Handling these rare problems lets you easily scale your queries to hundreds of databases.</a:t>
-            </a:r>
+              <a:t>what</a:t>
+            </a:r>
+            <a:r>
+              <a:rPr lang="en-US" b="0" baseline="0" dirty="0" smtClean="0"/>
+              <a:t> to run and </a:t>
+            </a:r>
+            <a:r>
+              <a:rPr lang="en-US" b="1" baseline="0" dirty="0" smtClean="0"/>
+              <a:t>where</a:t>
+            </a:r>
+            <a:r>
+              <a:rPr lang="en-US" b="0" baseline="0" dirty="0" smtClean="0"/>
+              <a:t> to run it.  The procedure also allows you to specify </a:t>
+            </a:r>
+            <a:r>
+              <a:rPr lang="en-US" b="1" baseline="0" dirty="0" smtClean="0"/>
+              <a:t>how</a:t>
+            </a:r>
+            <a:r>
+              <a:rPr lang="en-US" b="0" baseline="0" dirty="0" smtClean="0"/>
+              <a:t> to run it.</a:t>
+            </a:r>
+            <a:endParaRPr lang="en-US" b="0" dirty="0" smtClean="0"/>
+          </a:p>
+          <a:p>
+            <a:endParaRPr lang="en-US" b="1" dirty="0" smtClean="0"/>
+          </a:p>
+          <a:p>
+            <a:r>
+              <a:rPr lang="en-US" dirty="0" smtClean="0"/>
+              <a:t>Running as a function is simple and neat,</a:t>
+            </a:r>
+            <a:r>
+              <a:rPr lang="en-US" baseline="0" dirty="0" smtClean="0"/>
+              <a:t> but in practice advanced users will normally want to run things as a procedure.  Running as a procedure makes it asynchronous, which is good for large jobs you don't want to wait for.  It also makes it possible to schedule and chain tasks.</a:t>
+            </a:r>
+            <a:endParaRPr lang="en-US" dirty="0"/>
           </a:p>
         </p:txBody>
       </p:sp>
@@ -2248,7 +2224,7 @@
     </p:spTree>
     <p:extLst>
       <p:ext uri="{BB962C8B-B14F-4D97-AF65-F5344CB8AC3E}">
-        <p14:creationId xmlns:p14="http://schemas.microsoft.com/office/powerpoint/2010/main" val="1909579223"/>
+        <p14:creationId xmlns:p14="http://schemas.microsoft.com/office/powerpoint/2010/main" val="3520608180"/>
       </p:ext>
     </p:extLst>
   </p:cSld>
@@ -2303,62 +2279,80 @@
           <a:lstStyle/>
           <a:p>
             <a:r>
+              <a:rPr lang="en-US" b="0" dirty="0" smtClean="0"/>
+              <a:t>Most</a:t>
+            </a:r>
+            <a:r>
+              <a:rPr lang="en-US" b="0" baseline="0" dirty="0" smtClean="0"/>
+              <a:t> of the features of Method5 happen in the background and aren't obvious at first.</a:t>
+            </a:r>
+          </a:p>
+          <a:p>
+            <a:r>
               <a:rPr lang="en-US" b="1" dirty="0" smtClean="0"/>
-              <a:t>1. P_CODE (required) -</a:t>
-            </a:r>
-            <a:r>
-              <a:rPr lang="en-US" dirty="0" smtClean="0"/>
-              <a:t> Any SQL or PL/SQL statement.  The</a:t>
-            </a:r>
-            <a:r>
-              <a:rPr lang="en-US" baseline="0" dirty="0" smtClean="0"/>
-              <a:t> results can be either the query results, a SQL*Plus feedback message for DDL and DML, or DBMS_OUTPUT for PL/SQL statements.</a:t>
-            </a:r>
-            <a:endParaRPr lang="en-US" dirty="0" smtClean="0"/>
+              <a:t>1. Performance -</a:t>
+            </a:r>
+            <a:r>
+              <a:rPr lang="en-US" dirty="0" smtClean="0"/>
+              <a:t> Asynchronous processing and parallelism make Method5 more responsive and orders of magnitude faster than other tools.</a:t>
+            </a:r>
           </a:p>
           <a:p>
             <a:r>
               <a:rPr lang="en-US" b="1" dirty="0" smtClean="0"/>
-              <a:t>2. P_TARGETS (optional, defaults to all databases) -</a:t>
-            </a:r>
-            <a:r>
-              <a:rPr lang="en-US" dirty="0" smtClean="0"/>
-              <a:t> Can be either a comma-separated list (of database names, hosts, lifecycles, lines of business, or cluster names) or a query that returns target names.  The</a:t>
-            </a:r>
-            <a:r>
-              <a:rPr lang="en-US" baseline="0" dirty="0" smtClean="0"/>
-              <a:t> names can also include wild-cards.  You can configure Target Groups for commonly-used queries.</a:t>
-            </a:r>
-            <a:endParaRPr lang="en-US" dirty="0" smtClean="0"/>
+              <a:t>2. Simple interface -</a:t>
+            </a:r>
+            <a:r>
+              <a:rPr lang="en-US" dirty="0" smtClean="0"/>
+              <a:t> The PL/SQL API makes it easy to create and automate tasks. No need to learn a new GUI or IDE, Method5 seamlessly integrates with your existing tools.</a:t>
+            </a:r>
           </a:p>
           <a:p>
             <a:r>
               <a:rPr lang="en-US" b="1" dirty="0" smtClean="0"/>
-              <a:t>3. P_TABLE_NAME (optional, defaults to auto-generated name) -</a:t>
-            </a:r>
-            <a:r>
-              <a:rPr lang="en-US" dirty="0" smtClean="0"/>
-              <a:t> The base name for the results, _META, and _ERR tables.</a:t>
-            </a:r>
-          </a:p>
-          <a:p>
+              <a:t>3.</a:t>
+            </a:r>
+            <a:r>
+              <a:rPr lang="en-US" b="1" baseline="0" dirty="0" smtClean="0"/>
+              <a:t> </a:t>
+            </a:r>
             <a:r>
               <a:rPr lang="en-US" b="1" dirty="0" smtClean="0"/>
-              <a:t>4. P_TABLE_EXISTS_ACTION (optional, defaults to ERROR) -</a:t>
-            </a:r>
-            <a:r>
-              <a:rPr lang="en-US" dirty="0" smtClean="0"/>
-              <a:t> One of ERROR, APPEND, DELETE, or DROP.</a:t>
+              <a:t>Relational storage -</a:t>
+            </a:r>
+            <a:r>
+              <a:rPr lang="en-US" dirty="0" smtClean="0"/>
+              <a:t> Everything about the database is stored in the database, making it easier to analyze, save, and share results.</a:t>
             </a:r>
           </a:p>
           <a:p>
             <a:r>
               <a:rPr lang="en-US" b="1" dirty="0" smtClean="0"/>
-              <a:t>5. P_ASYNCHRONOUS (optional, defaults to TRUE) -</a:t>
-            </a:r>
-            <a:r>
-              <a:rPr lang="en-US" dirty="0" smtClean="0"/>
-              <a:t> Return right away or wait for all results.</a:t>
+              <a:t>4. Easy administration -</a:t>
+            </a:r>
+            <a:r>
+              <a:rPr lang="en-US" dirty="0" smtClean="0"/>
+              <a:t> Method5 is agentless. Free and open source software only needs to be installed on one central management database. Users do not need to install custom software, manage connections, or modify configuration files. One administrator can configure Method5 and that configuration automatically applies to all users.</a:t>
+            </a:r>
+          </a:p>
+          <a:p>
+            <a:r>
+              <a:rPr lang="en-US" b="1" dirty="0" smtClean="0"/>
+              <a:t>5. Security -</a:t>
+            </a:r>
+            <a:r>
+              <a:rPr lang="en-US" dirty="0" smtClean="0"/>
+              <a:t> Method5 has been thoroughly hardened to avoid the typical security problems with multi-database tools. For example, there are no public database links or shared passwords. See the Security section in the user guide for details.</a:t>
+            </a:r>
+          </a:p>
+          <a:p>
+            <a:r>
+              <a:rPr lang="en-US" b="1" dirty="0" smtClean="0"/>
+              <a:t>6. Exception handling and metadata -</a:t>
+            </a:r>
+            <a:r>
+              <a:rPr lang="en-US" dirty="0" smtClean="0"/>
+              <a:t> Exceptions and metadata are stored in tables and do not stop other targets from processing. Hung jobs are automatically stopped based on a timeout parameter. Handling these rare problems lets you easily scale your queries to hundreds of databases.</a:t>
             </a:r>
           </a:p>
         </p:txBody>
@@ -2389,7 +2383,7 @@
     </p:spTree>
     <p:extLst>
       <p:ext uri="{BB962C8B-B14F-4D97-AF65-F5344CB8AC3E}">
-        <p14:creationId xmlns:p14="http://schemas.microsoft.com/office/powerpoint/2010/main" val="316232668"/>
+        <p14:creationId xmlns:p14="http://schemas.microsoft.com/office/powerpoint/2010/main" val="1909579223"/>
       </p:ext>
     </p:extLst>
   </p:cSld>
@@ -2443,102 +2437,64 @@
           <a:bodyPr/>
           <a:lstStyle/>
           <a:p>
-            <a:pPr marL="0" indent="0">
-              <a:buNone/>
-            </a:pPr>
             <a:r>
               <a:rPr lang="en-US" b="1" dirty="0" smtClean="0"/>
-              <a:t>1. Procedure -</a:t>
-            </a:r>
-            <a:r>
-              <a:rPr lang="en-US" dirty="0" smtClean="0"/>
-              <a:t> Running as a function is simple and neat,</a:t>
+              <a:t>1. P_CODE (required) -</a:t>
+            </a:r>
+            <a:r>
+              <a:rPr lang="en-US" dirty="0" smtClean="0"/>
+              <a:t> Any SQL or PL/SQL statement.  The</a:t>
             </a:r>
             <a:r>
               <a:rPr lang="en-US" baseline="0" dirty="0" smtClean="0"/>
-              <a:t> but in practice advanced users will normally want to run things as a procedure.  Running as a procedure makes it asynchronous, which is good for large jobs you don't want to wait for.  It also makes it possible to schedule and chain tasks.</a:t>
+              <a:t> results can be either the query results, a SQL*Plus feedback message for DDL and DML, or DBMS_OUTPUT for PL/SQL statements.</a:t>
             </a:r>
             <a:endParaRPr lang="en-US" dirty="0" smtClean="0"/>
           </a:p>
           <a:p>
-            <a:pPr marL="0" indent="0">
-              <a:buNone/>
-            </a:pPr>
             <a:r>
               <a:rPr lang="en-US" b="1" dirty="0" smtClean="0"/>
-              <a:t>2. Tables -</a:t>
-            </a:r>
-            <a:r>
-              <a:rPr lang="en-US" dirty="0" smtClean="0"/>
-              <a:t> Every execution</a:t>
+              <a:t>2. P_TARGETS (optional, defaults to all databases) -</a:t>
+            </a:r>
+            <a:r>
+              <a:rPr lang="en-US" dirty="0" smtClean="0"/>
+              <a:t> Can be either a comma-separated list (of database names, hosts, lifecycles, lines of business, or cluster names) or a query that returns target names.  The</a:t>
             </a:r>
             <a:r>
               <a:rPr lang="en-US" baseline="0" dirty="0" smtClean="0"/>
-              <a:t> automatically generates three tables.  The tables are given default names if none are specified.  The tables contain the data, the metadata, and the errors.</a:t>
+              <a:t> names can also include wild-cards.  You can configure Target Groups for commonly-used queries.</a:t>
             </a:r>
             <a:endParaRPr lang="en-US" dirty="0" smtClean="0"/>
           </a:p>
           <a:p>
-            <a:pPr marL="0" indent="0">
-              <a:buNone/>
-            </a:pPr>
             <a:r>
               <a:rPr lang="en-US" b="1" dirty="0" smtClean="0"/>
-              <a:t>3. Views -</a:t>
-            </a:r>
-            <a:r>
-              <a:rPr lang="en-US" dirty="0" smtClean="0"/>
-              <a:t> Since you may not know or remember the table names used, three</a:t>
-            </a:r>
-            <a:r>
-              <a:rPr lang="en-US" baseline="0" dirty="0" smtClean="0"/>
-              <a:t> views are created in your schema.  These views always reference the last run.  They are M5_RESULTS, M5_METADATA, and M5_ERRORS.</a:t>
-            </a:r>
-            <a:endParaRPr lang="en-US" dirty="0" smtClean="0"/>
-          </a:p>
-          <a:p>
-            <a:pPr marL="0" indent="0">
-              <a:buNone/>
-            </a:pPr>
+              <a:t>3. P_TABLE_NAME (optional, defaults to auto-generated name) -</a:t>
+            </a:r>
+            <a:r>
+              <a:rPr lang="en-US" dirty="0" smtClean="0"/>
+              <a:t> The base name for the results, _META, and _ERR tables.</a:t>
+            </a:r>
+          </a:p>
+          <a:p>
             <a:r>
               <a:rPr lang="en-US" b="1" dirty="0" smtClean="0"/>
-              <a:t>4.</a:t>
-            </a:r>
-            <a:r>
-              <a:rPr lang="en-US" b="1" baseline="0" dirty="0" smtClean="0"/>
-              <a:t> M5_ links - </a:t>
-            </a:r>
-            <a:r>
-              <a:rPr lang="en-US" baseline="0" dirty="0" smtClean="0"/>
-              <a:t>Database links are automatically copied and synchronized to your schema.  This can be useful for many ad hoc tasks.  Simply use @M5_$DBNAME in queries or through DBMS_UTILTY.EXECUTE_DDL_STATEMENT.</a:t>
-            </a:r>
-          </a:p>
-          <a:p>
-            <a:pPr marL="0" indent="0">
-              <a:buNone/>
-            </a:pPr>
-            <a:r>
-              <a:rPr lang="en-US" b="1" baseline="0" dirty="0" smtClean="0"/>
-              <a:t>5. Global Data Dictionary - </a:t>
-            </a:r>
-            <a:r>
-              <a:rPr lang="en-US" baseline="0" dirty="0" smtClean="0"/>
-              <a:t>Every night Method5 gathers some common data into tables such as M5_DBA_TABLES, M5_USER$, M5_DBA_ROLE_PRIVS, M5_DBA_SYS_PRIVS, and M5_DBA_TAB_PRIVS.  Having this data instantly available makes some tasks much simpler, such as finding out where a user exists, or where an object is granted.</a:t>
-            </a:r>
-          </a:p>
-          <a:p>
-            <a:pPr marL="0" indent="0">
-              <a:buNone/>
-            </a:pPr>
-            <a:r>
-              <a:rPr lang="en-US" b="1" baseline="0" dirty="0" smtClean="0"/>
-              <a:t>6. Limits - </a:t>
-            </a:r>
-            <a:r>
-              <a:rPr lang="en-US" baseline="0" dirty="0" smtClean="0"/>
-              <a:t>Method5 currently only runs SQL and PL/SQL statements.  It does not (yet) run operating system commands or SQL*Plus scripts.  It also (currently) only runs as DBA so you cannot perform tasks as SYSDBA.</a:t>
-            </a:r>
-            <a:endParaRPr lang="en-US" dirty="0"/>
+              <a:t>4. P_TABLE_EXISTS_ACTION (optional, defaults to ERROR) -</a:t>
+            </a:r>
+            <a:r>
+              <a:rPr lang="en-US" dirty="0" smtClean="0"/>
+              <a:t> One of ERROR, APPEND, DELETE, or DROP.</a:t>
+            </a:r>
+          </a:p>
+          <a:p>
+            <a:r>
+              <a:rPr lang="en-US" b="1" dirty="0" smtClean="0"/>
+              <a:t>5. P_ASYNCHRONOUS (optional, defaults to TRUE) -</a:t>
+            </a:r>
+            <a:r>
+              <a:rPr lang="en-US" dirty="0" smtClean="0"/>
+              <a:t> Return right away or wait for all results.</a:t>
+            </a:r>
           </a:p>
         </p:txBody>
       </p:sp>
@@ -2568,7 +2524,7 @@
     </p:spTree>
     <p:extLst>
       <p:ext uri="{BB962C8B-B14F-4D97-AF65-F5344CB8AC3E}">
-        <p14:creationId xmlns:p14="http://schemas.microsoft.com/office/powerpoint/2010/main" val="2408283472"/>
+        <p14:creationId xmlns:p14="http://schemas.microsoft.com/office/powerpoint/2010/main" val="316232668"/>
       </p:ext>
     </p:extLst>
   </p:cSld>
@@ -2759,7 +2715,7 @@
           <a:p>
             <a:fld id="{72057647-82FE-4F7C-83B4-53587791251A}" type="datetime1">
               <a:rPr lang="en-US" smtClean="0"/>
-              <a:t>2017-01-08</a:t>
+              <a:t>2017-01-12</a:t>
             </a:fld>
             <a:endParaRPr lang="en-US"/>
           </a:p>
@@ -2929,7 +2885,7 @@
           <a:p>
             <a:fld id="{8503FF21-708F-4C59-9505-D05A3791AC31}" type="datetime1">
               <a:rPr lang="en-US" smtClean="0"/>
-              <a:t>2017-01-08</a:t>
+              <a:t>2017-01-12</a:t>
             </a:fld>
             <a:endParaRPr lang="en-US"/>
           </a:p>
@@ -3109,7 +3065,7 @@
           <a:p>
             <a:fld id="{6EFC7DE3-7050-4999-ABCB-76E0E214913C}" type="datetime1">
               <a:rPr lang="en-US" smtClean="0"/>
-              <a:t>2017-01-08</a:t>
+              <a:t>2017-01-12</a:t>
             </a:fld>
             <a:endParaRPr lang="en-US"/>
           </a:p>
@@ -3279,7 +3235,7 @@
           <a:p>
             <a:fld id="{12698F6C-3B60-45A8-AA68-1C639B61BEFF}" type="datetime1">
               <a:rPr lang="en-US" smtClean="0"/>
-              <a:t>2017-01-08</a:t>
+              <a:t>2017-01-12</a:t>
             </a:fld>
             <a:endParaRPr lang="en-US" dirty="0"/>
           </a:p>
@@ -3555,7 +3511,7 @@
           <a:p>
             <a:fld id="{E05176C0-14DF-4768-8A16-43F22EF34937}" type="datetime1">
               <a:rPr lang="en-US" smtClean="0"/>
-              <a:t>2017-01-08</a:t>
+              <a:t>2017-01-12</a:t>
             </a:fld>
             <a:endParaRPr lang="en-US"/>
           </a:p>
@@ -3843,7 +3799,7 @@
           <a:p>
             <a:fld id="{EC27D113-D56C-4484-8E60-26B1BDDD2B7D}" type="datetime1">
               <a:rPr lang="en-US" smtClean="0"/>
-              <a:t>2017-01-08</a:t>
+              <a:t>2017-01-12</a:t>
             </a:fld>
             <a:endParaRPr lang="en-US"/>
           </a:p>
@@ -4265,7 +4221,7 @@
           <a:p>
             <a:fld id="{2346BE7D-CDCE-4B6B-92C3-A6060BB37F63}" type="datetime1">
               <a:rPr lang="en-US" smtClean="0"/>
-              <a:t>2017-01-08</a:t>
+              <a:t>2017-01-12</a:t>
             </a:fld>
             <a:endParaRPr lang="en-US"/>
           </a:p>
@@ -4383,7 +4339,7 @@
           <a:p>
             <a:fld id="{016112C5-3C0F-4913-A601-B7FE4F9C1F3A}" type="datetime1">
               <a:rPr lang="en-US" smtClean="0"/>
-              <a:t>2017-01-08</a:t>
+              <a:t>2017-01-12</a:t>
             </a:fld>
             <a:endParaRPr lang="en-US"/>
           </a:p>
@@ -4478,7 +4434,7 @@
           <a:p>
             <a:fld id="{8A5D4DBD-AFC0-4CD6-8B21-21C10C0D7EF6}" type="datetime1">
               <a:rPr lang="en-US" smtClean="0"/>
-              <a:t>2017-01-08</a:t>
+              <a:t>2017-01-12</a:t>
             </a:fld>
             <a:endParaRPr lang="en-US"/>
           </a:p>
@@ -4755,7 +4711,7 @@
           <a:p>
             <a:fld id="{3514C57E-D885-4B44-9FAF-8838A1BDE694}" type="datetime1">
               <a:rPr lang="en-US" smtClean="0"/>
-              <a:t>2017-01-08</a:t>
+              <a:t>2017-01-12</a:t>
             </a:fld>
             <a:endParaRPr lang="en-US"/>
           </a:p>
@@ -5008,7 +4964,7 @@
           <a:p>
             <a:fld id="{7BEDB21A-AE09-4B41-95A5-CA952A205099}" type="datetime1">
               <a:rPr lang="en-US" smtClean="0"/>
-              <a:t>2017-01-08</a:t>
+              <a:t>2017-01-12</a:t>
             </a:fld>
             <a:endParaRPr lang="en-US"/>
           </a:p>
@@ -5221,7 +5177,7 @@
           <a:p>
             <a:fld id="{2089B313-BB57-4BA5-B615-3D449DFED662}" type="datetime1">
               <a:rPr lang="en-US" smtClean="0"/>
-              <a:t>2017-01-08</a:t>
+              <a:t>2017-01-12</a:t>
             </a:fld>
             <a:endParaRPr lang="en-US" dirty="0"/>
           </a:p>
@@ -5639,7 +5595,7 @@
           <a:p>
             <a:fld id="{2E45DCD3-F6D5-47D1-A091-AE329ABC5543}" type="datetime1">
               <a:rPr lang="en-US" smtClean="0"/>
-              <a:t>2017-01-08</a:t>
+              <a:t>2017-01-12</a:t>
             </a:fld>
             <a:endParaRPr lang="en-US" dirty="0"/>
           </a:p>
@@ -5763,7 +5719,7 @@
           <a:p>
             <a:r>
               <a:rPr lang="en-US" dirty="0" smtClean="0"/>
-              <a:t>Other Features</a:t>
+              <a:t>Parameters</a:t>
             </a:r>
             <a:endParaRPr lang="en-US" dirty="0"/>
           </a:p>
@@ -5781,9 +5737,7 @@
         </p:nvSpPr>
         <p:spPr/>
         <p:txBody>
-          <a:bodyPr>
-            <a:normAutofit/>
-          </a:bodyPr>
+          <a:bodyPr/>
           <a:lstStyle/>
           <a:p>
             <a:pPr marL="514350" indent="-514350">
@@ -5792,7 +5746,7 @@
             </a:pPr>
             <a:r>
               <a:rPr lang="en-US" dirty="0" smtClean="0"/>
-              <a:t>Procedure</a:t>
+              <a:t>P_CODE</a:t>
             </a:r>
             <a:r>
               <a:rPr lang="en-US" dirty="0" smtClean="0">
@@ -5802,7 +5756,7 @@
                   </a:schemeClr>
                 </a:solidFill>
               </a:rPr>
-              <a:t> - M5_PROC</a:t>
+              <a:t> - what to run</a:t>
             </a:r>
           </a:p>
           <a:p>
@@ -5812,7 +5766,7 @@
             </a:pPr>
             <a:r>
               <a:rPr lang="en-US" dirty="0" smtClean="0"/>
-              <a:t>Tables</a:t>
+              <a:t>P_TARGETS</a:t>
             </a:r>
             <a:r>
               <a:rPr lang="en-US" dirty="0" smtClean="0">
@@ -5822,7 +5776,7 @@
                   </a:schemeClr>
                 </a:solidFill>
               </a:rPr>
-              <a:t> - data, _META, _ERR</a:t>
+              <a:t> - where to run it</a:t>
             </a:r>
           </a:p>
           <a:p>
@@ -5832,7 +5786,7 @@
             </a:pPr>
             <a:r>
               <a:rPr lang="en-US" dirty="0" smtClean="0"/>
-              <a:t>Views</a:t>
+              <a:t>P_TABLE_NAME</a:t>
             </a:r>
             <a:r>
               <a:rPr lang="en-US" dirty="0" smtClean="0">
@@ -5842,7 +5796,7 @@
                   </a:schemeClr>
                 </a:solidFill>
               </a:rPr>
-              <a:t> - M5_RESULTS, M5_METADATA, M5_ERRORS</a:t>
+              <a:t> - where to save it</a:t>
             </a:r>
           </a:p>
           <a:p>
@@ -5852,7 +5806,7 @@
             </a:pPr>
             <a:r>
               <a:rPr lang="en-US" dirty="0" smtClean="0"/>
-              <a:t>M5_ links</a:t>
+              <a:t>P_TABLE_EXISTS_ACTION</a:t>
             </a:r>
             <a:r>
               <a:rPr lang="en-US" dirty="0" smtClean="0">
@@ -5862,7 +5816,7 @@
                   </a:schemeClr>
                 </a:solidFill>
               </a:rPr>
-              <a:t> - M5_* created in your schema</a:t>
+              <a:t> - if it already exists</a:t>
             </a:r>
           </a:p>
           <a:p>
@@ -5872,7 +5826,7 @@
             </a:pPr>
             <a:r>
               <a:rPr lang="en-US" dirty="0" smtClean="0"/>
-              <a:t>Global Data Dictionary</a:t>
+              <a:t>P_ASYCHRONOUS</a:t>
             </a:r>
             <a:r>
               <a:rPr lang="en-US" dirty="0" smtClean="0">
@@ -5882,28 +5836,15 @@
                   </a:schemeClr>
                 </a:solidFill>
               </a:rPr>
-              <a:t> - M5_DBA_* tables refreshed nightly</a:t>
-            </a:r>
-          </a:p>
-          <a:p>
-            <a:pPr marL="514350" indent="-514350">
-              <a:buFont typeface="+mj-lt"/>
-              <a:buAutoNum type="arabicPeriod"/>
-            </a:pPr>
-            <a:r>
-              <a:rPr lang="en-US" dirty="0" smtClean="0"/>
-              <a:t>Limits </a:t>
-            </a:r>
-            <a:r>
-              <a:rPr lang="en-US" dirty="0" smtClean="0">
-                <a:solidFill>
-                  <a:schemeClr val="bg1">
-                    <a:lumMod val="50000"/>
-                  </a:schemeClr>
-                </a:solidFill>
-              </a:rPr>
-              <a:t>- SQL and PL/SQL only, as DBA</a:t>
-            </a:r>
+              <a:t> - return or wait for all rows</a:t>
+            </a:r>
+            <a:endParaRPr lang="en-US" dirty="0">
+              <a:solidFill>
+                <a:schemeClr val="bg1">
+                  <a:lumMod val="50000"/>
+                </a:schemeClr>
+              </a:solidFill>
+            </a:endParaRPr>
           </a:p>
         </p:txBody>
       </p:sp>
@@ -5922,9 +5863,9 @@
           <a:bodyPr/>
           <a:lstStyle/>
           <a:p>
-            <a:fld id="{8C6FBF27-FCE1-40A4-AD2E-EA28EB5C01F0}" type="datetime1">
-              <a:rPr lang="en-US" smtClean="0"/>
-              <a:t>2017-01-08</a:t>
+            <a:fld id="{73B3F948-1743-4F2D-B9D2-20F26DEE2D32}" type="datetime1">
+              <a:rPr lang="en-US" smtClean="0"/>
+              <a:t>2017-01-12</a:t>
             </a:fld>
             <a:endParaRPr lang="en-US"/>
           </a:p>
@@ -5956,7 +5897,7 @@
     </p:spTree>
     <p:extLst>
       <p:ext uri="{BB962C8B-B14F-4D97-AF65-F5344CB8AC3E}">
-        <p14:creationId xmlns:p14="http://schemas.microsoft.com/office/powerpoint/2010/main" val="530380749"/>
+        <p14:creationId xmlns:p14="http://schemas.microsoft.com/office/powerpoint/2010/main" val="3721550950"/>
       </p:ext>
     </p:extLst>
   </p:cSld>
@@ -6007,7 +5948,7 @@
           <a:p>
             <a:r>
               <a:rPr lang="en-US" dirty="0" smtClean="0"/>
-              <a:t>Technologies</a:t>
+              <a:t>Other Features</a:t>
             </a:r>
             <a:endParaRPr lang="en-US" dirty="0"/>
           </a:p>
@@ -6036,20 +5977,28 @@
             </a:pPr>
             <a:r>
               <a:rPr lang="en-US" dirty="0" smtClean="0"/>
-              <a:t>Dynamic</a:t>
-            </a:r>
-            <a:r>
-              <a:rPr lang="en-US" dirty="0"/>
-              <a:t>, templated SQL and </a:t>
-            </a:r>
-            <a:r>
-              <a:rPr lang="en-US" dirty="0" smtClean="0"/>
-              <a:t>PL/SQL</a:t>
-            </a:r>
-            <a:br>
-              <a:rPr lang="en-US" dirty="0" smtClean="0"/>
-            </a:br>
-            <a:endParaRPr lang="en-US" dirty="0" smtClean="0"/>
+              <a:t>Tables</a:t>
+            </a:r>
+            <a:r>
+              <a:rPr lang="en-US" dirty="0" smtClean="0">
+                <a:solidFill>
+                  <a:schemeClr val="bg1">
+                    <a:lumMod val="50000"/>
+                  </a:schemeClr>
+                </a:solidFill>
+              </a:rPr>
+              <a:t> </a:t>
+            </a:r>
+            <a:r>
+              <a:rPr lang="en-US" dirty="0" smtClean="0">
+                <a:solidFill>
+                  <a:schemeClr val="bg1">
+                    <a:lumMod val="50000"/>
+                  </a:schemeClr>
+                </a:solidFill>
+              </a:rPr>
+              <a:t>- data, _META, _ERR</a:t>
+            </a:r>
           </a:p>
           <a:p>
             <a:pPr marL="514350" indent="-514350">
@@ -6057,8 +6006,18 @@
               <a:buAutoNum type="arabicPeriod"/>
             </a:pPr>
             <a:r>
-              <a:rPr lang="en-US" dirty="0"/>
-              <a:t>Database Links</a:t>
+              <a:rPr lang="en-US" dirty="0" smtClean="0"/>
+              <a:t>Views</a:t>
+            </a:r>
+            <a:r>
+              <a:rPr lang="en-US" dirty="0" smtClean="0">
+                <a:solidFill>
+                  <a:schemeClr val="bg1">
+                    <a:lumMod val="50000"/>
+                  </a:schemeClr>
+                </a:solidFill>
+              </a:rPr>
+              <a:t> - M5_RESULTS, M5_METADATA, M5_ERRORS</a:t>
             </a:r>
           </a:p>
           <a:p>
@@ -6067,14 +6026,19 @@
               <a:buAutoNum type="arabicPeriod"/>
             </a:pPr>
             <a:r>
-              <a:rPr lang="en-US" dirty="0"/>
-              <a:t>PL/SQL </a:t>
-            </a:r>
-            <a:r>
-              <a:rPr lang="en-US" dirty="0" err="1"/>
-              <a:t>Lexer</a:t>
-            </a:r>
-            <a:endParaRPr lang="en-US" dirty="0"/>
+              <a:rPr lang="en-US" dirty="0" smtClean="0"/>
+              <a:t>M5_ links</a:t>
+            </a:r>
+            <a:r>
+              <a:rPr lang="en-US" dirty="0" smtClean="0">
+                <a:solidFill>
+                  <a:schemeClr val="bg1">
+                    <a:lumMod val="50000"/>
+                  </a:schemeClr>
+                </a:solidFill>
+              </a:rPr>
+              <a:t> - M5_* created in your schema</a:t>
+            </a:r>
           </a:p>
           <a:p>
             <a:pPr marL="514350" indent="-514350">
@@ -6083,9 +6047,18 @@
             </a:pPr>
             <a:r>
               <a:rPr lang="en-US" dirty="0" smtClean="0"/>
-              <a:t>DBMS_SCHEDULER, DBMS_PIPES </a:t>
-            </a:r>
-            <a:endParaRPr lang="en-US" dirty="0"/>
+              <a:t>Global Data Dictionary</a:t>
+            </a:r>
+            <a:r>
+              <a:rPr lang="en-US" dirty="0" smtClean="0">
+                <a:solidFill>
+                  <a:schemeClr val="bg1">
+                    <a:lumMod val="50000"/>
+                  </a:schemeClr>
+                </a:solidFill>
+              </a:rPr>
+              <a:t> - M5_DBA_* tables refreshed nightly</a:t>
+            </a:r>
           </a:p>
           <a:p>
             <a:pPr marL="514350" indent="-514350">
@@ -6094,14 +6067,143 @@
             </a:pPr>
             <a:r>
               <a:rPr lang="en-US" dirty="0" smtClean="0"/>
-              <a:t>Table-driven </a:t>
-            </a:r>
-            <a:r>
-              <a:rPr lang="en-US" dirty="0"/>
-              <a:t>configuration</a:t>
-            </a:r>
-            <a:endParaRPr lang="en-US" dirty="0" smtClean="0"/>
-          </a:p>
+              <a:t>Limits </a:t>
+            </a:r>
+            <a:r>
+              <a:rPr lang="en-US" dirty="0" smtClean="0">
+                <a:solidFill>
+                  <a:schemeClr val="bg1">
+                    <a:lumMod val="50000"/>
+                  </a:schemeClr>
+                </a:solidFill>
+              </a:rPr>
+              <a:t>- SQL and PL/SQL only, as DBA</a:t>
+            </a:r>
+          </a:p>
+        </p:txBody>
+      </p:sp>
+      <p:sp>
+        <p:nvSpPr>
+          <p:cNvPr id="4" name="Date Placeholder 3"/>
+          <p:cNvSpPr>
+            <a:spLocks noGrp="1"/>
+          </p:cNvSpPr>
+          <p:nvPr>
+            <p:ph type="dt" sz="half" idx="10"/>
+          </p:nvPr>
+        </p:nvSpPr>
+        <p:spPr/>
+        <p:txBody>
+          <a:bodyPr/>
+          <a:lstStyle/>
+          <a:p>
+            <a:fld id="{8C6FBF27-FCE1-40A4-AD2E-EA28EB5C01F0}" type="datetime1">
+              <a:rPr lang="en-US" smtClean="0"/>
+              <a:t>2017-01-12</a:t>
+            </a:fld>
+            <a:endParaRPr lang="en-US"/>
+          </a:p>
+        </p:txBody>
+      </p:sp>
+      <p:sp>
+        <p:nvSpPr>
+          <p:cNvPr id="5" name="Slide Number Placeholder 4"/>
+          <p:cNvSpPr>
+            <a:spLocks noGrp="1"/>
+          </p:cNvSpPr>
+          <p:nvPr>
+            <p:ph type="sldNum" sz="quarter" idx="12"/>
+          </p:nvPr>
+        </p:nvSpPr>
+        <p:spPr/>
+        <p:txBody>
+          <a:bodyPr/>
+          <a:lstStyle/>
+          <a:p>
+            <a:fld id="{05869706-863E-4BD1-B682-3CD80F60367B}" type="slidenum">
+              <a:rPr lang="en-US" smtClean="0"/>
+              <a:t>11</a:t>
+            </a:fld>
+            <a:endParaRPr lang="en-US"/>
+          </a:p>
+        </p:txBody>
+      </p:sp>
+    </p:spTree>
+    <p:extLst>
+      <p:ext uri="{BB962C8B-B14F-4D97-AF65-F5344CB8AC3E}">
+        <p14:creationId xmlns:p14="http://schemas.microsoft.com/office/powerpoint/2010/main" val="530380749"/>
+      </p:ext>
+    </p:extLst>
+  </p:cSld>
+  <p:clrMapOvr>
+    <a:masterClrMapping/>
+  </p:clrMapOvr>
+  <p:timing>
+    <p:tnLst>
+      <p:par>
+        <p:cTn id="1" dur="indefinite" restart="never" nodeType="tmRoot"/>
+      </p:par>
+    </p:tnLst>
+  </p:timing>
+</p:sld>
+</file>
+
+<file path=ppt/slides/slide12.xml><?xml version="1.0" encoding="utf-8"?>
+<p:sld xmlns:a="http://schemas.openxmlformats.org/drawingml/2006/main" xmlns:r="http://schemas.openxmlformats.org/officeDocument/2006/relationships" xmlns:p="http://schemas.openxmlformats.org/presentationml/2006/main">
+  <p:cSld>
+    <p:spTree>
+      <p:nvGrpSpPr>
+        <p:cNvPr id="1" name=""/>
+        <p:cNvGrpSpPr/>
+        <p:nvPr/>
+      </p:nvGrpSpPr>
+      <p:grpSpPr>
+        <a:xfrm>
+          <a:off x="0" y="0"/>
+          <a:ext cx="0" cy="0"/>
+          <a:chOff x="0" y="0"/>
+          <a:chExt cx="0" cy="0"/>
+        </a:xfrm>
+      </p:grpSpPr>
+      <p:sp>
+        <p:nvSpPr>
+          <p:cNvPr id="2" name="Title 1"/>
+          <p:cNvSpPr>
+            <a:spLocks noGrp="1"/>
+          </p:cNvSpPr>
+          <p:nvPr>
+            <p:ph type="title"/>
+          </p:nvPr>
+        </p:nvSpPr>
+        <p:spPr/>
+        <p:txBody>
+          <a:bodyPr/>
+          <a:lstStyle/>
+          <a:p>
+            <a:r>
+              <a:rPr lang="en-US" dirty="0" smtClean="0"/>
+              <a:t>Technologies</a:t>
+            </a:r>
+            <a:endParaRPr lang="en-US" dirty="0"/>
+          </a:p>
+        </p:txBody>
+      </p:sp>
+      <p:sp>
+        <p:nvSpPr>
+          <p:cNvPr id="3" name="Content Placeholder 2"/>
+          <p:cNvSpPr>
+            <a:spLocks noGrp="1"/>
+          </p:cNvSpPr>
+          <p:nvPr>
+            <p:ph idx="1"/>
+          </p:nvPr>
+        </p:nvSpPr>
+        <p:spPr/>
+        <p:txBody>
+          <a:bodyPr>
+            <a:normAutofit/>
+          </a:bodyPr>
+          <a:lstStyle/>
           <a:p>
             <a:pPr marL="514350" indent="-514350">
               <a:buFont typeface="+mj-lt"/>
@@ -6109,18 +6211,82 @@
             </a:pPr>
             <a:r>
               <a:rPr lang="en-US" dirty="0" smtClean="0"/>
-              <a:t>Oracle </a:t>
-            </a:r>
-            <a:r>
-              <a:rPr lang="en-US" dirty="0" smtClean="0"/>
-              <a:t>Data </a:t>
-            </a:r>
-            <a:r>
-              <a:rPr lang="en-US" dirty="0" smtClean="0"/>
-              <a:t>Cartridge</a:t>
-            </a:r>
+              <a:t>Dynamic</a:t>
+            </a:r>
+            <a:r>
+              <a:rPr lang="en-US" dirty="0"/>
+              <a:t>, templated SQL and </a:t>
+            </a:r>
+            <a:r>
+              <a:rPr lang="en-US" dirty="0" smtClean="0"/>
+              <a:t>PL/SQL</a:t>
+            </a:r>
+            <a:br>
+              <a:rPr lang="en-US" dirty="0" smtClean="0"/>
+            </a:br>
             <a:endParaRPr lang="en-US" dirty="0" smtClean="0"/>
           </a:p>
+          <a:p>
+            <a:pPr marL="514350" indent="-514350">
+              <a:buFont typeface="+mj-lt"/>
+              <a:buAutoNum type="arabicPeriod"/>
+            </a:pPr>
+            <a:r>
+              <a:rPr lang="en-US" dirty="0"/>
+              <a:t>Database Links</a:t>
+            </a:r>
+          </a:p>
+          <a:p>
+            <a:pPr marL="514350" indent="-514350">
+              <a:buFont typeface="+mj-lt"/>
+              <a:buAutoNum type="arabicPeriod"/>
+            </a:pPr>
+            <a:r>
+              <a:rPr lang="en-US" dirty="0"/>
+              <a:t>PL/SQL </a:t>
+            </a:r>
+            <a:r>
+              <a:rPr lang="en-US" dirty="0" err="1"/>
+              <a:t>Lexer</a:t>
+            </a:r>
+            <a:endParaRPr lang="en-US" dirty="0"/>
+          </a:p>
+          <a:p>
+            <a:pPr marL="514350" indent="-514350">
+              <a:buFont typeface="+mj-lt"/>
+              <a:buAutoNum type="arabicPeriod"/>
+            </a:pPr>
+            <a:r>
+              <a:rPr lang="en-US" dirty="0" smtClean="0"/>
+              <a:t>DBMS_SCHEDULER, DBMS_PIPES </a:t>
+            </a:r>
+            <a:endParaRPr lang="en-US" dirty="0"/>
+          </a:p>
+          <a:p>
+            <a:pPr marL="514350" indent="-514350">
+              <a:buFont typeface="+mj-lt"/>
+              <a:buAutoNum type="arabicPeriod"/>
+            </a:pPr>
+            <a:r>
+              <a:rPr lang="en-US" dirty="0" smtClean="0"/>
+              <a:t>Table-driven </a:t>
+            </a:r>
+            <a:r>
+              <a:rPr lang="en-US" dirty="0"/>
+              <a:t>configuration</a:t>
+            </a:r>
+            <a:endParaRPr lang="en-US" dirty="0" smtClean="0"/>
+          </a:p>
+          <a:p>
+            <a:pPr marL="514350" indent="-514350">
+              <a:buFont typeface="+mj-lt"/>
+              <a:buAutoNum type="arabicPeriod"/>
+            </a:pPr>
+            <a:r>
+              <a:rPr lang="en-US" dirty="0" smtClean="0"/>
+              <a:t>Oracle Data Cartridge</a:t>
+            </a:r>
+          </a:p>
         </p:txBody>
       </p:sp>
       <p:sp>
@@ -6140,7 +6306,7 @@
           <a:p>
             <a:fld id="{FC4CB26D-ED02-41C0-8C14-C61605713420}" type="datetime1">
               <a:rPr lang="en-US" smtClean="0"/>
-              <a:t>2017-01-08</a:t>
+              <a:t>2017-01-12</a:t>
             </a:fld>
             <a:endParaRPr lang="en-US"/>
           </a:p>
@@ -6163,7 +6329,7 @@
           <a:p>
             <a:fld id="{05869706-863E-4BD1-B682-3CD80F60367B}" type="slidenum">
               <a:rPr lang="en-US" smtClean="0"/>
-              <a:t>11</a:t>
+              <a:t>12</a:t>
             </a:fld>
             <a:endParaRPr lang="en-US"/>
           </a:p>
@@ -6325,7 +6491,7 @@
 </p:sld>
 </file>
 
-<file path=ppt/slides/slide12.xml><?xml version="1.0" encoding="utf-8"?>
+<file path=ppt/slides/slide13.xml><?xml version="1.0" encoding="utf-8"?>
 <p:sld xmlns:a="http://schemas.openxmlformats.org/drawingml/2006/main" xmlns:r="http://schemas.openxmlformats.org/officeDocument/2006/relationships" xmlns:p="http://schemas.openxmlformats.org/presentationml/2006/main">
   <p:cSld>
     <p:spTree>
@@ -6428,11 +6594,7 @@
             </a:pPr>
             <a:r>
               <a:rPr lang="en-US" dirty="0" smtClean="0"/>
-              <a:t>How </a:t>
-            </a:r>
-            <a:r>
-              <a:rPr lang="en-US" dirty="0" smtClean="0"/>
-              <a:t>much time will it take?</a:t>
+              <a:t>How much time will it take?</a:t>
             </a:r>
           </a:p>
           <a:p>
@@ -6479,7 +6641,7 @@
           <a:p>
             <a:fld id="{8A97B252-A157-47EE-8D8D-B5B4DAA37260}" type="datetime1">
               <a:rPr lang="en-US" smtClean="0"/>
-              <a:t>2017-01-08</a:t>
+              <a:t>2017-01-12</a:t>
             </a:fld>
             <a:endParaRPr lang="en-US"/>
           </a:p>
@@ -6502,7 +6664,7 @@
           <a:p>
             <a:fld id="{05869706-863E-4BD1-B682-3CD80F60367B}" type="slidenum">
               <a:rPr lang="en-US" smtClean="0"/>
-              <a:t>12</a:t>
+              <a:t>13</a:t>
             </a:fld>
             <a:endParaRPr lang="en-US"/>
           </a:p>
@@ -6528,7 +6690,7 @@
 </p:sld>
 </file>
 
-<file path=ppt/slides/slide13.xml><?xml version="1.0" encoding="utf-8"?>
+<file path=ppt/slides/slide14.xml><?xml version="1.0" encoding="utf-8"?>
 <p:sld xmlns:a="http://schemas.openxmlformats.org/drawingml/2006/main" xmlns:r="http://schemas.openxmlformats.org/officeDocument/2006/relationships" xmlns:p="http://schemas.openxmlformats.org/presentationml/2006/main">
   <p:cSld>
     <p:spTree>
@@ -6632,7 +6794,7 @@
           <a:p>
             <a:fld id="{14CB67C7-3BA7-4C89-AD88-5C3EB0A22414}" type="datetime1">
               <a:rPr lang="en-US" smtClean="0"/>
-              <a:t>2017-01-08</a:t>
+              <a:t>2017-01-12</a:t>
             </a:fld>
             <a:endParaRPr lang="en-US" dirty="0"/>
           </a:p>
@@ -6655,7 +6817,7 @@
           <a:p>
             <a:fld id="{05869706-863E-4BD1-B682-3CD80F60367B}" type="slidenum">
               <a:rPr lang="en-US" smtClean="0"/>
-              <a:t>13</a:t>
+              <a:t>14</a:t>
             </a:fld>
             <a:endParaRPr lang="en-US"/>
           </a:p>
@@ -6845,7 +7007,7 @@
 </p:sld>
 </file>
 
-<file path=ppt/slides/slide14.xml><?xml version="1.0" encoding="utf-8"?>
+<file path=ppt/slides/slide15.xml><?xml version="1.0" encoding="utf-8"?>
 <p:sld xmlns:a="http://schemas.openxmlformats.org/drawingml/2006/main" xmlns:r="http://schemas.openxmlformats.org/officeDocument/2006/relationships" xmlns:p="http://schemas.openxmlformats.org/presentationml/2006/main">
   <p:cSld>
     <p:spTree>
@@ -6931,11 +7093,7 @@
             </a:pPr>
             <a:r>
               <a:rPr lang="en-US" dirty="0" smtClean="0"/>
-              <a:t>Email </a:t>
-            </a:r>
-            <a:r>
-              <a:rPr lang="en-US" dirty="0" smtClean="0"/>
-              <a:t>Jon Heller: </a:t>
+              <a:t>Email Jon Heller: </a:t>
             </a:r>
             <a:r>
               <a:rPr lang="en-US" dirty="0" smtClean="0">
@@ -7001,7 +7159,6 @@
               <a:rPr lang="en-US" dirty="0" smtClean="0"/>
               <a:t>Professional services available</a:t>
             </a:r>
-            <a:endParaRPr lang="en-US" dirty="0" smtClean="0"/>
           </a:p>
         </p:txBody>
       </p:sp>
@@ -7022,7 +7179,7 @@
           <a:p>
             <a:fld id="{E18E99D8-5B8F-468C-BBE7-526BD68FE572}" type="datetime1">
               <a:rPr lang="en-US" smtClean="0"/>
-              <a:t>2017-01-08</a:t>
+              <a:t>2017-01-12</a:t>
             </a:fld>
             <a:endParaRPr lang="en-US"/>
           </a:p>
@@ -7045,7 +7202,7 @@
           <a:p>
             <a:fld id="{05869706-863E-4BD1-B682-3CD80F60367B}" type="slidenum">
               <a:rPr lang="en-US" smtClean="0"/>
-              <a:t>14</a:t>
+              <a:t>15</a:t>
             </a:fld>
             <a:endParaRPr lang="en-US"/>
           </a:p>
@@ -7071,7 +7228,7 @@
 </p:sld>
 </file>
 
-<file path=ppt/slides/slide15.xml><?xml version="1.0" encoding="utf-8"?>
+<file path=ppt/slides/slide16.xml><?xml version="1.0" encoding="utf-8"?>
 <p:sld xmlns:a="http://schemas.openxmlformats.org/drawingml/2006/main" xmlns:r="http://schemas.openxmlformats.org/officeDocument/2006/relationships" xmlns:p="http://schemas.openxmlformats.org/presentationml/2006/main">
   <p:cSld>
     <p:spTree>
@@ -7107,11 +7264,7 @@
           <a:p>
             <a:r>
               <a:rPr lang="en-US" dirty="0" smtClean="0"/>
-              <a:t>Your New </a:t>
-            </a:r>
-            <a:r>
-              <a:rPr lang="en-US" dirty="0" smtClean="0"/>
-              <a:t>Mission:</a:t>
+              <a:t>Your New Mission:</a:t>
             </a:r>
             <a:br>
               <a:rPr lang="en-US" dirty="0" smtClean="0"/>
@@ -7147,7 +7300,6 @@
               <a:rPr lang="en-US" dirty="0" smtClean="0"/>
               <a:t>Not just faster</a:t>
             </a:r>
-            <a:endParaRPr lang="en-US" dirty="0" smtClean="0"/>
           </a:p>
           <a:p>
             <a:pPr marL="514350" indent="-514350">
@@ -7218,7 +7370,7 @@
           <a:p>
             <a:fld id="{4E667C21-B277-46CB-80E7-1C015420E7D1}" type="datetime1">
               <a:rPr lang="en-US" smtClean="0"/>
-              <a:t>2017-01-08</a:t>
+              <a:t>2017-01-12</a:t>
             </a:fld>
             <a:endParaRPr lang="en-US" dirty="0"/>
           </a:p>
@@ -7241,7 +7393,7 @@
           <a:p>
             <a:fld id="{05869706-863E-4BD1-B682-3CD80F60367B}" type="slidenum">
               <a:rPr lang="en-US" smtClean="0"/>
-              <a:t>15</a:t>
+              <a:t>16</a:t>
             </a:fld>
             <a:endParaRPr lang="en-US"/>
           </a:p>
@@ -7479,11 +7631,7 @@
             </a:pPr>
             <a:r>
               <a:rPr lang="en-US" dirty="0" smtClean="0"/>
-              <a:t>Complements </a:t>
-            </a:r>
-            <a:r>
-              <a:rPr lang="en-US" dirty="0" smtClean="0"/>
-              <a:t>existing automation tools</a:t>
+              <a:t>Complements existing automation tools</a:t>
             </a:r>
           </a:p>
           <a:p>
@@ -7493,13 +7641,8 @@
             </a:pPr>
             <a:r>
               <a:rPr lang="en-US" dirty="0" smtClean="0"/>
-              <a:t>Open-source, robust </a:t>
-            </a:r>
-            <a:r>
-              <a:rPr lang="en-US" dirty="0" smtClean="0"/>
-              <a:t>implementation</a:t>
-            </a:r>
-            <a:endParaRPr lang="en-US" dirty="0" smtClean="0"/>
+              <a:t>Open-source, robust implementation</a:t>
+            </a:r>
           </a:p>
           <a:p>
             <a:pPr marL="514350" indent="-514350">
@@ -7508,17 +7651,8 @@
             </a:pPr>
             <a:r>
               <a:rPr lang="en-US" dirty="0" smtClean="0"/>
-              <a:t>Find, fix, and prevent </a:t>
-            </a:r>
-            <a:r>
-              <a:rPr lang="en-US" dirty="0" smtClean="0"/>
-              <a:t>problems </a:t>
-            </a:r>
-            <a:r>
-              <a:rPr lang="en-US" dirty="0" smtClean="0"/>
-              <a:t>everywhere</a:t>
-            </a:r>
-            <a:endParaRPr lang="en-US" dirty="0" smtClean="0"/>
+              <a:t>Find, fix, and prevent problems everywhere</a:t>
+            </a:r>
           </a:p>
           <a:p>
             <a:pPr marL="514350" indent="-514350">
@@ -7546,7 +7680,7 @@
           <a:p>
             <a:fld id="{04FA3B08-0866-4F48-BECB-8AEAA49887FE}" type="datetime1">
               <a:rPr lang="en-US" smtClean="0"/>
-              <a:t>2017-01-08</a:t>
+              <a:t>2017-01-12</a:t>
             </a:fld>
             <a:endParaRPr lang="en-US"/>
           </a:p>
@@ -7658,15 +7792,7 @@
             </a:pPr>
             <a:r>
               <a:rPr lang="en-US" sz="2800" dirty="0" smtClean="0"/>
-              <a:t>Oracle </a:t>
-            </a:r>
-            <a:r>
-              <a:rPr lang="en-US" sz="2800" dirty="0" smtClean="0"/>
-              <a:t>developer or DBA for 15 </a:t>
-            </a:r>
-            <a:r>
-              <a:rPr lang="en-US" sz="2800" dirty="0" smtClean="0"/>
-              <a:t>years</a:t>
+              <a:t>Oracle developer or DBA for 15 years</a:t>
             </a:r>
           </a:p>
           <a:p>
@@ -7713,7 +7839,6 @@
               <a:rPr lang="en-US" sz="2800" dirty="0" smtClean="0"/>
               <a:t>BS and MCS in Computer Science, NCSU</a:t>
             </a:r>
-            <a:endParaRPr lang="en-US" sz="2800" dirty="0" smtClean="0"/>
           </a:p>
           <a:p>
             <a:pPr marL="514350" indent="-514350">
@@ -7722,11 +7847,7 @@
             </a:pPr>
             <a:r>
               <a:rPr lang="en-US" sz="2800" dirty="0" smtClean="0"/>
-              <a:t>Certifications: </a:t>
-            </a:r>
-            <a:r>
-              <a:rPr lang="en-US" sz="2800" dirty="0" smtClean="0"/>
-              <a:t>PL/SQL, DBA, SQL Expert, SQL Tuning</a:t>
+              <a:t>Certifications: PL/SQL, DBA, SQL Expert, SQL Tuning</a:t>
             </a:r>
           </a:p>
           <a:p>
@@ -7761,7 +7882,7 @@
           <a:p>
             <a:fld id="{E0B1ECC0-3D31-49BF-9732-FEB21E3BFE0B}" type="datetime1">
               <a:rPr lang="en-US" smtClean="0"/>
-              <a:t>2017-01-08</a:t>
+              <a:t>2017-01-12</a:t>
             </a:fld>
             <a:endParaRPr lang="en-US"/>
           </a:p>
@@ -8098,7 +8219,6 @@
               <a:rPr lang="en-US" dirty="0" smtClean="0"/>
               <a:t>Only obvious, pre-defined tasks are automated</a:t>
             </a:r>
-            <a:endParaRPr lang="en-US" dirty="0" smtClean="0"/>
           </a:p>
           <a:p>
             <a:pPr marL="514350" indent="-514350">
@@ -8117,13 +8237,8 @@
             </a:pPr>
             <a:r>
               <a:rPr lang="en-US" dirty="0" smtClean="0"/>
-              <a:t>SQL and PL/SQL are great but </a:t>
-            </a:r>
-            <a:r>
-              <a:rPr lang="en-US" dirty="0" smtClean="0"/>
-              <a:t>per-database</a:t>
-            </a:r>
-            <a:endParaRPr lang="en-US" dirty="0" smtClean="0"/>
+              <a:t>SQL and PL/SQL are great but per-database</a:t>
+            </a:r>
           </a:p>
         </p:txBody>
       </p:sp>
@@ -8144,7 +8259,7 @@
           <a:p>
             <a:fld id="{59A89C50-A88C-43DA-A017-AA6F35F0B0C8}" type="datetime1">
               <a:rPr lang="en-US" smtClean="0"/>
-              <a:t>2017-01-08</a:t>
+              <a:t>2017-01-12</a:t>
             </a:fld>
             <a:endParaRPr lang="en-US"/>
           </a:p>
@@ -8281,7 +8396,7 @@
           <a:p>
             <a:fld id="{AA1E44A8-32B0-4E5A-A6DF-07DB1E700CAE}" type="datetime1">
               <a:rPr lang="en-US" smtClean="0"/>
-              <a:t>2017-01-08</a:t>
+              <a:t>2017-01-12</a:t>
             </a:fld>
             <a:endParaRPr lang="en-US"/>
           </a:p>
@@ -8693,7 +8808,6 @@
               <a:rPr lang="en-US" dirty="0" smtClean="0"/>
               <a:t>Won't transform your processes</a:t>
             </a:r>
-            <a:endParaRPr lang="en-US" dirty="0" smtClean="0"/>
           </a:p>
           <a:p>
             <a:pPr marL="514350" indent="-514350">
@@ -8702,17 +8816,8 @@
             </a:pPr>
             <a:r>
               <a:rPr lang="en-US" dirty="0" smtClean="0"/>
-              <a:t>Slow</a:t>
-            </a:r>
-            <a:r>
-              <a:rPr lang="en-US" dirty="0" smtClean="0"/>
-              <a:t>, complex, or </a:t>
-            </a:r>
-            <a:r>
-              <a:rPr lang="en-US" dirty="0" smtClean="0"/>
-              <a:t>insecure</a:t>
-            </a:r>
-            <a:endParaRPr lang="en-US" dirty="0" smtClean="0"/>
+              <a:t>Slow, complex, or insecure</a:t>
+            </a:r>
           </a:p>
           <a:p>
             <a:pPr marL="514350" indent="-514350">
@@ -8721,13 +8826,8 @@
             </a:pPr>
             <a:r>
               <a:rPr lang="en-US" dirty="0" smtClean="0"/>
-              <a:t>IDE, plugin, website, </a:t>
-            </a:r>
-            <a:r>
-              <a:rPr lang="en-US" dirty="0" smtClean="0"/>
-              <a:t>files, agents</a:t>
-            </a:r>
-            <a:endParaRPr lang="en-US" dirty="0" smtClean="0"/>
+              <a:t>IDE, plugin, website, files, agents</a:t>
+            </a:r>
           </a:p>
           <a:p>
             <a:pPr marL="514350" indent="-514350">
@@ -8748,7 +8848,6 @@
               <a:rPr lang="en-US" dirty="0" smtClean="0"/>
               <a:t>Pre-defined tasks only</a:t>
             </a:r>
-            <a:endParaRPr lang="en-US" dirty="0" smtClean="0"/>
           </a:p>
           <a:p>
             <a:pPr marL="514350" indent="-514350">
@@ -8879,6 +8978,10 @@
               <a:rPr lang="en-US" dirty="0" smtClean="0"/>
             </a:br>
             <a:r>
+              <a:rPr lang="en-US" dirty="0" smtClean="0"/>
+              <a:t>   </a:t>
+            </a:r>
+            <a:r>
               <a:rPr lang="en-US" b="1" dirty="0" smtClean="0">
                 <a:solidFill>
                   <a:srgbClr val="00B050"/>
@@ -8922,6 +9025,13 @@
               </a:rPr>
             </a:br>
             <a:r>
+              <a:rPr lang="en-US" dirty="0" smtClean="0">
+                <a:latin typeface="Courier New" panose="02070309020205020404" pitchFamily="49" charset="0"/>
+                <a:cs typeface="Courier New" panose="02070309020205020404" pitchFamily="49" charset="0"/>
+              </a:rPr>
+              <a:t>   </a:t>
+            </a:r>
+            <a:r>
               <a:rPr lang="en-US" b="1" dirty="0" smtClean="0">
                 <a:solidFill>
                   <a:srgbClr val="00B050"/>
@@ -8936,7 +9046,14 @@
                 <a:latin typeface="Courier New" panose="02070309020205020404" pitchFamily="49" charset="0"/>
                 <a:cs typeface="Courier New" panose="02070309020205020404" pitchFamily="49" charset="0"/>
               </a:rPr>
-              <a:t> DBA_USERS</a:t>
+              <a:t> </a:t>
+            </a:r>
+            <a:r>
+              <a:rPr lang="en-US" dirty="0" smtClean="0">
+                <a:latin typeface="Courier New" panose="02070309020205020404" pitchFamily="49" charset="0"/>
+                <a:cs typeface="Courier New" panose="02070309020205020404" pitchFamily="49" charset="0"/>
+              </a:rPr>
+              <a:t>DBA_USERS</a:t>
             </a:r>
             <a:br>
               <a:rPr lang="en-US" dirty="0" smtClean="0">
@@ -8945,6 +9062,13 @@
               </a:rPr>
             </a:br>
             <a:r>
+              <a:rPr lang="en-US" dirty="0" smtClean="0">
+                <a:latin typeface="Courier New" panose="02070309020205020404" pitchFamily="49" charset="0"/>
+                <a:cs typeface="Courier New" panose="02070309020205020404" pitchFamily="49" charset="0"/>
+              </a:rPr>
+              <a:t>  </a:t>
+            </a:r>
+            <a:r>
               <a:rPr lang="en-US" b="1" dirty="0" smtClean="0">
                 <a:solidFill>
                   <a:srgbClr val="00B050"/>
@@ -8959,7 +9083,14 @@
                 <a:latin typeface="Courier New" panose="02070309020205020404" pitchFamily="49" charset="0"/>
                 <a:cs typeface="Courier New" panose="02070309020205020404" pitchFamily="49" charset="0"/>
               </a:rPr>
-              <a:t> PROFILE </a:t>
+              <a:t> </a:t>
+            </a:r>
+            <a:r>
+              <a:rPr lang="en-US" dirty="0" smtClean="0">
+                <a:latin typeface="Courier New" panose="02070309020205020404" pitchFamily="49" charset="0"/>
+                <a:cs typeface="Courier New" panose="02070309020205020404" pitchFamily="49" charset="0"/>
+              </a:rPr>
+              <a:t>PROFILE </a:t>
             </a:r>
             <a:r>
               <a:rPr lang="en-US" b="1" dirty="0" smtClean="0">
@@ -9029,26 +9160,6 @@
                 <a:latin typeface="Courier New" panose="02070309020205020404" pitchFamily="49" charset="0"/>
                 <a:cs typeface="Courier New" panose="02070309020205020404" pitchFamily="49" charset="0"/>
               </a:rPr>
-              <a:t>IN</a:t>
-            </a:r>
-            <a:r>
-              <a:rPr lang="en-US" dirty="0" smtClean="0">
-                <a:solidFill>
-                  <a:srgbClr val="FF0000"/>
-                </a:solidFill>
-                <a:latin typeface="Courier New" panose="02070309020205020404" pitchFamily="49" charset="0"/>
-                <a:cs typeface="Courier New" panose="02070309020205020404" pitchFamily="49" charset="0"/>
-              </a:rPr>
-              <a:t> </a:t>
-            </a:r>
-            <a:r>
-              <a:rPr lang="en-US" b="1" dirty="0" smtClean="0">
-                <a:solidFill>
-                  <a:srgbClr val="FF0000"/>
-                </a:solidFill>
-                <a:latin typeface="Courier New" panose="02070309020205020404" pitchFamily="49" charset="0"/>
-                <a:cs typeface="Courier New" panose="02070309020205020404" pitchFamily="49" charset="0"/>
-              </a:rPr>
               <a:t>(</a:t>
             </a:r>
             <a:r>
@@ -9108,7 +9219,7 @@
           <a:p>
             <a:fld id="{1AF7749E-7951-4D42-9C43-2FC8E80375B1}" type="datetime1">
               <a:rPr lang="en-US" smtClean="0"/>
-              <a:t>2017-01-08</a:t>
+              <a:t>2017-01-12</a:t>
             </a:fld>
             <a:endParaRPr lang="en-US"/>
           </a:p>
@@ -9230,13 +9341,8 @@
             </a:pPr>
             <a:r>
               <a:rPr lang="en-US" dirty="0" smtClean="0"/>
-              <a:t>In production since 2014 for Ventech </a:t>
-            </a:r>
-            <a:r>
-              <a:rPr lang="en-US" dirty="0" smtClean="0"/>
-              <a:t>&amp; CMS</a:t>
-            </a:r>
-            <a:endParaRPr lang="en-US" dirty="0" smtClean="0"/>
+              <a:t>In production since 2014 for Ventech &amp; CMS</a:t>
+            </a:r>
           </a:p>
           <a:p>
             <a:pPr marL="514350" indent="-514350">
@@ -9245,13 +9351,8 @@
             </a:pPr>
             <a:r>
               <a:rPr lang="en-US" dirty="0" smtClean="0"/>
-              <a:t>&gt;400 databases, &gt;1PB </a:t>
-            </a:r>
-            <a:r>
-              <a:rPr lang="en-US" dirty="0" smtClean="0"/>
-              <a:t>data</a:t>
-            </a:r>
-            <a:endParaRPr lang="en-US" dirty="0" smtClean="0"/>
+              <a:t>&gt;400 databases, &gt;1PB data</a:t>
+            </a:r>
           </a:p>
           <a:p>
             <a:pPr marL="514350" indent="-514350">
@@ -9260,15 +9361,7 @@
             </a:pPr>
             <a:r>
               <a:rPr lang="en-US" dirty="0" smtClean="0"/>
-              <a:t>&gt;8 million runs, &gt;1800 </a:t>
-            </a:r>
-            <a:r>
-              <a:rPr lang="en-US" dirty="0" smtClean="0"/>
-              <a:t>tests</a:t>
-            </a:r>
-            <a:r>
-              <a:rPr lang="en-US" dirty="0" smtClean="0"/>
-              <a:t>, open source</a:t>
+              <a:t>&gt;8 million runs, &gt;1800 tests, open source</a:t>
             </a:r>
           </a:p>
           <a:p>
@@ -9300,7 +9393,7 @@
           <a:p>
             <a:fld id="{60D7856B-577C-489D-A2A8-2F221F81FEFA}" type="datetime1">
               <a:rPr lang="en-US" smtClean="0"/>
-              <a:t>2017-01-08</a:t>
+              <a:t>2017-01-12</a:t>
             </a:fld>
             <a:endParaRPr lang="en-US"/>
           </a:p>
@@ -9460,39 +9553,41 @@
         </p:nvSpPr>
         <p:spPr/>
         <p:txBody>
-          <a:bodyPr/>
-          <a:lstStyle/>
-          <a:p>
-            <a:r>
-              <a:rPr lang="en-US" dirty="0" smtClean="0"/>
-              <a:t>Basic Features</a:t>
-            </a:r>
-            <a:endParaRPr lang="en-US" dirty="0"/>
-          </a:p>
-        </p:txBody>
-      </p:sp>
-      <p:sp>
-        <p:nvSpPr>
-          <p:cNvPr id="3" name="Content Placeholder 2"/>
-          <p:cNvSpPr>
-            <a:spLocks noGrp="1"/>
-          </p:cNvSpPr>
-          <p:nvPr>
-            <p:ph idx="1"/>
-          </p:nvPr>
-        </p:nvSpPr>
-        <p:spPr/>
-        <p:txBody>
           <a:bodyPr>
             <a:normAutofit/>
           </a:bodyPr>
           <a:lstStyle/>
           <a:p>
+            <a:r>
+              <a:rPr lang="en-US" dirty="0" smtClean="0"/>
+              <a:t>Interface - Function or Procedure</a:t>
+            </a:r>
+            <a:endParaRPr lang="en-US" dirty="0"/>
+          </a:p>
+        </p:txBody>
+      </p:sp>
+      <p:sp>
+        <p:nvSpPr>
+          <p:cNvPr id="3" name="Content Placeholder 2"/>
+          <p:cNvSpPr>
+            <a:spLocks noGrp="1"/>
+          </p:cNvSpPr>
+          <p:nvPr>
+            <p:ph idx="1"/>
+          </p:nvPr>
+        </p:nvSpPr>
+        <p:spPr/>
+        <p:txBody>
+          <a:bodyPr>
+            <a:normAutofit fontScale="85000" lnSpcReduction="20000"/>
+          </a:bodyPr>
+          <a:lstStyle/>
+          <a:p>
             <a:pPr marL="0" indent="0">
               <a:buNone/>
             </a:pPr>
             <a:r>
-              <a:rPr lang="en-US" sz="2200" b="1" dirty="0" smtClean="0">
+              <a:rPr lang="en-US" sz="2600" b="1" dirty="0">
                 <a:solidFill>
                   <a:srgbClr val="008080"/>
                 </a:solidFill>
@@ -9504,7 +9599,7 @@
               <a:t>select</a:t>
             </a:r>
             <a:r>
-              <a:rPr lang="en-US" sz="2200" b="1" dirty="0" smtClean="0">
+              <a:rPr lang="en-US" sz="2600" b="1" dirty="0">
                 <a:solidFill>
                   <a:srgbClr val="000080"/>
                 </a:solidFill>
@@ -9521,7 +9616,7 @@
               <a:buNone/>
             </a:pPr>
             <a:r>
-              <a:rPr lang="en-US" sz="2200" b="1" dirty="0" smtClean="0">
+              <a:rPr lang="en-US" sz="2600" b="1" dirty="0">
                 <a:solidFill>
                   <a:srgbClr val="008080"/>
                 </a:solidFill>
@@ -9533,7 +9628,7 @@
               <a:t>from</a:t>
             </a:r>
             <a:r>
-              <a:rPr lang="en-US" sz="2200" b="1" dirty="0" smtClean="0">
+              <a:rPr lang="en-US" sz="2600" b="1" dirty="0">
                 <a:solidFill>
                   <a:srgbClr val="000080"/>
                 </a:solidFill>
@@ -9545,7 +9640,7 @@
               <a:t> </a:t>
             </a:r>
             <a:r>
-              <a:rPr lang="en-US" sz="2200" b="1" dirty="0" smtClean="0">
+              <a:rPr lang="en-US" sz="2600" b="1" dirty="0" smtClean="0">
                 <a:solidFill>
                   <a:srgbClr val="008080"/>
                 </a:solidFill>
@@ -9557,7 +9652,7 @@
               <a:t>table</a:t>
             </a:r>
             <a:r>
-              <a:rPr lang="en-US" sz="2200" b="1" dirty="0" smtClean="0">
+              <a:rPr lang="en-US" sz="2600" b="1" dirty="0" smtClean="0">
                 <a:solidFill>
                   <a:srgbClr val="000080"/>
                 </a:solidFill>
@@ -9566,10 +9661,22 @@
                 </a:highlight>
                 <a:latin typeface="Courier New"/>
               </a:rPr>
-              <a:t>(m5(</a:t>
-            </a:r>
-            <a:r>
-              <a:rPr lang="en-US" sz="2200" b="1" dirty="0" smtClean="0">
+              <a:t>(m5</a:t>
+            </a:r>
+            <a:r>
+              <a:rPr lang="en-US" sz="2600" b="1" dirty="0">
+                <a:solidFill>
+                  <a:srgbClr val="000080"/>
+                </a:solidFill>
+                <a:highlight>
+                  <a:srgbClr val="FFFFFF"/>
+                </a:highlight>
+                <a:latin typeface="Courier New"/>
+              </a:rPr>
+              <a:t>(</a:t>
+            </a:r>
+            <a:r>
+              <a:rPr lang="en-US" sz="2600" b="1" dirty="0">
                 <a:solidFill>
                   <a:srgbClr val="0000FF"/>
                 </a:solidFill>
@@ -9581,7 +9688,7 @@
               <a:t>'select * from dual'</a:t>
             </a:r>
             <a:r>
-              <a:rPr lang="en-US" sz="2200" b="1" dirty="0" smtClean="0">
+              <a:rPr lang="en-US" sz="2600" b="1" dirty="0">
                 <a:solidFill>
                   <a:srgbClr val="000080"/>
                 </a:solidFill>
@@ -9593,7 +9700,7 @@
               <a:t>, </a:t>
             </a:r>
             <a:r>
-              <a:rPr lang="en-US" sz="2200" b="1" dirty="0" smtClean="0">
+              <a:rPr lang="en-US" sz="2600" b="1" dirty="0">
                 <a:solidFill>
                   <a:srgbClr val="0000FF"/>
                 </a:solidFill>
@@ -9605,7 +9712,7 @@
               <a:t>'</a:t>
             </a:r>
             <a:r>
-              <a:rPr lang="en-US" sz="2200" b="1" dirty="0" err="1" smtClean="0">
+              <a:rPr lang="en-US" sz="2600" b="1" dirty="0" err="1">
                 <a:solidFill>
                   <a:srgbClr val="0000FF"/>
                 </a:solidFill>
@@ -9617,7 +9724,7 @@
               <a:t>dev,qa</a:t>
             </a:r>
             <a:r>
-              <a:rPr lang="en-US" sz="2200" b="1" dirty="0" smtClean="0">
+              <a:rPr lang="en-US" sz="2600" b="1" dirty="0" smtClean="0">
                 <a:solidFill>
                   <a:srgbClr val="0000FF"/>
                 </a:solidFill>
@@ -9629,7 +9736,7 @@
               <a:t>'</a:t>
             </a:r>
             <a:r>
-              <a:rPr lang="en-US" sz="2200" b="1" dirty="0" smtClean="0">
+              <a:rPr lang="en-US" sz="2600" b="1" dirty="0" smtClean="0">
                 <a:solidFill>
                   <a:srgbClr val="000080"/>
                 </a:solidFill>
@@ -9640,145 +9747,630 @@
               </a:rPr>
               <a:t>));</a:t>
             </a:r>
-            <a:endParaRPr lang="en-US" sz="2200" b="1" dirty="0"/>
-          </a:p>
-          <a:p>
-            <a:pPr marL="514350" indent="-514350">
-              <a:buFont typeface="+mj-lt"/>
-              <a:buAutoNum type="arabicPeriod"/>
+          </a:p>
+          <a:p>
+            <a:pPr marL="0" indent="0">
+              <a:buNone/>
             </a:pPr>
-            <a:r>
-              <a:rPr lang="en-US" dirty="0" smtClean="0"/>
-              <a:t>Performance</a:t>
-            </a:r>
-            <a:r>
-              <a:rPr lang="en-US" dirty="0" smtClean="0">
-                <a:solidFill>
-                  <a:schemeClr val="bg1">
-                    <a:lumMod val="50000"/>
-                  </a:schemeClr>
-                </a:solidFill>
+            <a:endParaRPr lang="en-US" sz="2000" b="1" dirty="0" smtClean="0">
+              <a:solidFill>
+                <a:srgbClr val="000080"/>
+              </a:solidFill>
+              <a:highlight>
+                <a:srgbClr val="FFFFFF"/>
+              </a:highlight>
+              <a:latin typeface="Courier New"/>
+            </a:endParaRPr>
+          </a:p>
+          <a:p>
+            <a:pPr marL="0" indent="0">
+              <a:buNone/>
+            </a:pPr>
+            <a:r>
+              <a:rPr lang="en-US" sz="2000" b="1" dirty="0" smtClean="0">
+                <a:solidFill>
+                  <a:srgbClr val="000080"/>
+                </a:solidFill>
+                <a:highlight>
+                  <a:srgbClr val="FFFFFF"/>
+                </a:highlight>
+                <a:latin typeface="Courier New"/>
               </a:rPr>
-              <a:t> - fast, asynchronous</a:t>
-            </a:r>
-          </a:p>
-          <a:p>
-            <a:pPr marL="514350" indent="-514350">
-              <a:buFont typeface="+mj-lt"/>
-              <a:buAutoNum type="arabicPeriod"/>
+              <a:t/>
+            </a:r>
+            <a:br>
+              <a:rPr lang="en-US" sz="2000" b="1" dirty="0" smtClean="0">
+                <a:solidFill>
+                  <a:srgbClr val="000080"/>
+                </a:solidFill>
+                <a:highlight>
+                  <a:srgbClr val="FFFFFF"/>
+                </a:highlight>
+                <a:latin typeface="Courier New"/>
+              </a:rPr>
+            </a:br>
+            <a:r>
+              <a:rPr lang="en-US" sz="2600" b="1" dirty="0">
+                <a:solidFill>
+                  <a:srgbClr val="008080"/>
+                </a:solidFill>
+                <a:highlight>
+                  <a:srgbClr val="FFFFFF"/>
+                </a:highlight>
+                <a:latin typeface="Courier New"/>
+              </a:rPr>
+              <a:t>begin</a:t>
+            </a:r>
+            <a:endParaRPr lang="en-US" sz="2600" b="1" dirty="0">
+              <a:solidFill>
+                <a:srgbClr val="000080"/>
+              </a:solidFill>
+              <a:highlight>
+                <a:srgbClr val="FFFFFF"/>
+              </a:highlight>
+              <a:latin typeface="Courier New"/>
+            </a:endParaRPr>
+          </a:p>
+          <a:p>
+            <a:pPr marL="0" indent="0">
+              <a:buNone/>
             </a:pPr>
             <a:r>
-              <a:rPr lang="en-US" dirty="0" smtClean="0"/>
-              <a:t>Interface - </a:t>
-            </a:r>
-            <a:r>
-              <a:rPr lang="en-US" dirty="0" smtClean="0">
-                <a:solidFill>
-                  <a:schemeClr val="bg1">
-                    <a:lumMod val="50000"/>
-                  </a:schemeClr>
-                </a:solidFill>
+              <a:rPr lang="en-US" sz="2600" b="1" dirty="0" smtClean="0">
+                <a:solidFill>
+                  <a:srgbClr val="000080"/>
+                </a:solidFill>
+                <a:highlight>
+                  <a:srgbClr val="FFFFFF"/>
+                </a:highlight>
+                <a:latin typeface="Courier New"/>
               </a:rPr>
-              <a:t>plain SQL and PL/SQL</a:t>
-            </a:r>
-          </a:p>
-          <a:p>
-            <a:pPr marL="514350" indent="-514350">
-              <a:buFont typeface="+mj-lt"/>
-              <a:buAutoNum type="arabicPeriod"/>
+              <a:t>  m5_proc</a:t>
+            </a:r>
+            <a:r>
+              <a:rPr lang="en-US" sz="2600" b="1" dirty="0">
+                <a:solidFill>
+                  <a:srgbClr val="000080"/>
+                </a:solidFill>
+                <a:highlight>
+                  <a:srgbClr val="FFFFFF"/>
+                </a:highlight>
+                <a:latin typeface="Courier New"/>
+              </a:rPr>
+              <a:t>(</a:t>
+            </a:r>
+          </a:p>
+          <a:p>
+            <a:pPr marL="0" indent="0">
+              <a:buNone/>
             </a:pPr>
             <a:r>
-              <a:rPr lang="en-US" dirty="0" smtClean="0"/>
-              <a:t>Relational - </a:t>
-            </a:r>
-            <a:r>
-              <a:rPr lang="en-US" dirty="0" smtClean="0">
-                <a:solidFill>
-                  <a:schemeClr val="bg1">
-                    <a:lumMod val="50000"/>
-                  </a:schemeClr>
-                </a:solidFill>
+              <a:rPr lang="en-US" sz="2600" b="1" dirty="0" smtClean="0">
+                <a:solidFill>
+                  <a:srgbClr val="000080"/>
+                </a:solidFill>
+                <a:highlight>
+                  <a:srgbClr val="FFFFFF"/>
+                </a:highlight>
+                <a:latin typeface="Courier New"/>
               </a:rPr>
-              <a:t>save, share, and join</a:t>
-            </a:r>
-          </a:p>
-          <a:p>
-            <a:pPr marL="514350" indent="-514350">
-              <a:buFont typeface="+mj-lt"/>
-              <a:buAutoNum type="arabicPeriod"/>
+              <a:t>    </a:t>
+            </a:r>
+            <a:r>
+              <a:rPr lang="en-US" sz="2600" b="1" dirty="0" err="1" smtClean="0">
+                <a:solidFill>
+                  <a:srgbClr val="000080"/>
+                </a:solidFill>
+                <a:highlight>
+                  <a:srgbClr val="FFFFFF"/>
+                </a:highlight>
+                <a:latin typeface="Courier New"/>
+              </a:rPr>
+              <a:t>p_code</a:t>
+            </a:r>
+            <a:r>
+              <a:rPr lang="en-US" sz="2600" b="1" dirty="0" smtClean="0">
+                <a:solidFill>
+                  <a:srgbClr val="000080"/>
+                </a:solidFill>
+                <a:highlight>
+                  <a:srgbClr val="FFFFFF"/>
+                </a:highlight>
+                <a:latin typeface="Courier New"/>
+              </a:rPr>
+              <a:t> =&gt; </a:t>
+            </a:r>
+            <a:r>
+              <a:rPr lang="en-US" sz="2600" b="1" dirty="0" smtClean="0">
+                <a:solidFill>
+                  <a:srgbClr val="0000FF"/>
+                </a:solidFill>
+                <a:highlight>
+                  <a:srgbClr val="FFFFFF"/>
+                </a:highlight>
+                <a:latin typeface="Courier New"/>
+              </a:rPr>
+              <a:t>'select </a:t>
+            </a:r>
+            <a:r>
+              <a:rPr lang="en-US" sz="2600" b="1" dirty="0">
+                <a:solidFill>
+                  <a:srgbClr val="0000FF"/>
+                </a:solidFill>
+                <a:highlight>
+                  <a:srgbClr val="FFFFFF"/>
+                </a:highlight>
+                <a:latin typeface="Courier New"/>
+              </a:rPr>
+              <a:t>* from </a:t>
+            </a:r>
+            <a:r>
+              <a:rPr lang="en-US" sz="2600" b="1" dirty="0" smtClean="0">
+                <a:solidFill>
+                  <a:srgbClr val="0000FF"/>
+                </a:solidFill>
+                <a:highlight>
+                  <a:srgbClr val="FFFFFF"/>
+                </a:highlight>
+                <a:latin typeface="Courier New"/>
+              </a:rPr>
+              <a:t>dual'</a:t>
+            </a:r>
+            <a:r>
+              <a:rPr lang="en-US" sz="2600" b="1" dirty="0" smtClean="0">
+                <a:solidFill>
+                  <a:srgbClr val="000080"/>
+                </a:solidFill>
+                <a:highlight>
+                  <a:srgbClr val="FFFFFF"/>
+                </a:highlight>
+                <a:latin typeface="Courier New"/>
+              </a:rPr>
+              <a:t>,</a:t>
+            </a:r>
+            <a:endParaRPr lang="en-US" sz="2600" b="1" dirty="0">
+              <a:solidFill>
+                <a:srgbClr val="000080"/>
+              </a:solidFill>
+              <a:highlight>
+                <a:srgbClr val="FFFFFF"/>
+              </a:highlight>
+              <a:latin typeface="Courier New"/>
+            </a:endParaRPr>
+          </a:p>
+          <a:p>
+            <a:pPr marL="0" indent="0">
+              <a:buNone/>
             </a:pPr>
             <a:r>
-              <a:rPr lang="en-US" dirty="0" smtClean="0"/>
-              <a:t>Administration </a:t>
-            </a:r>
-            <a:r>
-              <a:rPr lang="en-US" dirty="0" smtClean="0">
-                <a:solidFill>
-                  <a:schemeClr val="bg1">
-                    <a:lumMod val="50000"/>
-                  </a:schemeClr>
-                </a:solidFill>
+              <a:rPr lang="en-US" sz="2600" b="1" dirty="0" smtClean="0">
+                <a:solidFill>
+                  <a:srgbClr val="000080"/>
+                </a:solidFill>
+                <a:highlight>
+                  <a:srgbClr val="FFFFFF"/>
+                </a:highlight>
+                <a:latin typeface="Courier New"/>
               </a:rPr>
-              <a:t>- for most users - none</a:t>
-            </a:r>
-          </a:p>
-          <a:p>
-            <a:pPr marL="514350" indent="-514350">
-              <a:buFont typeface="+mj-lt"/>
-              <a:buAutoNum type="arabicPeriod"/>
+              <a:t>    </a:t>
+            </a:r>
+            <a:r>
+              <a:rPr lang="en-US" sz="2600" b="1" dirty="0" err="1" smtClean="0">
+                <a:solidFill>
+                  <a:srgbClr val="000080"/>
+                </a:solidFill>
+                <a:highlight>
+                  <a:srgbClr val="FFFFFF"/>
+                </a:highlight>
+                <a:latin typeface="Courier New"/>
+              </a:rPr>
+              <a:t>p_targets</a:t>
+            </a:r>
+            <a:r>
+              <a:rPr lang="en-US" sz="2600" b="1" dirty="0" smtClean="0">
+                <a:solidFill>
+                  <a:srgbClr val="000080"/>
+                </a:solidFill>
+                <a:highlight>
+                  <a:srgbClr val="FFFFFF"/>
+                </a:highlight>
+                <a:latin typeface="Courier New"/>
+              </a:rPr>
+              <a:t> =&gt;  </a:t>
+            </a:r>
+            <a:r>
+              <a:rPr lang="en-US" sz="2600" b="1" dirty="0">
+                <a:solidFill>
+                  <a:srgbClr val="0000FF"/>
+                </a:solidFill>
+                <a:highlight>
+                  <a:srgbClr val="FFFFFF"/>
+                </a:highlight>
+                <a:latin typeface="Courier New"/>
+              </a:rPr>
+              <a:t>'</a:t>
+            </a:r>
+            <a:r>
+              <a:rPr lang="en-US" sz="2600" b="1" dirty="0" err="1">
+                <a:solidFill>
+                  <a:srgbClr val="0000FF"/>
+                </a:solidFill>
+                <a:highlight>
+                  <a:srgbClr val="FFFFFF"/>
+                </a:highlight>
+                <a:latin typeface="Courier New"/>
+              </a:rPr>
+              <a:t>dev,qa</a:t>
+            </a:r>
+            <a:r>
+              <a:rPr lang="en-US" sz="2600" b="1" dirty="0">
+                <a:solidFill>
+                  <a:srgbClr val="0000FF"/>
+                </a:solidFill>
+                <a:highlight>
+                  <a:srgbClr val="FFFFFF"/>
+                </a:highlight>
+                <a:latin typeface="Courier New"/>
+              </a:rPr>
+              <a:t>'</a:t>
+            </a:r>
+            <a:r>
+              <a:rPr lang="en-US" sz="2600" b="1" dirty="0">
+                <a:solidFill>
+                  <a:srgbClr val="000080"/>
+                </a:solidFill>
+                <a:highlight>
+                  <a:srgbClr val="FFFFFF"/>
+                </a:highlight>
+                <a:latin typeface="Courier New"/>
+              </a:rPr>
+              <a:t>,</a:t>
+            </a:r>
+          </a:p>
+          <a:p>
+            <a:pPr marL="0" indent="0">
+              <a:buNone/>
             </a:pPr>
             <a:r>
-              <a:rPr lang="en-US" dirty="0" smtClean="0"/>
-              <a:t>Security </a:t>
-            </a:r>
-            <a:r>
-              <a:rPr lang="en-US" dirty="0" smtClean="0">
-                <a:solidFill>
-                  <a:schemeClr val="bg1">
-                    <a:lumMod val="50000"/>
-                  </a:schemeClr>
-                </a:solidFill>
+              <a:rPr lang="en-US" sz="2600" b="1" dirty="0" smtClean="0">
+                <a:solidFill>
+                  <a:srgbClr val="000080"/>
+                </a:solidFill>
+                <a:highlight>
+                  <a:srgbClr val="FFFFFF"/>
+                </a:highlight>
+                <a:latin typeface="Courier New"/>
               </a:rPr>
-              <a:t>- nothing to worry about</a:t>
-            </a:r>
-          </a:p>
-          <a:p>
-            <a:pPr marL="514350" indent="-514350">
-              <a:buFont typeface="+mj-lt"/>
-              <a:buAutoNum type="arabicPeriod"/>
+              <a:t>    </a:t>
+            </a:r>
+            <a:r>
+              <a:rPr lang="en-US" sz="2600" b="1" dirty="0" err="1" smtClean="0">
+                <a:solidFill>
+                  <a:srgbClr val="000080"/>
+                </a:solidFill>
+                <a:highlight>
+                  <a:srgbClr val="FFFFFF"/>
+                </a:highlight>
+                <a:latin typeface="Courier New"/>
+              </a:rPr>
+              <a:t>p_table_name</a:t>
+            </a:r>
+            <a:r>
+              <a:rPr lang="en-US" sz="2600" b="1" dirty="0" smtClean="0">
+                <a:solidFill>
+                  <a:srgbClr val="000080"/>
+                </a:solidFill>
+                <a:highlight>
+                  <a:srgbClr val="FFFFFF"/>
+                </a:highlight>
+                <a:latin typeface="Courier New"/>
+              </a:rPr>
+              <a:t> =&gt; </a:t>
+            </a:r>
+            <a:r>
+              <a:rPr lang="en-US" sz="2600" b="1" dirty="0">
+                <a:solidFill>
+                  <a:srgbClr val="0000FF"/>
+                </a:solidFill>
+                <a:highlight>
+                  <a:srgbClr val="FFFFFF"/>
+                </a:highlight>
+                <a:latin typeface="Courier New"/>
+              </a:rPr>
+              <a:t>'</a:t>
+            </a:r>
+            <a:r>
+              <a:rPr lang="en-US" sz="2600" b="1" dirty="0" err="1">
+                <a:solidFill>
+                  <a:srgbClr val="0000FF"/>
+                </a:solidFill>
+                <a:highlight>
+                  <a:srgbClr val="FFFFFF"/>
+                </a:highlight>
+                <a:latin typeface="Courier New"/>
+              </a:rPr>
+              <a:t>test_data</a:t>
+            </a:r>
+            <a:r>
+              <a:rPr lang="en-US" sz="2600" b="1" dirty="0">
+                <a:solidFill>
+                  <a:srgbClr val="0000FF"/>
+                </a:solidFill>
+                <a:highlight>
+                  <a:srgbClr val="FFFFFF"/>
+                </a:highlight>
+                <a:latin typeface="Courier New"/>
+              </a:rPr>
+              <a:t>'</a:t>
+            </a:r>
+            <a:r>
+              <a:rPr lang="en-US" sz="2600" b="1" dirty="0">
+                <a:solidFill>
+                  <a:srgbClr val="000080"/>
+                </a:solidFill>
+                <a:highlight>
+                  <a:srgbClr val="FFFFFF"/>
+                </a:highlight>
+                <a:latin typeface="Courier New"/>
+              </a:rPr>
+              <a:t>,</a:t>
+            </a:r>
+          </a:p>
+          <a:p>
+            <a:pPr marL="0" indent="0">
+              <a:buNone/>
             </a:pPr>
             <a:r>
-              <a:rPr lang="en-US" dirty="0" smtClean="0"/>
-              <a:t>Exceptions and Metadata </a:t>
-            </a:r>
-            <a:r>
-              <a:rPr lang="en-US" dirty="0" smtClean="0">
-                <a:solidFill>
-                  <a:schemeClr val="bg1">
-                    <a:lumMod val="50000"/>
-                  </a:schemeClr>
-                </a:solidFill>
+              <a:rPr lang="en-US" sz="2600" b="1" dirty="0" smtClean="0">
+                <a:solidFill>
+                  <a:srgbClr val="000080"/>
+                </a:solidFill>
+                <a:highlight>
+                  <a:srgbClr val="FFFFFF"/>
+                </a:highlight>
+                <a:latin typeface="Courier New"/>
               </a:rPr>
-              <a:t>- </a:t>
-            </a:r>
-            <a:r>
-              <a:rPr lang="en-US" dirty="0" smtClean="0">
-                <a:solidFill>
-                  <a:schemeClr val="bg1">
-                    <a:lumMod val="50000"/>
-                  </a:schemeClr>
-                </a:solidFill>
+              <a:t>    </a:t>
+            </a:r>
+            <a:r>
+              <a:rPr lang="en-US" sz="2600" b="1" dirty="0" err="1" smtClean="0">
+                <a:solidFill>
+                  <a:srgbClr val="000080"/>
+                </a:solidFill>
+                <a:highlight>
+                  <a:srgbClr val="FFFFFF"/>
+                </a:highlight>
+                <a:latin typeface="Courier New"/>
               </a:rPr>
-              <a:t>handled</a:t>
-            </a:r>
-            <a:endParaRPr lang="en-US" dirty="0">
+              <a:t>p_table_exists_action</a:t>
+            </a:r>
+            <a:r>
+              <a:rPr lang="en-US" sz="2600" b="1" dirty="0" smtClean="0">
+                <a:solidFill>
+                  <a:srgbClr val="000080"/>
+                </a:solidFill>
+                <a:highlight>
+                  <a:srgbClr val="FFFFFF"/>
+                </a:highlight>
+                <a:latin typeface="Courier New"/>
+              </a:rPr>
+              <a:t> </a:t>
+            </a:r>
+            <a:r>
+              <a:rPr lang="en-US" sz="2600" b="1" dirty="0">
+                <a:solidFill>
+                  <a:srgbClr val="000080"/>
+                </a:solidFill>
+                <a:highlight>
+                  <a:srgbClr val="FFFFFF"/>
+                </a:highlight>
+                <a:latin typeface="Courier New"/>
+              </a:rPr>
+              <a:t>=&gt; </a:t>
+            </a:r>
+            <a:r>
+              <a:rPr lang="en-US" sz="2600" b="1" dirty="0">
+                <a:solidFill>
+                  <a:srgbClr val="0000FF"/>
+                </a:solidFill>
+                <a:highlight>
+                  <a:srgbClr val="FFFFFF"/>
+                </a:highlight>
+                <a:latin typeface="Courier New"/>
+              </a:rPr>
+              <a:t>'drop'</a:t>
+            </a:r>
+            <a:r>
+              <a:rPr lang="en-US" sz="2600" b="1" dirty="0">
+                <a:solidFill>
+                  <a:srgbClr val="000080"/>
+                </a:solidFill>
+                <a:highlight>
+                  <a:srgbClr val="FFFFFF"/>
+                </a:highlight>
+                <a:latin typeface="Courier New"/>
+              </a:rPr>
+              <a:t>,</a:t>
+            </a:r>
+          </a:p>
+          <a:p>
+            <a:pPr marL="0" indent="0">
+              <a:buNone/>
+            </a:pPr>
+            <a:r>
+              <a:rPr lang="en-US" sz="2600" b="1" dirty="0" smtClean="0">
+                <a:solidFill>
+                  <a:srgbClr val="000080"/>
+                </a:solidFill>
+                <a:highlight>
+                  <a:srgbClr val="FFFFFF"/>
+                </a:highlight>
+                <a:latin typeface="Courier New"/>
+              </a:rPr>
+              <a:t>    </a:t>
+            </a:r>
+            <a:r>
+              <a:rPr lang="en-US" sz="2600" b="1" dirty="0" err="1" smtClean="0">
+                <a:solidFill>
+                  <a:srgbClr val="000080"/>
+                </a:solidFill>
+                <a:highlight>
+                  <a:srgbClr val="FFFFFF"/>
+                </a:highlight>
+                <a:latin typeface="Courier New"/>
+              </a:rPr>
+              <a:t>p_asynchronous</a:t>
+            </a:r>
+            <a:r>
+              <a:rPr lang="en-US" sz="2600" b="1" dirty="0" smtClean="0">
+                <a:solidFill>
+                  <a:srgbClr val="000080"/>
+                </a:solidFill>
+                <a:highlight>
+                  <a:srgbClr val="FFFFFF"/>
+                </a:highlight>
+                <a:latin typeface="Courier New"/>
+              </a:rPr>
+              <a:t> =&gt; </a:t>
+            </a:r>
+            <a:r>
+              <a:rPr lang="en-US" sz="2600" b="1" dirty="0" smtClean="0">
+                <a:solidFill>
+                  <a:srgbClr val="008080"/>
+                </a:solidFill>
+                <a:highlight>
+                  <a:srgbClr val="FFFFFF"/>
+                </a:highlight>
+                <a:latin typeface="Courier New"/>
+              </a:rPr>
+              <a:t>true</a:t>
+            </a:r>
+            <a:endParaRPr lang="en-US" sz="2600" b="1" dirty="0" smtClean="0">
               <a:solidFill>
-                <a:schemeClr val="bg1">
-                  <a:lumMod val="50000"/>
-                </a:schemeClr>
+                <a:srgbClr val="000080"/>
               </a:solidFill>
+              <a:highlight>
+                <a:srgbClr val="FFFFFF"/>
+              </a:highlight>
+              <a:latin typeface="Courier New"/>
             </a:endParaRPr>
           </a:p>
+          <a:p>
+            <a:pPr marL="0" indent="0">
+              <a:buNone/>
+            </a:pPr>
+            <a:r>
+              <a:rPr lang="en-US" sz="2600" b="1" dirty="0" smtClean="0">
+                <a:solidFill>
+                  <a:srgbClr val="000080"/>
+                </a:solidFill>
+                <a:highlight>
+                  <a:srgbClr val="FFFFFF"/>
+                </a:highlight>
+                <a:latin typeface="Courier New"/>
+              </a:rPr>
+              <a:t>  );</a:t>
+            </a:r>
+            <a:endParaRPr lang="en-US" sz="2600" b="1" dirty="0">
+              <a:solidFill>
+                <a:srgbClr val="000080"/>
+              </a:solidFill>
+              <a:highlight>
+                <a:srgbClr val="FFFFFF"/>
+              </a:highlight>
+              <a:latin typeface="Courier New"/>
+            </a:endParaRPr>
+          </a:p>
+          <a:p>
+            <a:pPr marL="0" indent="0">
+              <a:buNone/>
+            </a:pPr>
+            <a:r>
+              <a:rPr lang="en-US" sz="2600" b="1" dirty="0" smtClean="0">
+                <a:solidFill>
+                  <a:srgbClr val="008080"/>
+                </a:solidFill>
+                <a:highlight>
+                  <a:srgbClr val="FFFFFF"/>
+                </a:highlight>
+                <a:latin typeface="Courier New"/>
+              </a:rPr>
+              <a:t>end</a:t>
+            </a:r>
+            <a:r>
+              <a:rPr lang="en-US" sz="2600" b="1" dirty="0">
+                <a:solidFill>
+                  <a:srgbClr val="000080"/>
+                </a:solidFill>
+                <a:highlight>
+                  <a:srgbClr val="FFFFFF"/>
+                </a:highlight>
+                <a:latin typeface="Courier New"/>
+              </a:rPr>
+              <a:t>;</a:t>
+            </a:r>
+          </a:p>
+          <a:p>
+            <a:pPr marL="0" indent="0">
+              <a:buNone/>
+            </a:pPr>
+            <a:r>
+              <a:rPr lang="en-US" sz="2600" b="1" dirty="0" smtClean="0">
+                <a:solidFill>
+                  <a:srgbClr val="000080"/>
+                </a:solidFill>
+                <a:highlight>
+                  <a:srgbClr val="FFFFFF"/>
+                </a:highlight>
+                <a:latin typeface="Courier New"/>
+              </a:rPr>
+              <a:t>/</a:t>
+            </a:r>
+          </a:p>
+        </p:txBody>
+      </p:sp>
+      <p:sp>
+        <p:nvSpPr>
+          <p:cNvPr id="6" name="Rectangle 5"/>
+          <p:cNvSpPr/>
+          <p:nvPr/>
+        </p:nvSpPr>
+        <p:spPr>
+          <a:xfrm>
+            <a:off x="2971800" y="2286000"/>
+            <a:ext cx="3200400" cy="377851"/>
+          </a:xfrm>
+          <a:prstGeom prst="rect">
+            <a:avLst/>
+          </a:prstGeom>
+        </p:spPr>
+        <p:style>
+          <a:lnRef idx="2">
+            <a:schemeClr val="accent1">
+              <a:shade val="50000"/>
+            </a:schemeClr>
+          </a:lnRef>
+          <a:fillRef idx="1">
+            <a:schemeClr val="accent1"/>
+          </a:fillRef>
+          <a:effectRef idx="0">
+            <a:schemeClr val="accent1"/>
+          </a:effectRef>
+          <a:fontRef idx="minor">
+            <a:schemeClr val="lt1"/>
+          </a:fontRef>
+        </p:style>
+        <p:txBody>
+          <a:bodyPr rtlCol="0" anchor="ctr"/>
+          <a:lstStyle/>
+          <a:p>
+            <a:pPr algn="ctr"/>
+            <a:r>
+              <a:rPr lang="en-US" sz="2800" dirty="0" smtClean="0"/>
+              <a:t>WHAT</a:t>
+            </a:r>
+            <a:endParaRPr lang="en-US" sz="2800" dirty="0"/>
+          </a:p>
         </p:txBody>
       </p:sp>
       <p:sp>
@@ -9796,11 +10388,11 @@
           <a:bodyPr/>
           <a:lstStyle/>
           <a:p>
-            <a:fld id="{D97E924C-66F2-4356-A8CE-66225EAB43F5}" type="datetime1">
-              <a:rPr lang="en-US" smtClean="0"/>
-              <a:t>2017-01-08</a:t>
+            <a:fld id="{12698F6C-3B60-45A8-AA68-1C639B61BEFF}" type="datetime1">
+              <a:rPr lang="en-US" smtClean="0"/>
+              <a:t>2017-01-12</a:t>
             </a:fld>
-            <a:endParaRPr lang="en-US"/>
+            <a:endParaRPr lang="en-US" dirty="0"/>
           </a:p>
         </p:txBody>
       </p:sp>
@@ -9827,10 +10419,186 @@
           </a:p>
         </p:txBody>
       </p:sp>
+      <p:sp>
+        <p:nvSpPr>
+          <p:cNvPr id="7" name="Rectangle 6"/>
+          <p:cNvSpPr/>
+          <p:nvPr/>
+        </p:nvSpPr>
+        <p:spPr>
+          <a:xfrm>
+            <a:off x="6696750" y="2286000"/>
+            <a:ext cx="1177634" cy="377851"/>
+          </a:xfrm>
+          <a:prstGeom prst="rect">
+            <a:avLst/>
+          </a:prstGeom>
+        </p:spPr>
+        <p:style>
+          <a:lnRef idx="2">
+            <a:schemeClr val="accent1">
+              <a:shade val="50000"/>
+            </a:schemeClr>
+          </a:lnRef>
+          <a:fillRef idx="1">
+            <a:schemeClr val="accent1"/>
+          </a:fillRef>
+          <a:effectRef idx="0">
+            <a:schemeClr val="accent1"/>
+          </a:effectRef>
+          <a:fontRef idx="minor">
+            <a:schemeClr val="lt1"/>
+          </a:fontRef>
+        </p:style>
+        <p:txBody>
+          <a:bodyPr lIns="0" rIns="0" rtlCol="0" anchor="ctr"/>
+          <a:lstStyle/>
+          <a:p>
+            <a:pPr algn="ctr"/>
+            <a:r>
+              <a:rPr lang="en-US" sz="2800" dirty="0" smtClean="0"/>
+              <a:t>WHERE</a:t>
+            </a:r>
+            <a:endParaRPr lang="en-US" sz="2800" dirty="0"/>
+          </a:p>
+        </p:txBody>
+      </p:sp>
+      <p:sp>
+        <p:nvSpPr>
+          <p:cNvPr id="8" name="Rectangle 7"/>
+          <p:cNvSpPr/>
+          <p:nvPr/>
+        </p:nvSpPr>
+        <p:spPr>
+          <a:xfrm>
+            <a:off x="6705600" y="3378201"/>
+            <a:ext cx="1295400" cy="304800"/>
+          </a:xfrm>
+          <a:prstGeom prst="rect">
+            <a:avLst/>
+          </a:prstGeom>
+        </p:spPr>
+        <p:style>
+          <a:lnRef idx="2">
+            <a:schemeClr val="accent1">
+              <a:shade val="50000"/>
+            </a:schemeClr>
+          </a:lnRef>
+          <a:fillRef idx="1">
+            <a:schemeClr val="accent1"/>
+          </a:fillRef>
+          <a:effectRef idx="0">
+            <a:schemeClr val="accent1"/>
+          </a:effectRef>
+          <a:fontRef idx="minor">
+            <a:schemeClr val="lt1"/>
+          </a:fontRef>
+        </p:style>
+        <p:txBody>
+          <a:bodyPr rtlCol="0" anchor="ctr"/>
+          <a:lstStyle/>
+          <a:p>
+            <a:pPr algn="ctr"/>
+            <a:r>
+              <a:rPr lang="en-US" sz="2800" dirty="0" smtClean="0"/>
+              <a:t>WHAT</a:t>
+            </a:r>
+            <a:endParaRPr lang="en-US" sz="2400" dirty="0"/>
+          </a:p>
+        </p:txBody>
+      </p:sp>
+      <p:sp>
+        <p:nvSpPr>
+          <p:cNvPr id="9" name="Rectangle 8"/>
+          <p:cNvSpPr/>
+          <p:nvPr/>
+        </p:nvSpPr>
+        <p:spPr>
+          <a:xfrm>
+            <a:off x="6705600" y="3760078"/>
+            <a:ext cx="1295400" cy="335280"/>
+          </a:xfrm>
+          <a:prstGeom prst="rect">
+            <a:avLst/>
+          </a:prstGeom>
+        </p:spPr>
+        <p:style>
+          <a:lnRef idx="2">
+            <a:schemeClr val="accent1">
+              <a:shade val="50000"/>
+            </a:schemeClr>
+          </a:lnRef>
+          <a:fillRef idx="1">
+            <a:schemeClr val="accent1"/>
+          </a:fillRef>
+          <a:effectRef idx="0">
+            <a:schemeClr val="accent1"/>
+          </a:effectRef>
+          <a:fontRef idx="minor">
+            <a:schemeClr val="lt1"/>
+          </a:fontRef>
+        </p:style>
+        <p:txBody>
+          <a:bodyPr rtlCol="0" anchor="ctr"/>
+          <a:lstStyle/>
+          <a:p>
+            <a:pPr algn="ctr"/>
+            <a:r>
+              <a:rPr lang="en-US" sz="2800" dirty="0" smtClean="0"/>
+              <a:t>WHERE</a:t>
+            </a:r>
+            <a:endParaRPr lang="en-US" sz="2800" dirty="0"/>
+          </a:p>
+        </p:txBody>
+      </p:sp>
+      <p:sp>
+        <p:nvSpPr>
+          <p:cNvPr id="10" name="Rectangle 9"/>
+          <p:cNvSpPr/>
+          <p:nvPr/>
+        </p:nvSpPr>
+        <p:spPr>
+          <a:xfrm>
+            <a:off x="6705600" y="4172436"/>
+            <a:ext cx="1295400" cy="951528"/>
+          </a:xfrm>
+          <a:prstGeom prst="rect">
+            <a:avLst/>
+          </a:prstGeom>
+        </p:spPr>
+        <p:style>
+          <a:lnRef idx="2">
+            <a:schemeClr val="accent1">
+              <a:shade val="50000"/>
+            </a:schemeClr>
+          </a:lnRef>
+          <a:fillRef idx="1">
+            <a:schemeClr val="accent1"/>
+          </a:fillRef>
+          <a:effectRef idx="0">
+            <a:schemeClr val="accent1"/>
+          </a:effectRef>
+          <a:fontRef idx="minor">
+            <a:schemeClr val="lt1"/>
+          </a:fontRef>
+        </p:style>
+        <p:txBody>
+          <a:bodyPr rtlCol="0" anchor="ctr"/>
+          <a:lstStyle/>
+          <a:p>
+            <a:pPr algn="ctr"/>
+            <a:r>
+              <a:rPr lang="en-US" sz="2800" dirty="0" smtClean="0"/>
+              <a:t>HOW</a:t>
+            </a:r>
+            <a:endParaRPr lang="en-US" sz="2800" dirty="0"/>
+          </a:p>
+        </p:txBody>
+      </p:sp>
     </p:spTree>
     <p:extLst>
       <p:ext uri="{BB962C8B-B14F-4D97-AF65-F5344CB8AC3E}">
-        <p14:creationId xmlns:p14="http://schemas.microsoft.com/office/powerpoint/2010/main" val="2488138635"/>
+        <p14:creationId xmlns:p14="http://schemas.microsoft.com/office/powerpoint/2010/main" val="2705181770"/>
       </p:ext>
     </p:extLst>
   </p:cSld>
@@ -9881,7 +10649,7 @@
           <a:p>
             <a:r>
               <a:rPr lang="en-US" dirty="0" smtClean="0"/>
-              <a:t>Parameters</a:t>
+              <a:t>Basic Features</a:t>
             </a:r>
             <a:endParaRPr lang="en-US" dirty="0"/>
           </a:p>
@@ -9899,7 +10667,9 @@
         </p:nvSpPr>
         <p:spPr/>
         <p:txBody>
-          <a:bodyPr/>
+          <a:bodyPr>
+            <a:normAutofit/>
+          </a:bodyPr>
           <a:lstStyle/>
           <a:p>
             <a:pPr marL="514350" indent="-514350">
@@ -9908,7 +10678,7 @@
             </a:pPr>
             <a:r>
               <a:rPr lang="en-US" dirty="0" smtClean="0"/>
-              <a:t>P_CODE</a:t>
+              <a:t>Performance</a:t>
             </a:r>
             <a:r>
               <a:rPr lang="en-US" dirty="0" smtClean="0">
@@ -9918,7 +10688,17 @@
                   </a:schemeClr>
                 </a:solidFill>
               </a:rPr>
-              <a:t> - what to run</a:t>
+              <a:t> </a:t>
+            </a:r>
+            <a:r>
+              <a:rPr lang="en-US" dirty="0" smtClean="0">
+                <a:solidFill>
+                  <a:schemeClr val="bg1">
+                    <a:lumMod val="50000"/>
+                  </a:schemeClr>
+                </a:solidFill>
+              </a:rPr>
+              <a:t>- fast, asynchronous</a:t>
             </a:r>
           </a:p>
           <a:p>
@@ -9928,7 +10708,7 @@
             </a:pPr>
             <a:r>
               <a:rPr lang="en-US" dirty="0" smtClean="0"/>
-              <a:t>P_TARGETS</a:t>
+              <a:t>Interface - </a:t>
             </a:r>
             <a:r>
               <a:rPr lang="en-US" dirty="0" smtClean="0">
@@ -9938,7 +10718,7 @@
                   </a:schemeClr>
                 </a:solidFill>
               </a:rPr>
-              <a:t> - where to run it</a:t>
+              <a:t>plain SQL and PL/SQL</a:t>
             </a:r>
           </a:p>
           <a:p>
@@ -9948,7 +10728,7 @@
             </a:pPr>
             <a:r>
               <a:rPr lang="en-US" dirty="0" smtClean="0"/>
-              <a:t>P_TABLE_NAME</a:t>
+              <a:t>Relational - </a:t>
             </a:r>
             <a:r>
               <a:rPr lang="en-US" dirty="0" smtClean="0">
@@ -9958,7 +10738,7 @@
                   </a:schemeClr>
                 </a:solidFill>
               </a:rPr>
-              <a:t> - where to save it</a:t>
+              <a:t>save, share, and join</a:t>
             </a:r>
           </a:p>
           <a:p>
@@ -9968,7 +10748,7 @@
             </a:pPr>
             <a:r>
               <a:rPr lang="en-US" dirty="0" smtClean="0"/>
-              <a:t>P_TABLE_EXISTS_ACTION</a:t>
+              <a:t>Administration </a:t>
             </a:r>
             <a:r>
               <a:rPr lang="en-US" dirty="0" smtClean="0">
@@ -9978,7 +10758,7 @@
                   </a:schemeClr>
                 </a:solidFill>
               </a:rPr>
-              <a:t> - if it already exists</a:t>
+              <a:t>- for most users - none</a:t>
             </a:r>
           </a:p>
           <a:p>
@@ -9988,7 +10768,7 @@
             </a:pPr>
             <a:r>
               <a:rPr lang="en-US" dirty="0" smtClean="0"/>
-              <a:t>P_ASYCHRONOUS</a:t>
+              <a:t>Security </a:t>
             </a:r>
             <a:r>
               <a:rPr lang="en-US" dirty="0" smtClean="0">
@@ -9998,7 +10778,27 @@
                   </a:schemeClr>
                 </a:solidFill>
               </a:rPr>
-              <a:t> - return or wait for all rows</a:t>
+              <a:t>- nothing to worry about</a:t>
+            </a:r>
+          </a:p>
+          <a:p>
+            <a:pPr marL="514350" indent="-514350">
+              <a:buFont typeface="+mj-lt"/>
+              <a:buAutoNum type="arabicPeriod"/>
+            </a:pPr>
+            <a:r>
+              <a:rPr lang="en-US" dirty="0" smtClean="0"/>
+              <a:t>Exceptions and Metadata </a:t>
+            </a:r>
+            <a:r>
+              <a:rPr lang="en-US" dirty="0" smtClean="0">
+                <a:solidFill>
+                  <a:schemeClr val="bg1">
+                    <a:lumMod val="50000"/>
+                  </a:schemeClr>
+                </a:solidFill>
+              </a:rPr>
+              <a:t>- handled</a:t>
             </a:r>
             <a:endParaRPr lang="en-US" dirty="0">
               <a:solidFill>
@@ -10025,9 +10825,9 @@
           <a:bodyPr/>
           <a:lstStyle/>
           <a:p>
-            <a:fld id="{73B3F948-1743-4F2D-B9D2-20F26DEE2D32}" type="datetime1">
-              <a:rPr lang="en-US" smtClean="0"/>
-              <a:t>2017-01-08</a:t>
+            <a:fld id="{D97E924C-66F2-4356-A8CE-66225EAB43F5}" type="datetime1">
+              <a:rPr lang="en-US" smtClean="0"/>
+              <a:t>2017-01-12</a:t>
             </a:fld>
             <a:endParaRPr lang="en-US"/>
           </a:p>
@@ -10059,7 +10859,7 @@
     </p:spTree>
     <p:extLst>
       <p:ext uri="{BB962C8B-B14F-4D97-AF65-F5344CB8AC3E}">
-        <p14:creationId xmlns:p14="http://schemas.microsoft.com/office/powerpoint/2010/main" val="3721550950"/>
+        <p14:creationId xmlns:p14="http://schemas.microsoft.com/office/powerpoint/2010/main" val="2488138635"/>
       </p:ext>
     </p:extLst>
   </p:cSld>

</xml_diff>

<commit_message>
Added link in summary, added admin email info.
</commit_message>
<xml_diff>
--- a/presentations/Method5.pptx
+++ b/presentations/Method5.pptx
@@ -210,7 +210,7 @@
           <a:p>
             <a:fld id="{E8184847-EC06-4734-8E30-343A2DA340C9}" type="datetimeFigureOut">
               <a:rPr lang="en-US" smtClean="0"/>
-              <a:t>2017-01-12</a:t>
+              <a:t>2017-01-16</a:t>
             </a:fld>
             <a:endParaRPr lang="en-US"/>
           </a:p>
@@ -375,7 +375,7 @@
           <a:p>
             <a:fld id="{DC284B00-8F05-4CB2-A4E6-4A642AFA915E}" type="datetimeFigureOut">
               <a:rPr lang="en-US" smtClean="0"/>
-              <a:t>2017-01-12</a:t>
+              <a:t>2017-01-16</a:t>
             </a:fld>
             <a:endParaRPr lang="en-US"/>
           </a:p>
@@ -776,11 +776,7 @@
             </a:pPr>
             <a:r>
               <a:rPr lang="en-US" b="1" dirty="0" smtClean="0"/>
-              <a:t>1. </a:t>
-            </a:r>
-            <a:r>
-              <a:rPr lang="en-US" b="1" dirty="0" smtClean="0"/>
-              <a:t>Tables -</a:t>
+              <a:t>1. Tables -</a:t>
             </a:r>
             <a:r>
               <a:rPr lang="en-US" dirty="0" smtClean="0"/>
@@ -798,11 +794,7 @@
             </a:pPr>
             <a:r>
               <a:rPr lang="en-US" b="1" dirty="0" smtClean="0"/>
-              <a:t>2. </a:t>
-            </a:r>
-            <a:r>
-              <a:rPr lang="en-US" b="1" dirty="0" smtClean="0"/>
-              <a:t>Views -</a:t>
+              <a:t>2. Views -</a:t>
             </a:r>
             <a:r>
               <a:rPr lang="en-US" dirty="0" smtClean="0"/>
@@ -824,11 +816,7 @@
             </a:r>
             <a:r>
               <a:rPr lang="en-US" b="1" baseline="0" dirty="0" smtClean="0"/>
-              <a:t> </a:t>
-            </a:r>
-            <a:r>
-              <a:rPr lang="en-US" b="1" baseline="0" dirty="0" smtClean="0"/>
-              <a:t>M5_ links - </a:t>
+              <a:t> M5_ links - </a:t>
             </a:r>
             <a:r>
               <a:rPr lang="en-US" baseline="0" dirty="0" smtClean="0"/>
@@ -841,11 +829,7 @@
             </a:pPr>
             <a:r>
               <a:rPr lang="en-US" b="1" baseline="0" dirty="0" smtClean="0"/>
-              <a:t>4. </a:t>
-            </a:r>
-            <a:r>
-              <a:rPr lang="en-US" b="1" baseline="0" dirty="0" smtClean="0"/>
-              <a:t>Global Data Dictionary - </a:t>
+              <a:t>4. Global Data Dictionary - </a:t>
             </a:r>
             <a:r>
               <a:rPr lang="en-US" baseline="0" dirty="0" smtClean="0"/>
@@ -858,7 +842,21 @@
             </a:pPr>
             <a:r>
               <a:rPr lang="en-US" b="1" baseline="0" dirty="0" smtClean="0"/>
-              <a:t>5. </a:t>
+              <a:t>5. Admin Email - </a:t>
+            </a:r>
+            <a:r>
+              <a:rPr lang="en-US" b="0" baseline="0" dirty="0" smtClean="0"/>
+              <a:t>An email is sent to the administrator every day listing issues encountered by Method5.  These problems are often a blessing in disguise.  For example, if a job never finished and had to be manually killed that implies one of your databases is unavailable.  Method5 will often catch a problem that OEM missed. </a:t>
+            </a:r>
+            <a:endParaRPr lang="en-US" b="1" baseline="0" dirty="0" smtClean="0"/>
+          </a:p>
+          <a:p>
+            <a:pPr marL="0" indent="0">
+              <a:buNone/>
+            </a:pPr>
+            <a:r>
+              <a:rPr lang="en-US" b="1" baseline="0" dirty="0" smtClean="0"/>
+              <a:t>6. </a:t>
             </a:r>
             <a:r>
               <a:rPr lang="en-US" b="1" baseline="0" dirty="0" smtClean="0"/>
@@ -2715,7 +2713,7 @@
           <a:p>
             <a:fld id="{72057647-82FE-4F7C-83B4-53587791251A}" type="datetime1">
               <a:rPr lang="en-US" smtClean="0"/>
-              <a:t>2017-01-12</a:t>
+              <a:t>2017-01-16</a:t>
             </a:fld>
             <a:endParaRPr lang="en-US"/>
           </a:p>
@@ -2885,7 +2883,7 @@
           <a:p>
             <a:fld id="{8503FF21-708F-4C59-9505-D05A3791AC31}" type="datetime1">
               <a:rPr lang="en-US" smtClean="0"/>
-              <a:t>2017-01-12</a:t>
+              <a:t>2017-01-16</a:t>
             </a:fld>
             <a:endParaRPr lang="en-US"/>
           </a:p>
@@ -3065,7 +3063,7 @@
           <a:p>
             <a:fld id="{6EFC7DE3-7050-4999-ABCB-76E0E214913C}" type="datetime1">
               <a:rPr lang="en-US" smtClean="0"/>
-              <a:t>2017-01-12</a:t>
+              <a:t>2017-01-16</a:t>
             </a:fld>
             <a:endParaRPr lang="en-US"/>
           </a:p>
@@ -3235,7 +3233,7 @@
           <a:p>
             <a:fld id="{12698F6C-3B60-45A8-AA68-1C639B61BEFF}" type="datetime1">
               <a:rPr lang="en-US" smtClean="0"/>
-              <a:t>2017-01-12</a:t>
+              <a:t>2017-01-16</a:t>
             </a:fld>
             <a:endParaRPr lang="en-US" dirty="0"/>
           </a:p>
@@ -3511,7 +3509,7 @@
           <a:p>
             <a:fld id="{E05176C0-14DF-4768-8A16-43F22EF34937}" type="datetime1">
               <a:rPr lang="en-US" smtClean="0"/>
-              <a:t>2017-01-12</a:t>
+              <a:t>2017-01-16</a:t>
             </a:fld>
             <a:endParaRPr lang="en-US"/>
           </a:p>
@@ -3799,7 +3797,7 @@
           <a:p>
             <a:fld id="{EC27D113-D56C-4484-8E60-26B1BDDD2B7D}" type="datetime1">
               <a:rPr lang="en-US" smtClean="0"/>
-              <a:t>2017-01-12</a:t>
+              <a:t>2017-01-16</a:t>
             </a:fld>
             <a:endParaRPr lang="en-US"/>
           </a:p>
@@ -4221,7 +4219,7 @@
           <a:p>
             <a:fld id="{2346BE7D-CDCE-4B6B-92C3-A6060BB37F63}" type="datetime1">
               <a:rPr lang="en-US" smtClean="0"/>
-              <a:t>2017-01-12</a:t>
+              <a:t>2017-01-16</a:t>
             </a:fld>
             <a:endParaRPr lang="en-US"/>
           </a:p>
@@ -4339,7 +4337,7 @@
           <a:p>
             <a:fld id="{016112C5-3C0F-4913-A601-B7FE4F9C1F3A}" type="datetime1">
               <a:rPr lang="en-US" smtClean="0"/>
-              <a:t>2017-01-12</a:t>
+              <a:t>2017-01-16</a:t>
             </a:fld>
             <a:endParaRPr lang="en-US"/>
           </a:p>
@@ -4434,7 +4432,7 @@
           <a:p>
             <a:fld id="{8A5D4DBD-AFC0-4CD6-8B21-21C10C0D7EF6}" type="datetime1">
               <a:rPr lang="en-US" smtClean="0"/>
-              <a:t>2017-01-12</a:t>
+              <a:t>2017-01-16</a:t>
             </a:fld>
             <a:endParaRPr lang="en-US"/>
           </a:p>
@@ -4711,7 +4709,7 @@
           <a:p>
             <a:fld id="{3514C57E-D885-4B44-9FAF-8838A1BDE694}" type="datetime1">
               <a:rPr lang="en-US" smtClean="0"/>
-              <a:t>2017-01-12</a:t>
+              <a:t>2017-01-16</a:t>
             </a:fld>
             <a:endParaRPr lang="en-US"/>
           </a:p>
@@ -4964,7 +4962,7 @@
           <a:p>
             <a:fld id="{7BEDB21A-AE09-4B41-95A5-CA952A205099}" type="datetime1">
               <a:rPr lang="en-US" smtClean="0"/>
-              <a:t>2017-01-12</a:t>
+              <a:t>2017-01-16</a:t>
             </a:fld>
             <a:endParaRPr lang="en-US"/>
           </a:p>
@@ -5177,7 +5175,7 @@
           <a:p>
             <a:fld id="{2089B313-BB57-4BA5-B615-3D449DFED662}" type="datetime1">
               <a:rPr lang="en-US" smtClean="0"/>
-              <a:t>2017-01-12</a:t>
+              <a:t>2017-01-16</a:t>
             </a:fld>
             <a:endParaRPr lang="en-US" dirty="0"/>
           </a:p>
@@ -5595,7 +5593,7 @@
           <a:p>
             <a:fld id="{2E45DCD3-F6D5-47D1-A091-AE329ABC5543}" type="datetime1">
               <a:rPr lang="en-US" smtClean="0"/>
-              <a:t>2017-01-12</a:t>
+              <a:t>2017-01-16</a:t>
             </a:fld>
             <a:endParaRPr lang="en-US" dirty="0"/>
           </a:p>
@@ -5865,7 +5863,7 @@
           <a:p>
             <a:fld id="{73B3F948-1743-4F2D-B9D2-20F26DEE2D32}" type="datetime1">
               <a:rPr lang="en-US" smtClean="0"/>
-              <a:t>2017-01-12</a:t>
+              <a:t>2017-01-16</a:t>
             </a:fld>
             <a:endParaRPr lang="en-US"/>
           </a:p>
@@ -5987,17 +5985,7 @@
                   </a:schemeClr>
                 </a:solidFill>
               </a:rPr>
-              <a:t> </a:t>
-            </a:r>
-            <a:r>
-              <a:rPr lang="en-US" dirty="0" smtClean="0">
-                <a:solidFill>
-                  <a:schemeClr val="bg1">
-                    <a:lumMod val="50000"/>
-                  </a:schemeClr>
-                </a:solidFill>
-              </a:rPr>
-              <a:t>- data, _META, _ERR</a:t>
+              <a:t> - data, _META, _ERR</a:t>
             </a:r>
           </a:p>
           <a:p>
@@ -6057,8 +6045,25 @@
                   </a:schemeClr>
                 </a:solidFill>
               </a:rPr>
-              <a:t> - M5_DBA_* tables refreshed nightly</a:t>
-            </a:r>
+              <a:t> - M5_DBA_* tables refreshed </a:t>
+            </a:r>
+            <a:r>
+              <a:rPr lang="en-US" dirty="0" smtClean="0">
+                <a:solidFill>
+                  <a:schemeClr val="bg1">
+                    <a:lumMod val="50000"/>
+                  </a:schemeClr>
+                </a:solidFill>
+              </a:rPr>
+              <a:t>nightly</a:t>
+            </a:r>
+            <a:endParaRPr lang="en-US" dirty="0" smtClean="0">
+              <a:solidFill>
+                <a:schemeClr val="bg1">
+                  <a:lumMod val="50000"/>
+                </a:schemeClr>
+              </a:solidFill>
+            </a:endParaRPr>
           </a:p>
           <a:p>
             <a:pPr marL="514350" indent="-514350">
@@ -6067,7 +6072,7 @@
             </a:pPr>
             <a:r>
               <a:rPr lang="en-US" dirty="0" smtClean="0"/>
-              <a:t>Limits </a:t>
+              <a:t>Admin Email</a:t>
             </a:r>
             <a:r>
               <a:rPr lang="en-US" dirty="0" smtClean="0">
@@ -6077,6 +6082,26 @@
                   </a:schemeClr>
                 </a:solidFill>
               </a:rPr>
+              <a:t> - Summary of daily issues</a:t>
+            </a:r>
+          </a:p>
+          <a:p>
+            <a:pPr marL="514350" indent="-514350">
+              <a:buFont typeface="+mj-lt"/>
+              <a:buAutoNum type="arabicPeriod"/>
+            </a:pPr>
+            <a:r>
+              <a:rPr lang="en-US" dirty="0" smtClean="0"/>
+              <a:t>Limits </a:t>
+            </a:r>
+            <a:r>
+              <a:rPr lang="en-US" dirty="0" smtClean="0">
+                <a:solidFill>
+                  <a:schemeClr val="bg1">
+                    <a:lumMod val="50000"/>
+                  </a:schemeClr>
+                </a:solidFill>
+              </a:rPr>
               <a:t>- SQL and PL/SQL only, as DBA</a:t>
             </a:r>
           </a:p>
@@ -6099,7 +6124,7 @@
           <a:p>
             <a:fld id="{8C6FBF27-FCE1-40A4-AD2E-EA28EB5C01F0}" type="datetime1">
               <a:rPr lang="en-US" smtClean="0"/>
-              <a:t>2017-01-12</a:t>
+              <a:t>2017-01-16</a:t>
             </a:fld>
             <a:endParaRPr lang="en-US"/>
           </a:p>
@@ -6306,7 +6331,7 @@
           <a:p>
             <a:fld id="{FC4CB26D-ED02-41C0-8C14-C61605713420}" type="datetime1">
               <a:rPr lang="en-US" smtClean="0"/>
-              <a:t>2017-01-12</a:t>
+              <a:t>2017-01-16</a:t>
             </a:fld>
             <a:endParaRPr lang="en-US"/>
           </a:p>
@@ -6641,7 +6666,7 @@
           <a:p>
             <a:fld id="{8A97B252-A157-47EE-8D8D-B5B4DAA37260}" type="datetime1">
               <a:rPr lang="en-US" smtClean="0"/>
-              <a:t>2017-01-12</a:t>
+              <a:t>2017-01-16</a:t>
             </a:fld>
             <a:endParaRPr lang="en-US"/>
           </a:p>
@@ -6794,7 +6819,7 @@
           <a:p>
             <a:fld id="{14CB67C7-3BA7-4C89-AD88-5C3EB0A22414}" type="datetime1">
               <a:rPr lang="en-US" smtClean="0"/>
-              <a:t>2017-01-12</a:t>
+              <a:t>2017-01-16</a:t>
             </a:fld>
             <a:endParaRPr lang="en-US" dirty="0"/>
           </a:p>
@@ -7179,7 +7204,7 @@
           <a:p>
             <a:fld id="{E18E99D8-5B8F-468C-BBE7-526BD68FE572}" type="datetime1">
               <a:rPr lang="en-US" smtClean="0"/>
-              <a:t>2017-01-12</a:t>
+              <a:t>2017-01-16</a:t>
             </a:fld>
             <a:endParaRPr lang="en-US"/>
           </a:p>
@@ -7370,7 +7395,7 @@
           <a:p>
             <a:fld id="{4E667C21-B277-46CB-80E7-1C015420E7D1}" type="datetime1">
               <a:rPr lang="en-US" smtClean="0"/>
-              <a:t>2017-01-12</a:t>
+              <a:t>2017-01-16</a:t>
             </a:fld>
             <a:endParaRPr lang="en-US" dirty="0"/>
           </a:p>
@@ -7472,7 +7497,7 @@
         <p:spPr/>
         <p:txBody>
           <a:bodyPr>
-            <a:normAutofit/>
+            <a:normAutofit fontScale="92500" lnSpcReduction="10000"/>
           </a:bodyPr>
           <a:lstStyle/>
           <a:p>
@@ -7650,8 +7675,25 @@
               <a:buAutoNum type="arabicPeriod"/>
             </a:pPr>
             <a:r>
-              <a:rPr lang="en-US" dirty="0" smtClean="0"/>
-              <a:t>Find, fix, and prevent problems everywhere</a:t>
+              <a:rPr lang="en-US" dirty="0" smtClean="0">
+                <a:hlinkClick r:id="rId3"/>
+              </a:rPr>
+              <a:t>https://method5.github.io</a:t>
+            </a:r>
+            <a:endParaRPr lang="en-US" dirty="0" smtClean="0"/>
+          </a:p>
+          <a:p>
+            <a:pPr marL="514350" indent="-514350">
+              <a:buFont typeface="+mj-lt"/>
+              <a:buAutoNum type="arabicPeriod"/>
+            </a:pPr>
+            <a:r>
+              <a:rPr lang="en-US" dirty="0" smtClean="0"/>
+              <a:t>Find</a:t>
+            </a:r>
+            <a:r>
+              <a:rPr lang="en-US" dirty="0" smtClean="0"/>
+              <a:t>, fix, and prevent problems everywhere</a:t>
             </a:r>
           </a:p>
           <a:p>
@@ -7680,7 +7722,7 @@
           <a:p>
             <a:fld id="{04FA3B08-0866-4F48-BECB-8AEAA49887FE}" type="datetime1">
               <a:rPr lang="en-US" smtClean="0"/>
-              <a:t>2017-01-12</a:t>
+              <a:t>2017-01-16</a:t>
             </a:fld>
             <a:endParaRPr lang="en-US"/>
           </a:p>
@@ -7882,7 +7924,7 @@
           <a:p>
             <a:fld id="{E0B1ECC0-3D31-49BF-9732-FEB21E3BFE0B}" type="datetime1">
               <a:rPr lang="en-US" smtClean="0"/>
-              <a:t>2017-01-12</a:t>
+              <a:t>2017-01-16</a:t>
             </a:fld>
             <a:endParaRPr lang="en-US"/>
           </a:p>
@@ -8259,7 +8301,7 @@
           <a:p>
             <a:fld id="{59A89C50-A88C-43DA-A017-AA6F35F0B0C8}" type="datetime1">
               <a:rPr lang="en-US" smtClean="0"/>
-              <a:t>2017-01-12</a:t>
+              <a:t>2017-01-16</a:t>
             </a:fld>
             <a:endParaRPr lang="en-US"/>
           </a:p>
@@ -8396,7 +8438,7 @@
           <a:p>
             <a:fld id="{AA1E44A8-32B0-4E5A-A6DF-07DB1E700CAE}" type="datetime1">
               <a:rPr lang="en-US" smtClean="0"/>
-              <a:t>2017-01-12</a:t>
+              <a:t>2017-01-16</a:t>
             </a:fld>
             <a:endParaRPr lang="en-US"/>
           </a:p>
@@ -9046,14 +9088,7 @@
                 <a:latin typeface="Courier New" panose="02070309020205020404" pitchFamily="49" charset="0"/>
                 <a:cs typeface="Courier New" panose="02070309020205020404" pitchFamily="49" charset="0"/>
               </a:rPr>
-              <a:t> </a:t>
-            </a:r>
-            <a:r>
-              <a:rPr lang="en-US" dirty="0" smtClean="0">
-                <a:latin typeface="Courier New" panose="02070309020205020404" pitchFamily="49" charset="0"/>
-                <a:cs typeface="Courier New" panose="02070309020205020404" pitchFamily="49" charset="0"/>
-              </a:rPr>
-              <a:t>DBA_USERS</a:t>
+              <a:t> DBA_USERS</a:t>
             </a:r>
             <a:br>
               <a:rPr lang="en-US" dirty="0" smtClean="0">
@@ -9083,14 +9118,7 @@
                 <a:latin typeface="Courier New" panose="02070309020205020404" pitchFamily="49" charset="0"/>
                 <a:cs typeface="Courier New" panose="02070309020205020404" pitchFamily="49" charset="0"/>
               </a:rPr>
-              <a:t> </a:t>
-            </a:r>
-            <a:r>
-              <a:rPr lang="en-US" dirty="0" smtClean="0">
-                <a:latin typeface="Courier New" panose="02070309020205020404" pitchFamily="49" charset="0"/>
-                <a:cs typeface="Courier New" panose="02070309020205020404" pitchFamily="49" charset="0"/>
-              </a:rPr>
-              <a:t>PROFILE </a:t>
+              <a:t> PROFILE </a:t>
             </a:r>
             <a:r>
               <a:rPr lang="en-US" b="1" dirty="0" smtClean="0">
@@ -9219,7 +9247,7 @@
           <a:p>
             <a:fld id="{1AF7749E-7951-4D42-9C43-2FC8E80375B1}" type="datetime1">
               <a:rPr lang="en-US" smtClean="0"/>
-              <a:t>2017-01-12</a:t>
+              <a:t>2017-01-16</a:t>
             </a:fld>
             <a:endParaRPr lang="en-US"/>
           </a:p>
@@ -9393,7 +9421,7 @@
           <a:p>
             <a:fld id="{60D7856B-577C-489D-A2A8-2F221F81FEFA}" type="datetime1">
               <a:rPr lang="en-US" smtClean="0"/>
-              <a:t>2017-01-12</a:t>
+              <a:t>2017-01-16</a:t>
             </a:fld>
             <a:endParaRPr lang="en-US"/>
           </a:p>
@@ -10390,7 +10418,7 @@
           <a:p>
             <a:fld id="{12698F6C-3B60-45A8-AA68-1C639B61BEFF}" type="datetime1">
               <a:rPr lang="en-US" smtClean="0"/>
-              <a:t>2017-01-12</a:t>
+              <a:t>2017-01-16</a:t>
             </a:fld>
             <a:endParaRPr lang="en-US" dirty="0"/>
           </a:p>
@@ -10688,17 +10716,7 @@
                   </a:schemeClr>
                 </a:solidFill>
               </a:rPr>
-              <a:t> </a:t>
-            </a:r>
-            <a:r>
-              <a:rPr lang="en-US" dirty="0" smtClean="0">
-                <a:solidFill>
-                  <a:schemeClr val="bg1">
-                    <a:lumMod val="50000"/>
-                  </a:schemeClr>
-                </a:solidFill>
-              </a:rPr>
-              <a:t>- fast, asynchronous</a:t>
+              <a:t> - fast, asynchronous</a:t>
             </a:r>
           </a:p>
           <a:p>
@@ -10827,7 +10845,7 @@
           <a:p>
             <a:fld id="{D97E924C-66F2-4356-A8CE-66225EAB43F5}" type="datetime1">
               <a:rPr lang="en-US" smtClean="0"/>
-              <a:t>2017-01-12</a:t>
+              <a:t>2017-01-16</a:t>
             </a:fld>
             <a:endParaRPr lang="en-US"/>
           </a:p>

</xml_diff>

<commit_message>
Added version star, link, and simpler install requirements.
</commit_message>
<xml_diff>
--- a/presentations/Method5.pptx
+++ b/presentations/Method5.pptx
@@ -210,7 +210,7 @@
           <a:p>
             <a:fld id="{E8184847-EC06-4734-8E30-343A2DA340C9}" type="datetimeFigureOut">
               <a:rPr lang="en-US" smtClean="0"/>
-              <a:t>2017-01-16</a:t>
+              <a:t>3/21/2017</a:t>
             </a:fld>
             <a:endParaRPr lang="en-US"/>
           </a:p>
@@ -375,7 +375,7 @@
           <a:p>
             <a:fld id="{DC284B00-8F05-4CB2-A4E6-4A642AFA915E}" type="datetimeFigureOut">
               <a:rPr lang="en-US" smtClean="0"/>
-              <a:t>2017-01-16</a:t>
+              <a:t>3/21/2017</a:t>
             </a:fld>
             <a:endParaRPr lang="en-US"/>
           </a:p>
@@ -856,7 +856,21 @@
             </a:pPr>
             <a:r>
               <a:rPr lang="en-US" b="1" baseline="0" dirty="0" smtClean="0"/>
-              <a:t>6. </a:t>
+              <a:t>6. Version Star –</a:t>
+            </a:r>
+            <a:r>
+              <a:rPr lang="en-US" b="0" baseline="0" dirty="0" smtClean="0"/>
+              <a:t> Querying different versions of Oracle can be difficult because the data dictionary has different columns.  For example, most data dictionary views in 12c have the new CON_ID column.  A "select * from v$..." will return different result sets between 11g and 12c.  To get around this issue, if you replace "*" with "**", Method5 will convert the "**" into an explicit list of columns based on the lowest Oracle version.  This avoids "not enough values" or "too many values" errors, and ensures that all databases return data regardless of the version.  The results will miss some of the newer columns, such as CON_ID.</a:t>
+            </a:r>
+            <a:endParaRPr lang="en-US" b="1" baseline="0" dirty="0" smtClean="0"/>
+          </a:p>
+          <a:p>
+            <a:pPr marL="0" indent="0">
+              <a:buNone/>
+            </a:pPr>
+            <a:r>
+              <a:rPr lang="en-US" b="1" baseline="0" dirty="0" smtClean="0"/>
+              <a:t>7. </a:t>
             </a:r>
             <a:r>
               <a:rPr lang="en-US" b="1" baseline="0" dirty="0" smtClean="0"/>
@@ -1104,13 +1118,21 @@
             </a:r>
             <a:r>
               <a:rPr lang="en-US" baseline="0" dirty="0" smtClean="0"/>
-              <a:t> management database that can communicate with all other database.  You must have SYSDBA to install, and DBA privileges to use.  Any currently-supported platform, version, or edition will work.  (And probably some unsupported ones also.)</a:t>
-            </a:r>
-          </a:p>
-          <a:p>
-            <a:r>
-              <a:rPr lang="en-US" dirty="0" smtClean="0"/>
-              <a:t>2. Only one person needs to install and administer it.  The configuration is automatically applied to other users.</a:t>
+              <a:t> management database that can communicate with all other database.  You must have SYSDBA to install, and DBA privileges to use.  Any currently-supported platform, version, or edition will work.  (And probably some unsupported ones also</a:t>
+            </a:r>
+            <a:r>
+              <a:rPr lang="en-US" baseline="0" dirty="0" smtClean="0"/>
+              <a:t>.)  For testing you only need a single database - the default installation will create some fake links that simulate a multi-database environment.</a:t>
+            </a:r>
+          </a:p>
+          <a:p>
+            <a:r>
+              <a:rPr lang="en-US" dirty="0" smtClean="0"/>
+              <a:t>2</a:t>
+            </a:r>
+            <a:r>
+              <a:rPr lang="en-US" dirty="0" smtClean="0"/>
+              <a:t>. Only one person needs to install and administer it.  The configuration is automatically applied to other users.</a:t>
             </a:r>
           </a:p>
           <a:p>
@@ -1128,11 +1150,19 @@
           <a:p>
             <a:r>
               <a:rPr lang="en-US" dirty="0" smtClean="0"/>
-              <a:t>5. The</a:t>
+              <a:t>5. </a:t>
+            </a:r>
+            <a:r>
+              <a:rPr lang="en-US" dirty="0" smtClean="0"/>
+              <a:t>Getting started</a:t>
             </a:r>
             <a:r>
               <a:rPr lang="en-US" baseline="0" dirty="0" smtClean="0"/>
-              <a:t> level of effort can vary widely depending on how standardized your environment is.  1000 perfectly-standardized databases will be easier than 10 databases all with different platforms, versions, and configurations.  One of the nice side-effects of Method5 is that it really drives home how useful standardization can be.  You may want to work on one environment at a time; you don't need to get every database working in order to use this.</a:t>
+              <a:t> will take less than an hour.  The time to setup all your connections will vary depending </a:t>
+            </a:r>
+            <a:r>
+              <a:rPr lang="en-US" baseline="0" dirty="0" smtClean="0"/>
+              <a:t>on how standardized your environment is.  1000 perfectly-standardized databases will be easier than 10 databases all with different platforms, versions, and configurations.  One of the nice side-effects of Method5 is that it really drives home how useful standardization can be.  You may want to work on one environment at a time; you don't need to get every database working in order to use this.</a:t>
             </a:r>
           </a:p>
           <a:p>
@@ -2713,7 +2743,7 @@
           <a:p>
             <a:fld id="{72057647-82FE-4F7C-83B4-53587791251A}" type="datetime1">
               <a:rPr lang="en-US" smtClean="0"/>
-              <a:t>2017-01-16</a:t>
+              <a:t>3/21/2017</a:t>
             </a:fld>
             <a:endParaRPr lang="en-US"/>
           </a:p>
@@ -2883,7 +2913,7 @@
           <a:p>
             <a:fld id="{8503FF21-708F-4C59-9505-D05A3791AC31}" type="datetime1">
               <a:rPr lang="en-US" smtClean="0"/>
-              <a:t>2017-01-16</a:t>
+              <a:t>3/21/2017</a:t>
             </a:fld>
             <a:endParaRPr lang="en-US"/>
           </a:p>
@@ -3063,7 +3093,7 @@
           <a:p>
             <a:fld id="{6EFC7DE3-7050-4999-ABCB-76E0E214913C}" type="datetime1">
               <a:rPr lang="en-US" smtClean="0"/>
-              <a:t>2017-01-16</a:t>
+              <a:t>3/21/2017</a:t>
             </a:fld>
             <a:endParaRPr lang="en-US"/>
           </a:p>
@@ -3233,7 +3263,7 @@
           <a:p>
             <a:fld id="{12698F6C-3B60-45A8-AA68-1C639B61BEFF}" type="datetime1">
               <a:rPr lang="en-US" smtClean="0"/>
-              <a:t>2017-01-16</a:t>
+              <a:t>3/21/2017</a:t>
             </a:fld>
             <a:endParaRPr lang="en-US" dirty="0"/>
           </a:p>
@@ -3509,7 +3539,7 @@
           <a:p>
             <a:fld id="{E05176C0-14DF-4768-8A16-43F22EF34937}" type="datetime1">
               <a:rPr lang="en-US" smtClean="0"/>
-              <a:t>2017-01-16</a:t>
+              <a:t>3/21/2017</a:t>
             </a:fld>
             <a:endParaRPr lang="en-US"/>
           </a:p>
@@ -3797,7 +3827,7 @@
           <a:p>
             <a:fld id="{EC27D113-D56C-4484-8E60-26B1BDDD2B7D}" type="datetime1">
               <a:rPr lang="en-US" smtClean="0"/>
-              <a:t>2017-01-16</a:t>
+              <a:t>3/21/2017</a:t>
             </a:fld>
             <a:endParaRPr lang="en-US"/>
           </a:p>
@@ -4219,7 +4249,7 @@
           <a:p>
             <a:fld id="{2346BE7D-CDCE-4B6B-92C3-A6060BB37F63}" type="datetime1">
               <a:rPr lang="en-US" smtClean="0"/>
-              <a:t>2017-01-16</a:t>
+              <a:t>3/21/2017</a:t>
             </a:fld>
             <a:endParaRPr lang="en-US"/>
           </a:p>
@@ -4337,7 +4367,7 @@
           <a:p>
             <a:fld id="{016112C5-3C0F-4913-A601-B7FE4F9C1F3A}" type="datetime1">
               <a:rPr lang="en-US" smtClean="0"/>
-              <a:t>2017-01-16</a:t>
+              <a:t>3/21/2017</a:t>
             </a:fld>
             <a:endParaRPr lang="en-US"/>
           </a:p>
@@ -4432,7 +4462,7 @@
           <a:p>
             <a:fld id="{8A5D4DBD-AFC0-4CD6-8B21-21C10C0D7EF6}" type="datetime1">
               <a:rPr lang="en-US" smtClean="0"/>
-              <a:t>2017-01-16</a:t>
+              <a:t>3/21/2017</a:t>
             </a:fld>
             <a:endParaRPr lang="en-US"/>
           </a:p>
@@ -4709,7 +4739,7 @@
           <a:p>
             <a:fld id="{3514C57E-D885-4B44-9FAF-8838A1BDE694}" type="datetime1">
               <a:rPr lang="en-US" smtClean="0"/>
-              <a:t>2017-01-16</a:t>
+              <a:t>3/21/2017</a:t>
             </a:fld>
             <a:endParaRPr lang="en-US"/>
           </a:p>
@@ -4962,7 +4992,7 @@
           <a:p>
             <a:fld id="{7BEDB21A-AE09-4B41-95A5-CA952A205099}" type="datetime1">
               <a:rPr lang="en-US" smtClean="0"/>
-              <a:t>2017-01-16</a:t>
+              <a:t>3/21/2017</a:t>
             </a:fld>
             <a:endParaRPr lang="en-US"/>
           </a:p>
@@ -5175,7 +5205,7 @@
           <a:p>
             <a:fld id="{2089B313-BB57-4BA5-B615-3D449DFED662}" type="datetime1">
               <a:rPr lang="en-US" smtClean="0"/>
-              <a:t>2017-01-16</a:t>
+              <a:t>3/21/2017</a:t>
             </a:fld>
             <a:endParaRPr lang="en-US" dirty="0"/>
           </a:p>
@@ -5561,18 +5591,35 @@
             <p:ph type="subTitle" idx="1"/>
           </p:nvPr>
         </p:nvSpPr>
-        <p:spPr/>
+        <p:spPr>
+          <a:xfrm>
+            <a:off x="1371600" y="3657600"/>
+            <a:ext cx="6400800" cy="1752600"/>
+          </a:xfrm>
+        </p:spPr>
         <p:txBody>
           <a:bodyPr>
-            <a:normAutofit/>
+            <a:normAutofit fontScale="92500" lnSpcReduction="10000"/>
           </a:bodyPr>
           <a:lstStyle/>
           <a:p>
             <a:r>
               <a:rPr lang="en-US" sz="4000" dirty="0" smtClean="0"/>
-              <a:t>Parallel Remote Execution for Oracle SQL</a:t>
-            </a:r>
-            <a:endParaRPr lang="en-US" sz="4000" dirty="0"/>
+              <a:t>Parallel Remote Execution for Oracle </a:t>
+            </a:r>
+            <a:r>
+              <a:rPr lang="en-US" sz="4000" dirty="0" smtClean="0"/>
+              <a:t>SQL</a:t>
+            </a:r>
+          </a:p>
+          <a:p>
+            <a:r>
+              <a:rPr lang="en-US" sz="4000" dirty="0" smtClean="0">
+                <a:hlinkClick r:id="rId3" action="ppaction://hlinkfile"/>
+              </a:rPr>
+              <a:t>method5.github.io</a:t>
+            </a:r>
+            <a:endParaRPr lang="en-US" sz="4000" dirty="0" smtClean="0"/>
           </a:p>
         </p:txBody>
       </p:sp>
@@ -5593,7 +5640,7 @@
           <a:p>
             <a:fld id="{2E45DCD3-F6D5-47D1-A091-AE329ABC5543}" type="datetime1">
               <a:rPr lang="en-US" smtClean="0"/>
-              <a:t>2017-01-16</a:t>
+              <a:t>3/21/2017</a:t>
             </a:fld>
             <a:endParaRPr lang="en-US" dirty="0"/>
           </a:p>
@@ -5631,7 +5678,7 @@
           <p:nvPr/>
         </p:nvPicPr>
         <p:blipFill>
-          <a:blip r:embed="rId3" cstate="print">
+          <a:blip r:embed="rId4" cstate="print">
             <a:extLst>
               <a:ext uri="{28A0092B-C50C-407E-A947-70E740481C1C}">
                 <a14:useLocalDpi xmlns:a14="http://schemas.microsoft.com/office/drawing/2010/main" val="0"/>
@@ -5645,7 +5692,7 @@
         </p:blipFill>
         <p:spPr bwMode="auto">
           <a:xfrm>
-            <a:off x="457200" y="1958339"/>
+            <a:off x="457200" y="1600200"/>
             <a:ext cx="8229600" cy="1851661"/>
           </a:xfrm>
           <a:prstGeom prst="rect">
@@ -5863,7 +5910,7 @@
           <a:p>
             <a:fld id="{73B3F948-1743-4F2D-B9D2-20F26DEE2D32}" type="datetime1">
               <a:rPr lang="en-US" smtClean="0"/>
-              <a:t>2017-01-16</a:t>
+              <a:t>3/21/2017</a:t>
             </a:fld>
             <a:endParaRPr lang="en-US"/>
           </a:p>
@@ -5965,7 +6012,7 @@
         <p:spPr/>
         <p:txBody>
           <a:bodyPr>
-            <a:normAutofit/>
+            <a:normAutofit fontScale="92500" lnSpcReduction="10000"/>
           </a:bodyPr>
           <a:lstStyle/>
           <a:p>
@@ -6045,7 +6092,17 @@
                   </a:schemeClr>
                 </a:solidFill>
               </a:rPr>
-              <a:t> - M5_DBA_* tables refreshed </a:t>
+              <a:t> - M5_DBA_* tables refreshed nightly</a:t>
+            </a:r>
+          </a:p>
+          <a:p>
+            <a:pPr marL="514350" indent="-514350">
+              <a:buFont typeface="+mj-lt"/>
+              <a:buAutoNum type="arabicPeriod"/>
+            </a:pPr>
+            <a:r>
+              <a:rPr lang="en-US" dirty="0" smtClean="0"/>
+              <a:t>Admin Email</a:t>
             </a:r>
             <a:r>
               <a:rPr lang="en-US" dirty="0" smtClean="0">
@@ -6055,7 +6112,37 @@
                   </a:schemeClr>
                 </a:solidFill>
               </a:rPr>
-              <a:t>nightly</a:t>
+              <a:t> - Summary of daily </a:t>
+            </a:r>
+            <a:r>
+              <a:rPr lang="en-US" dirty="0" smtClean="0">
+                <a:solidFill>
+                  <a:schemeClr val="bg1">
+                    <a:lumMod val="50000"/>
+                  </a:schemeClr>
+                </a:solidFill>
+              </a:rPr>
+              <a:t>issues</a:t>
+            </a:r>
+          </a:p>
+          <a:p>
+            <a:pPr marL="514350" indent="-514350">
+              <a:buFont typeface="+mj-lt"/>
+              <a:buAutoNum type="arabicPeriod"/>
+            </a:pPr>
+            <a:r>
+              <a:rPr lang="en-US" dirty="0" smtClean="0"/>
+              <a:t>Version Star -</a:t>
+            </a:r>
+            <a:r>
+              <a:rPr lang="en-US" dirty="0" smtClean="0">
+                <a:solidFill>
+                  <a:schemeClr val="bg1">
+                    <a:lumMod val="50000"/>
+                  </a:schemeClr>
+                </a:solidFill>
+              </a:rPr>
+              <a:t> Use "**" for version differences</a:t>
             </a:r>
             <a:endParaRPr lang="en-US" dirty="0" smtClean="0">
               <a:solidFill>
@@ -6072,7 +6159,7 @@
             </a:pPr>
             <a:r>
               <a:rPr lang="en-US" dirty="0" smtClean="0"/>
-              <a:t>Admin Email</a:t>
+              <a:t>Limits </a:t>
             </a:r>
             <a:r>
               <a:rPr lang="en-US" dirty="0" smtClean="0">
@@ -6082,26 +6169,6 @@
                   </a:schemeClr>
                 </a:solidFill>
               </a:rPr>
-              <a:t> - Summary of daily issues</a:t>
-            </a:r>
-          </a:p>
-          <a:p>
-            <a:pPr marL="514350" indent="-514350">
-              <a:buFont typeface="+mj-lt"/>
-              <a:buAutoNum type="arabicPeriod"/>
-            </a:pPr>
-            <a:r>
-              <a:rPr lang="en-US" dirty="0" smtClean="0"/>
-              <a:t>Limits </a:t>
-            </a:r>
-            <a:r>
-              <a:rPr lang="en-US" dirty="0" smtClean="0">
-                <a:solidFill>
-                  <a:schemeClr val="bg1">
-                    <a:lumMod val="50000"/>
-                  </a:schemeClr>
-                </a:solidFill>
-              </a:rPr>
               <a:t>- SQL and PL/SQL only, as DBA</a:t>
             </a:r>
           </a:p>
@@ -6124,7 +6191,7 @@
           <a:p>
             <a:fld id="{8C6FBF27-FCE1-40A4-AD2E-EA28EB5C01F0}" type="datetime1">
               <a:rPr lang="en-US" smtClean="0"/>
-              <a:t>2017-01-16</a:t>
+              <a:t>3/21/2017</a:t>
             </a:fld>
             <a:endParaRPr lang="en-US"/>
           </a:p>
@@ -6331,7 +6398,7 @@
           <a:p>
             <a:fld id="{FC4CB26D-ED02-41C0-8C14-C61605713420}" type="datetime1">
               <a:rPr lang="en-US" smtClean="0"/>
-              <a:t>2017-01-16</a:t>
+              <a:t>3/21/2017</a:t>
             </a:fld>
             <a:endParaRPr lang="en-US"/>
           </a:p>
@@ -6643,7 +6710,19 @@
             </a:br>
             <a:r>
               <a:rPr lang="en-US" dirty="0" smtClean="0"/>
-              <a:t>A DBA can probably get started in one hour</a:t>
+              <a:t>Any </a:t>
+            </a:r>
+            <a:r>
+              <a:rPr lang="en-US" dirty="0" smtClean="0"/>
+              <a:t>DBA can </a:t>
+            </a:r>
+            <a:r>
+              <a:rPr lang="en-US" dirty="0" smtClean="0"/>
+              <a:t>try it out in less </a:t>
+            </a:r>
+            <a:r>
+              <a:rPr lang="en-US" dirty="0" smtClean="0"/>
+              <a:t>than one hour</a:t>
             </a:r>
             <a:endParaRPr lang="en-US" dirty="0"/>
           </a:p>
@@ -6666,7 +6745,7 @@
           <a:p>
             <a:fld id="{8A97B252-A157-47EE-8D8D-B5B4DAA37260}" type="datetime1">
               <a:rPr lang="en-US" smtClean="0"/>
-              <a:t>2017-01-16</a:t>
+              <a:t>3/21/2017</a:t>
             </a:fld>
             <a:endParaRPr lang="en-US"/>
           </a:p>
@@ -6819,7 +6898,7 @@
           <a:p>
             <a:fld id="{14CB67C7-3BA7-4C89-AD88-5C3EB0A22414}" type="datetime1">
               <a:rPr lang="en-US" smtClean="0"/>
-              <a:t>2017-01-16</a:t>
+              <a:t>3/21/2017</a:t>
             </a:fld>
             <a:endParaRPr lang="en-US" dirty="0"/>
           </a:p>
@@ -7204,7 +7283,7 @@
           <a:p>
             <a:fld id="{E18E99D8-5B8F-468C-BBE7-526BD68FE572}" type="datetime1">
               <a:rPr lang="en-US" smtClean="0"/>
-              <a:t>2017-01-16</a:t>
+              <a:t>3/21/2017</a:t>
             </a:fld>
             <a:endParaRPr lang="en-US"/>
           </a:p>
@@ -7395,7 +7474,7 @@
           <a:p>
             <a:fld id="{4E667C21-B277-46CB-80E7-1C015420E7D1}" type="datetime1">
               <a:rPr lang="en-US" smtClean="0"/>
-              <a:t>2017-01-16</a:t>
+              <a:t>3/21/2017</a:t>
             </a:fld>
             <a:endParaRPr lang="en-US" dirty="0"/>
           </a:p>
@@ -7675,10 +7754,20 @@
               <a:buAutoNum type="arabicPeriod"/>
             </a:pPr>
             <a:r>
+              <a:rPr lang="en-US" dirty="0" smtClean="0"/>
+              <a:t>More resources - </a:t>
+            </a:r>
+            <a:r>
               <a:rPr lang="en-US" dirty="0" smtClean="0">
                 <a:hlinkClick r:id="rId3"/>
               </a:rPr>
-              <a:t>https://method5.github.io</a:t>
+              <a:t>https</a:t>
+            </a:r>
+            <a:r>
+              <a:rPr lang="en-US" dirty="0" smtClean="0">
+                <a:hlinkClick r:id="rId3"/>
+              </a:rPr>
+              <a:t>://method5.github.io</a:t>
             </a:r>
             <a:endParaRPr lang="en-US" dirty="0" smtClean="0"/>
           </a:p>
@@ -7689,11 +7778,7 @@
             </a:pPr>
             <a:r>
               <a:rPr lang="en-US" dirty="0" smtClean="0"/>
-              <a:t>Find</a:t>
-            </a:r>
-            <a:r>
-              <a:rPr lang="en-US" dirty="0" smtClean="0"/>
-              <a:t>, fix, and prevent problems everywhere</a:t>
+              <a:t>Find, fix, and prevent problems everywhere</a:t>
             </a:r>
           </a:p>
           <a:p>
@@ -7722,7 +7807,7 @@
           <a:p>
             <a:fld id="{04FA3B08-0866-4F48-BECB-8AEAA49887FE}" type="datetime1">
               <a:rPr lang="en-US" smtClean="0"/>
-              <a:t>2017-01-16</a:t>
+              <a:t>3/21/2017</a:t>
             </a:fld>
             <a:endParaRPr lang="en-US"/>
           </a:p>
@@ -7924,7 +8009,7 @@
           <a:p>
             <a:fld id="{E0B1ECC0-3D31-49BF-9732-FEB21E3BFE0B}" type="datetime1">
               <a:rPr lang="en-US" smtClean="0"/>
-              <a:t>2017-01-16</a:t>
+              <a:t>3/21/2017</a:t>
             </a:fld>
             <a:endParaRPr lang="en-US"/>
           </a:p>
@@ -8301,7 +8386,7 @@
           <a:p>
             <a:fld id="{59A89C50-A88C-43DA-A017-AA6F35F0B0C8}" type="datetime1">
               <a:rPr lang="en-US" smtClean="0"/>
-              <a:t>2017-01-16</a:t>
+              <a:t>3/21/2017</a:t>
             </a:fld>
             <a:endParaRPr lang="en-US"/>
           </a:p>
@@ -8438,7 +8523,7 @@
           <a:p>
             <a:fld id="{AA1E44A8-32B0-4E5A-A6DF-07DB1E700CAE}" type="datetime1">
               <a:rPr lang="en-US" smtClean="0"/>
-              <a:t>2017-01-16</a:t>
+              <a:t>3/21/2017</a:t>
             </a:fld>
             <a:endParaRPr lang="en-US"/>
           </a:p>
@@ -9247,7 +9332,7 @@
           <a:p>
             <a:fld id="{1AF7749E-7951-4D42-9C43-2FC8E80375B1}" type="datetime1">
               <a:rPr lang="en-US" smtClean="0"/>
-              <a:t>2017-01-16</a:t>
+              <a:t>3/21/2017</a:t>
             </a:fld>
             <a:endParaRPr lang="en-US"/>
           </a:p>
@@ -9421,7 +9506,7 @@
           <a:p>
             <a:fld id="{60D7856B-577C-489D-A2A8-2F221F81FEFA}" type="datetime1">
               <a:rPr lang="en-US" smtClean="0"/>
-              <a:t>2017-01-16</a:t>
+              <a:t>3/21/2017</a:t>
             </a:fld>
             <a:endParaRPr lang="en-US"/>
           </a:p>
@@ -10418,7 +10503,7 @@
           <a:p>
             <a:fld id="{12698F6C-3B60-45A8-AA68-1C639B61BEFF}" type="datetime1">
               <a:rPr lang="en-US" smtClean="0"/>
-              <a:t>2017-01-16</a:t>
+              <a:t>3/21/2017</a:t>
             </a:fld>
             <a:endParaRPr lang="en-US" dirty="0"/>
           </a:p>
@@ -10845,7 +10930,7 @@
           <a:p>
             <a:fld id="{D97E924C-66F2-4356-A8CE-66225EAB43F5}" type="datetime1">
               <a:rPr lang="en-US" smtClean="0"/>
-              <a:t>2017-01-16</a:t>
+              <a:t>3/21/2017</a:t>
             </a:fld>
             <a:endParaRPr lang="en-US"/>
           </a:p>

</xml_diff>

<commit_message>
Fixed link on title page.
</commit_message>
<xml_diff>
--- a/presentations/Method5.pptx
+++ b/presentations/Method5.pptx
@@ -5615,9 +5615,9 @@
           <a:p>
             <a:r>
               <a:rPr lang="en-US" sz="4000" dirty="0" smtClean="0">
-                <a:hlinkClick r:id="rId3" action="ppaction://hlinkfile"/>
+                <a:hlinkClick r:id="rId3"/>
               </a:rPr>
-              <a:t>method5.github.io</a:t>
+              <a:t>https://method5.github.io</a:t>
             </a:r>
             <a:endParaRPr lang="en-US" sz="4000" dirty="0" smtClean="0"/>
           </a:p>

</xml_diff>

<commit_message>
Changes based on corporate review.
- Removed references to clients on slide 7 (and changed "2 years" to "3 years")
- Removed "professional services" from slide 15
</commit_message>
<xml_diff>
--- a/presentations/Method5.pptx
+++ b/presentations/Method5.pptx
@@ -210,7 +210,7 @@
           <a:p>
             <a:fld id="{E8184847-EC06-4734-8E30-343A2DA340C9}" type="datetimeFigureOut">
               <a:rPr lang="en-US" smtClean="0"/>
-              <a:t>8/12/2017</a:t>
+              <a:t>9/11/2017</a:t>
             </a:fld>
             <a:endParaRPr lang="en-US"/>
           </a:p>
@@ -375,7 +375,7 @@
           <a:p>
             <a:fld id="{DC284B00-8F05-4CB2-A4E6-4A642AFA915E}" type="datetimeFigureOut">
               <a:rPr lang="en-US" smtClean="0"/>
-              <a:t>8/12/2017</a:t>
+              <a:t>9/11/2017</a:t>
             </a:fld>
             <a:endParaRPr lang="en-US"/>
           </a:p>
@@ -1255,6 +1255,90 @@
           <a:bodyPr/>
           <a:lstStyle/>
           <a:p>
+            <a:endParaRPr lang="en-US"/>
+          </a:p>
+        </p:txBody>
+      </p:sp>
+      <p:sp>
+        <p:nvSpPr>
+          <p:cNvPr id="4" name="Slide Number Placeholder 3"/>
+          <p:cNvSpPr>
+            <a:spLocks noGrp="1"/>
+          </p:cNvSpPr>
+          <p:nvPr>
+            <p:ph type="sldNum" sz="quarter" idx="10"/>
+          </p:nvPr>
+        </p:nvSpPr>
+        <p:spPr/>
+        <p:txBody>
+          <a:bodyPr/>
+          <a:lstStyle/>
+          <a:p>
+            <a:fld id="{72AE7ADF-BF07-437B-AD5B-68C1A8D7189D}" type="slidenum">
+              <a:rPr lang="en-US" smtClean="0"/>
+              <a:t>14</a:t>
+            </a:fld>
+            <a:endParaRPr lang="en-US"/>
+          </a:p>
+        </p:txBody>
+      </p:sp>
+    </p:spTree>
+    <p:extLst>
+      <p:ext uri="{BB962C8B-B14F-4D97-AF65-F5344CB8AC3E}">
+        <p14:creationId xmlns:p14="http://schemas.microsoft.com/office/powerpoint/2010/main" val="3281300294"/>
+      </p:ext>
+    </p:extLst>
+  </p:cSld>
+  <p:clrMapOvr>
+    <a:masterClrMapping/>
+  </p:clrMapOvr>
+</p:notes>
+</file>
+
+<file path=ppt/notesSlides/notesSlide14.xml><?xml version="1.0" encoding="utf-8"?>
+<p:notes xmlns:a="http://schemas.openxmlformats.org/drawingml/2006/main" xmlns:r="http://schemas.openxmlformats.org/officeDocument/2006/relationships" xmlns:p="http://schemas.openxmlformats.org/presentationml/2006/main">
+  <p:cSld>
+    <p:spTree>
+      <p:nvGrpSpPr>
+        <p:cNvPr id="1" name=""/>
+        <p:cNvGrpSpPr/>
+        <p:nvPr/>
+      </p:nvGrpSpPr>
+      <p:grpSpPr>
+        <a:xfrm>
+          <a:off x="0" y="0"/>
+          <a:ext cx="0" cy="0"/>
+          <a:chOff x="0" y="0"/>
+          <a:chExt cx="0" cy="0"/>
+        </a:xfrm>
+      </p:grpSpPr>
+      <p:sp>
+        <p:nvSpPr>
+          <p:cNvPr id="2" name="Slide Image Placeholder 1"/>
+          <p:cNvSpPr>
+            <a:spLocks noGrp="1" noRot="1" noChangeAspect="1"/>
+          </p:cNvSpPr>
+          <p:nvPr>
+            <p:ph type="sldImg"/>
+          </p:nvPr>
+        </p:nvSpPr>
+        <p:spPr/>
+      </p:sp>
+      <p:sp>
+        <p:nvSpPr>
+          <p:cNvPr id="3" name="Notes Placeholder 2"/>
+          <p:cNvSpPr>
+            <a:spLocks noGrp="1"/>
+          </p:cNvSpPr>
+          <p:nvPr>
+            <p:ph type="body" idx="1"/>
+          </p:nvPr>
+        </p:nvSpPr>
+        <p:spPr/>
+        <p:txBody>
+          <a:bodyPr/>
+          <a:lstStyle/>
+          <a:p>
             <a:endParaRPr lang="en-US" dirty="0"/>
           </a:p>
         </p:txBody>
@@ -1295,7 +1379,7 @@
 </p:notes>
 </file>
 
-<file path=ppt/notesSlides/notesSlide14.xml><?xml version="1.0" encoding="utf-8"?>
+<file path=ppt/notesSlides/notesSlide15.xml><?xml version="1.0" encoding="utf-8"?>
 <p:notes xmlns:a="http://schemas.openxmlformats.org/drawingml/2006/main" xmlns:r="http://schemas.openxmlformats.org/officeDocument/2006/relationships" xmlns:p="http://schemas.openxmlformats.org/presentationml/2006/main">
   <p:cSld>
     <p:spTree>
@@ -2031,7 +2115,15 @@
           <a:p>
             <a:r>
               <a:rPr lang="en-US" dirty="0" smtClean="0"/>
-              <a:t>2. Method5 has been used in production for 2 years to help manage the largest healthcare data center in the world.</a:t>
+              <a:t>2. Method5 has been used in production for </a:t>
+            </a:r>
+            <a:r>
+              <a:rPr lang="en-US" dirty="0" smtClean="0"/>
+              <a:t>3 </a:t>
+            </a:r>
+            <a:r>
+              <a:rPr lang="en-US" dirty="0" smtClean="0"/>
+              <a:t>years to help manage the largest healthcare data center in the world.</a:t>
             </a:r>
           </a:p>
           <a:p>
@@ -2501,11 +2593,7 @@
             </a:r>
             <a:r>
               <a:rPr lang="en-US" dirty="0" smtClean="0"/>
-              <a:t> Return right away or wait for all results</a:t>
-            </a:r>
-            <a:r>
-              <a:rPr lang="en-US" dirty="0" smtClean="0"/>
-              <a:t>.</a:t>
+              <a:t> Return right away or wait for all results.</a:t>
             </a:r>
           </a:p>
           <a:p>
@@ -2742,7 +2830,7 @@
           <a:p>
             <a:fld id="{72057647-82FE-4F7C-83B4-53587791251A}" type="datetime1">
               <a:rPr lang="en-US" smtClean="0"/>
-              <a:t>8/12/2017</a:t>
+              <a:t>9/11/2017</a:t>
             </a:fld>
             <a:endParaRPr lang="en-US"/>
           </a:p>
@@ -2912,7 +3000,7 @@
           <a:p>
             <a:fld id="{8503FF21-708F-4C59-9505-D05A3791AC31}" type="datetime1">
               <a:rPr lang="en-US" smtClean="0"/>
-              <a:t>8/12/2017</a:t>
+              <a:t>9/11/2017</a:t>
             </a:fld>
             <a:endParaRPr lang="en-US"/>
           </a:p>
@@ -3092,7 +3180,7 @@
           <a:p>
             <a:fld id="{6EFC7DE3-7050-4999-ABCB-76E0E214913C}" type="datetime1">
               <a:rPr lang="en-US" smtClean="0"/>
-              <a:t>8/12/2017</a:t>
+              <a:t>9/11/2017</a:t>
             </a:fld>
             <a:endParaRPr lang="en-US"/>
           </a:p>
@@ -3262,7 +3350,7 @@
           <a:p>
             <a:fld id="{12698F6C-3B60-45A8-AA68-1C639B61BEFF}" type="datetime1">
               <a:rPr lang="en-US" smtClean="0"/>
-              <a:t>8/12/2017</a:t>
+              <a:t>9/11/2017</a:t>
             </a:fld>
             <a:endParaRPr lang="en-US" dirty="0"/>
           </a:p>
@@ -3538,7 +3626,7 @@
           <a:p>
             <a:fld id="{E05176C0-14DF-4768-8A16-43F22EF34937}" type="datetime1">
               <a:rPr lang="en-US" smtClean="0"/>
-              <a:t>8/12/2017</a:t>
+              <a:t>9/11/2017</a:t>
             </a:fld>
             <a:endParaRPr lang="en-US"/>
           </a:p>
@@ -3826,7 +3914,7 @@
           <a:p>
             <a:fld id="{EC27D113-D56C-4484-8E60-26B1BDDD2B7D}" type="datetime1">
               <a:rPr lang="en-US" smtClean="0"/>
-              <a:t>8/12/2017</a:t>
+              <a:t>9/11/2017</a:t>
             </a:fld>
             <a:endParaRPr lang="en-US"/>
           </a:p>
@@ -4248,7 +4336,7 @@
           <a:p>
             <a:fld id="{2346BE7D-CDCE-4B6B-92C3-A6060BB37F63}" type="datetime1">
               <a:rPr lang="en-US" smtClean="0"/>
-              <a:t>8/12/2017</a:t>
+              <a:t>9/11/2017</a:t>
             </a:fld>
             <a:endParaRPr lang="en-US"/>
           </a:p>
@@ -4366,7 +4454,7 @@
           <a:p>
             <a:fld id="{016112C5-3C0F-4913-A601-B7FE4F9C1F3A}" type="datetime1">
               <a:rPr lang="en-US" smtClean="0"/>
-              <a:t>8/12/2017</a:t>
+              <a:t>9/11/2017</a:t>
             </a:fld>
             <a:endParaRPr lang="en-US"/>
           </a:p>
@@ -4461,7 +4549,7 @@
           <a:p>
             <a:fld id="{8A5D4DBD-AFC0-4CD6-8B21-21C10C0D7EF6}" type="datetime1">
               <a:rPr lang="en-US" smtClean="0"/>
-              <a:t>8/12/2017</a:t>
+              <a:t>9/11/2017</a:t>
             </a:fld>
             <a:endParaRPr lang="en-US"/>
           </a:p>
@@ -4738,7 +4826,7 @@
           <a:p>
             <a:fld id="{3514C57E-D885-4B44-9FAF-8838A1BDE694}" type="datetime1">
               <a:rPr lang="en-US" smtClean="0"/>
-              <a:t>8/12/2017</a:t>
+              <a:t>9/11/2017</a:t>
             </a:fld>
             <a:endParaRPr lang="en-US"/>
           </a:p>
@@ -4991,7 +5079,7 @@
           <a:p>
             <a:fld id="{7BEDB21A-AE09-4B41-95A5-CA952A205099}" type="datetime1">
               <a:rPr lang="en-US" smtClean="0"/>
-              <a:t>8/12/2017</a:t>
+              <a:t>9/11/2017</a:t>
             </a:fld>
             <a:endParaRPr lang="en-US"/>
           </a:p>
@@ -5204,7 +5292,7 @@
           <a:p>
             <a:fld id="{2089B313-BB57-4BA5-B615-3D449DFED662}" type="datetime1">
               <a:rPr lang="en-US" smtClean="0"/>
-              <a:t>8/12/2017</a:t>
+              <a:t>9/11/2017</a:t>
             </a:fld>
             <a:endParaRPr lang="en-US" dirty="0"/>
           </a:p>
@@ -5604,11 +5692,7 @@
           <a:p>
             <a:r>
               <a:rPr lang="en-US" sz="4000" dirty="0" smtClean="0"/>
-              <a:t>Remote </a:t>
-            </a:r>
-            <a:r>
-              <a:rPr lang="en-US" sz="4000" dirty="0" smtClean="0"/>
-              <a:t>Execution for Oracle SQL</a:t>
+              <a:t>Remote Execution for Oracle SQL</a:t>
             </a:r>
           </a:p>
           <a:p>
@@ -5639,7 +5723,7 @@
           <a:p>
             <a:fld id="{2E45DCD3-F6D5-47D1-A091-AE329ABC5543}" type="datetime1">
               <a:rPr lang="en-US" smtClean="0"/>
-              <a:t>8/12/2017</a:t>
+              <a:t>9/11/2017</a:t>
             </a:fld>
             <a:endParaRPr lang="en-US" dirty="0"/>
           </a:p>
@@ -5901,27 +5985,7 @@
                   </a:schemeClr>
                 </a:solidFill>
               </a:rPr>
-              <a:t> </a:t>
-            </a:r>
-            <a:r>
-              <a:rPr lang="en-US" dirty="0" smtClean="0">
-                <a:solidFill>
-                  <a:schemeClr val="bg1">
-                    <a:lumMod val="50000"/>
-                  </a:schemeClr>
-                </a:solidFill>
-              </a:rPr>
-              <a:t>- </a:t>
-            </a:r>
-            <a:r>
-              <a:rPr lang="en-US" dirty="0" smtClean="0">
-                <a:solidFill>
-                  <a:schemeClr val="bg1">
-                    <a:lumMod val="50000"/>
-                  </a:schemeClr>
-                </a:solidFill>
-              </a:rPr>
-              <a:t>run with SYSDBA privilege</a:t>
+              <a:t> - run with SYSDBA privilege</a:t>
             </a:r>
           </a:p>
         </p:txBody>
@@ -5943,7 +6007,7 @@
           <a:p>
             <a:fld id="{73B3F948-1743-4F2D-B9D2-20F26DEE2D32}" type="datetime1">
               <a:rPr lang="en-US" smtClean="0"/>
-              <a:t>8/12/2017</a:t>
+              <a:t>9/11/2017</a:t>
             </a:fld>
             <a:endParaRPr lang="en-US"/>
           </a:p>
@@ -6207,7 +6271,7 @@
           <a:p>
             <a:fld id="{8C6FBF27-FCE1-40A4-AD2E-EA28EB5C01F0}" type="datetime1">
               <a:rPr lang="en-US" smtClean="0"/>
-              <a:t>8/12/2017</a:t>
+              <a:t>9/11/2017</a:t>
             </a:fld>
             <a:endParaRPr lang="en-US"/>
           </a:p>
@@ -6414,7 +6478,7 @@
           <a:p>
             <a:fld id="{FC4CB26D-ED02-41C0-8C14-C61605713420}" type="datetime1">
               <a:rPr lang="en-US" smtClean="0"/>
-              <a:t>8/12/2017</a:t>
+              <a:t>9/11/2017</a:t>
             </a:fld>
             <a:endParaRPr lang="en-US"/>
           </a:p>
@@ -6749,7 +6813,7 @@
           <a:p>
             <a:fld id="{8A97B252-A157-47EE-8D8D-B5B4DAA37260}" type="datetime1">
               <a:rPr lang="en-US" smtClean="0"/>
-              <a:t>8/12/2017</a:t>
+              <a:t>9/11/2017</a:t>
             </a:fld>
             <a:endParaRPr lang="en-US"/>
           </a:p>
@@ -6865,19 +6929,19 @@
             </a:r>
             <a:r>
               <a:rPr lang="en-US" sz="2800" dirty="0" smtClean="0">
-                <a:hlinkClick r:id="rId2"/>
+                <a:hlinkClick r:id="rId3"/>
               </a:rPr>
               <a:t>https</a:t>
             </a:r>
             <a:r>
               <a:rPr lang="en-US" sz="2800" dirty="0">
-                <a:hlinkClick r:id="rId2"/>
+                <a:hlinkClick r:id="rId3"/>
               </a:rPr>
               <a:t>://</a:t>
             </a:r>
             <a:r>
               <a:rPr lang="en-US" sz="2800" dirty="0" smtClean="0">
-                <a:hlinkClick r:id="rId2"/>
+                <a:hlinkClick r:id="rId3"/>
               </a:rPr>
               <a:t>method5.github.io/examples/</a:t>
             </a:r>
@@ -6902,7 +6966,7 @@
           <a:p>
             <a:fld id="{14CB67C7-3BA7-4C89-AD88-5C3EB0A22414}" type="datetime1">
               <a:rPr lang="en-US" smtClean="0"/>
-              <a:t>8/12/2017</a:t>
+              <a:t>9/11/2017</a:t>
             </a:fld>
             <a:endParaRPr lang="en-US" dirty="0"/>
           </a:p>
@@ -6940,7 +7004,7 @@
           <p:nvPr/>
         </p:nvPicPr>
         <p:blipFill>
-          <a:blip r:embed="rId3">
+          <a:blip r:embed="rId4">
             <a:extLst>
               <a:ext uri="{28A0092B-C50C-407E-A947-70E740481C1C}">
                 <a14:useLocalDpi xmlns:a14="http://schemas.microsoft.com/office/drawing/2010/main" val="0"/>
@@ -6981,7 +7045,7 @@
           <p:nvPr/>
         </p:nvPicPr>
         <p:blipFill>
-          <a:blip r:embed="rId4">
+          <a:blip r:embed="rId5">
             <a:extLst>
               <a:ext uri="{28A0092B-C50C-407E-A947-70E740481C1C}">
                 <a14:useLocalDpi xmlns:a14="http://schemas.microsoft.com/office/drawing/2010/main" val="0"/>
@@ -7022,7 +7086,7 @@
           <p:nvPr/>
         </p:nvPicPr>
         <p:blipFill>
-          <a:blip r:embed="rId5" cstate="print">
+          <a:blip r:embed="rId6" cstate="print">
             <a:extLst>
               <a:ext uri="{28A0092B-C50C-407E-A947-70E740481C1C}">
                 <a14:useLocalDpi xmlns:a14="http://schemas.microsoft.com/office/drawing/2010/main" val="0"/>
@@ -7063,7 +7127,7 @@
           <p:nvPr/>
         </p:nvPicPr>
         <p:blipFill>
-          <a:blip r:embed="rId6">
+          <a:blip r:embed="rId7">
             <a:extLst>
               <a:ext uri="{28A0092B-C50C-407E-A947-70E740481C1C}">
                 <a14:useLocalDpi xmlns:a14="http://schemas.microsoft.com/office/drawing/2010/main" val="0"/>
@@ -7168,7 +7232,7 @@
         <p:spPr/>
         <p:txBody>
           <a:bodyPr>
-            <a:normAutofit lnSpcReduction="10000"/>
+            <a:normAutofit/>
           </a:bodyPr>
           <a:lstStyle/>
           <a:p>
@@ -7258,16 +7322,6 @@
             </a:r>
             <a:endParaRPr lang="en-US" dirty="0" smtClean="0"/>
           </a:p>
-          <a:p>
-            <a:pPr marL="514350" indent="-514350">
-              <a:buFont typeface="+mj-lt"/>
-              <a:buAutoNum type="arabicPeriod"/>
-            </a:pPr>
-            <a:r>
-              <a:rPr lang="en-US" dirty="0" smtClean="0"/>
-              <a:t>Professional services available</a:t>
-            </a:r>
-          </a:p>
         </p:txBody>
       </p:sp>
       <p:sp>
@@ -7287,7 +7341,7 @@
           <a:p>
             <a:fld id="{E18E99D8-5B8F-468C-BBE7-526BD68FE572}" type="datetime1">
               <a:rPr lang="en-US" smtClean="0"/>
-              <a:t>8/12/2017</a:t>
+              <a:t>9/11/2017</a:t>
             </a:fld>
             <a:endParaRPr lang="en-US"/>
           </a:p>
@@ -7478,7 +7532,7 @@
           <a:p>
             <a:fld id="{4E667C21-B277-46CB-80E7-1C015420E7D1}" type="datetime1">
               <a:rPr lang="en-US" smtClean="0"/>
-              <a:t>8/12/2017</a:t>
+              <a:t>9/11/2017</a:t>
             </a:fld>
             <a:endParaRPr lang="en-US" dirty="0"/>
           </a:p>
@@ -7805,7 +7859,7 @@
           <a:p>
             <a:fld id="{04FA3B08-0866-4F48-BECB-8AEAA49887FE}" type="datetime1">
               <a:rPr lang="en-US" smtClean="0"/>
-              <a:t>8/12/2017</a:t>
+              <a:t>9/11/2017</a:t>
             </a:fld>
             <a:endParaRPr lang="en-US"/>
           </a:p>
@@ -8007,7 +8061,7 @@
           <a:p>
             <a:fld id="{E0B1ECC0-3D31-49BF-9732-FEB21E3BFE0B}" type="datetime1">
               <a:rPr lang="en-US" smtClean="0"/>
-              <a:t>8/12/2017</a:t>
+              <a:t>9/11/2017</a:t>
             </a:fld>
             <a:endParaRPr lang="en-US"/>
           </a:p>
@@ -8384,7 +8438,7 @@
           <a:p>
             <a:fld id="{59A89C50-A88C-43DA-A017-AA6F35F0B0C8}" type="datetime1">
               <a:rPr lang="en-US" smtClean="0"/>
-              <a:t>8/12/2017</a:t>
+              <a:t>9/11/2017</a:t>
             </a:fld>
             <a:endParaRPr lang="en-US"/>
           </a:p>
@@ -8521,7 +8575,7 @@
           <a:p>
             <a:fld id="{AA1E44A8-32B0-4E5A-A6DF-07DB1E700CAE}" type="datetime1">
               <a:rPr lang="en-US" smtClean="0"/>
-              <a:t>8/12/2017</a:t>
+              <a:t>9/11/2017</a:t>
             </a:fld>
             <a:endParaRPr lang="en-US"/>
           </a:p>
@@ -9330,7 +9384,7 @@
           <a:p>
             <a:fld id="{1AF7749E-7951-4D42-9C43-2FC8E80375B1}" type="datetime1">
               <a:rPr lang="en-US" smtClean="0"/>
-              <a:t>8/12/2017</a:t>
+              <a:t>9/11/2017</a:t>
             </a:fld>
             <a:endParaRPr lang="en-US"/>
           </a:p>
@@ -9452,8 +9506,17 @@
             </a:pPr>
             <a:r>
               <a:rPr lang="en-US" dirty="0" smtClean="0"/>
-              <a:t>In production since 2014 for Ventech &amp; CMS</a:t>
-            </a:r>
+              <a:t>In production since </a:t>
+            </a:r>
+            <a:r>
+              <a:rPr lang="en-US" dirty="0"/>
+              <a:t>2014 for the largest healthcare data center in the </a:t>
+            </a:r>
+            <a:r>
+              <a:rPr lang="en-US" dirty="0" smtClean="0"/>
+              <a:t>world</a:t>
+            </a:r>
+            <a:endParaRPr lang="en-US" dirty="0" smtClean="0"/>
           </a:p>
           <a:p>
             <a:pPr marL="514350" indent="-514350">
@@ -9504,7 +9567,7 @@
           <a:p>
             <a:fld id="{60D7856B-577C-489D-A2A8-2F221F81FEFA}" type="datetime1">
               <a:rPr lang="en-US" smtClean="0"/>
-              <a:t>8/12/2017</a:t>
+              <a:t>9/11/2017</a:t>
             </a:fld>
             <a:endParaRPr lang="en-US"/>
           </a:p>
@@ -9533,88 +9596,6 @@
           </a:p>
         </p:txBody>
       </p:sp>
-      <p:pic>
-        <p:nvPicPr>
-          <p:cNvPr id="1026" name="Picture 2" descr="http://ventechsolutions.us/wp-content/uploads/2016/02/ventechsolutions-logo2016_USA.png"/>
-          <p:cNvPicPr>
-            <a:picLocks noChangeAspect="1" noChangeArrowheads="1"/>
-          </p:cNvPicPr>
-          <p:nvPr/>
-        </p:nvPicPr>
-        <p:blipFill>
-          <a:blip r:embed="rId3">
-            <a:extLst>
-              <a:ext uri="{28A0092B-C50C-407E-A947-70E740481C1C}">
-                <a14:useLocalDpi xmlns:a14="http://schemas.microsoft.com/office/drawing/2010/main" val="0"/>
-              </a:ext>
-            </a:extLst>
-          </a:blip>
-          <a:srcRect/>
-          <a:stretch>
-            <a:fillRect/>
-          </a:stretch>
-        </p:blipFill>
-        <p:spPr bwMode="auto">
-          <a:xfrm>
-            <a:off x="1371600" y="4629150"/>
-            <a:ext cx="2457450" cy="1238250"/>
-          </a:xfrm>
-          <a:prstGeom prst="rect">
-            <a:avLst/>
-          </a:prstGeom>
-          <a:noFill/>
-          <a:extLst>
-            <a:ext uri="{909E8E84-426E-40DD-AFC4-6F175D3DCCD1}">
-              <a14:hiddenFill xmlns:a14="http://schemas.microsoft.com/office/drawing/2010/main">
-                <a:solidFill>
-                  <a:srgbClr val="FFFFFF"/>
-                </a:solidFill>
-              </a14:hiddenFill>
-            </a:ext>
-          </a:extLst>
-        </p:spPr>
-      </p:pic>
-      <p:pic>
-        <p:nvPicPr>
-          <p:cNvPr id="1028" name="Picture 4" descr="https://assets.cms.gov/resources/cms/images/logo/site-logo.png"/>
-          <p:cNvPicPr>
-            <a:picLocks noChangeAspect="1" noChangeArrowheads="1"/>
-          </p:cNvPicPr>
-          <p:nvPr/>
-        </p:nvPicPr>
-        <p:blipFill>
-          <a:blip r:embed="rId4">
-            <a:extLst>
-              <a:ext uri="{28A0092B-C50C-407E-A947-70E740481C1C}">
-                <a14:useLocalDpi xmlns:a14="http://schemas.microsoft.com/office/drawing/2010/main" val="0"/>
-              </a:ext>
-            </a:extLst>
-          </a:blip>
-          <a:srcRect/>
-          <a:stretch>
-            <a:fillRect/>
-          </a:stretch>
-        </p:blipFill>
-        <p:spPr bwMode="auto">
-          <a:xfrm>
-            <a:off x="4572000" y="4910137"/>
-            <a:ext cx="3267075" cy="676276"/>
-          </a:xfrm>
-          <a:prstGeom prst="rect">
-            <a:avLst/>
-          </a:prstGeom>
-          <a:noFill/>
-          <a:extLst>
-            <a:ext uri="{909E8E84-426E-40DD-AFC4-6F175D3DCCD1}">
-              <a14:hiddenFill xmlns:a14="http://schemas.microsoft.com/office/drawing/2010/main">
-                <a:solidFill>
-                  <a:srgbClr val="FFFFFF"/>
-                </a:solidFill>
-              </a14:hiddenFill>
-            </a:ext>
-          </a:extLst>
-        </p:spPr>
-      </p:pic>
     </p:spTree>
     <p:extLst>
       <p:ext uri="{BB962C8B-B14F-4D97-AF65-F5344CB8AC3E}">
@@ -10501,7 +10482,7 @@
           <a:p>
             <a:fld id="{12698F6C-3B60-45A8-AA68-1C639B61BEFF}" type="datetime1">
               <a:rPr lang="en-US" smtClean="0"/>
-              <a:t>8/12/2017</a:t>
+              <a:t>9/11/2017</a:t>
             </a:fld>
             <a:endParaRPr lang="en-US" dirty="0"/>
           </a:p>
@@ -10928,7 +10909,7 @@
           <a:p>
             <a:fld id="{D97E924C-66F2-4356-A8CE-66225EAB43F5}" type="datetime1">
               <a:rPr lang="en-US" smtClean="0"/>
-              <a:t>8/12/2017</a:t>
+              <a:t>9/11/2017</a:t>
             </a:fld>
             <a:endParaRPr lang="en-US"/>
           </a:p>

</xml_diff>

<commit_message>
Updates based on recent new features
- Updated run count
- Added shell scripting ability
- Added "run_as_sys" to diagram
- Added note about shell scripts require an active database.
- Removed "Limits" from "Other Features", since those features were added in the past year.
- Changed "Examples - Live Demonstration" to "Examples".  If session is recorded I cannot show details of our environment.
- Some other minor wording changes.
</commit_message>
<xml_diff>
--- a/presentations/Method5.pptx
+++ b/presentations/Method5.pptx
@@ -210,7 +210,7 @@
           <a:p>
             <a:fld id="{E8184847-EC06-4734-8E30-343A2DA340C9}" type="datetimeFigureOut">
               <a:rPr lang="en-US" smtClean="0"/>
-              <a:t>9/11/2017</a:t>
+              <a:t>10/24/2017</a:t>
             </a:fld>
             <a:endParaRPr lang="en-US"/>
           </a:p>
@@ -375,7 +375,7 @@
           <a:p>
             <a:fld id="{DC284B00-8F05-4CB2-A4E6-4A642AFA915E}" type="datetimeFigureOut">
               <a:rPr lang="en-US" smtClean="0"/>
-              <a:t>9/11/2017</a:t>
+              <a:t>10/24/2017</a:t>
             </a:fld>
             <a:endParaRPr lang="en-US"/>
           </a:p>
@@ -771,112 +771,103 @@
           <a:bodyPr/>
           <a:lstStyle/>
           <a:p>
-            <a:pPr marL="0" indent="0">
-              <a:buNone/>
-            </a:pPr>
             <a:r>
               <a:rPr lang="en-US" b="1" dirty="0" smtClean="0"/>
-              <a:t>1. Tables -</a:t>
-            </a:r>
-            <a:r>
-              <a:rPr lang="en-US" dirty="0" smtClean="0"/>
-              <a:t> Every execution</a:t>
+              <a:t>1. P_CODE (required) -</a:t>
+            </a:r>
+            <a:r>
+              <a:rPr lang="en-US" dirty="0" smtClean="0"/>
+              <a:t> Any </a:t>
+            </a:r>
+            <a:r>
+              <a:rPr lang="en-US" dirty="0" smtClean="0"/>
+              <a:t>SQL statement, PL/SQL block, or Linux/Unix shell script.  The</a:t>
             </a:r>
             <a:r>
               <a:rPr lang="en-US" baseline="0" dirty="0" smtClean="0"/>
-              <a:t> automatically generates three tables.  The tables are given default names if none are specified.  The tables contain the data, the metadata, and the errors.</a:t>
+              <a:t> </a:t>
+            </a:r>
+            <a:r>
+              <a:rPr lang="en-US" baseline="0" dirty="0" smtClean="0"/>
+              <a:t>results can be either the query results, a SQL*Plus feedback message for DDL and DML, </a:t>
+            </a:r>
+            <a:r>
+              <a:rPr lang="en-US" baseline="0" dirty="0" smtClean="0"/>
+              <a:t>DBMS_OUTPUT </a:t>
+            </a:r>
+            <a:r>
+              <a:rPr lang="en-US" baseline="0" dirty="0" smtClean="0"/>
+              <a:t>for PL/SQL </a:t>
+            </a:r>
+            <a:r>
+              <a:rPr lang="en-US" baseline="0" dirty="0" smtClean="0"/>
+              <a:t>statements, or standard output and standard error for shell scripts.  (Shell scripts require</a:t>
+            </a:r>
+            <a:r>
+              <a:rPr lang="en-US" dirty="0" smtClean="0"/>
+              <a:t> an active database so Method5 cannot yet be used for activities that restart the database, like patching and upgrading.)</a:t>
             </a:r>
             <a:endParaRPr lang="en-US" dirty="0" smtClean="0"/>
           </a:p>
           <a:p>
-            <a:pPr marL="0" indent="0">
-              <a:buNone/>
-            </a:pPr>
             <a:r>
               <a:rPr lang="en-US" b="1" dirty="0" smtClean="0"/>
-              <a:t>2. Views -</a:t>
-            </a:r>
-            <a:r>
-              <a:rPr lang="en-US" dirty="0" smtClean="0"/>
-              <a:t> Since you may not know or remember the table names used, three</a:t>
+              <a:t>2. P_TARGETS (optional, defaults to all databases) -</a:t>
+            </a:r>
+            <a:r>
+              <a:rPr lang="en-US" dirty="0" smtClean="0"/>
+              <a:t> Can be either a comma-separated list (of database names, hosts, lifecycles, lines of business, or cluster names) or a query that returns target names.  The</a:t>
             </a:r>
             <a:r>
               <a:rPr lang="en-US" baseline="0" dirty="0" smtClean="0"/>
-              <a:t> views are created in your schema.  These views always reference the last run.  They are M5_RESULTS, M5_METADATA, and M5_ERRORS.</a:t>
+              <a:t> names can also include wild-cards.  You can configure Target Groups for commonly-used queries.</a:t>
             </a:r>
             <a:endParaRPr lang="en-US" dirty="0" smtClean="0"/>
           </a:p>
           <a:p>
-            <a:pPr marL="0" indent="0">
-              <a:buNone/>
-            </a:pPr>
             <a:r>
               <a:rPr lang="en-US" b="1" dirty="0" smtClean="0"/>
-              <a:t>3.</a:t>
-            </a:r>
-            <a:r>
-              <a:rPr lang="en-US" b="1" baseline="0" dirty="0" smtClean="0"/>
-              <a:t> M5_ links - </a:t>
+              <a:t>3. P_TABLE_NAME (optional, defaults to auto-generated name) -</a:t>
+            </a:r>
+            <a:r>
+              <a:rPr lang="en-US" dirty="0" smtClean="0"/>
+              <a:t> The base name for the results, _META, and _ERR tables.</a:t>
+            </a:r>
+          </a:p>
+          <a:p>
+            <a:r>
+              <a:rPr lang="en-US" b="1" dirty="0" smtClean="0"/>
+              <a:t>4. P_TABLE_EXISTS_ACTION (optional, defaults to ERROR) -</a:t>
+            </a:r>
+            <a:r>
+              <a:rPr lang="en-US" dirty="0" smtClean="0"/>
+              <a:t> One of ERROR, APPEND, DELETE, or DROP.</a:t>
+            </a:r>
+          </a:p>
+          <a:p>
+            <a:r>
+              <a:rPr lang="en-US" b="1" dirty="0" smtClean="0"/>
+              <a:t>5. P_ASYNCHRONOUS (optional, defaults to TRUE) -</a:t>
+            </a:r>
+            <a:r>
+              <a:rPr lang="en-US" dirty="0" smtClean="0"/>
+              <a:t> Return right away or wait for all results.</a:t>
+            </a:r>
+          </a:p>
+          <a:p>
+            <a:r>
+              <a:rPr lang="en-US" b="1" dirty="0" smtClean="0"/>
+              <a:t>6. P_RUN_AS_SYS (optional, defaults to FALSE) -</a:t>
+            </a:r>
+            <a:r>
+              <a:rPr lang="en-US" dirty="0" smtClean="0"/>
+              <a:t> Run the command as the SYS user.  Command</a:t>
             </a:r>
             <a:r>
               <a:rPr lang="en-US" baseline="0" dirty="0" smtClean="0"/>
-              <a:t>Database links are automatically copied and synchronized to your schema.  This can be useful for many ad hoc tasks.  Simply use @M5_$DBNAME in queries or through DBMS_UTILTY.EXECUTE_DDL_STATEMENT.</a:t>
-            </a:r>
-          </a:p>
-          <a:p>
-            <a:pPr marL="0" indent="0">
-              <a:buNone/>
-            </a:pPr>
-            <a:r>
-              <a:rPr lang="en-US" b="1" baseline="0" dirty="0" smtClean="0"/>
-              <a:t>4. Global Data Dictionary - </a:t>
-            </a:r>
-            <a:r>
-              <a:rPr lang="en-US" baseline="0" dirty="0" smtClean="0"/>
-              <a:t>Every night Method5 gathers some common data into tables such as M5_DBA_TABLES, M5_USER$, M5_DBA_ROLE_PRIVS, M5_DBA_SYS_PRIVS, and M5_DBA_TAB_PRIVS.  Having this data instantly available makes some tasks much simpler, such as finding out where a user exists, or where an object is granted.</a:t>
-            </a:r>
-          </a:p>
-          <a:p>
-            <a:pPr marL="0" indent="0">
-              <a:buNone/>
-            </a:pPr>
-            <a:r>
-              <a:rPr lang="en-US" b="1" baseline="0" dirty="0" smtClean="0"/>
-              <a:t>5. Admin Email - </a:t>
-            </a:r>
-            <a:r>
-              <a:rPr lang="en-US" b="0" baseline="0" dirty="0" smtClean="0"/>
-              <a:t>An email is sent to the administrator every day listing issues encountered by Method5.  These problems are often a blessing in disguise.  For example, if a job never finished and had to be manually killed that implies one of your databases is unavailable.  Method5 will often catch a problem that OEM missed. </a:t>
-            </a:r>
-            <a:endParaRPr lang="en-US" b="1" baseline="0" dirty="0" smtClean="0"/>
-          </a:p>
-          <a:p>
-            <a:pPr marL="0" indent="0">
-              <a:buNone/>
-            </a:pPr>
-            <a:r>
-              <a:rPr lang="en-US" b="1" baseline="0" dirty="0" smtClean="0"/>
-              <a:t>6. Version Star –</a:t>
-            </a:r>
-            <a:r>
-              <a:rPr lang="en-US" b="0" baseline="0" dirty="0" smtClean="0"/>
-              <a:t> Querying different versions of Oracle can be difficult because the data dictionary has different columns.  For example, most data dictionary views in 12c have the new CON_ID column.  A "select * from v$..." will return different result sets between 11g and 12c.  To get around this issue, if you replace "*" with "**", Method5 will convert the "**" into an explicit list of columns based on the lowest Oracle version.  This avoids "not enough values" or "too many values" errors, and ensures that all databases return data regardless of the version.  The results will miss some of the newer columns, such as CON_ID.</a:t>
-            </a:r>
-            <a:endParaRPr lang="en-US" b="1" baseline="0" dirty="0" smtClean="0"/>
-          </a:p>
-          <a:p>
-            <a:pPr marL="0" indent="0">
-              <a:buNone/>
-            </a:pPr>
-            <a:r>
-              <a:rPr lang="en-US" b="1" baseline="0" dirty="0" smtClean="0"/>
-              <a:t>7. Limits - </a:t>
-            </a:r>
-            <a:r>
-              <a:rPr lang="en-US" baseline="0" dirty="0" smtClean="0"/>
-              <a:t>Method5 currently only runs SQL and PL/SQL statements.  It does not (yet) run operating system commands or SQL*Plus scripts.  It also (currently) only runs as DBA so you cannot perform tasks as SYSDBA.</a:t>
-            </a:r>
-            <a:endParaRPr lang="en-US" dirty="0"/>
+              <a:t>s should only run as SYS when necessary, which is probably less than 1% of the time.  This feature has extra protections that prevent other users from calling it.  Only the Method5 user from the master database can use this feature.  See the security section of the user guide for more details.  If you're still worried about it, this feature can be disabled for everyone or for specific users.</a:t>
+            </a:r>
+            <a:endParaRPr lang="en-US" dirty="0" smtClean="0"/>
           </a:p>
         </p:txBody>
       </p:sp>
@@ -897,7 +888,7 @@
           <a:p>
             <a:fld id="{72AE7ADF-BF07-437B-AD5B-68C1A8D7189D}" type="slidenum">
               <a:rPr lang="en-US" smtClean="0"/>
-              <a:t>11</a:t>
+              <a:t>10</a:t>
             </a:fld>
             <a:endParaRPr lang="en-US"/>
           </a:p>
@@ -906,7 +897,7 @@
     </p:spTree>
     <p:extLst>
       <p:ext uri="{BB962C8B-B14F-4D97-AF65-F5344CB8AC3E}">
-        <p14:creationId xmlns:p14="http://schemas.microsoft.com/office/powerpoint/2010/main" val="2408283472"/>
+        <p14:creationId xmlns:p14="http://schemas.microsoft.com/office/powerpoint/2010/main" val="316232668"/>
       </p:ext>
     </p:extLst>
   </p:cSld>
@@ -964,38 +955,52 @@
               <a:buNone/>
             </a:pPr>
             <a:r>
-              <a:rPr lang="en-US" dirty="0" smtClean="0"/>
-              <a:t>1. Like</a:t>
+              <a:rPr lang="en-US" b="1" dirty="0" smtClean="0"/>
+              <a:t>1. Tables -</a:t>
+            </a:r>
+            <a:r>
+              <a:rPr lang="en-US" dirty="0" smtClean="0"/>
+              <a:t> Every execution</a:t>
             </a:r>
             <a:r>
               <a:rPr lang="en-US" baseline="0" dirty="0" smtClean="0"/>
-              <a:t> any good database solution, the heavy-lifting is done with SQL statements glued together with PL/SQL.  The dynamic code is nested several levels deep.  To avoid the typical concatenation-hell, the alternative quoting mechanism and REPLACE are used.  This simple trick makes dynamic code drastically more readable.</a:t>
-            </a:r>
+              <a:t> automatically generates three tables.  The tables are given default names if none are specified.  The tables contain the data, the metadata, and the errors.</a:t>
+            </a:r>
+            <a:endParaRPr lang="en-US" dirty="0" smtClean="0"/>
           </a:p>
           <a:p>
             <a:pPr marL="0" indent="0">
               <a:buNone/>
             </a:pPr>
             <a:r>
+              <a:rPr lang="en-US" b="1" dirty="0" smtClean="0"/>
+              <a:t>2. Views -</a:t>
+            </a:r>
+            <a:r>
+              <a:rPr lang="en-US" dirty="0" smtClean="0"/>
+              <a:t> Since you may not know or remember the table names used, three</a:t>
+            </a:r>
+            <a:r>
               <a:rPr lang="en-US" baseline="0" dirty="0" smtClean="0"/>
-              <a:t>2. Database links are what ties everything together.  Database links have gotten a bad reputation.  Yes, many people make horrible mistakes with them, but when used right it makes inter-database communication incredibly simple.</a:t>
-            </a:r>
+              <a:t> views are created in your schema.  These views always reference the last run.  They are M5_RESULTS, M5_METADATA, and M5_ERRORS.</a:t>
+            </a:r>
+            <a:endParaRPr lang="en-US" dirty="0" smtClean="0"/>
           </a:p>
           <a:p>
             <a:pPr marL="0" indent="0">
               <a:buNone/>
             </a:pPr>
             <a:r>
+              <a:rPr lang="en-US" b="1" dirty="0" smtClean="0"/>
+              <a:t>3.</a:t>
+            </a:r>
+            <a:r>
+              <a:rPr lang="en-US" b="1" baseline="0" dirty="0" smtClean="0"/>
+              <a:t> M5_ links - </a:t>
+            </a:r>
+            <a:r>
               <a:rPr lang="en-US" baseline="0" dirty="0" smtClean="0"/>
-              <a:t>3. 99% of all Oracle SQL code parsing or code transformation  programs are fundamentally broken.  Things like statement classification and terminator removal are often handled with simple  regular expressions.  SQL and PL/SQL are insanely complicated languages, with over 2,000 keywords and 30 years of syntax history.  A proper </a:t>
-            </a:r>
-            <a:r>
-              <a:rPr lang="en-US" baseline="0" dirty="0" err="1" smtClean="0"/>
-              <a:t>lexer</a:t>
-            </a:r>
-            <a:r>
-              <a:rPr lang="en-US" baseline="0" dirty="0" smtClean="0"/>
-              <a:t> is a requirement to build a robust system that can handle any code.</a:t>
+              <a:t>Database links are automatically copied and synchronized to your schema.  This can be useful for many ad hoc tasks.  Simply use @M5_$DBNAME in queries or through DBMS_UTILTY.EXECUTE_DDL_STATEMENT.</a:t>
             </a:r>
           </a:p>
           <a:p>
@@ -1003,8 +1008,12 @@
               <a:buNone/>
             </a:pPr>
             <a:r>
+              <a:rPr lang="en-US" b="1" baseline="0" dirty="0" smtClean="0"/>
+              <a:t>4. Global Data Dictionary - </a:t>
+            </a:r>
+            <a:r>
               <a:rPr lang="en-US" baseline="0" dirty="0" smtClean="0"/>
-              <a:t>4. Scheduler and pipes work together to enable parallelism and asynchronous processing.</a:t>
+              <a:t>Every night Method5 gathers some common data into tables such as M5_DBA_TABLES, M5_USER$, M5_DBA_ROLE_PRIVS, M5_DBA_SYS_PRIVS, and M5_DBA_TAB_PRIVS.  Having this data instantly available makes some tasks much simpler, such as finding out where a user exists, or where an object is granted.</a:t>
             </a:r>
           </a:p>
           <a:p>
@@ -1012,19 +1021,32 @@
               <a:buNone/>
             </a:pPr>
             <a:r>
-              <a:rPr lang="en-US" baseline="0" dirty="0" smtClean="0"/>
-              <a:t>5. Everything is configured in tables.  You don't have to worry about XML configuration files or agent parameter files.</a:t>
-            </a:r>
+              <a:rPr lang="en-US" b="1" baseline="0" dirty="0" smtClean="0"/>
+              <a:t>5. Admin Email - </a:t>
+            </a:r>
+            <a:r>
+              <a:rPr lang="en-US" b="0" baseline="0" dirty="0" smtClean="0"/>
+              <a:t>An email is sent to the administrator every day listing issues encountered by Method5.  These problems are often a blessing in disguise.  For example, if a job never finished and had to be manually killed that implies one of your databases is unavailable.  Method5 will often catch a problem that OEM missed. </a:t>
+            </a:r>
+            <a:endParaRPr lang="en-US" b="1" baseline="0" dirty="0" smtClean="0"/>
           </a:p>
           <a:p>
             <a:pPr marL="0" indent="0">
               <a:buNone/>
             </a:pPr>
             <a:r>
-              <a:rPr lang="en-US" baseline="0" dirty="0" smtClean="0"/>
-              <a:t>6. Oracle Data Cartridge is the magic (or at least cryptic) piece that allows Method5 to extend Oracle SQL.  It provides the ability to return "anything", dynamically, in a SQL context.  Running dynamic SQL in SQL is much harder than it sounds.</a:t>
-            </a:r>
-            <a:endParaRPr lang="en-US" dirty="0"/>
+              <a:rPr lang="en-US" b="1" baseline="0" dirty="0" smtClean="0"/>
+              <a:t>6. Version Star –</a:t>
+            </a:r>
+            <a:r>
+              <a:rPr lang="en-US" b="0" baseline="0" dirty="0" smtClean="0"/>
+              <a:t> Querying different versions of Oracle can be difficult because the data dictionary has different columns.  For example, most data dictionary views in 12c have the new CON_ID column.  A "select * from v$..." will return different result sets between 11g and 12c.  To get around this issue, if you replace "*" with "**", Method5 will convert the "**" into an explicit list of columns based on the lowest Oracle version.  This avoids "not enough values" or "too many values" errors, and ensures that all databases return data regardless of the version.  The results will miss some of the newer columns, such as CON_ID</a:t>
+            </a:r>
+            <a:r>
+              <a:rPr lang="en-US" b="0" baseline="0" dirty="0" smtClean="0"/>
+              <a:t>.</a:t>
+            </a:r>
+            <a:endParaRPr lang="en-US" b="1" baseline="0" dirty="0" smtClean="0"/>
           </a:p>
         </p:txBody>
       </p:sp>
@@ -1045,7 +1067,7 @@
           <a:p>
             <a:fld id="{72AE7ADF-BF07-437B-AD5B-68C1A8D7189D}" type="slidenum">
               <a:rPr lang="en-US" smtClean="0"/>
-              <a:t>12</a:t>
+              <a:t>11</a:t>
             </a:fld>
             <a:endParaRPr lang="en-US"/>
           </a:p>
@@ -1054,7 +1076,7 @@
     </p:spTree>
     <p:extLst>
       <p:ext uri="{BB962C8B-B14F-4D97-AF65-F5344CB8AC3E}">
-        <p14:creationId xmlns:p14="http://schemas.microsoft.com/office/powerpoint/2010/main" val="1500454840"/>
+        <p14:creationId xmlns:p14="http://schemas.microsoft.com/office/powerpoint/2010/main" val="2408283472"/>
       </p:ext>
     </p:extLst>
   </p:cSld>
@@ -1108,68 +1130,78 @@
           <a:bodyPr/>
           <a:lstStyle/>
           <a:p>
-            <a:r>
-              <a:rPr lang="en-US" dirty="0" smtClean="0"/>
-              <a:t>1. Requirements - You must have a central</a:t>
+            <a:pPr marL="0" indent="0">
+              <a:buNone/>
+            </a:pPr>
+            <a:r>
+              <a:rPr lang="en-US" dirty="0" smtClean="0"/>
+              <a:t>1. Like</a:t>
             </a:r>
             <a:r>
               <a:rPr lang="en-US" baseline="0" dirty="0" smtClean="0"/>
-              <a:t> management database that can communicate with all other database.  You must have SYSDBA to install, and DBA privileges to use.  Any currently-supported platform, version, or edition will work.  (And probably some unsupported ones also.)  For testing you only need a single database - the default installation will create some fake links that simulate a multi-database environment.</a:t>
-            </a:r>
-          </a:p>
-          <a:p>
-            <a:r>
-              <a:rPr lang="en-US" dirty="0" smtClean="0"/>
-              <a:t>2. Only one person needs to install and administer it.  The configuration is automatically applied to other users.</a:t>
-            </a:r>
-          </a:p>
-          <a:p>
-            <a:r>
-              <a:rPr lang="en-US" dirty="0" smtClean="0"/>
-              <a:t>3. Download the free, open source code from GitHub and follow the instructions.</a:t>
-            </a:r>
-          </a:p>
-          <a:p>
-            <a:r>
-              <a:rPr lang="en-US" dirty="0" smtClean="0"/>
-              <a:t>4. The code is 100% inside the database - there are no agents, plugins, websites, configuration files, etc.</a:t>
-            </a:r>
-          </a:p>
-          <a:p>
-            <a:r>
-              <a:rPr lang="en-US" dirty="0" smtClean="0"/>
-              <a:t>5. Getting started</a:t>
-            </a:r>
+              <a:t> any good database solution, the heavy-lifting is done with SQL statements glued together with PL/SQL.  The dynamic code is nested several levels deep.  To avoid the typical concatenation-hell, the alternative quoting mechanism and REPLACE are used.  This simple trick makes dynamic code drastically more readable.</a:t>
+            </a:r>
+          </a:p>
+          <a:p>
+            <a:pPr marL="0" indent="0">
+              <a:buNone/>
+            </a:pPr>
             <a:r>
               <a:rPr lang="en-US" baseline="0" dirty="0" smtClean="0"/>
-              <a:t> will take less than an hour.  The time to setup all your connections will vary depending on how standardized your environment is.  1000 perfectly-standardized databases will be easier than 10 databases all with different platforms, versions, and configurations.  One of the nice side-effects of Method5 is that it really drives home how useful standardization can be.  You may want to work on one environment at a time; you don't need to get every database working in order to use this.</a:t>
-            </a:r>
-          </a:p>
-          <a:p>
+              <a:t>2. Database links are what ties everything together.  Database links have gotten a bad reputation.  Yes, many people make horrible mistakes with them, but when used right it makes inter-database communication incredibly simple.</a:t>
+            </a:r>
+          </a:p>
+          <a:p>
+            <a:pPr marL="0" indent="0">
+              <a:buNone/>
+            </a:pPr>
             <a:r>
               <a:rPr lang="en-US" baseline="0" dirty="0" smtClean="0"/>
-              <a:t>6. If you encounter any problems you can create a GitHub issue on the repository or you can email Jon Heller at either hjon@ventechsolutions.com or jon@jonheller.org.</a:t>
-            </a:r>
-          </a:p>
-          <a:p>
+              <a:t>3. 99% of all Oracle SQL code parsing or code transformation  programs are fundamentally broken.  Things like statement classification and terminator removal are often handled with simple  regular expressions.  SQL and PL/SQL are insanely complicated languages, with over 2,000 keywords and 30 years of syntax history.  A proper </a:t>
+            </a:r>
+            <a:r>
+              <a:rPr lang="en-US" baseline="0" dirty="0" err="1" smtClean="0"/>
+              <a:t>lexer</a:t>
+            </a:r>
+            <a:r>
+              <a:rPr lang="en-US" baseline="0" dirty="0" smtClean="0"/>
+              <a:t> is a requirement to build a robust system that can handle any code.</a:t>
+            </a:r>
+          </a:p>
+          <a:p>
+            <a:pPr marL="0" indent="0">
+              <a:buNone/>
+            </a:pPr>
+            <a:r>
+              <a:rPr lang="en-US" baseline="0" dirty="0" smtClean="0"/>
+              <a:t>4. Scheduler and pipes work together to enable parallelism and asynchronous processing</a:t>
+            </a:r>
+            <a:r>
+              <a:rPr lang="en-US" baseline="0" dirty="0" smtClean="0"/>
+              <a:t>.</a:t>
+            </a:r>
+            <a:r>
+              <a:rPr lang="en-US" dirty="0" smtClean="0"/>
+              <a:t>  DBMS_SCHEDULER also enable the execution of shell scripts.</a:t>
+            </a:r>
             <a:endParaRPr lang="en-US" baseline="0" dirty="0" smtClean="0"/>
           </a:p>
           <a:p>
-            <a:r>
-              <a:rPr lang="en-US" dirty="0" smtClean="0"/>
-              <a:t>Most DBAs have everything they need to get started in about</a:t>
-            </a:r>
+            <a:pPr marL="0" indent="0">
+              <a:buNone/>
+            </a:pPr>
             <a:r>
               <a:rPr lang="en-US" baseline="0" dirty="0" smtClean="0"/>
-              <a:t> an hour.</a:t>
-            </a:r>
-            <a:r>
-              <a:rPr lang="en-US" dirty="0" smtClean="0"/>
-              <a:t>  You don't need to buy anything, sign up for anything, or install any operating system binaries.  The installation and</a:t>
-            </a:r>
+              <a:t>5. Everything is configured in tables.  You don't have to worry about XML configuration files or agent parameter files.</a:t>
+            </a:r>
+          </a:p>
+          <a:p>
+            <a:pPr marL="0" indent="0">
+              <a:buNone/>
+            </a:pPr>
             <a:r>
               <a:rPr lang="en-US" baseline="0" dirty="0" smtClean="0"/>
-              <a:t> administration tasks aren't that different from what you do on a day-to-day basis.</a:t>
+              <a:t>6. Oracle Data Cartridge is the magic (or at least cryptic) piece that allows Method5 to extend Oracle SQL.  It provides the ability to return "anything", dynamically, in a SQL context.  Running dynamic SQL in SQL is much harder than it sounds.</a:t>
             </a:r>
             <a:endParaRPr lang="en-US" dirty="0"/>
           </a:p>
@@ -1192,7 +1224,7 @@
           <a:p>
             <a:fld id="{72AE7ADF-BF07-437B-AD5B-68C1A8D7189D}" type="slidenum">
               <a:rPr lang="en-US" smtClean="0"/>
-              <a:t>13</a:t>
+              <a:t>12</a:t>
             </a:fld>
             <a:endParaRPr lang="en-US"/>
           </a:p>
@@ -1201,7 +1233,7 @@
     </p:spTree>
     <p:extLst>
       <p:ext uri="{BB962C8B-B14F-4D97-AF65-F5344CB8AC3E}">
-        <p14:creationId xmlns:p14="http://schemas.microsoft.com/office/powerpoint/2010/main" val="489585203"/>
+        <p14:creationId xmlns:p14="http://schemas.microsoft.com/office/powerpoint/2010/main" val="1500454840"/>
       </p:ext>
     </p:extLst>
   </p:cSld>
@@ -1255,7 +1287,70 @@
           <a:bodyPr/>
           <a:lstStyle/>
           <a:p>
-            <a:endParaRPr lang="en-US"/>
+            <a:r>
+              <a:rPr lang="en-US" dirty="0" smtClean="0"/>
+              <a:t>1. Requirements - You must have a central</a:t>
+            </a:r>
+            <a:r>
+              <a:rPr lang="en-US" baseline="0" dirty="0" smtClean="0"/>
+              <a:t> management database that can communicate with all other database.  You must have SYSDBA to install, and DBA privileges to use.  Any currently-supported platform, version, or edition will work.  (And probably some unsupported ones also.)  For testing you only need a single database - the default installation will create some fake links that simulate a multi-database environment.</a:t>
+            </a:r>
+          </a:p>
+          <a:p>
+            <a:r>
+              <a:rPr lang="en-US" dirty="0" smtClean="0"/>
+              <a:t>2. Only one person needs to install and administer it.  The configuration is automatically applied to other users.</a:t>
+            </a:r>
+          </a:p>
+          <a:p>
+            <a:r>
+              <a:rPr lang="en-US" dirty="0" smtClean="0"/>
+              <a:t>3. Download the free, open source code from GitHub and follow the instructions.</a:t>
+            </a:r>
+          </a:p>
+          <a:p>
+            <a:r>
+              <a:rPr lang="en-US" dirty="0" smtClean="0"/>
+              <a:t>4. The code is 100% inside the database - there are no agents, plugins, websites, configuration files, etc.</a:t>
+            </a:r>
+          </a:p>
+          <a:p>
+            <a:r>
+              <a:rPr lang="en-US" dirty="0" smtClean="0"/>
+              <a:t>5. Getting started</a:t>
+            </a:r>
+            <a:r>
+              <a:rPr lang="en-US" baseline="0" dirty="0" smtClean="0"/>
+              <a:t> will take less than an hour.  The time to setup all your connections will vary depending on how standardized your environment is.  1000 perfectly-standardized databases will be easier than 10 databases all with different platforms, versions, and configurations.  One of the nice side-effects of Method5 is that it really drives home how useful standardization can be.  You may want to work on one environment at a time; you don't need to get every database working in order to use this.</a:t>
+            </a:r>
+          </a:p>
+          <a:p>
+            <a:r>
+              <a:rPr lang="en-US" baseline="0" dirty="0" smtClean="0"/>
+              <a:t>6. If you encounter any problems you can create a GitHub issue on the repository or you can email Jon Heller at either hjon@ventechsolutions.com or jon@jonheller.org.</a:t>
+            </a:r>
+          </a:p>
+          <a:p>
+            <a:endParaRPr lang="en-US" baseline="0" dirty="0" smtClean="0"/>
+          </a:p>
+          <a:p>
+            <a:r>
+              <a:rPr lang="en-US" dirty="0" smtClean="0"/>
+              <a:t>Most DBAs have everything they need to get started in about</a:t>
+            </a:r>
+            <a:r>
+              <a:rPr lang="en-US" baseline="0" dirty="0" smtClean="0"/>
+              <a:t> an hour.</a:t>
+            </a:r>
+            <a:r>
+              <a:rPr lang="en-US" dirty="0" smtClean="0"/>
+              <a:t>  You don't need to buy anything, sign up for anything, or install any operating system binaries.  The installation and</a:t>
+            </a:r>
+            <a:r>
+              <a:rPr lang="en-US" baseline="0" dirty="0" smtClean="0"/>
+              <a:t> administration tasks aren't that different from what you do on a day-to-day basis.</a:t>
+            </a:r>
+            <a:endParaRPr lang="en-US" dirty="0"/>
           </a:p>
         </p:txBody>
       </p:sp>
@@ -1276,7 +1371,7 @@
           <a:p>
             <a:fld id="{72AE7ADF-BF07-437B-AD5B-68C1A8D7189D}" type="slidenum">
               <a:rPr lang="en-US" smtClean="0"/>
-              <a:t>14</a:t>
+              <a:t>13</a:t>
             </a:fld>
             <a:endParaRPr lang="en-US"/>
           </a:p>
@@ -1285,7 +1380,7 @@
     </p:spTree>
     <p:extLst>
       <p:ext uri="{BB962C8B-B14F-4D97-AF65-F5344CB8AC3E}">
-        <p14:creationId xmlns:p14="http://schemas.microsoft.com/office/powerpoint/2010/main" val="3281300294"/>
+        <p14:creationId xmlns:p14="http://schemas.microsoft.com/office/powerpoint/2010/main" val="489585203"/>
       </p:ext>
     </p:extLst>
   </p:cSld>
@@ -1339,7 +1434,7 @@
           <a:bodyPr/>
           <a:lstStyle/>
           <a:p>
-            <a:endParaRPr lang="en-US" dirty="0"/>
+            <a:endParaRPr lang="en-US"/>
           </a:p>
         </p:txBody>
       </p:sp>
@@ -1360,7 +1455,7 @@
           <a:p>
             <a:fld id="{72AE7ADF-BF07-437B-AD5B-68C1A8D7189D}" type="slidenum">
               <a:rPr lang="en-US" smtClean="0"/>
-              <a:t>15</a:t>
+              <a:t>14</a:t>
             </a:fld>
             <a:endParaRPr lang="en-US"/>
           </a:p>
@@ -1369,7 +1464,7 @@
     </p:spTree>
     <p:extLst>
       <p:ext uri="{BB962C8B-B14F-4D97-AF65-F5344CB8AC3E}">
-        <p14:creationId xmlns:p14="http://schemas.microsoft.com/office/powerpoint/2010/main" val="2277858703"/>
+        <p14:creationId xmlns:p14="http://schemas.microsoft.com/office/powerpoint/2010/main" val="3281300294"/>
       </p:ext>
     </p:extLst>
   </p:cSld>
@@ -1423,38 +1518,130 @@
           <a:bodyPr/>
           <a:lstStyle/>
           <a:p>
-            <a:r>
-              <a:rPr lang="en-US" dirty="0" smtClean="0"/>
-              <a:t>1. Method5 isn't simply faster than the alternatives.</a:t>
-            </a:r>
-            <a:r>
-              <a:rPr lang="en-US" baseline="0" dirty="0" smtClean="0"/>
-              <a:t>  It's so much faster that it can change your attitude toward solving problems.</a:t>
-            </a:r>
-            <a:endParaRPr lang="en-US" dirty="0" smtClean="0"/>
-          </a:p>
-          <a:p>
-            <a:r>
-              <a:rPr lang="en-US" dirty="0" smtClean="0"/>
-              <a:t>1. For every problem, spend a minute thinking if there's a way to find it, fix it, or prevent it on other databases.</a:t>
-            </a:r>
-          </a:p>
-          <a:p>
-            <a:r>
-              <a:rPr lang="en-US" dirty="0" smtClean="0"/>
-              <a:t>2. There's no more excuse to not check every database - it only takes one line of code.</a:t>
-            </a:r>
-          </a:p>
-          <a:p>
-            <a:r>
-              <a:rPr lang="en-US" dirty="0" smtClean="0"/>
-              <a:t>3. Start being more proactive - no more Groundhog Day administration.</a:t>
+            <a:endParaRPr lang="en-US" dirty="0"/>
+          </a:p>
+        </p:txBody>
+      </p:sp>
+      <p:sp>
+        <p:nvSpPr>
+          <p:cNvPr id="4" name="Slide Number Placeholder 3"/>
+          <p:cNvSpPr>
+            <a:spLocks noGrp="1"/>
+          </p:cNvSpPr>
+          <p:nvPr>
+            <p:ph type="sldNum" sz="quarter" idx="10"/>
+          </p:nvPr>
+        </p:nvSpPr>
+        <p:spPr/>
+        <p:txBody>
+          <a:bodyPr/>
+          <a:lstStyle/>
+          <a:p>
+            <a:fld id="{72AE7ADF-BF07-437B-AD5B-68C1A8D7189D}" type="slidenum">
+              <a:rPr lang="en-US" smtClean="0"/>
+              <a:t>15</a:t>
+            </a:fld>
+            <a:endParaRPr lang="en-US"/>
+          </a:p>
+        </p:txBody>
+      </p:sp>
+    </p:spTree>
+    <p:extLst>
+      <p:ext uri="{BB962C8B-B14F-4D97-AF65-F5344CB8AC3E}">
+        <p14:creationId xmlns:p14="http://schemas.microsoft.com/office/powerpoint/2010/main" val="2277858703"/>
+      </p:ext>
+    </p:extLst>
+  </p:cSld>
+  <p:clrMapOvr>
+    <a:masterClrMapping/>
+  </p:clrMapOvr>
+</p:notes>
+</file>
+
+<file path=ppt/notesSlides/notesSlide16.xml><?xml version="1.0" encoding="utf-8"?>
+<p:notes xmlns:a="http://schemas.openxmlformats.org/drawingml/2006/main" xmlns:r="http://schemas.openxmlformats.org/officeDocument/2006/relationships" xmlns:p="http://schemas.openxmlformats.org/presentationml/2006/main">
+  <p:cSld>
+    <p:spTree>
+      <p:nvGrpSpPr>
+        <p:cNvPr id="1" name=""/>
+        <p:cNvGrpSpPr/>
+        <p:nvPr/>
+      </p:nvGrpSpPr>
+      <p:grpSpPr>
+        <a:xfrm>
+          <a:off x="0" y="0"/>
+          <a:ext cx="0" cy="0"/>
+          <a:chOff x="0" y="0"/>
+          <a:chExt cx="0" cy="0"/>
+        </a:xfrm>
+      </p:grpSpPr>
+      <p:sp>
+        <p:nvSpPr>
+          <p:cNvPr id="2" name="Slide Image Placeholder 1"/>
+          <p:cNvSpPr>
+            <a:spLocks noGrp="1" noRot="1" noChangeAspect="1"/>
+          </p:cNvSpPr>
+          <p:nvPr>
+            <p:ph type="sldImg"/>
+          </p:nvPr>
+        </p:nvSpPr>
+        <p:spPr/>
+      </p:sp>
+      <p:sp>
+        <p:nvSpPr>
+          <p:cNvPr id="3" name="Notes Placeholder 2"/>
+          <p:cNvSpPr>
+            <a:spLocks noGrp="1"/>
+          </p:cNvSpPr>
+          <p:nvPr>
+            <p:ph type="body" idx="1"/>
+          </p:nvPr>
+        </p:nvSpPr>
+        <p:spPr/>
+        <p:txBody>
+          <a:bodyPr/>
+          <a:lstStyle/>
+          <a:p>
+            <a:r>
+              <a:rPr lang="en-US" dirty="0" smtClean="0"/>
+              <a:t>1. Method5 isn't simply faster than </a:t>
+            </a:r>
+            <a:r>
+              <a:rPr lang="en-US" dirty="0" smtClean="0"/>
+              <a:t>your existing processes.</a:t>
             </a:r>
             <a:r>
               <a:rPr lang="en-US" baseline="0" dirty="0" smtClean="0"/>
               <a:t>  </a:t>
             </a:r>
             <a:r>
+              <a:rPr lang="en-US" baseline="0" dirty="0" smtClean="0"/>
+              <a:t>It's so much faster that it can change your attitude toward solving problems.</a:t>
+            </a:r>
+            <a:endParaRPr lang="en-US" dirty="0" smtClean="0"/>
+          </a:p>
+          <a:p>
+            <a:r>
+              <a:rPr lang="en-US" dirty="0" smtClean="0"/>
+              <a:t>1. For every problem, spend a minute thinking if there's a way to find it, fix it, or prevent it on other databases.</a:t>
+            </a:r>
+          </a:p>
+          <a:p>
+            <a:r>
+              <a:rPr lang="en-US" dirty="0" smtClean="0"/>
+              <a:t>2. There's no more excuse to not check every database - it only takes one line of code.</a:t>
+            </a:r>
+          </a:p>
+          <a:p>
+            <a:r>
+              <a:rPr lang="en-US" dirty="0" smtClean="0"/>
+              <a:t>3. Start being more proactive - no more Groundhog Day administration.</a:t>
+            </a:r>
+            <a:r>
+              <a:rPr lang="en-US" baseline="0" dirty="0" smtClean="0"/>
+              <a:t>  </a:t>
+            </a:r>
+            <a:r>
               <a:rPr lang="en-US" dirty="0" smtClean="0"/>
               <a:t>Even if the problem only takes you 5 minutes to fix each time, consider how much time everyone else spends on it before it even</a:t>
             </a:r>
@@ -1475,7 +1662,15 @@
           <a:p>
             <a:r>
               <a:rPr lang="en-US" dirty="0" smtClean="0"/>
-              <a:t>4. Treat all your databases like one database.</a:t>
+              <a:t>4. Treat all your databases like one </a:t>
+            </a:r>
+            <a:r>
+              <a:rPr lang="en-US" dirty="0" smtClean="0"/>
+              <a:t>logical database</a:t>
+            </a:r>
+            <a:r>
+              <a:rPr lang="en-US" dirty="0" smtClean="0"/>
+              <a:t>.</a:t>
             </a:r>
           </a:p>
           <a:p>
@@ -1651,44 +1846,7 @@
           <a:bodyPr/>
           <a:lstStyle/>
           <a:p>
-            <a:r>
-              <a:rPr lang="en-US" dirty="0" smtClean="0"/>
-              <a:t>1. DBAs spend too much time fixing the same problems again and again on different databases.  When you find a rare problem they won't spend the time</a:t>
-            </a:r>
-            <a:r>
-              <a:rPr lang="en-US" baseline="0" dirty="0" smtClean="0"/>
-              <a:t> to check other databases, it's not worth it.</a:t>
-            </a:r>
-            <a:endParaRPr lang="en-US" dirty="0" smtClean="0"/>
-          </a:p>
-          <a:p>
-            <a:r>
-              <a:rPr lang="en-US" dirty="0" smtClean="0"/>
-              <a:t>2. You can't perform simple tasks or answer simple questions across all your databases.</a:t>
-            </a:r>
-          </a:p>
-          <a:p>
-            <a:r>
-              <a:rPr lang="en-US" dirty="0" smtClean="0"/>
-              <a:t>3. You have tools to automate common, predefined tasks like cloning, installing, patching, and deployments.  But</a:t>
-            </a:r>
-            <a:r>
-              <a:rPr lang="en-US" baseline="0" dirty="0" smtClean="0"/>
-              <a:t> why not bring automation to tuning, troubleshooting, and other ad hoc tasks?</a:t>
-            </a:r>
-            <a:endParaRPr lang="en-US" dirty="0" smtClean="0"/>
-          </a:p>
-          <a:p>
-            <a:r>
-              <a:rPr lang="en-US" dirty="0" smtClean="0"/>
-              <a:t>4. Your environment has unique challenges.  How do you automate the "other" problems that take up so much time?</a:t>
-            </a:r>
-          </a:p>
-          <a:p>
-            <a:r>
-              <a:rPr lang="en-US" dirty="0" smtClean="0"/>
-              <a:t>5. SQL, PL/SQL, and the relational model help solve many of these problems, but they are stuck inside a single database.  Why can't you treat all of your databases as a single entity?</a:t>
-            </a:r>
+            <a:endParaRPr lang="en-US"/>
           </a:p>
         </p:txBody>
       </p:sp>
@@ -1709,7 +1867,7 @@
           <a:p>
             <a:fld id="{72AE7ADF-BF07-437B-AD5B-68C1A8D7189D}" type="slidenum">
               <a:rPr lang="en-US" smtClean="0"/>
-              <a:t>4</a:t>
+              <a:t>3</a:t>
             </a:fld>
             <a:endParaRPr lang="en-US"/>
           </a:p>
@@ -1718,7 +1876,7 @@
     </p:spTree>
     <p:extLst>
       <p:ext uri="{BB962C8B-B14F-4D97-AF65-F5344CB8AC3E}">
-        <p14:creationId xmlns:p14="http://schemas.microsoft.com/office/powerpoint/2010/main" val="750641178"/>
+        <p14:creationId xmlns:p14="http://schemas.microsoft.com/office/powerpoint/2010/main" val="1281599350"/>
       </p:ext>
     </p:extLst>
   </p:cSld>
@@ -1774,95 +1932,42 @@
           <a:p>
             <a:r>
               <a:rPr lang="en-US" dirty="0" smtClean="0"/>
-              <a:t>(Not all of these criticisms apply</a:t>
+              <a:t>1. DBAs spend too much time fixing the same problems again and again on different databases.  When you find a rare problem they won't spend the time</a:t>
             </a:r>
             <a:r>
               <a:rPr lang="en-US" baseline="0" dirty="0" smtClean="0"/>
-              <a:t> to all of the listed tools.)</a:t>
+              <a:t> to check other databases, it's not worth it.</a:t>
             </a:r>
             <a:endParaRPr lang="en-US" dirty="0" smtClean="0"/>
           </a:p>
           <a:p>
+            <a:r>
+              <a:rPr lang="en-US" dirty="0" smtClean="0"/>
+              <a:t>2. You can't perform simple tasks or answer simple questions across all your databases.</a:t>
+            </a:r>
+          </a:p>
+          <a:p>
+            <a:r>
+              <a:rPr lang="en-US" dirty="0" smtClean="0"/>
+              <a:t>3. You have tools to automate common, predefined tasks like cloning, installing, patching, and deployments.  But</a:t>
+            </a:r>
+            <a:r>
+              <a:rPr lang="en-US" baseline="0" dirty="0" smtClean="0"/>
+              <a:t> why not bring automation to tuning, troubleshooting, and other ad hoc tasks?</a:t>
+            </a:r>
             <a:endParaRPr lang="en-US" dirty="0" smtClean="0"/>
           </a:p>
           <a:p>
             <a:r>
               <a:rPr lang="en-US" dirty="0" smtClean="0"/>
-              <a:t>1. Existing tools and processes are not nearly good enough to transform the way you work. If you don't use these automation tools multiple times a day then they have failed to significantly help your organization.  Programs like </a:t>
-            </a:r>
-            <a:r>
-              <a:rPr lang="en-US" dirty="0" err="1" smtClean="0"/>
-              <a:t>Ansible</a:t>
-            </a:r>
-            <a:r>
-              <a:rPr lang="en-US" dirty="0" smtClean="0"/>
-              <a:t>, Salt, and Fabric can</a:t>
-            </a:r>
-            <a:r>
-              <a:rPr lang="en-US" baseline="0" dirty="0" smtClean="0"/>
-              <a:t> radically alter the way your system administrators work.  But they can't do the same for Oracle databases.</a:t>
-            </a:r>
-            <a:endParaRPr lang="en-US" dirty="0" smtClean="0"/>
-          </a:p>
-          <a:p>
-            <a:r>
-              <a:rPr lang="en-US" dirty="0" smtClean="0"/>
-              <a:t>2. None of the existing tools are fast, easy to use, and secure.</a:t>
-            </a:r>
-          </a:p>
-          <a:p>
-            <a:r>
-              <a:rPr lang="en-US" dirty="0" smtClean="0"/>
-              <a:t>3. We don't need more IDEs, plugins, websites, and agents. Good DBAs and developers will not give up their favorite IDE; you'll</a:t>
-            </a:r>
-            <a:r>
-              <a:rPr lang="en-US" baseline="0" dirty="0" smtClean="0"/>
-              <a:t> have to pry them from our </a:t>
-            </a:r>
-            <a:r>
-              <a:rPr lang="en-US" dirty="0" smtClean="0"/>
-              <a:t>cold, dead hands.</a:t>
-            </a:r>
-          </a:p>
-          <a:p>
-            <a:r>
-              <a:rPr lang="en-US" dirty="0" smtClean="0"/>
-              <a:t>4. Most of the "enterprise"</a:t>
-            </a:r>
-            <a:r>
-              <a:rPr lang="en-US" baseline="0" dirty="0" smtClean="0"/>
-              <a:t> automation programs are expensive and closed source.</a:t>
-            </a:r>
-          </a:p>
-          <a:p>
-            <a:r>
-              <a:rPr lang="en-US" dirty="0" smtClean="0"/>
-              <a:t>5. Some programs are only designed to run a small set of pre-defined</a:t>
-            </a:r>
-            <a:r>
-              <a:rPr lang="en-US" baseline="0" dirty="0" smtClean="0"/>
-              <a:t> scripts.</a:t>
-            </a:r>
-            <a:endParaRPr lang="en-US" dirty="0" smtClean="0"/>
-          </a:p>
-          <a:p>
-            <a:r>
-              <a:rPr lang="en-US" dirty="0" smtClean="0"/>
-              <a:t>5. Most importantly, none of</a:t>
-            </a:r>
-            <a:r>
-              <a:rPr lang="en-US" baseline="0" dirty="0" smtClean="0"/>
-              <a:t> the alternatives are </a:t>
-            </a:r>
-            <a:r>
-              <a:rPr lang="en-US" b="1" baseline="0" dirty="0" smtClean="0"/>
-              <a:t>relational</a:t>
-            </a:r>
-            <a:r>
-              <a:rPr lang="en-US" baseline="0" dirty="0" smtClean="0"/>
-              <a:t>.  There's nothing wrong with Java, SSH, shell scripts, text files, XML, JSON, etc.  But those are not the native language of databases.</a:t>
-            </a:r>
-            <a:endParaRPr lang="en-US" dirty="0"/>
+              <a:t>4. Your environment has unique challenges.  How do you automate the "other" problems that take up so much time?</a:t>
+            </a:r>
+          </a:p>
+          <a:p>
+            <a:r>
+              <a:rPr lang="en-US" dirty="0" smtClean="0"/>
+              <a:t>5. SQL, PL/SQL, and the relational model help solve many of these problems, but they are stuck inside a single database.  Why can't you treat all of your databases as a single entity?</a:t>
+            </a:r>
           </a:p>
         </p:txBody>
       </p:sp>
@@ -1883,7 +1988,7 @@
           <a:p>
             <a:fld id="{72AE7ADF-BF07-437B-AD5B-68C1A8D7189D}" type="slidenum">
               <a:rPr lang="en-US" smtClean="0"/>
-              <a:t>5</a:t>
+              <a:t>4</a:t>
             </a:fld>
             <a:endParaRPr lang="en-US"/>
           </a:p>
@@ -1892,7 +1997,7 @@
     </p:spTree>
     <p:extLst>
       <p:ext uri="{BB962C8B-B14F-4D97-AF65-F5344CB8AC3E}">
-        <p14:creationId xmlns:p14="http://schemas.microsoft.com/office/powerpoint/2010/main" val="2307987260"/>
+        <p14:creationId xmlns:p14="http://schemas.microsoft.com/office/powerpoint/2010/main" val="750641178"/>
       </p:ext>
     </p:extLst>
   </p:cSld>
@@ -1946,84 +2051,97 @@
           <a:bodyPr/>
           <a:lstStyle/>
           <a:p>
-            <a:pPr marL="0" marR="0" indent="0" algn="l" defTabSz="914400" rtl="0" eaLnBrk="1" fontAlgn="auto" latinLnBrk="0" hangingPunct="1">
-              <a:lnSpc>
-                <a:spcPct val="100000"/>
-              </a:lnSpc>
-              <a:spcBef>
-                <a:spcPts val="0"/>
-              </a:spcBef>
-              <a:spcAft>
-                <a:spcPts val="0"/>
-              </a:spcAft>
-              <a:buClrTx/>
-              <a:buSzTx/>
-              <a:buFontTx/>
-              <a:buNone/>
-              <a:tabLst/>
-              <a:defRPr/>
-            </a:pPr>
+            <a:r>
+              <a:rPr lang="en-US" dirty="0" smtClean="0"/>
+              <a:t>(Not all of these criticisms apply</a:t>
+            </a:r>
             <a:r>
               <a:rPr lang="en-US" baseline="0" dirty="0" smtClean="0"/>
-              <a:t>1.  We want to access anything in one statement. We want to pretend a thousand databases are just one.</a:t>
+              <a:t> to all of the listed tools.)</a:t>
             </a:r>
             <a:endParaRPr lang="en-US" dirty="0" smtClean="0"/>
           </a:p>
           <a:p>
-            <a:pPr marL="0" marR="0" indent="0" algn="l" defTabSz="914400" rtl="0" eaLnBrk="1" fontAlgn="auto" latinLnBrk="0" hangingPunct="1">
-              <a:lnSpc>
-                <a:spcPct val="100000"/>
-              </a:lnSpc>
-              <a:spcBef>
-                <a:spcPts val="0"/>
-              </a:spcBef>
-              <a:spcAft>
-                <a:spcPts val="0"/>
-              </a:spcAft>
-              <a:buClrTx/>
-              <a:buSzTx/>
-              <a:buFontTx/>
-              <a:buNone/>
-              <a:tabLst/>
-              <a:defRPr/>
-            </a:pPr>
-            <a:r>
-              <a:rPr lang="en-US" dirty="0" smtClean="0"/>
-              <a:t>2.  Dynamic SQL is sometimes classified as Method 1, 2, 3, or 4.  Method 1 is static, and Method 4 is so dynamic that even the select list is a variable.  You need a new type of dynamic SQL, a Method 5, where even the location is a variable.  This allows you to programmatically control both what to run and where to run it. It should run anywhere SQL can run and should not require anything other than an Oracle database.</a:t>
-            </a:r>
-          </a:p>
-          <a:p>
-            <a:pPr marL="0" marR="0" indent="0" algn="l" defTabSz="914400" rtl="0" eaLnBrk="1" fontAlgn="auto" latinLnBrk="0" hangingPunct="1">
-              <a:lnSpc>
-                <a:spcPct val="100000"/>
-              </a:lnSpc>
-              <a:spcBef>
-                <a:spcPts val="0"/>
-              </a:spcBef>
-              <a:spcAft>
-                <a:spcPts val="0"/>
-              </a:spcAft>
-              <a:buClrTx/>
-              <a:buSzTx/>
-              <a:buFontTx/>
-              <a:buNone/>
-              <a:tabLst/>
-              <a:defRPr/>
-            </a:pPr>
-            <a:r>
-              <a:rPr lang="en-US" dirty="0" smtClean="0"/>
-              <a:t>3. A new syntax would be nice - something like the 12c `CONTAINERS` clause on steroids.</a:t>
-            </a:r>
-          </a:p>
-          <a:p>
-            <a:r>
-              <a:rPr lang="en-US" dirty="0" smtClean="0"/>
-              <a:t>4. We</a:t>
+            <a:endParaRPr lang="en-US" dirty="0" smtClean="0"/>
+          </a:p>
+          <a:p>
+            <a:r>
+              <a:rPr lang="en-US" dirty="0" smtClean="0"/>
+              <a:t>1. Existing tools and processes are not nearly good enough to transform the way you work. If you don't use these automation tools multiple times a day then they have failed to significantly help your organization.  Programs like </a:t>
+            </a:r>
+            <a:r>
+              <a:rPr lang="en-US" dirty="0" err="1" smtClean="0"/>
+              <a:t>Ansible</a:t>
+            </a:r>
+            <a:r>
+              <a:rPr lang="en-US" dirty="0" smtClean="0"/>
+              <a:t>, Salt, and Fabric can</a:t>
             </a:r>
             <a:r>
               <a:rPr lang="en-US" baseline="0" dirty="0" smtClean="0"/>
-              <a:t> can't change SQL syntax but with Oracle Data Cartridge we can get very close.</a:t>
-            </a:r>
+              <a:t> radically alter the way your system administrators work.  But they can't do the same for Oracle databases.</a:t>
+            </a:r>
+            <a:endParaRPr lang="en-US" dirty="0" smtClean="0"/>
+          </a:p>
+          <a:p>
+            <a:r>
+              <a:rPr lang="en-US" dirty="0" smtClean="0"/>
+              <a:t>2. None of the existing tools are fast, easy to use, and secure.</a:t>
+            </a:r>
+          </a:p>
+          <a:p>
+            <a:r>
+              <a:rPr lang="en-US" dirty="0" smtClean="0"/>
+              <a:t>3. We don't need more IDEs, plugins, websites, and agents. Good DBAs and developers will not give up their favorite IDE; you'll</a:t>
+            </a:r>
+            <a:r>
+              <a:rPr lang="en-US" baseline="0" dirty="0" smtClean="0"/>
+              <a:t> have to pry them from our </a:t>
+            </a:r>
+            <a:r>
+              <a:rPr lang="en-US" dirty="0" smtClean="0"/>
+              <a:t>cold, dead hands.</a:t>
+            </a:r>
+          </a:p>
+          <a:p>
+            <a:r>
+              <a:rPr lang="en-US" dirty="0" smtClean="0"/>
+              <a:t>4. Most of the "enterprise"</a:t>
+            </a:r>
+            <a:r>
+              <a:rPr lang="en-US" baseline="0" dirty="0" smtClean="0"/>
+              <a:t> automation programs are expensive and closed source.</a:t>
+            </a:r>
+          </a:p>
+          <a:p>
+            <a:r>
+              <a:rPr lang="en-US" dirty="0" smtClean="0"/>
+              <a:t>5. Some programs are only designed to run a small set of pre-defined</a:t>
+            </a:r>
+            <a:r>
+              <a:rPr lang="en-US" baseline="0" dirty="0" smtClean="0"/>
+              <a:t> scripts.</a:t>
+            </a:r>
+            <a:endParaRPr lang="en-US" dirty="0" smtClean="0"/>
+          </a:p>
+          <a:p>
+            <a:r>
+              <a:rPr lang="en-US" dirty="0" smtClean="0"/>
+              <a:t>5. Most importantly, none of</a:t>
+            </a:r>
+            <a:r>
+              <a:rPr lang="en-US" baseline="0" dirty="0" smtClean="0"/>
+              <a:t> the alternatives are </a:t>
+            </a:r>
+            <a:r>
+              <a:rPr lang="en-US" b="1" baseline="0" dirty="0" smtClean="0"/>
+              <a:t>relational</a:t>
+            </a:r>
+            <a:r>
+              <a:rPr lang="en-US" baseline="0" dirty="0" smtClean="0"/>
+              <a:t>.  There's nothing wrong with Java, SSH, shell scripts, text files, XML, JSON, etc.  But those are not the native language of databases.</a:t>
+            </a:r>
+            <a:endParaRPr lang="en-US" dirty="0"/>
           </a:p>
         </p:txBody>
       </p:sp>
@@ -2044,7 +2162,7 @@
           <a:p>
             <a:fld id="{72AE7ADF-BF07-437B-AD5B-68C1A8D7189D}" type="slidenum">
               <a:rPr lang="en-US" smtClean="0"/>
-              <a:t>6</a:t>
+              <a:t>5</a:t>
             </a:fld>
             <a:endParaRPr lang="en-US"/>
           </a:p>
@@ -2053,7 +2171,7 @@
     </p:spTree>
     <p:extLst>
       <p:ext uri="{BB962C8B-B14F-4D97-AF65-F5344CB8AC3E}">
-        <p14:creationId xmlns:p14="http://schemas.microsoft.com/office/powerpoint/2010/main" val="2964524942"/>
+        <p14:creationId xmlns:p14="http://schemas.microsoft.com/office/powerpoint/2010/main" val="2307987260"/>
       </p:ext>
     </p:extLst>
   </p:cSld>
@@ -2107,64 +2225,84 @@
           <a:bodyPr/>
           <a:lstStyle/>
           <a:p>
-            <a:r>
-              <a:rPr lang="en-US" dirty="0" smtClean="0"/>
-              <a:t>1. You've probably seen this problem solved poorly many times before, you should be skeptical.  There are a lot of horrible ways to do this.</a:t>
-            </a:r>
-          </a:p>
-          <a:p>
-            <a:r>
-              <a:rPr lang="en-US" dirty="0" smtClean="0"/>
-              <a:t>2. Method5 has been used in production for </a:t>
-            </a:r>
-            <a:r>
-              <a:rPr lang="en-US" dirty="0" smtClean="0"/>
-              <a:t>3 </a:t>
-            </a:r>
-            <a:r>
-              <a:rPr lang="en-US" dirty="0" smtClean="0"/>
-              <a:t>years to help manage the largest healthcare data center in the world.</a:t>
-            </a:r>
-          </a:p>
-          <a:p>
-            <a:r>
-              <a:rPr lang="en-US" dirty="0" smtClean="0"/>
-              <a:t>3.</a:t>
-            </a:r>
+            <a:pPr marL="0" marR="0" indent="0" algn="l" defTabSz="914400" rtl="0" eaLnBrk="1" fontAlgn="auto" latinLnBrk="0" hangingPunct="1">
+              <a:lnSpc>
+                <a:spcPct val="100000"/>
+              </a:lnSpc>
+              <a:spcBef>
+                <a:spcPts val="0"/>
+              </a:spcBef>
+              <a:spcAft>
+                <a:spcPts val="0"/>
+              </a:spcAft>
+              <a:buClrTx/>
+              <a:buSzTx/>
+              <a:buFontTx/>
+              <a:buNone/>
+              <a:tabLst/>
+              <a:defRPr/>
+            </a:pPr>
             <a:r>
               <a:rPr lang="en-US" baseline="0" dirty="0" smtClean="0"/>
-              <a:t> </a:t>
-            </a:r>
-            <a:r>
-              <a:rPr lang="en-US" dirty="0" smtClean="0"/>
-              <a:t>We frequently run it against hundreds of databases with over a petabyte of SAN.</a:t>
-            </a:r>
-          </a:p>
-          <a:p>
-            <a:r>
-              <a:rPr lang="en-US" dirty="0" smtClean="0"/>
-              <a:t>4. It's ran over 8 million queries internally.  It contains 1800 automated tests.</a:t>
-            </a:r>
-          </a:p>
-          <a:p>
-            <a:r>
-              <a:rPr lang="en-US" dirty="0" smtClean="0"/>
-              <a:t>5. Security has always been a primary concern.  We've</a:t>
+              <a:t>1.  We want to access anything in one statement. We want to pretend a thousand databases are just one.</a:t>
+            </a:r>
+            <a:endParaRPr lang="en-US" dirty="0" smtClean="0"/>
+          </a:p>
+          <a:p>
+            <a:pPr marL="0" marR="0" indent="0" algn="l" defTabSz="914400" rtl="0" eaLnBrk="1" fontAlgn="auto" latinLnBrk="0" hangingPunct="1">
+              <a:lnSpc>
+                <a:spcPct val="100000"/>
+              </a:lnSpc>
+              <a:spcBef>
+                <a:spcPts val="0"/>
+              </a:spcBef>
+              <a:spcAft>
+                <a:spcPts val="0"/>
+              </a:spcAft>
+              <a:buClrTx/>
+              <a:buSzTx/>
+              <a:buFontTx/>
+              <a:buNone/>
+              <a:tabLst/>
+              <a:defRPr/>
+            </a:pPr>
+            <a:r>
+              <a:rPr lang="en-US" dirty="0" smtClean="0"/>
+              <a:t>2.  Dynamic SQL is sometimes classified as Method 1, 2, 3, or 4.  Method 1 is static, and Method 4 is so dynamic that even the select list is a variable.  You need a new type of dynamic SQL, a Method 5, where even the location is a variable.  This allows you to programmatically control both what to run and where to run it. It should run anywhere SQL can run and should not require anything other than an Oracle database.</a:t>
+            </a:r>
+          </a:p>
+          <a:p>
+            <a:pPr marL="0" marR="0" indent="0" algn="l" defTabSz="914400" rtl="0" eaLnBrk="1" fontAlgn="auto" latinLnBrk="0" hangingPunct="1">
+              <a:lnSpc>
+                <a:spcPct val="100000"/>
+              </a:lnSpc>
+              <a:spcBef>
+                <a:spcPts val="0"/>
+              </a:spcBef>
+              <a:spcAft>
+                <a:spcPts val="0"/>
+              </a:spcAft>
+              <a:buClrTx/>
+              <a:buSzTx/>
+              <a:buFontTx/>
+              <a:buNone/>
+              <a:tabLst/>
+              <a:defRPr/>
+            </a:pPr>
+            <a:r>
+              <a:rPr lang="en-US" dirty="0" smtClean="0"/>
+              <a:t>3. A new syntax would be nice - something like the 12c `CONTAINERS` clause on steroids.</a:t>
+            </a:r>
+          </a:p>
+          <a:p>
+            <a:r>
+              <a:rPr lang="en-US" dirty="0" smtClean="0"/>
+              <a:t>4. We</a:t>
             </a:r>
             <a:r>
               <a:rPr lang="en-US" baseline="0" dirty="0" smtClean="0"/>
-              <a:t> learned from the mistakes of other tools.  For example, there are no shared passwords or public database links.  </a:t>
-            </a:r>
-            <a:r>
-              <a:rPr lang="en-US" dirty="0" smtClean="0"/>
-              <a:t>All the code is online, you can look at it yourself.</a:t>
-            </a:r>
-          </a:p>
-          <a:p>
-            <a:endParaRPr lang="en-US" dirty="0" smtClean="0"/>
-          </a:p>
-          <a:p>
-            <a:endParaRPr lang="en-US" dirty="0"/>
+              <a:t> can't change SQL syntax but with Oracle Data Cartridge we can get very close.</a:t>
+            </a:r>
           </a:p>
         </p:txBody>
       </p:sp>
@@ -2185,7 +2323,7 @@
           <a:p>
             <a:fld id="{72AE7ADF-BF07-437B-AD5B-68C1A8D7189D}" type="slidenum">
               <a:rPr lang="en-US" smtClean="0"/>
-              <a:t>7</a:t>
+              <a:t>6</a:t>
             </a:fld>
             <a:endParaRPr lang="en-US"/>
           </a:p>
@@ -2194,7 +2332,7 @@
     </p:spTree>
     <p:extLst>
       <p:ext uri="{BB962C8B-B14F-4D97-AF65-F5344CB8AC3E}">
-        <p14:creationId xmlns:p14="http://schemas.microsoft.com/office/powerpoint/2010/main" val="3525267537"/>
+        <p14:creationId xmlns:p14="http://schemas.microsoft.com/office/powerpoint/2010/main" val="2964524942"/>
       </p:ext>
     </p:extLst>
   </p:cSld>
@@ -2249,51 +2387,62 @@
           <a:lstStyle/>
           <a:p>
             <a:r>
-              <a:rPr lang="en-US" b="0" dirty="0" smtClean="0"/>
-              <a:t>Method5</a:t>
-            </a:r>
-            <a:r>
-              <a:rPr lang="en-US" b="0" baseline="0" dirty="0" smtClean="0"/>
-              <a:t> can be run as either a function or a procedure.  Both of them let you specify </a:t>
-            </a:r>
-            <a:r>
-              <a:rPr lang="en-US" b="1" baseline="0" dirty="0" smtClean="0"/>
-              <a:t>what</a:t>
-            </a:r>
-            <a:r>
-              <a:rPr lang="en-US" b="0" baseline="0" dirty="0" smtClean="0"/>
-              <a:t> to run and </a:t>
-            </a:r>
-            <a:r>
-              <a:rPr lang="en-US" b="1" baseline="0" dirty="0" smtClean="0"/>
-              <a:t>where</a:t>
-            </a:r>
-            <a:r>
-              <a:rPr lang="en-US" b="0" baseline="0" dirty="0" smtClean="0"/>
-              <a:t> to run it.  The procedure also allows you to specify </a:t>
-            </a:r>
-            <a:r>
-              <a:rPr lang="en-US" b="1" baseline="0" dirty="0" smtClean="0"/>
-              <a:t>how</a:t>
-            </a:r>
-            <a:r>
-              <a:rPr lang="en-US" b="0" baseline="0" dirty="0" smtClean="0"/>
-              <a:t> to run it.</a:t>
-            </a:r>
-            <a:endParaRPr lang="en-US" b="0" dirty="0" smtClean="0"/>
-          </a:p>
-          <a:p>
-            <a:endParaRPr lang="en-US" b="1" dirty="0" smtClean="0"/>
-          </a:p>
-          <a:p>
-            <a:r>
-              <a:rPr lang="en-US" dirty="0" smtClean="0"/>
-              <a:t>Running as a function is simple and neat,</a:t>
+              <a:rPr lang="en-US" dirty="0" smtClean="0"/>
+              <a:t>1. You've probably seen this problem solved poorly many times before, you should be skeptical.  There are a lot of horrible ways to do this.</a:t>
+            </a:r>
+          </a:p>
+          <a:p>
+            <a:r>
+              <a:rPr lang="en-US" dirty="0" smtClean="0"/>
+              <a:t>2. Method5 has been used in production for 3 years to help manage the largest healthcare data center in the world.</a:t>
+            </a:r>
+          </a:p>
+          <a:p>
+            <a:r>
+              <a:rPr lang="en-US" dirty="0" smtClean="0"/>
+              <a:t>3.</a:t>
             </a:r>
             <a:r>
               <a:rPr lang="en-US" baseline="0" dirty="0" smtClean="0"/>
-              <a:t> but in practice advanced users will normally want to run things as a procedure.  Running as a procedure makes it asynchronous, which is good for large jobs you don't want to wait for.  It also makes it possible to schedule and chain tasks.</a:t>
-            </a:r>
+              <a:t> </a:t>
+            </a:r>
+            <a:r>
+              <a:rPr lang="en-US" dirty="0" smtClean="0"/>
+              <a:t>We frequently run it against hundreds of databases with over a petabyte of SAN.</a:t>
+            </a:r>
+          </a:p>
+          <a:p>
+            <a:r>
+              <a:rPr lang="en-US" dirty="0" smtClean="0"/>
+              <a:t>4. It's ran over </a:t>
+            </a:r>
+            <a:r>
+              <a:rPr lang="en-US" dirty="0" smtClean="0"/>
+              <a:t>10 </a:t>
+            </a:r>
+            <a:r>
+              <a:rPr lang="en-US" dirty="0" smtClean="0"/>
+              <a:t>million queries internally.  It contains 1800 automated tests.</a:t>
+            </a:r>
+          </a:p>
+          <a:p>
+            <a:r>
+              <a:rPr lang="en-US" dirty="0" smtClean="0"/>
+              <a:t>5. Security has always been a primary concern.  We've</a:t>
+            </a:r>
+            <a:r>
+              <a:rPr lang="en-US" baseline="0" dirty="0" smtClean="0"/>
+              <a:t> learned from the mistakes of other tools.  For example, there are no shared passwords or public database links.  </a:t>
+            </a:r>
+            <a:r>
+              <a:rPr lang="en-US" dirty="0" smtClean="0"/>
+              <a:t>All the code is online, you can look at it yourself.</a:t>
+            </a:r>
+          </a:p>
+          <a:p>
+            <a:endParaRPr lang="en-US" dirty="0" smtClean="0"/>
+          </a:p>
+          <a:p>
             <a:endParaRPr lang="en-US" dirty="0"/>
           </a:p>
         </p:txBody>
@@ -2315,7 +2464,7 @@
           <a:p>
             <a:fld id="{72AE7ADF-BF07-437B-AD5B-68C1A8D7189D}" type="slidenum">
               <a:rPr lang="en-US" smtClean="0"/>
-              <a:t>8</a:t>
+              <a:t>7</a:t>
             </a:fld>
             <a:endParaRPr lang="en-US"/>
           </a:p>
@@ -2324,7 +2473,7 @@
     </p:spTree>
     <p:extLst>
       <p:ext uri="{BB962C8B-B14F-4D97-AF65-F5344CB8AC3E}">
-        <p14:creationId xmlns:p14="http://schemas.microsoft.com/office/powerpoint/2010/main" val="3520608180"/>
+        <p14:creationId xmlns:p14="http://schemas.microsoft.com/office/powerpoint/2010/main" val="3525267537"/>
       </p:ext>
     </p:extLst>
   </p:cSld>
@@ -2380,80 +2529,83 @@
           <a:p>
             <a:r>
               <a:rPr lang="en-US" b="0" dirty="0" smtClean="0"/>
-              <a:t>Most</a:t>
+              <a:t>Method5</a:t>
             </a:r>
             <a:r>
               <a:rPr lang="en-US" b="0" baseline="0" dirty="0" smtClean="0"/>
-              <a:t> of the features of Method5 happen in the background and aren't obvious at first.</a:t>
-            </a:r>
-          </a:p>
-          <a:p>
-            <a:r>
-              <a:rPr lang="en-US" b="1" dirty="0" smtClean="0"/>
-              <a:t>1. Performance -</a:t>
-            </a:r>
-            <a:r>
-              <a:rPr lang="en-US" dirty="0" smtClean="0"/>
-              <a:t> Asynchronous processing and parallelism make Method5 more responsive and orders of magnitude faster than other tools.</a:t>
-            </a:r>
-          </a:p>
-          <a:p>
-            <a:r>
-              <a:rPr lang="en-US" b="1" dirty="0" smtClean="0"/>
-              <a:t>2. Simple interface -</a:t>
-            </a:r>
-            <a:r>
-              <a:rPr lang="en-US" dirty="0" smtClean="0"/>
-              <a:t> The PL/SQL API makes it easy to create and automate tasks. No need to learn a new GUI or IDE, Method5 seamlessly integrates with your existing tools.</a:t>
-            </a:r>
-          </a:p>
-          <a:p>
-            <a:r>
-              <a:rPr lang="en-US" b="1" dirty="0" smtClean="0"/>
-              <a:t>3.</a:t>
+              <a:t> can be run as either a function or a procedure.  Both of them let you specify </a:t>
             </a:r>
             <a:r>
               <a:rPr lang="en-US" b="1" baseline="0" dirty="0" smtClean="0"/>
+              <a:t>what</a:t>
+            </a:r>
+            <a:r>
+              <a:rPr lang="en-US" b="0" baseline="0" dirty="0" smtClean="0"/>
+              <a:t> to </a:t>
+            </a:r>
+            <a:r>
+              <a:rPr lang="en-US" b="0" baseline="0" dirty="0" smtClean="0"/>
+              <a:t>run, </a:t>
+            </a:r>
+            <a:r>
+              <a:rPr lang="en-US" b="1" baseline="0" dirty="0" smtClean="0"/>
+              <a:t>where</a:t>
+            </a:r>
+            <a:r>
+              <a:rPr lang="en-US" b="0" baseline="0" dirty="0" smtClean="0"/>
               <a:t> </a:t>
             </a:r>
             <a:r>
-              <a:rPr lang="en-US" b="1" dirty="0" smtClean="0"/>
-              <a:t>Relational storage -</a:t>
-            </a:r>
-            <a:r>
-              <a:rPr lang="en-US" dirty="0" smtClean="0"/>
-              <a:t> Everything about the database is stored in the database, making it easier to analyze, save, and share results.</a:t>
-            </a:r>
-          </a:p>
-          <a:p>
-            <a:r>
-              <a:rPr lang="en-US" b="1" dirty="0" smtClean="0"/>
-              <a:t>4. Easy administration -</a:t>
-            </a:r>
-            <a:r>
-              <a:rPr lang="en-US" dirty="0" smtClean="0"/>
-              <a:t> Method5 is agentless. Free and open source software only needs to be installed on one central management database. Users do not need to install custom software, manage connections, or modify configuration files. One administrator can configure Method5 and that configuration automatically applies to all users.</a:t>
-            </a:r>
-          </a:p>
-          <a:p>
-            <a:r>
-              <a:rPr lang="en-US" b="1" dirty="0" smtClean="0"/>
-              <a:t>5. Security -</a:t>
-            </a:r>
-            <a:r>
-              <a:rPr lang="en-US" dirty="0" smtClean="0"/>
-              <a:t> Method5 has been thoroughly hardened to avoid the typical security problems with multi-database tools. For example, there are no public database links or shared passwords. See the Security section in the user guide for details.</a:t>
-            </a:r>
-          </a:p>
-          <a:p>
-            <a:r>
-              <a:rPr lang="en-US" b="1" dirty="0" smtClean="0"/>
-              <a:t>6. Exception handling and metadata -</a:t>
-            </a:r>
-            <a:r>
-              <a:rPr lang="en-US" dirty="0" smtClean="0"/>
-              <a:t> Exceptions and metadata are stored in tables and do not stop other targets from processing. Hung jobs are automatically stopped based on a timeout parameter. Handling these rare problems lets you easily scale your queries to hundreds of databases.</a:t>
-            </a:r>
+              <a:rPr lang="en-US" b="0" baseline="0" dirty="0" smtClean="0"/>
+              <a:t>to run </a:t>
+            </a:r>
+            <a:r>
+              <a:rPr lang="en-US" b="0" baseline="0" dirty="0" smtClean="0"/>
+              <a:t>it, and </a:t>
+            </a:r>
+            <a:r>
+              <a:rPr lang="en-US" b="1" baseline="0" dirty="0" smtClean="0"/>
+              <a:t>how</a:t>
+            </a:r>
+            <a:r>
+              <a:rPr lang="en-US" b="0" baseline="0" dirty="0" smtClean="0"/>
+              <a:t> to run</a:t>
+            </a:r>
+            <a:r>
+              <a:rPr lang="en-US" b="0" dirty="0" smtClean="0"/>
+              <a:t> it.</a:t>
+            </a:r>
+            <a:r>
+              <a:rPr lang="en-US" b="0" baseline="0" dirty="0" smtClean="0"/>
+              <a:t>  </a:t>
+            </a:r>
+            <a:r>
+              <a:rPr lang="en-US" b="0" baseline="0" dirty="0" smtClean="0"/>
+              <a:t>The </a:t>
+            </a:r>
+            <a:r>
+              <a:rPr lang="en-US" b="0" baseline="0" dirty="0" smtClean="0"/>
+              <a:t>function returns results immediately to the screen.  The procedure </a:t>
+            </a:r>
+            <a:r>
+              <a:rPr lang="en-US" dirty="0" smtClean="0"/>
+              <a:t>only saves the results in background tables, and it gives you more control over how the commands are run.</a:t>
+            </a:r>
+            <a:endParaRPr lang="en-US" b="0" dirty="0" smtClean="0"/>
+          </a:p>
+          <a:p>
+            <a:endParaRPr lang="en-US" b="1" dirty="0" smtClean="0"/>
+          </a:p>
+          <a:p>
+            <a:r>
+              <a:rPr lang="en-US" dirty="0" smtClean="0"/>
+              <a:t>Running as a function is simple and neat,</a:t>
+            </a:r>
+            <a:r>
+              <a:rPr lang="en-US" baseline="0" dirty="0" smtClean="0"/>
+              <a:t> but in practice advanced users will normally want to run things as a procedure.  Running as a procedure makes it asynchronous, which is good for large jobs you don't want to wait for.  It also makes it possible to schedule and chain tasks.</a:t>
+            </a:r>
+            <a:endParaRPr lang="en-US" dirty="0"/>
           </a:p>
         </p:txBody>
       </p:sp>
@@ -2474,7 +2626,7 @@
           <a:p>
             <a:fld id="{72AE7ADF-BF07-437B-AD5B-68C1A8D7189D}" type="slidenum">
               <a:rPr lang="en-US" smtClean="0"/>
-              <a:t>9</a:t>
+              <a:t>8</a:t>
             </a:fld>
             <a:endParaRPr lang="en-US"/>
           </a:p>
@@ -2483,7 +2635,7 @@
     </p:spTree>
     <p:extLst>
       <p:ext uri="{BB962C8B-B14F-4D97-AF65-F5344CB8AC3E}">
-        <p14:creationId xmlns:p14="http://schemas.microsoft.com/office/powerpoint/2010/main" val="1909579223"/>
+        <p14:creationId xmlns:p14="http://schemas.microsoft.com/office/powerpoint/2010/main" val="3520608180"/>
       </p:ext>
     </p:extLst>
   </p:cSld>
@@ -2538,78 +2690,81 @@
           <a:lstStyle/>
           <a:p>
             <a:r>
+              <a:rPr lang="en-US" b="0" dirty="0" smtClean="0"/>
+              <a:t>Most</a:t>
+            </a:r>
+            <a:r>
+              <a:rPr lang="en-US" b="0" baseline="0" dirty="0" smtClean="0"/>
+              <a:t> of the features of Method5 happen in the background and aren't obvious at first.</a:t>
+            </a:r>
+          </a:p>
+          <a:p>
+            <a:r>
               <a:rPr lang="en-US" b="1" dirty="0" smtClean="0"/>
-              <a:t>1. P_CODE (required) -</a:t>
-            </a:r>
-            <a:r>
-              <a:rPr lang="en-US" dirty="0" smtClean="0"/>
-              <a:t> Any SQL or PL/SQL statement.  The</a:t>
-            </a:r>
-            <a:r>
-              <a:rPr lang="en-US" baseline="0" dirty="0" smtClean="0"/>
-              <a:t> results can be either the query results, a SQL*Plus feedback message for DDL and DML, or DBMS_OUTPUT for PL/SQL statements.</a:t>
-            </a:r>
-            <a:endParaRPr lang="en-US" dirty="0" smtClean="0"/>
+              <a:t>1. Performance -</a:t>
+            </a:r>
+            <a:r>
+              <a:rPr lang="en-US" dirty="0" smtClean="0"/>
+              <a:t> Asynchronous processing and parallelism make Method5 more responsive and orders of magnitude faster than other tools.</a:t>
+            </a:r>
           </a:p>
           <a:p>
             <a:r>
               <a:rPr lang="en-US" b="1" dirty="0" smtClean="0"/>
-              <a:t>2. P_TARGETS (optional, defaults to all databases) -</a:t>
-            </a:r>
-            <a:r>
-              <a:rPr lang="en-US" dirty="0" smtClean="0"/>
-              <a:t> Can be either a comma-separated list (of database names, hosts, lifecycles, lines of business, or cluster names) or a query that returns target names.  The</a:t>
-            </a:r>
-            <a:r>
-              <a:rPr lang="en-US" baseline="0" dirty="0" smtClean="0"/>
-              <a:t> names can also include wild-cards.  You can configure Target Groups for commonly-used queries.</a:t>
-            </a:r>
-            <a:endParaRPr lang="en-US" dirty="0" smtClean="0"/>
+              <a:t>2. Simple interface -</a:t>
+            </a:r>
+            <a:r>
+              <a:rPr lang="en-US" dirty="0" smtClean="0"/>
+              <a:t> The PL/SQL API makes it easy to create and automate tasks. No need to learn a new GUI or IDE, Method5 seamlessly integrates with your existing tools.</a:t>
+            </a:r>
           </a:p>
           <a:p>
             <a:r>
               <a:rPr lang="en-US" b="1" dirty="0" smtClean="0"/>
-              <a:t>3. P_TABLE_NAME (optional, defaults to auto-generated name) -</a:t>
-            </a:r>
-            <a:r>
-              <a:rPr lang="en-US" dirty="0" smtClean="0"/>
-              <a:t> The base name for the results, _META, and _ERR tables.</a:t>
-            </a:r>
-          </a:p>
-          <a:p>
+              <a:t>3.</a:t>
+            </a:r>
+            <a:r>
+              <a:rPr lang="en-US" b="1" baseline="0" dirty="0" smtClean="0"/>
+              <a:t> </a:t>
+            </a:r>
             <a:r>
               <a:rPr lang="en-US" b="1" dirty="0" smtClean="0"/>
-              <a:t>4. P_TABLE_EXISTS_ACTION (optional, defaults to ERROR) -</a:t>
-            </a:r>
-            <a:r>
-              <a:rPr lang="en-US" dirty="0" smtClean="0"/>
-              <a:t> One of ERROR, APPEND, DELETE, or DROP.</a:t>
+              <a:t>Relational storage -</a:t>
+            </a:r>
+            <a:r>
+              <a:rPr lang="en-US" dirty="0" smtClean="0"/>
+              <a:t> Everything about the database is stored in the database, making it easier to analyze, save, and share results.</a:t>
             </a:r>
           </a:p>
           <a:p>
             <a:r>
               <a:rPr lang="en-US" b="1" dirty="0" smtClean="0"/>
-              <a:t>5. P_ASYNCHRONOUS (optional, defaults to TRUE) -</a:t>
-            </a:r>
-            <a:r>
-              <a:rPr lang="en-US" dirty="0" smtClean="0"/>
-              <a:t> Return right away or wait for all results.</a:t>
+              <a:t>4. Easy administration -</a:t>
+            </a:r>
+            <a:r>
+              <a:rPr lang="en-US" dirty="0" smtClean="0"/>
+              <a:t> Method5 is agentless. Free and open source software only needs to be installed on one central management database. Users do not need to install custom software, manage connections, or modify configuration files. One administrator can configure Method5 and that configuration automatically applies to all users.</a:t>
             </a:r>
           </a:p>
           <a:p>
             <a:r>
               <a:rPr lang="en-US" b="1" dirty="0" smtClean="0"/>
-              <a:t>6. P_RUN_AS_SYS (optional, defaults to FALSE) -</a:t>
-            </a:r>
-            <a:r>
-              <a:rPr lang="en-US" dirty="0" smtClean="0"/>
-              <a:t> Run the command as the SYS user.  Command</a:t>
-            </a:r>
-            <a:r>
-              <a:rPr lang="en-US" baseline="0" dirty="0" smtClean="0"/>
-              <a:t>s should only run as SYS when necessary, which is probably less than 1% of the time.  This feature has extra protections that prevent other users from calling it.  Only the Method5 user from the master database can use this feature.  See the security section of the user guide for more details.  If you're still worried about it, this feature can be disabled for everyone or for specific users.</a:t>
-            </a:r>
-            <a:endParaRPr lang="en-US" dirty="0" smtClean="0"/>
+              <a:t>5. Security -</a:t>
+            </a:r>
+            <a:r>
+              <a:rPr lang="en-US" dirty="0" smtClean="0"/>
+              <a:t> Method5 has been thoroughly hardened to avoid the typical security problems with multi-database tools. For example, there are no public database links or shared passwords. See the Security section in the user guide for details.</a:t>
+            </a:r>
+          </a:p>
+          <a:p>
+            <a:r>
+              <a:rPr lang="en-US" b="1" dirty="0" smtClean="0"/>
+              <a:t>6. Exception handling and metadata -</a:t>
+            </a:r>
+            <a:r>
+              <a:rPr lang="en-US" dirty="0" smtClean="0"/>
+              <a:t> Exceptions and metadata are stored in tables and do not stop other targets from processing. Hung jobs are automatically stopped based on a timeout parameter. Handling these rare problems lets you easily scale your queries to hundreds of databases.</a:t>
+            </a:r>
           </a:p>
         </p:txBody>
       </p:sp>
@@ -2630,7 +2785,7 @@
           <a:p>
             <a:fld id="{72AE7ADF-BF07-437B-AD5B-68C1A8D7189D}" type="slidenum">
               <a:rPr lang="en-US" smtClean="0"/>
-              <a:t>10</a:t>
+              <a:t>9</a:t>
             </a:fld>
             <a:endParaRPr lang="en-US"/>
           </a:p>
@@ -2639,7 +2794,7 @@
     </p:spTree>
     <p:extLst>
       <p:ext uri="{BB962C8B-B14F-4D97-AF65-F5344CB8AC3E}">
-        <p14:creationId xmlns:p14="http://schemas.microsoft.com/office/powerpoint/2010/main" val="316232668"/>
+        <p14:creationId xmlns:p14="http://schemas.microsoft.com/office/powerpoint/2010/main" val="1909579223"/>
       </p:ext>
     </p:extLst>
   </p:cSld>
@@ -2830,7 +2985,7 @@
           <a:p>
             <a:fld id="{72057647-82FE-4F7C-83B4-53587791251A}" type="datetime1">
               <a:rPr lang="en-US" smtClean="0"/>
-              <a:t>9/11/2017</a:t>
+              <a:t>10/24/2017</a:t>
             </a:fld>
             <a:endParaRPr lang="en-US"/>
           </a:p>
@@ -3000,7 +3155,7 @@
           <a:p>
             <a:fld id="{8503FF21-708F-4C59-9505-D05A3791AC31}" type="datetime1">
               <a:rPr lang="en-US" smtClean="0"/>
-              <a:t>9/11/2017</a:t>
+              <a:t>10/24/2017</a:t>
             </a:fld>
             <a:endParaRPr lang="en-US"/>
           </a:p>
@@ -3180,7 +3335,7 @@
           <a:p>
             <a:fld id="{6EFC7DE3-7050-4999-ABCB-76E0E214913C}" type="datetime1">
               <a:rPr lang="en-US" smtClean="0"/>
-              <a:t>9/11/2017</a:t>
+              <a:t>10/24/2017</a:t>
             </a:fld>
             <a:endParaRPr lang="en-US"/>
           </a:p>
@@ -3350,7 +3505,7 @@
           <a:p>
             <a:fld id="{12698F6C-3B60-45A8-AA68-1C639B61BEFF}" type="datetime1">
               <a:rPr lang="en-US" smtClean="0"/>
-              <a:t>9/11/2017</a:t>
+              <a:t>10/24/2017</a:t>
             </a:fld>
             <a:endParaRPr lang="en-US" dirty="0"/>
           </a:p>
@@ -3626,7 +3781,7 @@
           <a:p>
             <a:fld id="{E05176C0-14DF-4768-8A16-43F22EF34937}" type="datetime1">
               <a:rPr lang="en-US" smtClean="0"/>
-              <a:t>9/11/2017</a:t>
+              <a:t>10/24/2017</a:t>
             </a:fld>
             <a:endParaRPr lang="en-US"/>
           </a:p>
@@ -3914,7 +4069,7 @@
           <a:p>
             <a:fld id="{EC27D113-D56C-4484-8E60-26B1BDDD2B7D}" type="datetime1">
               <a:rPr lang="en-US" smtClean="0"/>
-              <a:t>9/11/2017</a:t>
+              <a:t>10/24/2017</a:t>
             </a:fld>
             <a:endParaRPr lang="en-US"/>
           </a:p>
@@ -4336,7 +4491,7 @@
           <a:p>
             <a:fld id="{2346BE7D-CDCE-4B6B-92C3-A6060BB37F63}" type="datetime1">
               <a:rPr lang="en-US" smtClean="0"/>
-              <a:t>9/11/2017</a:t>
+              <a:t>10/24/2017</a:t>
             </a:fld>
             <a:endParaRPr lang="en-US"/>
           </a:p>
@@ -4454,7 +4609,7 @@
           <a:p>
             <a:fld id="{016112C5-3C0F-4913-A601-B7FE4F9C1F3A}" type="datetime1">
               <a:rPr lang="en-US" smtClean="0"/>
-              <a:t>9/11/2017</a:t>
+              <a:t>10/24/2017</a:t>
             </a:fld>
             <a:endParaRPr lang="en-US"/>
           </a:p>
@@ -4549,7 +4704,7 @@
           <a:p>
             <a:fld id="{8A5D4DBD-AFC0-4CD6-8B21-21C10C0D7EF6}" type="datetime1">
               <a:rPr lang="en-US" smtClean="0"/>
-              <a:t>9/11/2017</a:t>
+              <a:t>10/24/2017</a:t>
             </a:fld>
             <a:endParaRPr lang="en-US"/>
           </a:p>
@@ -4826,7 +4981,7 @@
           <a:p>
             <a:fld id="{3514C57E-D885-4B44-9FAF-8838A1BDE694}" type="datetime1">
               <a:rPr lang="en-US" smtClean="0"/>
-              <a:t>9/11/2017</a:t>
+              <a:t>10/24/2017</a:t>
             </a:fld>
             <a:endParaRPr lang="en-US"/>
           </a:p>
@@ -5079,7 +5234,7 @@
           <a:p>
             <a:fld id="{7BEDB21A-AE09-4B41-95A5-CA952A205099}" type="datetime1">
               <a:rPr lang="en-US" smtClean="0"/>
-              <a:t>9/11/2017</a:t>
+              <a:t>10/24/2017</a:t>
             </a:fld>
             <a:endParaRPr lang="en-US"/>
           </a:p>
@@ -5292,7 +5447,7 @@
           <a:p>
             <a:fld id="{2089B313-BB57-4BA5-B615-3D449DFED662}" type="datetime1">
               <a:rPr lang="en-US" smtClean="0"/>
-              <a:t>9/11/2017</a:t>
+              <a:t>10/24/2017</a:t>
             </a:fld>
             <a:endParaRPr lang="en-US" dirty="0"/>
           </a:p>
@@ -5397,6 +5552,13 @@
     <p:sldLayoutId id="2147483658" r:id="rId10"/>
     <p:sldLayoutId id="2147483659" r:id="rId11"/>
   </p:sldLayoutIdLst>
+  <p:timing>
+    <p:tnLst>
+      <p:par>
+        <p:cTn id="1" dur="indefinite" restart="never" nodeType="tmRoot"/>
+      </p:par>
+    </p:tnLst>
+  </p:timing>
   <p:hf hdr="0" ftr="0"/>
   <p:txStyles>
     <p:titleStyle>
@@ -5723,7 +5885,7 @@
           <a:p>
             <a:fld id="{2E45DCD3-F6D5-47D1-A091-AE329ABC5543}" type="datetime1">
               <a:rPr lang="en-US" smtClean="0"/>
-              <a:t>9/11/2017</a:t>
+              <a:t>10/24/2017</a:t>
             </a:fld>
             <a:endParaRPr lang="en-US" dirty="0"/>
           </a:p>
@@ -6007,7 +6169,7 @@
           <a:p>
             <a:fld id="{73B3F948-1743-4F2D-B9D2-20F26DEE2D32}" type="datetime1">
               <a:rPr lang="en-US" smtClean="0"/>
-              <a:t>9/11/2017</a:t>
+              <a:t>10/24/2017</a:t>
             </a:fld>
             <a:endParaRPr lang="en-US"/>
           </a:p>
@@ -6089,7 +6251,7 @@
           <a:lstStyle/>
           <a:p>
             <a:r>
-              <a:rPr lang="en-US" dirty="0" smtClean="0"/>
+              <a:rPr lang="en-US" smtClean="0"/>
               <a:t>Other Features</a:t>
             </a:r>
             <a:endParaRPr lang="en-US" dirty="0"/>
@@ -6109,7 +6271,7 @@
         <p:spPr/>
         <p:txBody>
           <a:bodyPr>
-            <a:normAutofit fontScale="92500" lnSpcReduction="10000"/>
+            <a:normAutofit/>
           </a:bodyPr>
           <a:lstStyle/>
           <a:p>
@@ -6118,11 +6280,11 @@
               <a:buAutoNum type="arabicPeriod"/>
             </a:pPr>
             <a:r>
-              <a:rPr lang="en-US" dirty="0" smtClean="0"/>
+              <a:rPr lang="en-US" smtClean="0"/>
               <a:t>Tables</a:t>
             </a:r>
             <a:r>
-              <a:rPr lang="en-US" dirty="0" smtClean="0">
+              <a:rPr lang="en-US" smtClean="0">
                 <a:solidFill>
                   <a:schemeClr val="bg1">
                     <a:lumMod val="50000"/>
@@ -6138,11 +6300,11 @@
               <a:buAutoNum type="arabicPeriod"/>
             </a:pPr>
             <a:r>
-              <a:rPr lang="en-US" dirty="0" smtClean="0"/>
+              <a:rPr lang="en-US" smtClean="0"/>
               <a:t>Views</a:t>
             </a:r>
             <a:r>
-              <a:rPr lang="en-US" dirty="0" smtClean="0">
+              <a:rPr lang="en-US" smtClean="0">
                 <a:solidFill>
                   <a:schemeClr val="bg1">
                     <a:lumMod val="50000"/>
@@ -6158,11 +6320,11 @@
               <a:buAutoNum type="arabicPeriod"/>
             </a:pPr>
             <a:r>
-              <a:rPr lang="en-US" dirty="0" smtClean="0"/>
+              <a:rPr lang="en-US" smtClean="0"/>
               <a:t>M5_ links</a:t>
             </a:r>
             <a:r>
-              <a:rPr lang="en-US" dirty="0" smtClean="0">
+              <a:rPr lang="en-US" smtClean="0">
                 <a:solidFill>
                   <a:schemeClr val="bg1">
                     <a:lumMod val="50000"/>
@@ -6178,11 +6340,11 @@
               <a:buAutoNum type="arabicPeriod"/>
             </a:pPr>
             <a:r>
-              <a:rPr lang="en-US" dirty="0" smtClean="0"/>
+              <a:rPr lang="en-US" smtClean="0"/>
               <a:t>Global Data Dictionary</a:t>
             </a:r>
             <a:r>
-              <a:rPr lang="en-US" dirty="0" smtClean="0">
+              <a:rPr lang="en-US" smtClean="0">
                 <a:solidFill>
                   <a:schemeClr val="bg1">
                     <a:lumMod val="50000"/>
@@ -6198,11 +6360,11 @@
               <a:buAutoNum type="arabicPeriod"/>
             </a:pPr>
             <a:r>
-              <a:rPr lang="en-US" dirty="0" smtClean="0"/>
+              <a:rPr lang="en-US" smtClean="0"/>
               <a:t>Admin Email</a:t>
             </a:r>
             <a:r>
-              <a:rPr lang="en-US" dirty="0" smtClean="0">
+              <a:rPr lang="en-US" smtClean="0">
                 <a:solidFill>
                   <a:schemeClr val="bg1">
                     <a:lumMod val="50000"/>
@@ -6218,11 +6380,11 @@
               <a:buAutoNum type="arabicPeriod"/>
             </a:pPr>
             <a:r>
-              <a:rPr lang="en-US" dirty="0" smtClean="0"/>
+              <a:rPr lang="en-US" smtClean="0"/>
               <a:t>Version Star -</a:t>
             </a:r>
             <a:r>
-              <a:rPr lang="en-US" dirty="0" smtClean="0">
+              <a:rPr lang="en-US" smtClean="0">
                 <a:solidFill>
                   <a:schemeClr val="bg1">
                     <a:lumMod val="50000"/>
@@ -6231,26 +6393,13 @@
               </a:rPr>
               <a:t> Use "**" for version differences</a:t>
             </a:r>
-          </a:p>
-          <a:p>
-            <a:pPr marL="514350" indent="-514350">
-              <a:buFont typeface="+mj-lt"/>
-              <a:buAutoNum type="arabicPeriod"/>
-            </a:pPr>
-            <a:r>
-              <a:rPr lang="en-US" dirty="0" smtClean="0"/>
-              <a:t>Limits </a:t>
-            </a:r>
-            <a:r>
-              <a:rPr lang="en-US" dirty="0" smtClean="0">
-                <a:solidFill>
-                  <a:schemeClr val="bg1">
-                    <a:lumMod val="50000"/>
-                  </a:schemeClr>
-                </a:solidFill>
-              </a:rPr>
-              <a:t>- SQL and PL/SQL only, as DBA</a:t>
-            </a:r>
+            <a:endParaRPr lang="en-US" dirty="0" smtClean="0">
+              <a:solidFill>
+                <a:schemeClr val="bg1">
+                  <a:lumMod val="50000"/>
+                </a:schemeClr>
+              </a:solidFill>
+            </a:endParaRPr>
           </a:p>
         </p:txBody>
       </p:sp>
@@ -6271,7 +6420,7 @@
           <a:p>
             <a:fld id="{8C6FBF27-FCE1-40A4-AD2E-EA28EB5C01F0}" type="datetime1">
               <a:rPr lang="en-US" smtClean="0"/>
-              <a:t>9/11/2017</a:t>
+              <a:t>10/24/2017</a:t>
             </a:fld>
             <a:endParaRPr lang="en-US"/>
           </a:p>
@@ -6478,7 +6627,7 @@
           <a:p>
             <a:fld id="{FC4CB26D-ED02-41C0-8C14-C61605713420}" type="datetime1">
               <a:rPr lang="en-US" smtClean="0"/>
-              <a:t>9/11/2017</a:t>
+              <a:t>10/24/2017</a:t>
             </a:fld>
             <a:endParaRPr lang="en-US"/>
           </a:p>
@@ -6813,7 +6962,7 @@
           <a:p>
             <a:fld id="{8A97B252-A157-47EE-8D8D-B5B4DAA37260}" type="datetime1">
               <a:rPr lang="en-US" smtClean="0"/>
-              <a:t>9/11/2017</a:t>
+              <a:t>10/24/2017</a:t>
             </a:fld>
             <a:endParaRPr lang="en-US"/>
           </a:p>
@@ -6896,7 +7045,7 @@
           <a:p>
             <a:r>
               <a:rPr lang="en-US" dirty="0" smtClean="0"/>
-              <a:t>Examples - Live Demonstration</a:t>
+              <a:t>Examples</a:t>
             </a:r>
             <a:endParaRPr lang="en-US" dirty="0"/>
           </a:p>
@@ -6919,9 +7068,8 @@
           </a:bodyPr>
           <a:lstStyle/>
           <a:p>
-            <a:pPr marL="514350" indent="-514350">
-              <a:buFont typeface="+mj-lt"/>
-              <a:buAutoNum type="arabicPeriod"/>
+            <a:pPr marL="0" indent="0">
+              <a:buNone/>
             </a:pPr>
             <a:r>
               <a:rPr lang="en-US" sz="2800" dirty="0" smtClean="0"/>
@@ -6966,7 +7114,7 @@
           <a:p>
             <a:fld id="{14CB67C7-3BA7-4C89-AD88-5C3EB0A22414}" type="datetime1">
               <a:rPr lang="en-US" smtClean="0"/>
-              <a:t>9/11/2017</a:t>
+              <a:t>10/24/2017</a:t>
             </a:fld>
             <a:endParaRPr lang="en-US" dirty="0"/>
           </a:p>
@@ -7244,7 +7392,13 @@
               <a:rPr lang="en-US" dirty="0" smtClean="0">
                 <a:hlinkClick r:id="rId3"/>
               </a:rPr>
-              <a:t>http://method5.github.io</a:t>
+              <a:t>https://</a:t>
+            </a:r>
+            <a:r>
+              <a:rPr lang="en-US" dirty="0" smtClean="0">
+                <a:hlinkClick r:id="rId3"/>
+              </a:rPr>
+              <a:t>method5.github.io</a:t>
             </a:r>
             <a:endParaRPr lang="en-US" dirty="0" smtClean="0"/>
           </a:p>
@@ -7341,7 +7495,7 @@
           <a:p>
             <a:fld id="{E18E99D8-5B8F-468C-BBE7-526BD68FE572}" type="datetime1">
               <a:rPr lang="en-US" smtClean="0"/>
-              <a:t>9/11/2017</a:t>
+              <a:t>10/24/2017</a:t>
             </a:fld>
             <a:endParaRPr lang="en-US"/>
           </a:p>
@@ -7532,7 +7686,7 @@
           <a:p>
             <a:fld id="{4E667C21-B277-46CB-80E7-1C015420E7D1}" type="datetime1">
               <a:rPr lang="en-US" smtClean="0"/>
-              <a:t>9/11/2017</a:t>
+              <a:t>10/24/2017</a:t>
             </a:fld>
             <a:endParaRPr lang="en-US" dirty="0"/>
           </a:p>
@@ -7634,7 +7788,7 @@
         <p:spPr/>
         <p:txBody>
           <a:bodyPr>
-            <a:normAutofit fontScale="92500" lnSpcReduction="10000"/>
+            <a:normAutofit fontScale="92500" lnSpcReduction="20000"/>
           </a:bodyPr>
           <a:lstStyle/>
           <a:p>
@@ -7644,7 +7798,11 @@
             </a:pPr>
             <a:r>
               <a:rPr lang="en-US" dirty="0" smtClean="0"/>
-              <a:t>Parallel remote execution SQL extension</a:t>
+              <a:t>Parallel remote execution SQL </a:t>
+            </a:r>
+            <a:r>
+              <a:rPr lang="en-US" dirty="0" smtClean="0"/>
+              <a:t>extension</a:t>
             </a:r>
           </a:p>
           <a:p>
@@ -7654,6 +7812,17 @@
             </a:pPr>
             <a:r>
               <a:rPr lang="en-US" dirty="0" smtClean="0"/>
+              <a:t>Easily run SQL, PL/SQL, and shell scripts</a:t>
+            </a:r>
+            <a:endParaRPr lang="en-US" dirty="0" smtClean="0"/>
+          </a:p>
+          <a:p>
+            <a:pPr marL="514350" indent="-514350">
+              <a:buFont typeface="+mj-lt"/>
+              <a:buAutoNum type="arabicPeriod"/>
+            </a:pPr>
+            <a:r>
+              <a:rPr lang="en-US" dirty="0" smtClean="0"/>
               <a:t>Can </a:t>
             </a:r>
             <a:r>
@@ -7664,7 +7833,7 @@
               <a:rPr lang="en-US" dirty="0"/>
             </a:br>
             <a:r>
-              <a:rPr lang="en-US" sz="2600" b="1" dirty="0" smtClean="0">
+              <a:rPr lang="en-US" sz="2800" b="1" dirty="0" smtClean="0">
                 <a:solidFill>
                   <a:srgbClr val="008080"/>
                 </a:solidFill>
@@ -7676,7 +7845,7 @@
               <a:t>select</a:t>
             </a:r>
             <a:r>
-              <a:rPr lang="en-US" sz="2600" b="1" dirty="0" smtClean="0">
+              <a:rPr lang="en-US" sz="2800" b="1" dirty="0" smtClean="0">
                 <a:solidFill>
                   <a:srgbClr val="000080"/>
                 </a:solidFill>
@@ -7688,7 +7857,7 @@
               <a:t> *</a:t>
             </a:r>
             <a:br>
-              <a:rPr lang="en-US" sz="2600" b="1" dirty="0" smtClean="0">
+              <a:rPr lang="en-US" sz="2800" b="1" dirty="0" smtClean="0">
                 <a:solidFill>
                   <a:srgbClr val="000080"/>
                 </a:solidFill>
@@ -7699,7 +7868,7 @@
               </a:rPr>
             </a:br>
             <a:r>
-              <a:rPr lang="en-US" sz="2600" b="1" dirty="0" smtClean="0">
+              <a:rPr lang="en-US" sz="2800" b="1" dirty="0" smtClean="0">
                 <a:solidFill>
                   <a:srgbClr val="008080"/>
                 </a:solidFill>
@@ -7711,7 +7880,7 @@
               <a:t>from</a:t>
             </a:r>
             <a:r>
-              <a:rPr lang="en-US" sz="2600" b="1" dirty="0" smtClean="0">
+              <a:rPr lang="en-US" sz="2800" b="1" dirty="0" smtClean="0">
                 <a:solidFill>
                   <a:srgbClr val="000080"/>
                 </a:solidFill>
@@ -7723,7 +7892,7 @@
               <a:t> </a:t>
             </a:r>
             <a:r>
-              <a:rPr lang="en-US" sz="2600" b="1" dirty="0">
+              <a:rPr lang="en-US" sz="2800" b="1" dirty="0">
                 <a:solidFill>
                   <a:srgbClr val="008080"/>
                 </a:solidFill>
@@ -7735,7 +7904,7 @@
               <a:t>table</a:t>
             </a:r>
             <a:r>
-              <a:rPr lang="en-US" sz="2600" b="1" dirty="0">
+              <a:rPr lang="en-US" sz="2800" b="1" dirty="0">
                 <a:solidFill>
                   <a:srgbClr val="000080"/>
                 </a:solidFill>
@@ -7747,7 +7916,7 @@
               <a:t>(m5(</a:t>
             </a:r>
             <a:r>
-              <a:rPr lang="en-US" sz="2600" b="1" dirty="0">
+              <a:rPr lang="en-US" sz="2800" b="1" dirty="0">
                 <a:solidFill>
                   <a:srgbClr val="0000FF"/>
                 </a:solidFill>
@@ -7759,7 +7928,7 @@
               <a:t>'select * from dual'</a:t>
             </a:r>
             <a:r>
-              <a:rPr lang="en-US" sz="2600" b="1" dirty="0">
+              <a:rPr lang="en-US" sz="2800" b="1" dirty="0">
                 <a:solidFill>
                   <a:srgbClr val="000080"/>
                 </a:solidFill>
@@ -7859,7 +8028,7 @@
           <a:p>
             <a:fld id="{04FA3B08-0866-4F48-BECB-8AEAA49887FE}" type="datetime1">
               <a:rPr lang="en-US" smtClean="0"/>
-              <a:t>9/11/2017</a:t>
+              <a:t>10/24/2017</a:t>
             </a:fld>
             <a:endParaRPr lang="en-US"/>
           </a:p>
@@ -8036,7 +8205,7 @@
             </a:pPr>
             <a:r>
               <a:rPr lang="en-US" sz="2800" dirty="0" smtClean="0">
-                <a:hlinkClick r:id="rId2"/>
+                <a:hlinkClick r:id="rId3"/>
               </a:rPr>
               <a:t>hjon@ventechsolutions.com</a:t>
             </a:r>
@@ -8061,7 +8230,7 @@
           <a:p>
             <a:fld id="{E0B1ECC0-3D31-49BF-9732-FEB21E3BFE0B}" type="datetime1">
               <a:rPr lang="en-US" smtClean="0"/>
-              <a:t>9/11/2017</a:t>
+              <a:t>10/24/2017</a:t>
             </a:fld>
             <a:endParaRPr lang="en-US"/>
           </a:p>
@@ -8099,7 +8268,7 @@
           <p:nvPr/>
         </p:nvPicPr>
         <p:blipFill rotWithShape="1">
-          <a:blip r:embed="rId3">
+          <a:blip r:embed="rId4">
             <a:extLst>
               <a:ext uri="{28A0092B-C50C-407E-A947-70E740481C1C}">
                 <a14:useLocalDpi xmlns:a14="http://schemas.microsoft.com/office/drawing/2010/main" val="0"/>
@@ -8138,7 +8307,7 @@
           <p:nvPr/>
         </p:nvPicPr>
         <p:blipFill>
-          <a:blip r:embed="rId4" cstate="print">
+          <a:blip r:embed="rId5" cstate="print">
             <a:extLst>
               <a:ext uri="{28A0092B-C50C-407E-A947-70E740481C1C}">
                 <a14:useLocalDpi xmlns:a14="http://schemas.microsoft.com/office/drawing/2010/main" val="0"/>
@@ -8179,7 +8348,7 @@
           <p:nvPr/>
         </p:nvPicPr>
         <p:blipFill>
-          <a:blip r:embed="rId5" cstate="print">
+          <a:blip r:embed="rId6" cstate="print">
             <a:extLst>
               <a:ext uri="{28A0092B-C50C-407E-A947-70E740481C1C}">
                 <a14:useLocalDpi xmlns:a14="http://schemas.microsoft.com/office/drawing/2010/main" val="0"/>
@@ -8220,7 +8389,7 @@
           <p:nvPr/>
         </p:nvPicPr>
         <p:blipFill rotWithShape="1">
-          <a:blip r:embed="rId6">
+          <a:blip r:embed="rId7">
             <a:extLst>
               <a:ext uri="{28A0092B-C50C-407E-A947-70E740481C1C}">
                 <a14:useLocalDpi xmlns:a14="http://schemas.microsoft.com/office/drawing/2010/main" val="0"/>
@@ -8259,7 +8428,7 @@
           <p:nvPr/>
         </p:nvPicPr>
         <p:blipFill>
-          <a:blip r:embed="rId7">
+          <a:blip r:embed="rId8">
             <a:extLst>
               <a:ext uri="{28A0092B-C50C-407E-A947-70E740481C1C}">
                 <a14:useLocalDpi xmlns:a14="http://schemas.microsoft.com/office/drawing/2010/main" val="0"/>
@@ -8438,7 +8607,7 @@
           <a:p>
             <a:fld id="{59A89C50-A88C-43DA-A017-AA6F35F0B0C8}" type="datetime1">
               <a:rPr lang="en-US" smtClean="0"/>
-              <a:t>9/11/2017</a:t>
+              <a:t>10/24/2017</a:t>
             </a:fld>
             <a:endParaRPr lang="en-US"/>
           </a:p>
@@ -8575,7 +8744,7 @@
           <a:p>
             <a:fld id="{AA1E44A8-32B0-4E5A-A6DF-07DB1E700CAE}" type="datetime1">
               <a:rPr lang="en-US" smtClean="0"/>
-              <a:t>9/11/2017</a:t>
+              <a:t>10/24/2017</a:t>
             </a:fld>
             <a:endParaRPr lang="en-US"/>
           </a:p>
@@ -9384,7 +9553,7 @@
           <a:p>
             <a:fld id="{1AF7749E-7951-4D42-9C43-2FC8E80375B1}" type="datetime1">
               <a:rPr lang="en-US" smtClean="0"/>
-              <a:t>9/11/2017</a:t>
+              <a:t>10/24/2017</a:t>
             </a:fld>
             <a:endParaRPr lang="en-US"/>
           </a:p>
@@ -9516,7 +9685,6 @@
               <a:rPr lang="en-US" dirty="0" smtClean="0"/>
               <a:t>world</a:t>
             </a:r>
-            <a:endParaRPr lang="en-US" dirty="0" smtClean="0"/>
           </a:p>
           <a:p>
             <a:pPr marL="514350" indent="-514350">
@@ -9535,7 +9703,11 @@
             </a:pPr>
             <a:r>
               <a:rPr lang="en-US" dirty="0" smtClean="0"/>
-              <a:t>&gt;8 million runs, &gt;1800 tests, open source</a:t>
+              <a:t>&gt;10 </a:t>
+            </a:r>
+            <a:r>
+              <a:rPr lang="en-US" dirty="0" smtClean="0"/>
+              <a:t>million runs, &gt;1800 tests, open source</a:t>
             </a:r>
           </a:p>
           <a:p>
@@ -9567,7 +9739,7 @@
           <a:p>
             <a:fld id="{60D7856B-577C-489D-A2A8-2F221F81FEFA}" type="datetime1">
               <a:rPr lang="en-US" smtClean="0"/>
-              <a:t>9/11/2017</a:t>
+              <a:t>10/24/2017</a:t>
             </a:fld>
             <a:endParaRPr lang="en-US"/>
           </a:p>
@@ -9668,10 +9840,15 @@
             <p:ph idx="1"/>
           </p:nvPr>
         </p:nvSpPr>
-        <p:spPr/>
+        <p:spPr>
+          <a:xfrm>
+            <a:off x="304800" y="1600200"/>
+            <a:ext cx="8458200" cy="4525963"/>
+          </a:xfrm>
+        </p:spPr>
         <p:txBody>
           <a:bodyPr>
-            <a:normAutofit fontScale="85000" lnSpcReduction="20000"/>
+            <a:normAutofit fontScale="77500" lnSpcReduction="20000"/>
           </a:bodyPr>
           <a:lstStyle/>
           <a:p>
@@ -9679,7 +9856,7 @@
               <a:buNone/>
             </a:pPr>
             <a:r>
-              <a:rPr lang="en-US" sz="2600" b="1" dirty="0">
+              <a:rPr lang="en-US" sz="2600" b="1" dirty="0" smtClean="0">
                 <a:solidFill>
                   <a:srgbClr val="008080"/>
                 </a:solidFill>
@@ -9691,7 +9868,7 @@
               <a:t>select</a:t>
             </a:r>
             <a:r>
-              <a:rPr lang="en-US" sz="2600" b="1" dirty="0">
+              <a:rPr lang="en-US" sz="2600" b="1" dirty="0" smtClean="0">
                 <a:solidFill>
                   <a:srgbClr val="000080"/>
                 </a:solidFill>
@@ -9708,7 +9885,7 @@
               <a:buNone/>
             </a:pPr>
             <a:r>
-              <a:rPr lang="en-US" sz="2600" b="1" dirty="0">
+              <a:rPr lang="en-US" sz="2600" b="1" dirty="0" smtClean="0">
                 <a:solidFill>
                   <a:srgbClr val="008080"/>
                 </a:solidFill>
@@ -9720,7 +9897,7 @@
               <a:t>from</a:t>
             </a:r>
             <a:r>
-              <a:rPr lang="en-US" sz="2600" b="1" dirty="0">
+              <a:rPr lang="en-US" sz="2600" b="1" dirty="0" smtClean="0">
                 <a:solidFill>
                   <a:srgbClr val="000080"/>
                 </a:solidFill>
@@ -9828,6 +10005,30 @@
               <a:t>'</a:t>
             </a:r>
             <a:r>
+              <a:rPr lang="en-US" sz="2600" b="1" dirty="0">
+                <a:solidFill>
+                  <a:srgbClr val="000080"/>
+                </a:solidFill>
+                <a:highlight>
+                  <a:srgbClr val="FFFFFF"/>
+                </a:highlight>
+                <a:latin typeface="Courier New"/>
+              </a:rPr>
+              <a:t>, </a:t>
+            </a:r>
+            <a:r>
+              <a:rPr lang="en-US" sz="2600" b="1" dirty="0" smtClean="0">
+                <a:solidFill>
+                  <a:srgbClr val="0000FF"/>
+                </a:solidFill>
+                <a:highlight>
+                  <a:srgbClr val="FFFFFF"/>
+                </a:highlight>
+                <a:latin typeface="Courier New"/>
+              </a:rPr>
+              <a:t>'yes'</a:t>
+            </a:r>
+            <a:r>
               <a:rPr lang="en-US" sz="2600" b="1" dirty="0" smtClean="0">
                 <a:solidFill>
                   <a:srgbClr val="000080"/>
@@ -9839,6 +10040,15 @@
               </a:rPr>
               <a:t>));</a:t>
             </a:r>
+            <a:endParaRPr lang="en-US" sz="2600" b="1" dirty="0" smtClean="0">
+              <a:solidFill>
+                <a:srgbClr val="000080"/>
+              </a:solidFill>
+              <a:highlight>
+                <a:srgbClr val="FFFFFF"/>
+              </a:highlight>
+              <a:latin typeface="Courier New"/>
+            </a:endParaRPr>
           </a:p>
           <a:p>
             <a:pPr marL="0" indent="0">
@@ -10136,6 +10346,59 @@
               <a:t>    </a:t>
             </a:r>
             <a:r>
+              <a:rPr lang="en-US" sz="2600" b="1" dirty="0" err="1">
+                <a:solidFill>
+                  <a:srgbClr val="000080"/>
+                </a:solidFill>
+                <a:highlight>
+                  <a:srgbClr val="FFFFFF"/>
+                </a:highlight>
+                <a:latin typeface="Courier New"/>
+              </a:rPr>
+              <a:t>p_run_as_sys</a:t>
+            </a:r>
+            <a:r>
+              <a:rPr lang="en-US" sz="2600" b="1" dirty="0">
+                <a:solidFill>
+                  <a:srgbClr val="000080"/>
+                </a:solidFill>
+                <a:highlight>
+                  <a:srgbClr val="FFFFFF"/>
+                </a:highlight>
+                <a:latin typeface="Courier New"/>
+              </a:rPr>
+              <a:t> =&gt; </a:t>
+            </a:r>
+            <a:r>
+              <a:rPr lang="en-US" sz="2600" b="1" dirty="0" smtClean="0">
+                <a:solidFill>
+                  <a:srgbClr val="008080"/>
+                </a:solidFill>
+                <a:highlight>
+                  <a:srgbClr val="FFFFFF"/>
+                </a:highlight>
+                <a:latin typeface="Courier New"/>
+              </a:rPr>
+              <a:t>false</a:t>
+            </a:r>
+          </a:p>
+          <a:p>
+            <a:pPr marL="0" indent="0">
+              <a:buNone/>
+            </a:pPr>
+            <a:r>
+              <a:rPr lang="en-US" sz="2600" b="1" dirty="0" smtClean="0">
+                <a:solidFill>
+                  <a:srgbClr val="000080"/>
+                </a:solidFill>
+                <a:highlight>
+                  <a:srgbClr val="FFFFFF"/>
+                </a:highlight>
+                <a:latin typeface="Courier New"/>
+              </a:rPr>
+              <a:t>    </a:t>
+            </a:r>
+            <a:r>
               <a:rPr lang="en-US" sz="2600" b="1" dirty="0" err="1" smtClean="0">
                 <a:solidFill>
                   <a:srgbClr val="000080"/>
@@ -10299,7 +10562,19 @@
                 </a:highlight>
                 <a:latin typeface="Courier New"/>
               </a:rPr>
-              <a:t>    </a:t>
+              <a:t> </a:t>
+            </a:r>
+            <a:r>
+              <a:rPr lang="en-US" sz="2600" b="1" dirty="0" smtClean="0">
+                <a:solidFill>
+                  <a:srgbClr val="000080"/>
+                </a:solidFill>
+                <a:highlight>
+                  <a:srgbClr val="FFFFFF"/>
+                </a:highlight>
+                <a:latin typeface="Courier New"/>
+              </a:rPr>
+              <a:t>   </a:t>
             </a:r>
             <a:r>
               <a:rPr lang="en-US" sz="2600" b="1" dirty="0" err="1" smtClean="0">
@@ -10336,6 +10611,18 @@
                 <a:latin typeface="Courier New"/>
               </a:rPr>
               <a:t>true</a:t>
+            </a:r>
+            <a:r>
+              <a:rPr lang="en-US" sz="2600" b="1" dirty="0">
+                <a:solidFill>
+                  <a:srgbClr val="000080"/>
+                </a:solidFill>
+                <a:highlight>
+                  <a:srgbClr val="FFFFFF"/>
+                </a:highlight>
+                <a:latin typeface="Courier New"/>
+              </a:rPr>
+              <a:t>,</a:t>
             </a:r>
             <a:endParaRPr lang="en-US" sz="2600" b="1" dirty="0" smtClean="0">
               <a:solidFill>
@@ -10361,7 +10648,7 @@
                 </a:highlight>
                 <a:latin typeface="Courier New"/>
               </a:rPr>
-              <a:t>  );</a:t>
+              <a:t>);</a:t>
             </a:r>
             <a:endParaRPr lang="en-US" sz="2600" b="1" dirty="0">
               <a:solidFill>
@@ -10429,8 +10716,8 @@
         </p:nvSpPr>
         <p:spPr>
           <a:xfrm>
-            <a:off x="2971800" y="2286000"/>
-            <a:ext cx="3200400" cy="377851"/>
+            <a:off x="2590800" y="2286000"/>
+            <a:ext cx="2895600" cy="377851"/>
           </a:xfrm>
           <a:prstGeom prst="rect">
             <a:avLst/>
@@ -10482,7 +10769,7 @@
           <a:p>
             <a:fld id="{12698F6C-3B60-45A8-AA68-1C639B61BEFF}" type="datetime1">
               <a:rPr lang="en-US" smtClean="0"/>
-              <a:t>9/11/2017</a:t>
+              <a:t>10/24/2017</a:t>
             </a:fld>
             <a:endParaRPr lang="en-US" dirty="0"/>
           </a:p>
@@ -10519,7 +10806,7 @@
         </p:nvSpPr>
         <p:spPr>
           <a:xfrm>
-            <a:off x="6696750" y="2286000"/>
+            <a:off x="5908966" y="2286000"/>
             <a:ext cx="1177634" cy="377851"/>
           </a:xfrm>
           <a:prstGeom prst="rect">
@@ -10563,7 +10850,7 @@
         </p:nvSpPr>
         <p:spPr>
           <a:xfrm>
-            <a:off x="6705600" y="3378201"/>
+            <a:off x="6705600" y="3124200"/>
             <a:ext cx="1295400" cy="304800"/>
           </a:xfrm>
           <a:prstGeom prst="rect">
@@ -10607,7 +10894,7 @@
         </p:nvSpPr>
         <p:spPr>
           <a:xfrm>
-            <a:off x="6705600" y="3760078"/>
+            <a:off x="6705600" y="3505200"/>
             <a:ext cx="1295400" cy="335280"/>
           </a:xfrm>
           <a:prstGeom prst="rect">
@@ -10651,8 +10938,52 @@
         </p:nvSpPr>
         <p:spPr>
           <a:xfrm>
-            <a:off x="6705600" y="4172436"/>
-            <a:ext cx="1295400" cy="951528"/>
+            <a:off x="6705600" y="3925272"/>
+            <a:ext cx="1295400" cy="1103928"/>
+          </a:xfrm>
+          <a:prstGeom prst="rect">
+            <a:avLst/>
+          </a:prstGeom>
+        </p:spPr>
+        <p:style>
+          <a:lnRef idx="2">
+            <a:schemeClr val="accent1">
+              <a:shade val="50000"/>
+            </a:schemeClr>
+          </a:lnRef>
+          <a:fillRef idx="1">
+            <a:schemeClr val="accent1"/>
+          </a:fillRef>
+          <a:effectRef idx="0">
+            <a:schemeClr val="accent1"/>
+          </a:effectRef>
+          <a:fontRef idx="minor">
+            <a:schemeClr val="lt1"/>
+          </a:fontRef>
+        </p:style>
+        <p:txBody>
+          <a:bodyPr rtlCol="0" anchor="ctr"/>
+          <a:lstStyle/>
+          <a:p>
+            <a:pPr algn="ctr"/>
+            <a:r>
+              <a:rPr lang="en-US" sz="2800" dirty="0" smtClean="0"/>
+              <a:t>HOW</a:t>
+            </a:r>
+            <a:endParaRPr lang="en-US" sz="2800" dirty="0"/>
+          </a:p>
+        </p:txBody>
+      </p:sp>
+      <p:sp>
+        <p:nvSpPr>
+          <p:cNvPr id="12" name="Rectangle 11"/>
+          <p:cNvSpPr/>
+          <p:nvPr/>
+        </p:nvSpPr>
+        <p:spPr>
+          <a:xfrm>
+            <a:off x="7467600" y="2286000"/>
+            <a:ext cx="990600" cy="377851"/>
           </a:xfrm>
           <a:prstGeom prst="rect">
             <a:avLst/>
@@ -10909,7 +11240,7 @@
           <a:p>
             <a:fld id="{D97E924C-66F2-4356-A8CE-66225EAB43F5}" type="datetime1">
               <a:rPr lang="en-US" smtClean="0"/>
-              <a:t>9/11/2017</a:t>
+              <a:t>10/24/2017</a:t>
             </a:fld>
             <a:endParaRPr lang="en-US"/>
           </a:p>

</xml_diff>

<commit_message>
Converted from 4:3 to 16:9
</commit_message>
<xml_diff>
--- a/presentations/Method5.pptx
+++ b/presentations/Method5.pptx
@@ -28,7 +28,7 @@
     <p:sldId id="267" r:id="rId16"/>
     <p:sldId id="268" r:id="rId17"/>
   </p:sldIdLst>
-  <p:sldSz cx="9144000" cy="6858000" type="screen4x3"/>
+  <p:sldSz cx="9144000" cy="5143500" type="screen16x9"/>
   <p:notesSz cx="6858000" cy="9144000"/>
   <p:defaultTextStyle>
     <a:defPPr>
@@ -210,7 +210,7 @@
           <a:p>
             <a:fld id="{E8184847-EC06-4734-8E30-343A2DA340C9}" type="datetimeFigureOut">
               <a:rPr lang="en-US" smtClean="0"/>
-              <a:t>10/24/2017</a:t>
+              <a:t>10/25/2017</a:t>
             </a:fld>
             <a:endParaRPr lang="en-US"/>
           </a:p>
@@ -375,7 +375,7 @@
           <a:p>
             <a:fld id="{DC284B00-8F05-4CB2-A4E6-4A642AFA915E}" type="datetimeFigureOut">
               <a:rPr lang="en-US" smtClean="0"/>
-              <a:t>10/24/2017</a:t>
+              <a:t>10/25/2017</a:t>
             </a:fld>
             <a:endParaRPr lang="en-US"/>
           </a:p>
@@ -393,8 +393,8 @@
         </p:nvSpPr>
         <p:spPr>
           <a:xfrm>
-            <a:off x="1143000" y="685800"/>
-            <a:ext cx="4572000" cy="3429000"/>
+            <a:off x="381000" y="685800"/>
+            <a:ext cx="6096000" cy="3429000"/>
           </a:xfrm>
           <a:prstGeom prst="rect">
             <a:avLst/>
@@ -670,7 +670,12 @@
             <p:ph type="sldImg"/>
           </p:nvPr>
         </p:nvSpPr>
-        <p:spPr/>
+        <p:spPr>
+          <a:xfrm>
+            <a:off x="381000" y="685800"/>
+            <a:ext cx="6096000" cy="3429000"/>
+          </a:xfrm>
+        </p:spPr>
       </p:sp>
       <p:sp>
         <p:nvSpPr>
@@ -754,7 +759,12 @@
             <p:ph type="sldImg"/>
           </p:nvPr>
         </p:nvSpPr>
-        <p:spPr/>
+        <p:spPr>
+          <a:xfrm>
+            <a:off x="381000" y="685800"/>
+            <a:ext cx="6096000" cy="3429000"/>
+          </a:xfrm>
+        </p:spPr>
       </p:sp>
       <p:sp>
         <p:nvSpPr>
@@ -777,37 +787,16 @@
             </a:r>
             <a:r>
               <a:rPr lang="en-US" dirty="0" smtClean="0"/>
-              <a:t> Any </a:t>
-            </a:r>
-            <a:r>
-              <a:rPr lang="en-US" dirty="0" smtClean="0"/>
-              <a:t>SQL statement, PL/SQL block, or Linux/Unix shell script.  The</a:t>
+              <a:t> Any SQL statement, PL/SQL block, or Linux/Unix shell script.  The</a:t>
             </a:r>
             <a:r>
               <a:rPr lang="en-US" baseline="0" dirty="0" smtClean="0"/>
-              <a:t> </a:t>
-            </a:r>
-            <a:r>
-              <a:rPr lang="en-US" baseline="0" dirty="0" smtClean="0"/>
-              <a:t>results can be either the query results, a SQL*Plus feedback message for DDL and DML, </a:t>
-            </a:r>
-            <a:r>
-              <a:rPr lang="en-US" baseline="0" dirty="0" smtClean="0"/>
-              <a:t>DBMS_OUTPUT </a:t>
-            </a:r>
-            <a:r>
-              <a:rPr lang="en-US" baseline="0" dirty="0" smtClean="0"/>
-              <a:t>for PL/SQL </a:t>
-            </a:r>
-            <a:r>
-              <a:rPr lang="en-US" baseline="0" dirty="0" smtClean="0"/>
-              <a:t>statements, or standard output and standard error for shell scripts.  (Shell scripts require</a:t>
+              <a:t> results can be either the query results, a SQL*Plus feedback message for DDL and DML, DBMS_OUTPUT for PL/SQL statements, or standard output and standard error for shell scripts.  (Shell scripts require</a:t>
             </a:r>
             <a:r>
               <a:rPr lang="en-US" dirty="0" smtClean="0"/>
               <a:t> an active database so Method5 cannot yet be used for activities that restart the database, like patching and upgrading.)</a:t>
             </a:r>
-            <a:endParaRPr lang="en-US" dirty="0" smtClean="0"/>
           </a:p>
           <a:p>
             <a:r>
@@ -934,7 +923,12 @@
             <p:ph type="sldImg"/>
           </p:nvPr>
         </p:nvSpPr>
-        <p:spPr/>
+        <p:spPr>
+          <a:xfrm>
+            <a:off x="381000" y="685800"/>
+            <a:ext cx="6096000" cy="3429000"/>
+          </a:xfrm>
+        </p:spPr>
       </p:sp>
       <p:sp>
         <p:nvSpPr>
@@ -1040,11 +1034,7 @@
             </a:r>
             <a:r>
               <a:rPr lang="en-US" b="0" baseline="0" dirty="0" smtClean="0"/>
-              <a:t> Querying different versions of Oracle can be difficult because the data dictionary has different columns.  For example, most data dictionary views in 12c have the new CON_ID column.  A "select * from v$..." will return different result sets between 11g and 12c.  To get around this issue, if you replace "*" with "**", Method5 will convert the "**" into an explicit list of columns based on the lowest Oracle version.  This avoids "not enough values" or "too many values" errors, and ensures that all databases return data regardless of the version.  The results will miss some of the newer columns, such as CON_ID</a:t>
-            </a:r>
-            <a:r>
-              <a:rPr lang="en-US" b="0" baseline="0" dirty="0" smtClean="0"/>
-              <a:t>.</a:t>
+              <a:t> Querying different versions of Oracle can be difficult because the data dictionary has different columns.  For example, most data dictionary views in 12c have the new CON_ID column.  A "select * from v$..." will return different result sets between 11g and 12c.  To get around this issue, if you replace "*" with "**", Method5 will convert the "**" into an explicit list of columns based on the lowest Oracle version.  This avoids "not enough values" or "too many values" errors, and ensures that all databases return data regardless of the version.  The results will miss some of the newer columns, such as CON_ID.</a:t>
             </a:r>
             <a:endParaRPr lang="en-US" b="1" baseline="0" dirty="0" smtClean="0"/>
           </a:p>
@@ -1113,7 +1103,12 @@
             <p:ph type="sldImg"/>
           </p:nvPr>
         </p:nvSpPr>
-        <p:spPr/>
+        <p:spPr>
+          <a:xfrm>
+            <a:off x="381000" y="685800"/>
+            <a:ext cx="6096000" cy="3429000"/>
+          </a:xfrm>
+        </p:spPr>
       </p:sp>
       <p:sp>
         <p:nvSpPr>
@@ -1174,11 +1169,7 @@
             </a:pPr>
             <a:r>
               <a:rPr lang="en-US" baseline="0" dirty="0" smtClean="0"/>
-              <a:t>4. Scheduler and pipes work together to enable parallelism and asynchronous processing</a:t>
-            </a:r>
-            <a:r>
-              <a:rPr lang="en-US" baseline="0" dirty="0" smtClean="0"/>
-              <a:t>.</a:t>
+              <a:t>4. Scheduler and pipes work together to enable parallelism and asynchronous processing.</a:t>
             </a:r>
             <a:r>
               <a:rPr lang="en-US" dirty="0" smtClean="0"/>
@@ -1270,7 +1261,12 @@
             <p:ph type="sldImg"/>
           </p:nvPr>
         </p:nvSpPr>
-        <p:spPr/>
+        <p:spPr>
+          <a:xfrm>
+            <a:off x="381000" y="685800"/>
+            <a:ext cx="6096000" cy="3429000"/>
+          </a:xfrm>
+        </p:spPr>
       </p:sp>
       <p:sp>
         <p:nvSpPr>
@@ -1417,7 +1413,12 @@
             <p:ph type="sldImg"/>
           </p:nvPr>
         </p:nvSpPr>
-        <p:spPr/>
+        <p:spPr>
+          <a:xfrm>
+            <a:off x="381000" y="685800"/>
+            <a:ext cx="6096000" cy="3429000"/>
+          </a:xfrm>
+        </p:spPr>
       </p:sp>
       <p:sp>
         <p:nvSpPr>
@@ -1501,7 +1502,12 @@
             <p:ph type="sldImg"/>
           </p:nvPr>
         </p:nvSpPr>
-        <p:spPr/>
+        <p:spPr>
+          <a:xfrm>
+            <a:off x="381000" y="685800"/>
+            <a:ext cx="6096000" cy="3429000"/>
+          </a:xfrm>
+        </p:spPr>
       </p:sp>
       <p:sp>
         <p:nvSpPr>
@@ -1585,7 +1591,12 @@
             <p:ph type="sldImg"/>
           </p:nvPr>
         </p:nvSpPr>
-        <p:spPr/>
+        <p:spPr>
+          <a:xfrm>
+            <a:off x="381000" y="685800"/>
+            <a:ext cx="6096000" cy="3429000"/>
+          </a:xfrm>
+        </p:spPr>
       </p:sp>
       <p:sp>
         <p:nvSpPr>
@@ -1604,44 +1615,36 @@
           <a:p>
             <a:r>
               <a:rPr lang="en-US" dirty="0" smtClean="0"/>
-              <a:t>1. Method5 isn't simply faster than </a:t>
-            </a:r>
-            <a:r>
-              <a:rPr lang="en-US" dirty="0" smtClean="0"/>
-              <a:t>your existing processes.</a:t>
+              <a:t>1. Method5 isn't simply faster than your existing processes.</a:t>
+            </a:r>
+            <a:r>
+              <a:rPr lang="en-US" baseline="0" dirty="0" smtClean="0"/>
+              <a:t>  It's so much faster that it can change your attitude toward solving problems.</a:t>
+            </a:r>
+            <a:endParaRPr lang="en-US" dirty="0" smtClean="0"/>
+          </a:p>
+          <a:p>
+            <a:r>
+              <a:rPr lang="en-US" dirty="0" smtClean="0"/>
+              <a:t>1. For every problem, spend a minute thinking if there's a way to find it, fix it, or prevent it on other databases.</a:t>
+            </a:r>
+          </a:p>
+          <a:p>
+            <a:r>
+              <a:rPr lang="en-US" dirty="0" smtClean="0"/>
+              <a:t>2. There's no more excuse to not check every database - it only takes one line of code.</a:t>
+            </a:r>
+          </a:p>
+          <a:p>
+            <a:r>
+              <a:rPr lang="en-US" dirty="0" smtClean="0"/>
+              <a:t>3. Start being more proactive - no more Groundhog Day administration.</a:t>
             </a:r>
             <a:r>
               <a:rPr lang="en-US" baseline="0" dirty="0" smtClean="0"/>
               <a:t>  </a:t>
             </a:r>
             <a:r>
-              <a:rPr lang="en-US" baseline="0" dirty="0" smtClean="0"/>
-              <a:t>It's so much faster that it can change your attitude toward solving problems.</a:t>
-            </a:r>
-            <a:endParaRPr lang="en-US" dirty="0" smtClean="0"/>
-          </a:p>
-          <a:p>
-            <a:r>
-              <a:rPr lang="en-US" dirty="0" smtClean="0"/>
-              <a:t>1. For every problem, spend a minute thinking if there's a way to find it, fix it, or prevent it on other databases.</a:t>
-            </a:r>
-          </a:p>
-          <a:p>
-            <a:r>
-              <a:rPr lang="en-US" dirty="0" smtClean="0"/>
-              <a:t>2. There's no more excuse to not check every database - it only takes one line of code.</a:t>
-            </a:r>
-          </a:p>
-          <a:p>
-            <a:r>
-              <a:rPr lang="en-US" dirty="0" smtClean="0"/>
-              <a:t>3. Start being more proactive - no more Groundhog Day administration.</a:t>
-            </a:r>
-            <a:r>
-              <a:rPr lang="en-US" baseline="0" dirty="0" smtClean="0"/>
-              <a:t>  </a:t>
-            </a:r>
-            <a:r>
               <a:rPr lang="en-US" dirty="0" smtClean="0"/>
               <a:t>Even if the problem only takes you 5 minutes to fix each time, consider how much time everyone else spends on it before it even</a:t>
             </a:r>
@@ -1662,15 +1665,7 @@
           <a:p>
             <a:r>
               <a:rPr lang="en-US" dirty="0" smtClean="0"/>
-              <a:t>4. Treat all your databases like one </a:t>
-            </a:r>
-            <a:r>
-              <a:rPr lang="en-US" dirty="0" smtClean="0"/>
-              <a:t>logical database</a:t>
-            </a:r>
-            <a:r>
-              <a:rPr lang="en-US" dirty="0" smtClean="0"/>
-              <a:t>.</a:t>
+              <a:t>4. Treat all your databases like one logical database.</a:t>
             </a:r>
           </a:p>
           <a:p>
@@ -1745,7 +1740,12 @@
             <p:ph type="sldImg"/>
           </p:nvPr>
         </p:nvSpPr>
-        <p:spPr/>
+        <p:spPr>
+          <a:xfrm>
+            <a:off x="381000" y="685800"/>
+            <a:ext cx="6096000" cy="3429000"/>
+          </a:xfrm>
+        </p:spPr>
       </p:sp>
       <p:sp>
         <p:nvSpPr>
@@ -1829,7 +1829,12 @@
             <p:ph type="sldImg"/>
           </p:nvPr>
         </p:nvSpPr>
-        <p:spPr/>
+        <p:spPr>
+          <a:xfrm>
+            <a:off x="381000" y="685800"/>
+            <a:ext cx="6096000" cy="3429000"/>
+          </a:xfrm>
+        </p:spPr>
       </p:sp>
       <p:sp>
         <p:nvSpPr>
@@ -1913,7 +1918,12 @@
             <p:ph type="sldImg"/>
           </p:nvPr>
         </p:nvSpPr>
-        <p:spPr/>
+        <p:spPr>
+          <a:xfrm>
+            <a:off x="381000" y="685800"/>
+            <a:ext cx="6096000" cy="3429000"/>
+          </a:xfrm>
+        </p:spPr>
       </p:sp>
       <p:sp>
         <p:nvSpPr>
@@ -2034,7 +2044,12 @@
             <p:ph type="sldImg"/>
           </p:nvPr>
         </p:nvSpPr>
-        <p:spPr/>
+        <p:spPr>
+          <a:xfrm>
+            <a:off x="381000" y="685800"/>
+            <a:ext cx="6096000" cy="3429000"/>
+          </a:xfrm>
+        </p:spPr>
       </p:sp>
       <p:sp>
         <p:nvSpPr>
@@ -2208,7 +2223,12 @@
             <p:ph type="sldImg"/>
           </p:nvPr>
         </p:nvSpPr>
-        <p:spPr/>
+        <p:spPr>
+          <a:xfrm>
+            <a:off x="381000" y="685800"/>
+            <a:ext cx="6096000" cy="3429000"/>
+          </a:xfrm>
+        </p:spPr>
       </p:sp>
       <p:sp>
         <p:nvSpPr>
@@ -2369,7 +2389,12 @@
             <p:ph type="sldImg"/>
           </p:nvPr>
         </p:nvSpPr>
-        <p:spPr/>
+        <p:spPr>
+          <a:xfrm>
+            <a:off x="381000" y="685800"/>
+            <a:ext cx="6096000" cy="3429000"/>
+          </a:xfrm>
+        </p:spPr>
       </p:sp>
       <p:sp>
         <p:nvSpPr>
@@ -2414,15 +2439,7 @@
           <a:p>
             <a:r>
               <a:rPr lang="en-US" dirty="0" smtClean="0"/>
-              <a:t>4. It's ran over </a:t>
-            </a:r>
-            <a:r>
-              <a:rPr lang="en-US" dirty="0" smtClean="0"/>
-              <a:t>10 </a:t>
-            </a:r>
-            <a:r>
-              <a:rPr lang="en-US" dirty="0" smtClean="0"/>
-              <a:t>million queries internally.  It contains 1800 automated tests.</a:t>
+              <a:t>4. It's ran over 10 million queries internally.  It contains 1800 automated tests.</a:t>
             </a:r>
           </a:p>
           <a:p>
@@ -2510,7 +2527,12 @@
             <p:ph type="sldImg"/>
           </p:nvPr>
         </p:nvSpPr>
-        <p:spPr/>
+        <p:spPr>
+          <a:xfrm>
+            <a:off x="381000" y="685800"/>
+            <a:ext cx="6096000" cy="3429000"/>
+          </a:xfrm>
+        </p:spPr>
       </p:sp>
       <p:sp>
         <p:nvSpPr>
@@ -2541,11 +2563,7 @@
             </a:r>
             <a:r>
               <a:rPr lang="en-US" b="0" baseline="0" dirty="0" smtClean="0"/>
-              <a:t> to </a:t>
-            </a:r>
-            <a:r>
-              <a:rPr lang="en-US" b="0" baseline="0" dirty="0" smtClean="0"/>
-              <a:t>run, </a:t>
+              <a:t> to run, </a:t>
             </a:r>
             <a:r>
               <a:rPr lang="en-US" b="1" baseline="0" dirty="0" smtClean="0"/>
@@ -2553,15 +2571,7 @@
             </a:r>
             <a:r>
               <a:rPr lang="en-US" b="0" baseline="0" dirty="0" smtClean="0"/>
-              <a:t> </a:t>
-            </a:r>
-            <a:r>
-              <a:rPr lang="en-US" b="0" baseline="0" dirty="0" smtClean="0"/>
-              <a:t>to run </a:t>
-            </a:r>
-            <a:r>
-              <a:rPr lang="en-US" b="0" baseline="0" dirty="0" smtClean="0"/>
-              <a:t>it, and </a:t>
+              <a:t> to run it, and </a:t>
             </a:r>
             <a:r>
               <a:rPr lang="en-US" b="1" baseline="0" dirty="0" smtClean="0"/>
@@ -2577,15 +2587,7 @@
             </a:r>
             <a:r>
               <a:rPr lang="en-US" b="0" baseline="0" dirty="0" smtClean="0"/>
-              <a:t>  </a:t>
-            </a:r>
-            <a:r>
-              <a:rPr lang="en-US" b="0" baseline="0" dirty="0" smtClean="0"/>
-              <a:t>The </a:t>
-            </a:r>
-            <a:r>
-              <a:rPr lang="en-US" b="0" baseline="0" dirty="0" smtClean="0"/>
-              <a:t>function returns results immediately to the screen.  The procedure </a:t>
+              <a:t>  The function returns results immediately to the screen.  The procedure </a:t>
             </a:r>
             <a:r>
               <a:rPr lang="en-US" dirty="0" smtClean="0"/>
@@ -2672,7 +2674,12 @@
             <p:ph type="sldImg"/>
           </p:nvPr>
         </p:nvSpPr>
-        <p:spPr/>
+        <p:spPr>
+          <a:xfrm>
+            <a:off x="381000" y="685800"/>
+            <a:ext cx="6096000" cy="3429000"/>
+          </a:xfrm>
+        </p:spPr>
       </p:sp>
       <p:sp>
         <p:nvSpPr>
@@ -2833,8 +2840,8 @@
         </p:nvSpPr>
         <p:spPr>
           <a:xfrm>
-            <a:off x="685800" y="2130425"/>
-            <a:ext cx="7772400" cy="1470025"/>
+            <a:off x="685800" y="1597820"/>
+            <a:ext cx="7772400" cy="1102519"/>
           </a:xfrm>
         </p:spPr>
         <p:txBody>
@@ -2861,8 +2868,8 @@
         </p:nvSpPr>
         <p:spPr>
           <a:xfrm>
-            <a:off x="1371600" y="3886200"/>
-            <a:ext cx="6400800" cy="1752600"/>
+            <a:off x="1371600" y="2914650"/>
+            <a:ext cx="6400800" cy="1314450"/>
           </a:xfrm>
         </p:spPr>
         <p:txBody>
@@ -2985,7 +2992,7 @@
           <a:p>
             <a:fld id="{72057647-82FE-4F7C-83B4-53587791251A}" type="datetime1">
               <a:rPr lang="en-US" smtClean="0"/>
-              <a:t>10/24/2017</a:t>
+              <a:t>10/25/2017</a:t>
             </a:fld>
             <a:endParaRPr lang="en-US"/>
           </a:p>
@@ -3155,7 +3162,7 @@
           <a:p>
             <a:fld id="{8503FF21-708F-4C59-9505-D05A3791AC31}" type="datetime1">
               <a:rPr lang="en-US" smtClean="0"/>
-              <a:t>10/24/2017</a:t>
+              <a:t>10/25/2017</a:t>
             </a:fld>
             <a:endParaRPr lang="en-US"/>
           </a:p>
@@ -3245,8 +3252,8 @@
         </p:nvSpPr>
         <p:spPr>
           <a:xfrm>
-            <a:off x="6629400" y="274638"/>
-            <a:ext cx="2057400" cy="5851525"/>
+            <a:off x="6629400" y="205980"/>
+            <a:ext cx="2057400" cy="4388644"/>
           </a:xfrm>
         </p:spPr>
         <p:txBody>
@@ -3273,8 +3280,8 @@
         </p:nvSpPr>
         <p:spPr>
           <a:xfrm>
-            <a:off x="457200" y="274638"/>
-            <a:ext cx="6019800" cy="5851525"/>
+            <a:off x="457200" y="205980"/>
+            <a:ext cx="6019800" cy="4388644"/>
           </a:xfrm>
         </p:spPr>
         <p:txBody>
@@ -3335,7 +3342,7 @@
           <a:p>
             <a:fld id="{6EFC7DE3-7050-4999-ABCB-76E0E214913C}" type="datetime1">
               <a:rPr lang="en-US" smtClean="0"/>
-              <a:t>10/24/2017</a:t>
+              <a:t>10/25/2017</a:t>
             </a:fld>
             <a:endParaRPr lang="en-US"/>
           </a:p>
@@ -3505,7 +3512,7 @@
           <a:p>
             <a:fld id="{12698F6C-3B60-45A8-AA68-1C639B61BEFF}" type="datetime1">
               <a:rPr lang="en-US" smtClean="0"/>
-              <a:t>10/24/2017</a:t>
+              <a:t>10/25/2017</a:t>
             </a:fld>
             <a:endParaRPr lang="en-US" dirty="0"/>
           </a:p>
@@ -3575,8 +3582,8 @@
         </p:blipFill>
         <p:spPr>
           <a:xfrm>
-            <a:off x="3695700" y="6324600"/>
-            <a:ext cx="1752600" cy="394335"/>
+            <a:off x="3790945" y="4705350"/>
+            <a:ext cx="1562110" cy="352496"/>
           </a:xfrm>
           <a:prstGeom prst="rect">
             <a:avLst/>
@@ -3593,6 +3600,13 @@
   <p:clrMapOvr>
     <a:masterClrMapping/>
   </p:clrMapOvr>
+  <p:timing>
+    <p:tnLst>
+      <p:par>
+        <p:cTn id="1" dur="indefinite" restart="never" nodeType="tmRoot"/>
+      </p:par>
+    </p:tnLst>
+  </p:timing>
 </p:sldLayout>
 </file>
 
@@ -3625,8 +3639,8 @@
         </p:nvSpPr>
         <p:spPr>
           <a:xfrm>
-            <a:off x="722313" y="4406900"/>
-            <a:ext cx="7772400" cy="1362075"/>
+            <a:off x="722313" y="3305176"/>
+            <a:ext cx="7772400" cy="1021556"/>
           </a:xfrm>
         </p:spPr>
         <p:txBody>
@@ -3657,8 +3671,8 @@
         </p:nvSpPr>
         <p:spPr>
           <a:xfrm>
-            <a:off x="722313" y="2906713"/>
-            <a:ext cx="7772400" cy="1500187"/>
+            <a:off x="722313" y="2180035"/>
+            <a:ext cx="7772400" cy="1125140"/>
           </a:xfrm>
         </p:spPr>
         <p:txBody>
@@ -3781,7 +3795,7 @@
           <a:p>
             <a:fld id="{E05176C0-14DF-4768-8A16-43F22EF34937}" type="datetime1">
               <a:rPr lang="en-US" smtClean="0"/>
-              <a:t>10/24/2017</a:t>
+              <a:t>10/25/2017</a:t>
             </a:fld>
             <a:endParaRPr lang="en-US"/>
           </a:p>
@@ -3894,8 +3908,8 @@
         </p:nvSpPr>
         <p:spPr>
           <a:xfrm>
-            <a:off x="457200" y="1600200"/>
-            <a:ext cx="4038600" cy="4525963"/>
+            <a:off x="457200" y="1200151"/>
+            <a:ext cx="4038600" cy="3394472"/>
           </a:xfrm>
         </p:spPr>
         <p:txBody>
@@ -3979,8 +3993,8 @@
         </p:nvSpPr>
         <p:spPr>
           <a:xfrm>
-            <a:off x="4648200" y="1600200"/>
-            <a:ext cx="4038600" cy="4525963"/>
+            <a:off x="4648200" y="1200151"/>
+            <a:ext cx="4038600" cy="3394472"/>
           </a:xfrm>
         </p:spPr>
         <p:txBody>
@@ -4069,7 +4083,7 @@
           <a:p>
             <a:fld id="{EC27D113-D56C-4484-8E60-26B1BDDD2B7D}" type="datetime1">
               <a:rPr lang="en-US" smtClean="0"/>
-              <a:t>10/24/2017</a:t>
+              <a:t>10/25/2017</a:t>
             </a:fld>
             <a:endParaRPr lang="en-US"/>
           </a:p>
@@ -4186,8 +4200,8 @@
         </p:nvSpPr>
         <p:spPr>
           <a:xfrm>
-            <a:off x="457200" y="1535113"/>
-            <a:ext cx="4040188" cy="639762"/>
+            <a:off x="457200" y="1151335"/>
+            <a:ext cx="4040188" cy="479822"/>
           </a:xfrm>
         </p:spPr>
         <p:txBody>
@@ -4251,8 +4265,8 @@
         </p:nvSpPr>
         <p:spPr>
           <a:xfrm>
-            <a:off x="457200" y="2174875"/>
-            <a:ext cx="4040188" cy="3951288"/>
+            <a:off x="457200" y="1631156"/>
+            <a:ext cx="4040188" cy="2963466"/>
           </a:xfrm>
         </p:spPr>
         <p:txBody>
@@ -4336,8 +4350,8 @@
         </p:nvSpPr>
         <p:spPr>
           <a:xfrm>
-            <a:off x="4645025" y="1535113"/>
-            <a:ext cx="4041775" cy="639762"/>
+            <a:off x="4645028" y="1151335"/>
+            <a:ext cx="4041775" cy="479822"/>
           </a:xfrm>
         </p:spPr>
         <p:txBody>
@@ -4401,8 +4415,8 @@
         </p:nvSpPr>
         <p:spPr>
           <a:xfrm>
-            <a:off x="4645025" y="2174875"/>
-            <a:ext cx="4041775" cy="3951288"/>
+            <a:off x="4645028" y="1631156"/>
+            <a:ext cx="4041775" cy="2963466"/>
           </a:xfrm>
         </p:spPr>
         <p:txBody>
@@ -4491,7 +4505,7 @@
           <a:p>
             <a:fld id="{2346BE7D-CDCE-4B6B-92C3-A6060BB37F63}" type="datetime1">
               <a:rPr lang="en-US" smtClean="0"/>
-              <a:t>10/24/2017</a:t>
+              <a:t>10/25/2017</a:t>
             </a:fld>
             <a:endParaRPr lang="en-US"/>
           </a:p>
@@ -4609,7 +4623,7 @@
           <a:p>
             <a:fld id="{016112C5-3C0F-4913-A601-B7FE4F9C1F3A}" type="datetime1">
               <a:rPr lang="en-US" smtClean="0"/>
-              <a:t>10/24/2017</a:t>
+              <a:t>10/25/2017</a:t>
             </a:fld>
             <a:endParaRPr lang="en-US"/>
           </a:p>
@@ -4704,7 +4718,7 @@
           <a:p>
             <a:fld id="{8A5D4DBD-AFC0-4CD6-8B21-21C10C0D7EF6}" type="datetime1">
               <a:rPr lang="en-US" smtClean="0"/>
-              <a:t>10/24/2017</a:t>
+              <a:t>10/25/2017</a:t>
             </a:fld>
             <a:endParaRPr lang="en-US"/>
           </a:p>
@@ -4794,8 +4808,8 @@
         </p:nvSpPr>
         <p:spPr>
           <a:xfrm>
-            <a:off x="457200" y="273050"/>
-            <a:ext cx="3008313" cy="1162050"/>
+            <a:off x="457203" y="204787"/>
+            <a:ext cx="3008313" cy="871538"/>
           </a:xfrm>
         </p:spPr>
         <p:txBody>
@@ -4826,8 +4840,8 @@
         </p:nvSpPr>
         <p:spPr>
           <a:xfrm>
-            <a:off x="3575050" y="273050"/>
-            <a:ext cx="5111750" cy="5853113"/>
+            <a:off x="3575050" y="204789"/>
+            <a:ext cx="5111750" cy="4389835"/>
           </a:xfrm>
         </p:spPr>
         <p:txBody>
@@ -4911,8 +4925,8 @@
         </p:nvSpPr>
         <p:spPr>
           <a:xfrm>
-            <a:off x="457200" y="1435100"/>
-            <a:ext cx="3008313" cy="4691063"/>
+            <a:off x="457203" y="1076327"/>
+            <a:ext cx="3008313" cy="3518297"/>
           </a:xfrm>
         </p:spPr>
         <p:txBody>
@@ -4981,7 +4995,7 @@
           <a:p>
             <a:fld id="{3514C57E-D885-4B44-9FAF-8838A1BDE694}" type="datetime1">
               <a:rPr lang="en-US" smtClean="0"/>
-              <a:t>10/24/2017</a:t>
+              <a:t>10/25/2017</a:t>
             </a:fld>
             <a:endParaRPr lang="en-US"/>
           </a:p>
@@ -5071,8 +5085,8 @@
         </p:nvSpPr>
         <p:spPr>
           <a:xfrm>
-            <a:off x="1792288" y="4800600"/>
-            <a:ext cx="5486400" cy="566738"/>
+            <a:off x="1792288" y="3600451"/>
+            <a:ext cx="5486400" cy="425054"/>
           </a:xfrm>
         </p:spPr>
         <p:txBody>
@@ -5103,8 +5117,8 @@
         </p:nvSpPr>
         <p:spPr>
           <a:xfrm>
-            <a:off x="1792288" y="612775"/>
-            <a:ext cx="5486400" cy="4114800"/>
+            <a:off x="1792288" y="459581"/>
+            <a:ext cx="5486400" cy="3086100"/>
           </a:xfrm>
         </p:spPr>
         <p:txBody>
@@ -5164,8 +5178,8 @@
         </p:nvSpPr>
         <p:spPr>
           <a:xfrm>
-            <a:off x="1792288" y="5367338"/>
-            <a:ext cx="5486400" cy="804862"/>
+            <a:off x="1792288" y="4025504"/>
+            <a:ext cx="5486400" cy="603647"/>
           </a:xfrm>
         </p:spPr>
         <p:txBody>
@@ -5234,7 +5248,7 @@
           <a:p>
             <a:fld id="{7BEDB21A-AE09-4B41-95A5-CA952A205099}" type="datetime1">
               <a:rPr lang="en-US" smtClean="0"/>
-              <a:t>10/24/2017</a:t>
+              <a:t>10/25/2017</a:t>
             </a:fld>
             <a:endParaRPr lang="en-US"/>
           </a:p>
@@ -5329,8 +5343,8 @@
         </p:nvSpPr>
         <p:spPr>
           <a:xfrm>
-            <a:off x="457200" y="274638"/>
-            <a:ext cx="8229600" cy="1143000"/>
+            <a:off x="457200" y="205979"/>
+            <a:ext cx="8229600" cy="857250"/>
           </a:xfrm>
           <a:prstGeom prst="rect">
             <a:avLst/>
@@ -5362,8 +5376,8 @@
         </p:nvSpPr>
         <p:spPr>
           <a:xfrm>
-            <a:off x="457200" y="1600200"/>
-            <a:ext cx="8229600" cy="4525963"/>
+            <a:off x="457200" y="1200151"/>
+            <a:ext cx="8229600" cy="3394472"/>
           </a:xfrm>
           <a:prstGeom prst="rect">
             <a:avLst/>
@@ -5424,8 +5438,8 @@
         </p:nvSpPr>
         <p:spPr>
           <a:xfrm>
-            <a:off x="457200" y="6356350"/>
-            <a:ext cx="2133600" cy="365125"/>
+            <a:off x="457200" y="4767264"/>
+            <a:ext cx="2133600" cy="273844"/>
           </a:xfrm>
           <a:prstGeom prst="rect">
             <a:avLst/>
@@ -5447,7 +5461,7 @@
           <a:p>
             <a:fld id="{2089B313-BB57-4BA5-B615-3D449DFED662}" type="datetime1">
               <a:rPr lang="en-US" smtClean="0"/>
-              <a:t>10/24/2017</a:t>
+              <a:t>10/25/2017</a:t>
             </a:fld>
             <a:endParaRPr lang="en-US" dirty="0"/>
           </a:p>
@@ -5465,8 +5479,8 @@
         </p:nvSpPr>
         <p:spPr>
           <a:xfrm>
-            <a:off x="2743200" y="6356350"/>
-            <a:ext cx="3657600" cy="365125"/>
+            <a:off x="2743200" y="4767264"/>
+            <a:ext cx="3657600" cy="273844"/>
           </a:xfrm>
           <a:prstGeom prst="rect">
             <a:avLst/>
@@ -5502,8 +5516,8 @@
         </p:nvSpPr>
         <p:spPr>
           <a:xfrm>
-            <a:off x="6553200" y="6356350"/>
-            <a:ext cx="2133600" cy="365125"/>
+            <a:off x="6553200" y="4767264"/>
+            <a:ext cx="2133600" cy="273844"/>
           </a:xfrm>
           <a:prstGeom prst="rect">
             <a:avLst/>
@@ -5842,13 +5856,13 @@
         </p:nvSpPr>
         <p:spPr>
           <a:xfrm>
-            <a:off x="1257300" y="3657600"/>
-            <a:ext cx="6629400" cy="1752600"/>
+            <a:off x="1257300" y="3086100"/>
+            <a:ext cx="6629400" cy="1314450"/>
           </a:xfrm>
         </p:spPr>
         <p:txBody>
           <a:bodyPr>
-            <a:normAutofit fontScale="92500"/>
+            <a:normAutofit fontScale="92500" lnSpcReduction="10000"/>
           </a:bodyPr>
           <a:lstStyle/>
           <a:p>
@@ -5885,7 +5899,7 @@
           <a:p>
             <a:fld id="{2E45DCD3-F6D5-47D1-A091-AE329ABC5543}" type="datetime1">
               <a:rPr lang="en-US" smtClean="0"/>
-              <a:t>10/24/2017</a:t>
+              <a:t>10/25/2017</a:t>
             </a:fld>
             <a:endParaRPr lang="en-US" dirty="0"/>
           </a:p>
@@ -5937,8 +5951,8 @@
         </p:blipFill>
         <p:spPr bwMode="auto">
           <a:xfrm>
-            <a:off x="457200" y="1600200"/>
-            <a:ext cx="8229600" cy="1851661"/>
+            <a:off x="304800" y="819150"/>
+            <a:ext cx="8534400" cy="1920433"/>
           </a:xfrm>
           <a:prstGeom prst="rect">
             <a:avLst/>
@@ -6027,7 +6041,9 @@
         </p:nvSpPr>
         <p:spPr/>
         <p:txBody>
-          <a:bodyPr/>
+          <a:bodyPr>
+            <a:normAutofit lnSpcReduction="10000"/>
+          </a:bodyPr>
           <a:lstStyle/>
           <a:p>
             <a:pPr marL="514350" indent="-514350">
@@ -6169,7 +6185,7 @@
           <a:p>
             <a:fld id="{73B3F948-1743-4F2D-B9D2-20F26DEE2D32}" type="datetime1">
               <a:rPr lang="en-US" smtClean="0"/>
-              <a:t>10/24/2017</a:t>
+              <a:t>10/25/2017</a:t>
             </a:fld>
             <a:endParaRPr lang="en-US"/>
           </a:p>
@@ -6271,7 +6287,7 @@
         <p:spPr/>
         <p:txBody>
           <a:bodyPr>
-            <a:normAutofit/>
+            <a:normAutofit fontScale="85000" lnSpcReduction="10000"/>
           </a:bodyPr>
           <a:lstStyle/>
           <a:p>
@@ -6420,7 +6436,7 @@
           <a:p>
             <a:fld id="{8C6FBF27-FCE1-40A4-AD2E-EA28EB5C01F0}" type="datetime1">
               <a:rPr lang="en-US" smtClean="0"/>
-              <a:t>10/24/2017</a:t>
+              <a:t>10/25/2017</a:t>
             </a:fld>
             <a:endParaRPr lang="en-US"/>
           </a:p>
@@ -6522,7 +6538,7 @@
         <p:spPr/>
         <p:txBody>
           <a:bodyPr>
-            <a:normAutofit/>
+            <a:normAutofit fontScale="92500" lnSpcReduction="20000"/>
           </a:bodyPr>
           <a:lstStyle/>
           <a:p>
@@ -6627,7 +6643,7 @@
           <a:p>
             <a:fld id="{FC4CB26D-ED02-41C0-8C14-C61605713420}" type="datetime1">
               <a:rPr lang="en-US" smtClean="0"/>
-              <a:t>10/24/2017</a:t>
+              <a:t>10/25/2017</a:t>
             </a:fld>
             <a:endParaRPr lang="en-US"/>
           </a:p>
@@ -6679,8 +6695,8 @@
         </p:blipFill>
         <p:spPr bwMode="auto">
           <a:xfrm>
-            <a:off x="762000" y="2329222"/>
-            <a:ext cx="7502525" cy="299748"/>
+            <a:off x="762003" y="1660969"/>
+            <a:ext cx="7538371" cy="301181"/>
           </a:xfrm>
           <a:prstGeom prst="rect">
             <a:avLst/>
@@ -6733,8 +6749,8 @@
         </p:blipFill>
         <p:spPr bwMode="auto">
           <a:xfrm>
-            <a:off x="5562600" y="4419600"/>
-            <a:ext cx="3169775" cy="1752600"/>
+            <a:off x="5791200" y="3105150"/>
+            <a:ext cx="2737771" cy="1513741"/>
           </a:xfrm>
           <a:prstGeom prst="rect">
             <a:avLst/>
@@ -6774,8 +6790,8 @@
         </p:blipFill>
         <p:spPr bwMode="auto">
           <a:xfrm>
-            <a:off x="5956862" y="2609850"/>
-            <a:ext cx="2381250" cy="1428750"/>
+            <a:off x="6144085" y="1885950"/>
+            <a:ext cx="2032000" cy="1219200"/>
           </a:xfrm>
           <a:prstGeom prst="rect">
             <a:avLst/>
@@ -6865,7 +6881,7 @@
         <p:spPr/>
         <p:txBody>
           <a:bodyPr>
-            <a:normAutofit fontScale="92500" lnSpcReduction="10000"/>
+            <a:normAutofit fontScale="77500" lnSpcReduction="20000"/>
           </a:bodyPr>
           <a:lstStyle/>
           <a:p>
@@ -6962,7 +6978,7 @@
           <a:p>
             <a:fld id="{8A97B252-A157-47EE-8D8D-B5B4DAA37260}" type="datetime1">
               <a:rPr lang="en-US" smtClean="0"/>
-              <a:t>10/24/2017</a:t>
+              <a:t>10/25/2017</a:t>
             </a:fld>
             <a:endParaRPr lang="en-US"/>
           </a:p>
@@ -7114,7 +7130,7 @@
           <a:p>
             <a:fld id="{14CB67C7-3BA7-4C89-AD88-5C3EB0A22414}" type="datetime1">
               <a:rPr lang="en-US" smtClean="0"/>
-              <a:t>10/24/2017</a:t>
+              <a:t>10/25/2017</a:t>
             </a:fld>
             <a:endParaRPr lang="en-US" dirty="0"/>
           </a:p>
@@ -7166,8 +7182,8 @@
         </p:blipFill>
         <p:spPr bwMode="auto">
           <a:xfrm>
-            <a:off x="3800015" y="2532936"/>
-            <a:ext cx="4826001" cy="1143000"/>
+            <a:off x="3657600" y="1809750"/>
+            <a:ext cx="4789267" cy="1134300"/>
           </a:xfrm>
           <a:prstGeom prst="rect">
             <a:avLst/>
@@ -7207,8 +7223,8 @@
         </p:blipFill>
         <p:spPr bwMode="auto">
           <a:xfrm>
-            <a:off x="457200" y="4353057"/>
-            <a:ext cx="4767261" cy="1433512"/>
+            <a:off x="457203" y="3269807"/>
+            <a:ext cx="4267197" cy="1283143"/>
           </a:xfrm>
           <a:prstGeom prst="rect">
             <a:avLst/>
@@ -7248,8 +7264,8 @@
         </p:blipFill>
         <p:spPr bwMode="auto">
           <a:xfrm>
-            <a:off x="573993" y="2170333"/>
-            <a:ext cx="3159807" cy="1868207"/>
+            <a:off x="573997" y="1627750"/>
+            <a:ext cx="3007404" cy="1778100"/>
           </a:xfrm>
           <a:prstGeom prst="rect">
             <a:avLst/>
@@ -7289,8 +7305,8 @@
         </p:blipFill>
         <p:spPr bwMode="auto">
           <a:xfrm>
-            <a:off x="5218052" y="3733799"/>
-            <a:ext cx="3316348" cy="2672029"/>
+            <a:off x="4800599" y="2971473"/>
+            <a:ext cx="3646267" cy="1657677"/>
           </a:xfrm>
           <a:prstGeom prst="rect">
             <a:avLst/>
@@ -7380,7 +7396,7 @@
         <p:spPr/>
         <p:txBody>
           <a:bodyPr>
-            <a:normAutofit/>
+            <a:normAutofit fontScale="92500" lnSpcReduction="10000"/>
           </a:bodyPr>
           <a:lstStyle/>
           <a:p>
@@ -7392,13 +7408,7 @@
               <a:rPr lang="en-US" dirty="0" smtClean="0">
                 <a:hlinkClick r:id="rId3"/>
               </a:rPr>
-              <a:t>https://</a:t>
-            </a:r>
-            <a:r>
-              <a:rPr lang="en-US" dirty="0" smtClean="0">
-                <a:hlinkClick r:id="rId3"/>
-              </a:rPr>
-              <a:t>method5.github.io</a:t>
+              <a:t>https://method5.github.io</a:t>
             </a:r>
             <a:endParaRPr lang="en-US" dirty="0" smtClean="0"/>
           </a:p>
@@ -7495,7 +7505,7 @@
           <a:p>
             <a:fld id="{E18E99D8-5B8F-468C-BBE7-526BD68FE572}" type="datetime1">
               <a:rPr lang="en-US" smtClean="0"/>
-              <a:t>10/24/2017</a:t>
+              <a:t>10/25/2017</a:t>
             </a:fld>
             <a:endParaRPr lang="en-US"/>
           </a:p>
@@ -7605,7 +7615,9 @@
         </p:nvSpPr>
         <p:spPr/>
         <p:txBody>
-          <a:bodyPr/>
+          <a:bodyPr>
+            <a:normAutofit lnSpcReduction="10000"/>
+          </a:bodyPr>
           <a:lstStyle/>
           <a:p>
             <a:pPr marL="514350" indent="-514350">
@@ -7686,7 +7698,7 @@
           <a:p>
             <a:fld id="{4E667C21-B277-46CB-80E7-1C015420E7D1}" type="datetime1">
               <a:rPr lang="en-US" smtClean="0"/>
-              <a:t>10/24/2017</a:t>
+              <a:t>10/25/2017</a:t>
             </a:fld>
             <a:endParaRPr lang="en-US" dirty="0"/>
           </a:p>
@@ -7788,7 +7800,7 @@
         <p:spPr/>
         <p:txBody>
           <a:bodyPr>
-            <a:normAutofit fontScale="92500" lnSpcReduction="20000"/>
+            <a:normAutofit fontScale="77500" lnSpcReduction="20000"/>
           </a:bodyPr>
           <a:lstStyle/>
           <a:p>
@@ -7798,11 +7810,7 @@
             </a:pPr>
             <a:r>
               <a:rPr lang="en-US" dirty="0" smtClean="0"/>
-              <a:t>Parallel remote execution SQL </a:t>
-            </a:r>
-            <a:r>
-              <a:rPr lang="en-US" dirty="0" smtClean="0"/>
-              <a:t>extension</a:t>
+              <a:t>Parallel remote execution SQL extension</a:t>
             </a:r>
           </a:p>
           <a:p>
@@ -7814,7 +7822,6 @@
               <a:rPr lang="en-US" dirty="0" smtClean="0"/>
               <a:t>Easily run SQL, PL/SQL, and shell scripts</a:t>
             </a:r>
-            <a:endParaRPr lang="en-US" dirty="0" smtClean="0"/>
           </a:p>
           <a:p>
             <a:pPr marL="514350" indent="-514350">
@@ -7823,17 +7830,17 @@
             </a:pPr>
             <a:r>
               <a:rPr lang="en-US" dirty="0" smtClean="0"/>
-              <a:t>Can </a:t>
-            </a:r>
-            <a:r>
-              <a:rPr lang="en-US" dirty="0"/>
-              <a:t>be as simple as:</a:t>
+              <a:t>Advanced features in a simple syntax:</a:t>
+            </a:r>
+            <a:r>
+              <a:rPr lang="en-US" dirty="0" smtClean="0"/>
+              <a:t/>
             </a:r>
             <a:br>
-              <a:rPr lang="en-US" dirty="0"/>
+              <a:rPr lang="en-US" dirty="0" smtClean="0"/>
             </a:br>
             <a:r>
-              <a:rPr lang="en-US" sz="2800" b="1" dirty="0" smtClean="0">
+              <a:rPr lang="en-US" sz="3100" b="1" dirty="0" smtClean="0">
                 <a:solidFill>
                   <a:srgbClr val="008080"/>
                 </a:solidFill>
@@ -7845,7 +7852,7 @@
               <a:t>select</a:t>
             </a:r>
             <a:r>
-              <a:rPr lang="en-US" sz="2800" b="1" dirty="0" smtClean="0">
+              <a:rPr lang="en-US" sz="3100" b="1" dirty="0" smtClean="0">
                 <a:solidFill>
                   <a:srgbClr val="000080"/>
                 </a:solidFill>
@@ -7857,7 +7864,7 @@
               <a:t> *</a:t>
             </a:r>
             <a:br>
-              <a:rPr lang="en-US" sz="2800" b="1" dirty="0" smtClean="0">
+              <a:rPr lang="en-US" sz="3100" b="1" dirty="0" smtClean="0">
                 <a:solidFill>
                   <a:srgbClr val="000080"/>
                 </a:solidFill>
@@ -7868,7 +7875,7 @@
               </a:rPr>
             </a:br>
             <a:r>
-              <a:rPr lang="en-US" sz="2800" b="1" dirty="0" smtClean="0">
+              <a:rPr lang="en-US" sz="3100" b="1" dirty="0" smtClean="0">
                 <a:solidFill>
                   <a:srgbClr val="008080"/>
                 </a:solidFill>
@@ -7880,7 +7887,7 @@
               <a:t>from</a:t>
             </a:r>
             <a:r>
-              <a:rPr lang="en-US" sz="2800" b="1" dirty="0" smtClean="0">
+              <a:rPr lang="en-US" sz="3100" b="1" dirty="0" smtClean="0">
                 <a:solidFill>
                   <a:srgbClr val="000080"/>
                 </a:solidFill>
@@ -7892,7 +7899,7 @@
               <a:t> </a:t>
             </a:r>
             <a:r>
-              <a:rPr lang="en-US" sz="2800" b="1" dirty="0">
+              <a:rPr lang="en-US" sz="3100" b="1" dirty="0">
                 <a:solidFill>
                   <a:srgbClr val="008080"/>
                 </a:solidFill>
@@ -7904,7 +7911,7 @@
               <a:t>table</a:t>
             </a:r>
             <a:r>
-              <a:rPr lang="en-US" sz="2800" b="1" dirty="0">
+              <a:rPr lang="en-US" sz="3100" b="1" dirty="0">
                 <a:solidFill>
                   <a:srgbClr val="000080"/>
                 </a:solidFill>
@@ -7916,7 +7923,7 @@
               <a:t>(m5(</a:t>
             </a:r>
             <a:r>
-              <a:rPr lang="en-US" sz="2800" b="1" dirty="0">
+              <a:rPr lang="en-US" sz="3100" b="1" dirty="0">
                 <a:solidFill>
                   <a:srgbClr val="0000FF"/>
                 </a:solidFill>
@@ -7928,7 +7935,7 @@
               <a:t>'select * from dual'</a:t>
             </a:r>
             <a:r>
-              <a:rPr lang="en-US" sz="2800" b="1" dirty="0">
+              <a:rPr lang="en-US" sz="3100" b="1" dirty="0">
                 <a:solidFill>
                   <a:srgbClr val="000080"/>
                 </a:solidFill>
@@ -7939,7 +7946,7 @@
               </a:rPr>
               <a:t>));</a:t>
             </a:r>
-            <a:endParaRPr lang="en-US" sz="2600" b="1" dirty="0"/>
+            <a:endParaRPr lang="en-US" b="1" dirty="0"/>
           </a:p>
           <a:p>
             <a:pPr marL="514350" indent="-514350">
@@ -7947,22 +7954,12 @@
               <a:buAutoNum type="arabicPeriod"/>
             </a:pPr>
             <a:r>
-              <a:rPr lang="en-US" dirty="0"/>
-              <a:t>Plus many advanced </a:t>
-            </a:r>
-            <a:r>
-              <a:rPr lang="en-US" dirty="0" smtClean="0"/>
-              <a:t>features</a:t>
-            </a:r>
-          </a:p>
-          <a:p>
-            <a:pPr marL="514350" indent="-514350">
-              <a:buFont typeface="+mj-lt"/>
-              <a:buAutoNum type="arabicPeriod"/>
-            </a:pPr>
-            <a:r>
-              <a:rPr lang="en-US" dirty="0" smtClean="0"/>
-              <a:t>Complements existing automation tools</a:t>
+              <a:rPr lang="en-US" dirty="0" smtClean="0"/>
+              <a:t>Complements </a:t>
+            </a:r>
+            <a:r>
+              <a:rPr lang="en-US" dirty="0" smtClean="0"/>
+              <a:t>existing automation tools</a:t>
             </a:r>
           </a:p>
           <a:p>
@@ -8028,7 +8025,7 @@
           <a:p>
             <a:fld id="{04FA3B08-0866-4F48-BECB-8AEAA49887FE}" type="datetime1">
               <a:rPr lang="en-US" smtClean="0"/>
-              <a:t>10/24/2017</a:t>
+              <a:t>10/25/2017</a:t>
             </a:fld>
             <a:endParaRPr lang="en-US"/>
           </a:p>
@@ -8127,10 +8124,15 @@
             <p:ph idx="1"/>
           </p:nvPr>
         </p:nvSpPr>
-        <p:spPr/>
+        <p:spPr>
+          <a:xfrm>
+            <a:off x="457200" y="1200151"/>
+            <a:ext cx="8229600" cy="2871981"/>
+          </a:xfrm>
+        </p:spPr>
         <p:txBody>
           <a:bodyPr>
-            <a:normAutofit/>
+            <a:normAutofit fontScale="92500" lnSpcReduction="20000"/>
           </a:bodyPr>
           <a:lstStyle/>
           <a:p>
@@ -8160,12 +8162,12 @@
               <a:buAutoNum type="arabicPeriod"/>
             </a:pPr>
             <a:r>
-              <a:rPr lang="en-US" sz="2800" dirty="0" err="1" smtClean="0"/>
-              <a:t>Stackoverflow</a:t>
-            </a:r>
-            <a:r>
               <a:rPr lang="en-US" sz="2800" dirty="0" smtClean="0"/>
-              <a:t> top user in Oracle and PL/SQL</a:t>
+              <a:t>Stack Overflow </a:t>
+            </a:r>
+            <a:r>
+              <a:rPr lang="en-US" sz="2800" dirty="0" smtClean="0"/>
+              <a:t>top user in Oracle and PL/SQL</a:t>
             </a:r>
           </a:p>
           <a:p>
@@ -8230,7 +8232,7 @@
           <a:p>
             <a:fld id="{E0B1ECC0-3D31-49BF-9732-FEB21E3BFE0B}" type="datetime1">
               <a:rPr lang="en-US" smtClean="0"/>
-              <a:t>10/24/2017</a:t>
+              <a:t>10/25/2017</a:t>
             </a:fld>
             <a:endParaRPr lang="en-US"/>
           </a:p>
@@ -8280,8 +8282,8 @@
         </p:blipFill>
         <p:spPr bwMode="auto">
           <a:xfrm>
-            <a:off x="533400" y="5472495"/>
-            <a:ext cx="1680000" cy="419328"/>
+            <a:off x="533401" y="4117017"/>
+            <a:ext cx="1670857" cy="417046"/>
           </a:xfrm>
           <a:prstGeom prst="rect">
             <a:avLst/>
@@ -8321,8 +8323,8 @@
         </p:blipFill>
         <p:spPr bwMode="auto">
           <a:xfrm>
-            <a:off x="5251407" y="5415478"/>
-            <a:ext cx="1594803" cy="519891"/>
+            <a:off x="5255515" y="4130581"/>
+            <a:ext cx="1594803" cy="389918"/>
           </a:xfrm>
           <a:prstGeom prst="rect">
             <a:avLst/>
@@ -8362,8 +8364,8 @@
         </p:blipFill>
         <p:spPr bwMode="auto">
           <a:xfrm>
-            <a:off x="4449555" y="5429508"/>
-            <a:ext cx="561460" cy="561460"/>
+            <a:off x="4432492" y="4032170"/>
+            <a:ext cx="586740" cy="586740"/>
           </a:xfrm>
           <a:prstGeom prst="rect">
             <a:avLst/>
@@ -8401,8 +8403,8 @@
         </p:blipFill>
         <p:spPr bwMode="auto">
           <a:xfrm>
-            <a:off x="2453792" y="5411668"/>
-            <a:ext cx="1755371" cy="526611"/>
+            <a:off x="2440540" y="4062193"/>
+            <a:ext cx="1755670" cy="526694"/>
           </a:xfrm>
           <a:prstGeom prst="rect">
             <a:avLst/>
@@ -8442,8 +8444,8 @@
         </p:blipFill>
         <p:spPr bwMode="auto">
           <a:xfrm>
-            <a:off x="7086600" y="5105400"/>
-            <a:ext cx="1828800" cy="1223494"/>
+            <a:off x="7086601" y="3714750"/>
+            <a:ext cx="1825943" cy="1221581"/>
           </a:xfrm>
           <a:prstGeom prst="rect">
             <a:avLst/>
@@ -8535,7 +8537,7 @@
         <p:spPr/>
         <p:txBody>
           <a:bodyPr>
-            <a:normAutofit/>
+            <a:normAutofit lnSpcReduction="10000"/>
           </a:bodyPr>
           <a:lstStyle/>
           <a:p>
@@ -8607,7 +8609,7 @@
           <a:p>
             <a:fld id="{59A89C50-A88C-43DA-A017-AA6F35F0B0C8}" type="datetime1">
               <a:rPr lang="en-US" smtClean="0"/>
-              <a:t>10/24/2017</a:t>
+              <a:t>10/25/2017</a:t>
             </a:fld>
             <a:endParaRPr lang="en-US"/>
           </a:p>
@@ -8722,8 +8724,8 @@
         </p:blipFill>
         <p:spPr>
           <a:xfrm>
-            <a:off x="6644660" y="1524000"/>
-            <a:ext cx="2122131" cy="774456"/>
+            <a:off x="6644660" y="1143000"/>
+            <a:ext cx="2122131" cy="580842"/>
           </a:xfrm>
         </p:spPr>
       </p:pic>
@@ -8744,7 +8746,7 @@
           <a:p>
             <a:fld id="{AA1E44A8-32B0-4E5A-A6DF-07DB1E700CAE}" type="datetime1">
               <a:rPr lang="en-US" smtClean="0"/>
-              <a:t>10/24/2017</a:t>
+              <a:t>10/25/2017</a:t>
             </a:fld>
             <a:endParaRPr lang="en-US"/>
           </a:p>
@@ -8796,7 +8798,7 @@
         </p:blipFill>
         <p:spPr bwMode="auto">
           <a:xfrm>
-            <a:off x="6472238" y="4600575"/>
+            <a:off x="6472238" y="3538538"/>
             <a:ext cx="971550" cy="809625"/>
           </a:xfrm>
           <a:prstGeom prst="rect">
@@ -8850,7 +8852,7 @@
         </p:blipFill>
         <p:spPr bwMode="auto">
           <a:xfrm>
-            <a:off x="7472363" y="4191000"/>
+            <a:off x="7472366" y="3143250"/>
             <a:ext cx="1362075" cy="1600200"/>
           </a:xfrm>
           <a:prstGeom prst="rect">
@@ -8904,7 +8906,7 @@
         </p:blipFill>
         <p:spPr bwMode="auto">
           <a:xfrm>
-            <a:off x="6653213" y="2438400"/>
+            <a:off x="6653213" y="1889003"/>
             <a:ext cx="2105025" cy="333375"/>
           </a:xfrm>
           <a:prstGeom prst="rect">
@@ -8958,7 +8960,7 @@
         </p:blipFill>
         <p:spPr bwMode="auto">
           <a:xfrm>
-            <a:off x="6572250" y="3276600"/>
+            <a:off x="6572250" y="2387539"/>
             <a:ext cx="2266950" cy="590550"/>
           </a:xfrm>
           <a:prstGeom prst="rect">
@@ -8999,8 +9001,8 @@
         </p:nvSpPr>
         <p:spPr>
           <a:xfrm>
-            <a:off x="457200" y="1600200"/>
-            <a:ext cx="8229600" cy="4525963"/>
+            <a:off x="457200" y="1200151"/>
+            <a:ext cx="8229600" cy="3394472"/>
           </a:xfrm>
           <a:prstGeom prst="rect">
             <a:avLst/>
@@ -9008,7 +9010,7 @@
         </p:spPr>
         <p:txBody>
           <a:bodyPr vert="horz" lIns="91440" tIns="45720" rIns="91440" bIns="45720" rtlCol="0">
-            <a:normAutofit/>
+            <a:normAutofit lnSpcReduction="10000"/>
           </a:bodyPr>
           <a:lstStyle>
             <a:lvl1pPr marL="342900" indent="-342900" algn="l" defTabSz="914400" rtl="0" eaLnBrk="1" latinLnBrk="0" hangingPunct="1">
@@ -9286,7 +9288,7 @@
         <p:spPr/>
         <p:txBody>
           <a:bodyPr>
-            <a:normAutofit/>
+            <a:normAutofit fontScale="92500" lnSpcReduction="20000"/>
           </a:bodyPr>
           <a:lstStyle/>
           <a:p>
@@ -9553,7 +9555,7 @@
           <a:p>
             <a:fld id="{1AF7749E-7951-4D42-9C43-2FC8E80375B1}" type="datetime1">
               <a:rPr lang="en-US" smtClean="0"/>
-              <a:t>10/24/2017</a:t>
+              <a:t>10/25/2017</a:t>
             </a:fld>
             <a:endParaRPr lang="en-US"/>
           </a:p>
@@ -9656,7 +9658,9 @@
         </p:nvSpPr>
         <p:spPr/>
         <p:txBody>
-          <a:bodyPr/>
+          <a:bodyPr>
+            <a:normAutofit lnSpcReduction="10000"/>
+          </a:bodyPr>
           <a:lstStyle/>
           <a:p>
             <a:pPr marL="514350" indent="-514350">
@@ -9703,11 +9707,7 @@
             </a:pPr>
             <a:r>
               <a:rPr lang="en-US" dirty="0" smtClean="0"/>
-              <a:t>&gt;10 </a:t>
-            </a:r>
-            <a:r>
-              <a:rPr lang="en-US" dirty="0" smtClean="0"/>
-              <a:t>million runs, &gt;1800 tests, open source</a:t>
+              <a:t>&gt;10 million runs, &gt;1800 tests, open source</a:t>
             </a:r>
           </a:p>
           <a:p>
@@ -9739,7 +9739,7 @@
           <a:p>
             <a:fld id="{60D7856B-577C-489D-A2A8-2F221F81FEFA}" type="datetime1">
               <a:rPr lang="en-US" smtClean="0"/>
-              <a:t>10/24/2017</a:t>
+              <a:t>10/25/2017</a:t>
             </a:fld>
             <a:endParaRPr lang="en-US"/>
           </a:p>
@@ -9842,13 +9842,13 @@
         </p:nvSpPr>
         <p:spPr>
           <a:xfrm>
-            <a:off x="304800" y="1600200"/>
-            <a:ext cx="8458200" cy="4525963"/>
+            <a:off x="304800" y="1200150"/>
+            <a:ext cx="8458200" cy="3581400"/>
           </a:xfrm>
         </p:spPr>
         <p:txBody>
           <a:bodyPr>
-            <a:normAutofit fontScale="77500" lnSpcReduction="20000"/>
+            <a:normAutofit fontScale="40000" lnSpcReduction="20000"/>
           </a:bodyPr>
           <a:lstStyle/>
           <a:p>
@@ -9856,7 +9856,7 @@
               <a:buNone/>
             </a:pPr>
             <a:r>
-              <a:rPr lang="en-US" sz="2600" b="1" dirty="0" smtClean="0">
+              <a:rPr lang="en-US" sz="5000" b="1" dirty="0" smtClean="0">
                 <a:solidFill>
                   <a:srgbClr val="008080"/>
                 </a:solidFill>
@@ -9868,7 +9868,7 @@
               <a:t>select</a:t>
             </a:r>
             <a:r>
-              <a:rPr lang="en-US" sz="2600" b="1" dirty="0" smtClean="0">
+              <a:rPr lang="en-US" sz="5000" b="1" dirty="0" smtClean="0">
                 <a:solidFill>
                   <a:srgbClr val="000080"/>
                 </a:solidFill>
@@ -9885,7 +9885,7 @@
               <a:buNone/>
             </a:pPr>
             <a:r>
-              <a:rPr lang="en-US" sz="2600" b="1" dirty="0" smtClean="0">
+              <a:rPr lang="en-US" sz="5000" b="1" dirty="0" smtClean="0">
                 <a:solidFill>
                   <a:srgbClr val="008080"/>
                 </a:solidFill>
@@ -9897,7 +9897,7 @@
               <a:t>from</a:t>
             </a:r>
             <a:r>
-              <a:rPr lang="en-US" sz="2600" b="1" dirty="0" smtClean="0">
+              <a:rPr lang="en-US" sz="5000" b="1" dirty="0" smtClean="0">
                 <a:solidFill>
                   <a:srgbClr val="000080"/>
                 </a:solidFill>
@@ -9909,7 +9909,7 @@
               <a:t> </a:t>
             </a:r>
             <a:r>
-              <a:rPr lang="en-US" sz="2600" b="1" dirty="0" smtClean="0">
+              <a:rPr lang="en-US" sz="5000" b="1" dirty="0" smtClean="0">
                 <a:solidFill>
                   <a:srgbClr val="008080"/>
                 </a:solidFill>
@@ -9921,7 +9921,7 @@
               <a:t>table</a:t>
             </a:r>
             <a:r>
-              <a:rPr lang="en-US" sz="2600" b="1" dirty="0" smtClean="0">
+              <a:rPr lang="en-US" sz="5000" b="1" dirty="0" smtClean="0">
                 <a:solidFill>
                   <a:srgbClr val="000080"/>
                 </a:solidFill>
@@ -9933,7 +9933,7 @@
               <a:t>(m5</a:t>
             </a:r>
             <a:r>
-              <a:rPr lang="en-US" sz="2600" b="1" dirty="0">
+              <a:rPr lang="en-US" sz="5000" b="1" dirty="0">
                 <a:solidFill>
                   <a:srgbClr val="000080"/>
                 </a:solidFill>
@@ -9945,7 +9945,7 @@
               <a:t>(</a:t>
             </a:r>
             <a:r>
-              <a:rPr lang="en-US" sz="2600" b="1" dirty="0">
+              <a:rPr lang="en-US" sz="5000" b="1" dirty="0">
                 <a:solidFill>
                   <a:srgbClr val="0000FF"/>
                 </a:solidFill>
@@ -9957,7 +9957,7 @@
               <a:t>'select * from dual'</a:t>
             </a:r>
             <a:r>
-              <a:rPr lang="en-US" sz="2600" b="1" dirty="0">
+              <a:rPr lang="en-US" sz="5000" b="1" dirty="0">
                 <a:solidFill>
                   <a:srgbClr val="000080"/>
                 </a:solidFill>
@@ -9969,7 +9969,7 @@
               <a:t>, </a:t>
             </a:r>
             <a:r>
-              <a:rPr lang="en-US" sz="2600" b="1" dirty="0">
+              <a:rPr lang="en-US" sz="5000" b="1" dirty="0">
                 <a:solidFill>
                   <a:srgbClr val="0000FF"/>
                 </a:solidFill>
@@ -9981,7 +9981,7 @@
               <a:t>'</a:t>
             </a:r>
             <a:r>
-              <a:rPr lang="en-US" sz="2600" b="1" dirty="0" err="1">
+              <a:rPr lang="en-US" sz="5000" b="1" dirty="0" err="1">
                 <a:solidFill>
                   <a:srgbClr val="0000FF"/>
                 </a:solidFill>
@@ -9993,7 +9993,7 @@
               <a:t>dev,qa</a:t>
             </a:r>
             <a:r>
-              <a:rPr lang="en-US" sz="2600" b="1" dirty="0" smtClean="0">
+              <a:rPr lang="en-US" sz="5000" b="1" dirty="0" smtClean="0">
                 <a:solidFill>
                   <a:srgbClr val="0000FF"/>
                 </a:solidFill>
@@ -10005,7 +10005,7 @@
               <a:t>'</a:t>
             </a:r>
             <a:r>
-              <a:rPr lang="en-US" sz="2600" b="1" dirty="0">
+              <a:rPr lang="en-US" sz="5000" b="1" dirty="0">
                 <a:solidFill>
                   <a:srgbClr val="000080"/>
                 </a:solidFill>
@@ -10017,7 +10017,7 @@
               <a:t>, </a:t>
             </a:r>
             <a:r>
-              <a:rPr lang="en-US" sz="2600" b="1" dirty="0" smtClean="0">
+              <a:rPr lang="en-US" sz="5000" b="1" dirty="0" smtClean="0">
                 <a:solidFill>
                   <a:srgbClr val="0000FF"/>
                 </a:solidFill>
@@ -10029,7 +10029,7 @@
               <a:t>'yes'</a:t>
             </a:r>
             <a:r>
-              <a:rPr lang="en-US" sz="2600" b="1" dirty="0" smtClean="0">
+              <a:rPr lang="en-US" sz="5000" b="1" dirty="0" smtClean="0">
                 <a:solidFill>
                   <a:srgbClr val="000080"/>
                 </a:solidFill>
@@ -10092,7 +10092,7 @@
               </a:rPr>
             </a:br>
             <a:r>
-              <a:rPr lang="en-US" sz="2600" b="1" dirty="0">
+              <a:rPr lang="en-US" sz="4000" b="1" dirty="0">
                 <a:solidFill>
                   <a:srgbClr val="008080"/>
                 </a:solidFill>
@@ -10103,7 +10103,7 @@
               </a:rPr>
               <a:t>begin</a:t>
             </a:r>
-            <a:endParaRPr lang="en-US" sz="2600" b="1" dirty="0">
+            <a:endParaRPr lang="en-US" sz="4000" b="1" dirty="0">
               <a:solidFill>
                 <a:srgbClr val="000080"/>
               </a:solidFill>
@@ -10118,7 +10118,7 @@
               <a:buNone/>
             </a:pPr>
             <a:r>
-              <a:rPr lang="en-US" sz="2600" b="1" dirty="0" smtClean="0">
+              <a:rPr lang="en-US" sz="4000" b="1" dirty="0" smtClean="0">
                 <a:solidFill>
                   <a:srgbClr val="000080"/>
                 </a:solidFill>
@@ -10130,7 +10130,7 @@
               <a:t>  m5_proc</a:t>
             </a:r>
             <a:r>
-              <a:rPr lang="en-US" sz="2600" b="1" dirty="0">
+              <a:rPr lang="en-US" sz="4000" b="1" dirty="0">
                 <a:solidFill>
                   <a:srgbClr val="000080"/>
                 </a:solidFill>
@@ -10147,7 +10147,7 @@
               <a:buNone/>
             </a:pPr>
             <a:r>
-              <a:rPr lang="en-US" sz="2600" b="1" dirty="0" smtClean="0">
+              <a:rPr lang="en-US" sz="4000" b="1" dirty="0" smtClean="0">
                 <a:solidFill>
                   <a:srgbClr val="000080"/>
                 </a:solidFill>
@@ -10159,7 +10159,7 @@
               <a:t>    </a:t>
             </a:r>
             <a:r>
-              <a:rPr lang="en-US" sz="2600" b="1" dirty="0" err="1" smtClean="0">
+              <a:rPr lang="en-US" sz="4000" b="1" dirty="0" err="1" smtClean="0">
                 <a:solidFill>
                   <a:srgbClr val="000080"/>
                 </a:solidFill>
@@ -10171,7 +10171,7 @@
               <a:t>p_code</a:t>
             </a:r>
             <a:r>
-              <a:rPr lang="en-US" sz="2600" b="1" dirty="0" smtClean="0">
+              <a:rPr lang="en-US" sz="4000" b="1" dirty="0" smtClean="0">
                 <a:solidFill>
                   <a:srgbClr val="000080"/>
                 </a:solidFill>
@@ -10180,22 +10180,22 @@
                 </a:highlight>
                 <a:latin typeface="Courier New"/>
               </a:rPr>
-              <a:t> =&gt; </a:t>
-            </a:r>
-            <a:r>
-              <a:rPr lang="en-US" sz="2600" b="1" dirty="0" smtClean="0">
-                <a:solidFill>
-                  <a:srgbClr val="0000FF"/>
+              <a:t> </a:t>
+            </a:r>
+            <a:r>
+              <a:rPr lang="en-US" sz="4000" b="1" dirty="0" smtClean="0">
+                <a:solidFill>
+                  <a:srgbClr val="000080"/>
                 </a:solidFill>
                 <a:highlight>
                   <a:srgbClr val="FFFFFF"/>
                 </a:highlight>
                 <a:latin typeface="Courier New"/>
               </a:rPr>
-              <a:t>'select </a:t>
-            </a:r>
-            <a:r>
-              <a:rPr lang="en-US" sz="2600" b="1" dirty="0">
+              <a:t>               =&gt; </a:t>
+            </a:r>
+            <a:r>
+              <a:rPr lang="en-US" sz="4000" b="1" dirty="0" smtClean="0">
                 <a:solidFill>
                   <a:srgbClr val="0000FF"/>
                 </a:solidFill>
@@ -10204,10 +10204,10 @@
                 </a:highlight>
                 <a:latin typeface="Courier New"/>
               </a:rPr>
-              <a:t>* from </a:t>
-            </a:r>
-            <a:r>
-              <a:rPr lang="en-US" sz="2600" b="1" dirty="0" smtClean="0">
+              <a:t>'select </a:t>
+            </a:r>
+            <a:r>
+              <a:rPr lang="en-US" sz="4000" b="1" dirty="0">
                 <a:solidFill>
                   <a:srgbClr val="0000FF"/>
                 </a:solidFill>
@@ -10216,21 +10216,33 @@
                 </a:highlight>
                 <a:latin typeface="Courier New"/>
               </a:rPr>
-              <a:t>dual'</a:t>
-            </a:r>
-            <a:r>
-              <a:rPr lang="en-US" sz="2600" b="1" dirty="0" smtClean="0">
-                <a:solidFill>
-                  <a:srgbClr val="000080"/>
+              <a:t>* from </a:t>
+            </a:r>
+            <a:r>
+              <a:rPr lang="en-US" sz="4000" b="1" dirty="0" smtClean="0">
+                <a:solidFill>
+                  <a:srgbClr val="0000FF"/>
                 </a:solidFill>
                 <a:highlight>
                   <a:srgbClr val="FFFFFF"/>
                 </a:highlight>
                 <a:latin typeface="Courier New"/>
               </a:rPr>
+              <a:t>dual'</a:t>
+            </a:r>
+            <a:r>
+              <a:rPr lang="en-US" sz="4000" b="1" dirty="0" smtClean="0">
+                <a:solidFill>
+                  <a:srgbClr val="000080"/>
+                </a:solidFill>
+                <a:highlight>
+                  <a:srgbClr val="FFFFFF"/>
+                </a:highlight>
+                <a:latin typeface="Courier New"/>
+              </a:rPr>
               <a:t>,</a:t>
             </a:r>
-            <a:endParaRPr lang="en-US" sz="2600" b="1" dirty="0">
+            <a:endParaRPr lang="en-US" sz="4000" b="1" dirty="0">
               <a:solidFill>
                 <a:srgbClr val="000080"/>
               </a:solidFill>
@@ -10245,7 +10257,7 @@
               <a:buNone/>
             </a:pPr>
             <a:r>
-              <a:rPr lang="en-US" sz="2600" b="1" dirty="0" smtClean="0">
+              <a:rPr lang="en-US" sz="4000" b="1" dirty="0" smtClean="0">
                 <a:solidFill>
                   <a:srgbClr val="000080"/>
                 </a:solidFill>
@@ -10257,7 +10269,7 @@
               <a:t>    </a:t>
             </a:r>
             <a:r>
-              <a:rPr lang="en-US" sz="2600" b="1" dirty="0" err="1" smtClean="0">
+              <a:rPr lang="en-US" sz="4000" b="1" dirty="0" err="1" smtClean="0">
                 <a:solidFill>
                   <a:srgbClr val="000080"/>
                 </a:solidFill>
@@ -10269,7 +10281,7 @@
               <a:t>p_targets</a:t>
             </a:r>
             <a:r>
-              <a:rPr lang="en-US" sz="2600" b="1" dirty="0" smtClean="0">
+              <a:rPr lang="en-US" sz="4000" b="1" dirty="0" smtClean="0">
                 <a:solidFill>
                   <a:srgbClr val="000080"/>
                 </a:solidFill>
@@ -10278,22 +10290,22 @@
                 </a:highlight>
                 <a:latin typeface="Courier New"/>
               </a:rPr>
-              <a:t> =&gt;  </a:t>
-            </a:r>
-            <a:r>
-              <a:rPr lang="en-US" sz="2600" b="1" dirty="0">
-                <a:solidFill>
-                  <a:srgbClr val="0000FF"/>
+              <a:t> </a:t>
+            </a:r>
+            <a:r>
+              <a:rPr lang="en-US" sz="4000" b="1" dirty="0" smtClean="0">
+                <a:solidFill>
+                  <a:srgbClr val="000080"/>
                 </a:solidFill>
                 <a:highlight>
                   <a:srgbClr val="FFFFFF"/>
                 </a:highlight>
                 <a:latin typeface="Courier New"/>
               </a:rPr>
-              <a:t>'</a:t>
-            </a:r>
-            <a:r>
-              <a:rPr lang="en-US" sz="2600" b="1" dirty="0" err="1">
+              <a:t>            =&gt; </a:t>
+            </a:r>
+            <a:r>
+              <a:rPr lang="en-US" sz="4000" b="1" dirty="0" smtClean="0">
                 <a:solidFill>
                   <a:srgbClr val="0000FF"/>
                 </a:solidFill>
@@ -10302,10 +10314,10 @@
                 </a:highlight>
                 <a:latin typeface="Courier New"/>
               </a:rPr>
-              <a:t>dev,qa</a:t>
-            </a:r>
-            <a:r>
-              <a:rPr lang="en-US" sz="2600" b="1" dirty="0">
+              <a:t>'</a:t>
+            </a:r>
+            <a:r>
+              <a:rPr lang="en-US" sz="4000" b="1" dirty="0" err="1" smtClean="0">
                 <a:solidFill>
                   <a:srgbClr val="0000FF"/>
                 </a:solidFill>
@@ -10314,27 +10326,22 @@
                 </a:highlight>
                 <a:latin typeface="Courier New"/>
               </a:rPr>
-              <a:t>'</a:t>
-            </a:r>
-            <a:r>
-              <a:rPr lang="en-US" sz="2600" b="1" dirty="0">
-                <a:solidFill>
-                  <a:srgbClr val="000080"/>
+              <a:t>dev,qa</a:t>
+            </a:r>
+            <a:r>
+              <a:rPr lang="en-US" sz="4000" b="1" dirty="0">
+                <a:solidFill>
+                  <a:srgbClr val="0000FF"/>
                 </a:solidFill>
                 <a:highlight>
                   <a:srgbClr val="FFFFFF"/>
                 </a:highlight>
                 <a:latin typeface="Courier New"/>
               </a:rPr>
-              <a:t>,</a:t>
-            </a:r>
-          </a:p>
-          <a:p>
-            <a:pPr marL="0" indent="0">
-              <a:buNone/>
-            </a:pPr>
-            <a:r>
-              <a:rPr lang="en-US" sz="2600" b="1" dirty="0" smtClean="0">
+              <a:t>'</a:t>
+            </a:r>
+            <a:r>
+              <a:rPr lang="en-US" sz="4000" b="1" dirty="0">
                 <a:solidFill>
                   <a:srgbClr val="000080"/>
                 </a:solidFill>
@@ -10343,10 +10350,15 @@
                 </a:highlight>
                 <a:latin typeface="Courier New"/>
               </a:rPr>
-              <a:t>    </a:t>
-            </a:r>
-            <a:r>
-              <a:rPr lang="en-US" sz="2600" b="1" dirty="0" err="1">
+              <a:t>,</a:t>
+            </a:r>
+          </a:p>
+          <a:p>
+            <a:pPr marL="0" indent="0">
+              <a:buNone/>
+            </a:pPr>
+            <a:r>
+              <a:rPr lang="en-US" sz="4000" b="1" dirty="0" smtClean="0">
                 <a:solidFill>
                   <a:srgbClr val="000080"/>
                 </a:solidFill>
@@ -10355,10 +10367,10 @@
                 </a:highlight>
                 <a:latin typeface="Courier New"/>
               </a:rPr>
-              <a:t>p_run_as_sys</a:t>
-            </a:r>
-            <a:r>
-              <a:rPr lang="en-US" sz="2600" b="1" dirty="0">
+              <a:t>    </a:t>
+            </a:r>
+            <a:r>
+              <a:rPr lang="en-US" sz="4000" b="1" dirty="0" err="1">
                 <a:solidFill>
                   <a:srgbClr val="000080"/>
                 </a:solidFill>
@@ -10367,27 +10379,22 @@
                 </a:highlight>
                 <a:latin typeface="Courier New"/>
               </a:rPr>
-              <a:t> =&gt; </a:t>
-            </a:r>
-            <a:r>
-              <a:rPr lang="en-US" sz="2600" b="1" dirty="0" smtClean="0">
-                <a:solidFill>
-                  <a:srgbClr val="008080"/>
+              <a:t>p_run_as_sys</a:t>
+            </a:r>
+            <a:r>
+              <a:rPr lang="en-US" sz="4000" b="1" dirty="0">
+                <a:solidFill>
+                  <a:srgbClr val="000080"/>
                 </a:solidFill>
                 <a:highlight>
                   <a:srgbClr val="FFFFFF"/>
                 </a:highlight>
                 <a:latin typeface="Courier New"/>
               </a:rPr>
-              <a:t>false</a:t>
-            </a:r>
-          </a:p>
-          <a:p>
-            <a:pPr marL="0" indent="0">
-              <a:buNone/>
-            </a:pPr>
-            <a:r>
-              <a:rPr lang="en-US" sz="2600" b="1" dirty="0" smtClean="0">
+              <a:t> </a:t>
+            </a:r>
+            <a:r>
+              <a:rPr lang="en-US" sz="4000" b="1" dirty="0" smtClean="0">
                 <a:solidFill>
                   <a:srgbClr val="000080"/>
                 </a:solidFill>
@@ -10396,22 +10403,27 @@
                 </a:highlight>
                 <a:latin typeface="Courier New"/>
               </a:rPr>
-              <a:t>    </a:t>
-            </a:r>
-            <a:r>
-              <a:rPr lang="en-US" sz="2600" b="1" dirty="0" err="1" smtClean="0">
-                <a:solidFill>
-                  <a:srgbClr val="000080"/>
+              <a:t>         =&gt; </a:t>
+            </a:r>
+            <a:r>
+              <a:rPr lang="en-US" sz="4000" b="1" dirty="0" smtClean="0">
+                <a:solidFill>
+                  <a:srgbClr val="008080"/>
                 </a:solidFill>
                 <a:highlight>
                   <a:srgbClr val="FFFFFF"/>
                 </a:highlight>
                 <a:latin typeface="Courier New"/>
               </a:rPr>
-              <a:t>p_table_name</a:t>
-            </a:r>
-            <a:r>
-              <a:rPr lang="en-US" sz="2600" b="1" dirty="0" smtClean="0">
+              <a:t>false</a:t>
+            </a:r>
+          </a:p>
+          <a:p>
+            <a:pPr marL="0" indent="0">
+              <a:buNone/>
+            </a:pPr>
+            <a:r>
+              <a:rPr lang="en-US" sz="4000" b="1" dirty="0" smtClean="0">
                 <a:solidFill>
                   <a:srgbClr val="000080"/>
                 </a:solidFill>
@@ -10420,87 +10432,82 @@
                 </a:highlight>
                 <a:latin typeface="Courier New"/>
               </a:rPr>
-              <a:t> =&gt; </a:t>
-            </a:r>
-            <a:r>
-              <a:rPr lang="en-US" sz="2600" b="1" dirty="0">
-                <a:solidFill>
-                  <a:srgbClr val="0000FF"/>
+              <a:t>    </a:t>
+            </a:r>
+            <a:r>
+              <a:rPr lang="en-US" sz="4000" b="1" dirty="0" err="1" smtClean="0">
+                <a:solidFill>
+                  <a:srgbClr val="000080"/>
                 </a:solidFill>
                 <a:highlight>
                   <a:srgbClr val="FFFFFF"/>
                 </a:highlight>
                 <a:latin typeface="Courier New"/>
               </a:rPr>
-              <a:t>'</a:t>
-            </a:r>
-            <a:r>
-              <a:rPr lang="en-US" sz="2600" b="1" dirty="0" err="1">
-                <a:solidFill>
-                  <a:srgbClr val="0000FF"/>
+              <a:t>p_table_name</a:t>
+            </a:r>
+            <a:r>
+              <a:rPr lang="en-US" sz="4000" b="1" dirty="0" smtClean="0">
+                <a:solidFill>
+                  <a:srgbClr val="000080"/>
                 </a:solidFill>
                 <a:highlight>
                   <a:srgbClr val="FFFFFF"/>
                 </a:highlight>
                 <a:latin typeface="Courier New"/>
               </a:rPr>
-              <a:t>test_data</a:t>
-            </a:r>
-            <a:r>
-              <a:rPr lang="en-US" sz="2600" b="1" dirty="0">
-                <a:solidFill>
-                  <a:srgbClr val="0000FF"/>
+              <a:t> </a:t>
+            </a:r>
+            <a:r>
+              <a:rPr lang="en-US" sz="4000" b="1" dirty="0" smtClean="0">
+                <a:solidFill>
+                  <a:srgbClr val="000080"/>
                 </a:solidFill>
                 <a:highlight>
                   <a:srgbClr val="FFFFFF"/>
                 </a:highlight>
                 <a:latin typeface="Courier New"/>
               </a:rPr>
-              <a:t>'</a:t>
-            </a:r>
-            <a:r>
-              <a:rPr lang="en-US" sz="2600" b="1" dirty="0">
-                <a:solidFill>
-                  <a:srgbClr val="000080"/>
+              <a:t>         =&gt; </a:t>
+            </a:r>
+            <a:r>
+              <a:rPr lang="en-US" sz="4000" b="1" dirty="0">
+                <a:solidFill>
+                  <a:srgbClr val="0000FF"/>
                 </a:solidFill>
                 <a:highlight>
                   <a:srgbClr val="FFFFFF"/>
                 </a:highlight>
                 <a:latin typeface="Courier New"/>
               </a:rPr>
-              <a:t>,</a:t>
-            </a:r>
-          </a:p>
-          <a:p>
-            <a:pPr marL="0" indent="0">
-              <a:buNone/>
-            </a:pPr>
-            <a:r>
-              <a:rPr lang="en-US" sz="2600" b="1" dirty="0" smtClean="0">
-                <a:solidFill>
-                  <a:srgbClr val="000080"/>
+              <a:t>'</a:t>
+            </a:r>
+            <a:r>
+              <a:rPr lang="en-US" sz="4000" b="1" dirty="0" err="1">
+                <a:solidFill>
+                  <a:srgbClr val="0000FF"/>
                 </a:solidFill>
                 <a:highlight>
                   <a:srgbClr val="FFFFFF"/>
                 </a:highlight>
                 <a:latin typeface="Courier New"/>
               </a:rPr>
-              <a:t>    </a:t>
-            </a:r>
-            <a:r>
-              <a:rPr lang="en-US" sz="2600" b="1" dirty="0" err="1" smtClean="0">
-                <a:solidFill>
-                  <a:srgbClr val="000080"/>
+              <a:t>test_data</a:t>
+            </a:r>
+            <a:r>
+              <a:rPr lang="en-US" sz="4000" b="1" dirty="0">
+                <a:solidFill>
+                  <a:srgbClr val="0000FF"/>
                 </a:solidFill>
                 <a:highlight>
                   <a:srgbClr val="FFFFFF"/>
                 </a:highlight>
                 <a:latin typeface="Courier New"/>
               </a:rPr>
-              <a:t>p_table_exists_action</a:t>
-            </a:r>
-            <a:r>
-              <a:rPr lang="en-US" sz="2600" b="1" dirty="0" smtClean="0">
+              <a:t>'</a:t>
+            </a:r>
+            <a:r>
+              <a:rPr lang="en-US" sz="4000" b="1" dirty="0">
                 <a:solidFill>
                   <a:srgbClr val="000080"/>
                 </a:solidFill>
@@ -10509,10 +10516,15 @@
                 </a:highlight>
                 <a:latin typeface="Courier New"/>
               </a:rPr>
-              <a:t> </a:t>
-            </a:r>
-            <a:r>
-              <a:rPr lang="en-US" sz="2600" b="1" dirty="0">
+              <a:t>,</a:t>
+            </a:r>
+          </a:p>
+          <a:p>
+            <a:pPr marL="0" indent="0">
+              <a:buNone/>
+            </a:pPr>
+            <a:r>
+              <a:rPr lang="en-US" sz="4000" b="1" dirty="0" smtClean="0">
                 <a:solidFill>
                   <a:srgbClr val="000080"/>
                 </a:solidFill>
@@ -10521,22 +10533,22 @@
                 </a:highlight>
                 <a:latin typeface="Courier New"/>
               </a:rPr>
-              <a:t>=&gt; </a:t>
-            </a:r>
-            <a:r>
-              <a:rPr lang="en-US" sz="2600" b="1" dirty="0">
-                <a:solidFill>
-                  <a:srgbClr val="0000FF"/>
+              <a:t>    </a:t>
+            </a:r>
+            <a:r>
+              <a:rPr lang="en-US" sz="4000" b="1" dirty="0" err="1" smtClean="0">
+                <a:solidFill>
+                  <a:srgbClr val="000080"/>
                 </a:solidFill>
                 <a:highlight>
                   <a:srgbClr val="FFFFFF"/>
                 </a:highlight>
                 <a:latin typeface="Courier New"/>
               </a:rPr>
-              <a:t>'drop'</a:t>
-            </a:r>
-            <a:r>
-              <a:rPr lang="en-US" sz="2600" b="1" dirty="0">
+              <a:t>p_table_exists_action</a:t>
+            </a:r>
+            <a:r>
+              <a:rPr lang="en-US" sz="4000" b="1" dirty="0" smtClean="0">
                 <a:solidFill>
                   <a:srgbClr val="000080"/>
                 </a:solidFill>
@@ -10545,15 +10557,10 @@
                 </a:highlight>
                 <a:latin typeface="Courier New"/>
               </a:rPr>
-              <a:t>,</a:t>
-            </a:r>
-          </a:p>
-          <a:p>
-            <a:pPr marL="0" indent="0">
-              <a:buNone/>
-            </a:pPr>
-            <a:r>
-              <a:rPr lang="en-US" sz="2600" b="1" dirty="0" smtClean="0">
+              <a:t> </a:t>
+            </a:r>
+            <a:r>
+              <a:rPr lang="en-US" sz="4000" b="1" dirty="0">
                 <a:solidFill>
                   <a:srgbClr val="000080"/>
                 </a:solidFill>
@@ -10562,22 +10569,22 @@
                 </a:highlight>
                 <a:latin typeface="Courier New"/>
               </a:rPr>
-              <a:t> </a:t>
-            </a:r>
-            <a:r>
-              <a:rPr lang="en-US" sz="2600" b="1" dirty="0" smtClean="0">
-                <a:solidFill>
-                  <a:srgbClr val="000080"/>
+              <a:t>=&gt; </a:t>
+            </a:r>
+            <a:r>
+              <a:rPr lang="en-US" sz="4000" b="1" dirty="0">
+                <a:solidFill>
+                  <a:srgbClr val="0000FF"/>
                 </a:solidFill>
                 <a:highlight>
                   <a:srgbClr val="FFFFFF"/>
                 </a:highlight>
                 <a:latin typeface="Courier New"/>
               </a:rPr>
-              <a:t>   </a:t>
-            </a:r>
-            <a:r>
-              <a:rPr lang="en-US" sz="2600" b="1" dirty="0" err="1" smtClean="0">
+              <a:t>'drop'</a:t>
+            </a:r>
+            <a:r>
+              <a:rPr lang="en-US" sz="4000" b="1" dirty="0">
                 <a:solidFill>
                   <a:srgbClr val="000080"/>
                 </a:solidFill>
@@ -10586,10 +10593,15 @@
                 </a:highlight>
                 <a:latin typeface="Courier New"/>
               </a:rPr>
-              <a:t>p_asynchronous</a:t>
-            </a:r>
-            <a:r>
-              <a:rPr lang="en-US" sz="2600" b="1" dirty="0" smtClean="0">
+              <a:t>,</a:t>
+            </a:r>
+          </a:p>
+          <a:p>
+            <a:pPr marL="0" indent="0">
+              <a:buNone/>
+            </a:pPr>
+            <a:r>
+              <a:rPr lang="en-US" sz="4000" b="1" dirty="0" smtClean="0">
                 <a:solidFill>
                   <a:srgbClr val="000080"/>
                 </a:solidFill>
@@ -10598,22 +10610,22 @@
                 </a:highlight>
                 <a:latin typeface="Courier New"/>
               </a:rPr>
-              <a:t> =&gt; </a:t>
-            </a:r>
-            <a:r>
-              <a:rPr lang="en-US" sz="2600" b="1" dirty="0" smtClean="0">
-                <a:solidFill>
-                  <a:srgbClr val="008080"/>
+              <a:t>    </a:t>
+            </a:r>
+            <a:r>
+              <a:rPr lang="en-US" sz="4000" b="1" dirty="0" err="1" smtClean="0">
+                <a:solidFill>
+                  <a:srgbClr val="000080"/>
                 </a:solidFill>
                 <a:highlight>
                   <a:srgbClr val="FFFFFF"/>
                 </a:highlight>
                 <a:latin typeface="Courier New"/>
               </a:rPr>
-              <a:t>true</a:t>
-            </a:r>
-            <a:r>
-              <a:rPr lang="en-US" sz="2600" b="1" dirty="0">
+              <a:t>p_asynchronous</a:t>
+            </a:r>
+            <a:r>
+              <a:rPr lang="en-US" sz="4000" b="1" dirty="0" smtClean="0">
                 <a:solidFill>
                   <a:srgbClr val="000080"/>
                 </a:solidFill>
@@ -10622,7 +10634,124 @@
                 </a:highlight>
                 <a:latin typeface="Courier New"/>
               </a:rPr>
+              <a:t> </a:t>
+            </a:r>
+            <a:r>
+              <a:rPr lang="en-US" sz="4000" b="1" dirty="0" smtClean="0">
+                <a:solidFill>
+                  <a:srgbClr val="000080"/>
+                </a:solidFill>
+                <a:highlight>
+                  <a:srgbClr val="FFFFFF"/>
+                </a:highlight>
+                <a:latin typeface="Courier New"/>
+              </a:rPr>
+              <a:t>       =&gt; </a:t>
+            </a:r>
+            <a:r>
+              <a:rPr lang="en-US" sz="4000" b="1" dirty="0" smtClean="0">
+                <a:solidFill>
+                  <a:srgbClr val="008080"/>
+                </a:solidFill>
+                <a:highlight>
+                  <a:srgbClr val="FFFFFF"/>
+                </a:highlight>
+                <a:latin typeface="Courier New"/>
+              </a:rPr>
+              <a:t>true</a:t>
+            </a:r>
+            <a:r>
+              <a:rPr lang="en-US" sz="4000" b="1" dirty="0">
+                <a:solidFill>
+                  <a:srgbClr val="000080"/>
+                </a:solidFill>
+                <a:highlight>
+                  <a:srgbClr val="FFFFFF"/>
+                </a:highlight>
+                <a:latin typeface="Courier New"/>
+              </a:rPr>
               <a:t>,</a:t>
+            </a:r>
+            <a:endParaRPr lang="en-US" sz="4000" b="1" dirty="0" smtClean="0">
+              <a:solidFill>
+                <a:srgbClr val="000080"/>
+              </a:solidFill>
+              <a:highlight>
+                <a:srgbClr val="FFFFFF"/>
+              </a:highlight>
+              <a:latin typeface="Courier New"/>
+            </a:endParaRPr>
+          </a:p>
+          <a:p>
+            <a:pPr marL="0" indent="0">
+              <a:buNone/>
+            </a:pPr>
+            <a:r>
+              <a:rPr lang="en-US" sz="4000" b="1" dirty="0" smtClean="0">
+                <a:solidFill>
+                  <a:srgbClr val="000080"/>
+                </a:solidFill>
+                <a:highlight>
+                  <a:srgbClr val="FFFFFF"/>
+                </a:highlight>
+                <a:latin typeface="Courier New"/>
+              </a:rPr>
+              <a:t>);</a:t>
+            </a:r>
+            <a:endParaRPr lang="en-US" sz="4000" b="1" dirty="0">
+              <a:solidFill>
+                <a:srgbClr val="000080"/>
+              </a:solidFill>
+              <a:highlight>
+                <a:srgbClr val="FFFFFF"/>
+              </a:highlight>
+              <a:latin typeface="Courier New"/>
+            </a:endParaRPr>
+          </a:p>
+          <a:p>
+            <a:pPr marL="0" indent="0">
+              <a:buNone/>
+            </a:pPr>
+            <a:r>
+              <a:rPr lang="en-US" sz="4000" b="1" dirty="0" smtClean="0">
+                <a:solidFill>
+                  <a:srgbClr val="008080"/>
+                </a:solidFill>
+                <a:highlight>
+                  <a:srgbClr val="FFFFFF"/>
+                </a:highlight>
+                <a:latin typeface="Courier New"/>
+              </a:rPr>
+              <a:t>end</a:t>
+            </a:r>
+            <a:r>
+              <a:rPr lang="en-US" sz="4000" b="1" dirty="0">
+                <a:solidFill>
+                  <a:srgbClr val="000080"/>
+                </a:solidFill>
+                <a:highlight>
+                  <a:srgbClr val="FFFFFF"/>
+                </a:highlight>
+                <a:latin typeface="Courier New"/>
+              </a:rPr>
+              <a:t>;</a:t>
+            </a:r>
+          </a:p>
+          <a:p>
+            <a:pPr marL="0" indent="0">
+              <a:buNone/>
+            </a:pPr>
+            <a:r>
+              <a:rPr lang="en-US" sz="4000" b="1" dirty="0" smtClean="0">
+                <a:solidFill>
+                  <a:srgbClr val="000080"/>
+                </a:solidFill>
+                <a:highlight>
+                  <a:srgbClr val="FFFFFF"/>
+                </a:highlight>
+                <a:latin typeface="Courier New"/>
+              </a:rPr>
+              <a:t>/</a:t>
             </a:r>
             <a:endParaRPr lang="en-US" sz="2600" b="1" dirty="0" smtClean="0">
               <a:solidFill>
@@ -10634,77 +10763,51 @@
               <a:latin typeface="Courier New"/>
             </a:endParaRPr>
           </a:p>
-          <a:p>
-            <a:pPr marL="0" indent="0">
-              <a:buNone/>
-            </a:pPr>
-            <a:r>
-              <a:rPr lang="en-US" sz="2600" b="1" dirty="0" smtClean="0">
-                <a:solidFill>
-                  <a:srgbClr val="000080"/>
-                </a:solidFill>
-                <a:highlight>
-                  <a:srgbClr val="FFFFFF"/>
-                </a:highlight>
-                <a:latin typeface="Courier New"/>
-              </a:rPr>
-              <a:t>);</a:t>
-            </a:r>
-            <a:endParaRPr lang="en-US" sz="2600" b="1" dirty="0">
-              <a:solidFill>
-                <a:srgbClr val="000080"/>
-              </a:solidFill>
-              <a:highlight>
-                <a:srgbClr val="FFFFFF"/>
-              </a:highlight>
-              <a:latin typeface="Courier New"/>
-            </a:endParaRPr>
-          </a:p>
-          <a:p>
-            <a:pPr marL="0" indent="0">
-              <a:buNone/>
-            </a:pPr>
-            <a:r>
-              <a:rPr lang="en-US" sz="2600" b="1" dirty="0" smtClean="0">
-                <a:solidFill>
-                  <a:srgbClr val="008080"/>
-                </a:solidFill>
-                <a:highlight>
-                  <a:srgbClr val="FFFFFF"/>
-                </a:highlight>
-                <a:latin typeface="Courier New"/>
-              </a:rPr>
-              <a:t>end</a:t>
-            </a:r>
-            <a:r>
-              <a:rPr lang="en-US" sz="2600" b="1" dirty="0">
-                <a:solidFill>
-                  <a:srgbClr val="000080"/>
-                </a:solidFill>
-                <a:highlight>
-                  <a:srgbClr val="FFFFFF"/>
-                </a:highlight>
-                <a:latin typeface="Courier New"/>
-              </a:rPr>
-              <a:t>;</a:t>
-            </a:r>
-          </a:p>
-          <a:p>
-            <a:pPr marL="0" indent="0">
-              <a:buNone/>
-            </a:pPr>
-            <a:r>
-              <a:rPr lang="en-US" sz="2600" b="1" dirty="0" smtClean="0">
-                <a:solidFill>
-                  <a:srgbClr val="000080"/>
-                </a:solidFill>
-                <a:highlight>
-                  <a:srgbClr val="FFFFFF"/>
-                </a:highlight>
-                <a:latin typeface="Courier New"/>
-              </a:rPr>
-              <a:t>/</a:t>
-            </a:r>
+        </p:txBody>
+      </p:sp>
+      <p:sp>
+        <p:nvSpPr>
+          <p:cNvPr id="4" name="Date Placeholder 3"/>
+          <p:cNvSpPr>
+            <a:spLocks noGrp="1"/>
+          </p:cNvSpPr>
+          <p:nvPr>
+            <p:ph type="dt" sz="half" idx="10"/>
+          </p:nvPr>
+        </p:nvSpPr>
+        <p:spPr/>
+        <p:txBody>
+          <a:bodyPr/>
+          <a:lstStyle/>
+          <a:p>
+            <a:fld id="{12698F6C-3B60-45A8-AA68-1C639B61BEFF}" type="datetime1">
+              <a:rPr lang="en-US" smtClean="0"/>
+              <a:t>10/25/2017</a:t>
+            </a:fld>
+            <a:endParaRPr lang="en-US" dirty="0"/>
+          </a:p>
+        </p:txBody>
+      </p:sp>
+      <p:sp>
+        <p:nvSpPr>
+          <p:cNvPr id="5" name="Slide Number Placeholder 4"/>
+          <p:cNvSpPr>
+            <a:spLocks noGrp="1"/>
+          </p:cNvSpPr>
+          <p:nvPr>
+            <p:ph type="sldNum" sz="quarter" idx="12"/>
+          </p:nvPr>
+        </p:nvSpPr>
+        <p:spPr/>
+        <p:txBody>
+          <a:bodyPr/>
+          <a:lstStyle/>
+          <a:p>
+            <a:fld id="{05869706-863E-4BD1-B682-3CD80F60367B}" type="slidenum">
+              <a:rPr lang="en-US" smtClean="0"/>
+              <a:t>8</a:t>
+            </a:fld>
+            <a:endParaRPr lang="en-US"/>
           </a:p>
         </p:txBody>
       </p:sp>
@@ -10716,8 +10819,8 @@
         </p:nvSpPr>
         <p:spPr>
           <a:xfrm>
-            <a:off x="2590800" y="2286000"/>
-            <a:ext cx="2895600" cy="377851"/>
+            <a:off x="2590800" y="1809750"/>
+            <a:ext cx="2895600" cy="283388"/>
           </a:xfrm>
           <a:prstGeom prst="rect">
             <a:avLst/>
@@ -10754,60 +10857,14 @@
       </p:sp>
       <p:sp>
         <p:nvSpPr>
-          <p:cNvPr id="4" name="Date Placeholder 3"/>
-          <p:cNvSpPr>
-            <a:spLocks noGrp="1"/>
-          </p:cNvSpPr>
-          <p:nvPr>
-            <p:ph type="dt" sz="half" idx="10"/>
-          </p:nvPr>
-        </p:nvSpPr>
-        <p:spPr/>
-        <p:txBody>
-          <a:bodyPr/>
-          <a:lstStyle/>
-          <a:p>
-            <a:fld id="{12698F6C-3B60-45A8-AA68-1C639B61BEFF}" type="datetime1">
-              <a:rPr lang="en-US" smtClean="0"/>
-              <a:t>10/24/2017</a:t>
-            </a:fld>
-            <a:endParaRPr lang="en-US" dirty="0"/>
-          </a:p>
-        </p:txBody>
-      </p:sp>
-      <p:sp>
-        <p:nvSpPr>
-          <p:cNvPr id="5" name="Slide Number Placeholder 4"/>
-          <p:cNvSpPr>
-            <a:spLocks noGrp="1"/>
-          </p:cNvSpPr>
-          <p:nvPr>
-            <p:ph type="sldNum" sz="quarter" idx="12"/>
-          </p:nvPr>
-        </p:nvSpPr>
-        <p:spPr/>
-        <p:txBody>
-          <a:bodyPr/>
-          <a:lstStyle/>
-          <a:p>
-            <a:fld id="{05869706-863E-4BD1-B682-3CD80F60367B}" type="slidenum">
-              <a:rPr lang="en-US" smtClean="0"/>
-              <a:t>8</a:t>
-            </a:fld>
-            <a:endParaRPr lang="en-US"/>
-          </a:p>
-        </p:txBody>
-      </p:sp>
-      <p:sp>
-        <p:nvSpPr>
           <p:cNvPr id="7" name="Rectangle 6"/>
           <p:cNvSpPr/>
           <p:nvPr/>
         </p:nvSpPr>
         <p:spPr>
           <a:xfrm>
-            <a:off x="5908966" y="2286000"/>
-            <a:ext cx="1177634" cy="377851"/>
+            <a:off x="5908966" y="1831162"/>
+            <a:ext cx="1177634" cy="283388"/>
           </a:xfrm>
           <a:prstGeom prst="rect">
             <a:avLst/>
@@ -10850,8 +10907,8 @@
         </p:nvSpPr>
         <p:spPr>
           <a:xfrm>
-            <a:off x="6705600" y="3124200"/>
-            <a:ext cx="1295400" cy="304800"/>
+            <a:off x="6553200" y="2514600"/>
+            <a:ext cx="1295400" cy="228600"/>
           </a:xfrm>
           <a:prstGeom prst="rect">
             <a:avLst/>
@@ -10894,8 +10951,8 @@
         </p:nvSpPr>
         <p:spPr>
           <a:xfrm>
-            <a:off x="6705600" y="3505200"/>
-            <a:ext cx="1295400" cy="335280"/>
+            <a:off x="6553200" y="2800350"/>
+            <a:ext cx="1295400" cy="251460"/>
           </a:xfrm>
           <a:prstGeom prst="rect">
             <a:avLst/>
@@ -10938,8 +10995,8 @@
         </p:nvSpPr>
         <p:spPr>
           <a:xfrm>
-            <a:off x="6705600" y="3925272"/>
-            <a:ext cx="1295400" cy="1103928"/>
+            <a:off x="6553200" y="3115404"/>
+            <a:ext cx="1295400" cy="827946"/>
           </a:xfrm>
           <a:prstGeom prst="rect">
             <a:avLst/>
@@ -10982,8 +11039,8 @@
         </p:nvSpPr>
         <p:spPr>
           <a:xfrm>
-            <a:off x="7467600" y="2286000"/>
-            <a:ext cx="990600" cy="377851"/>
+            <a:off x="7467600" y="1831162"/>
+            <a:ext cx="990600" cy="283388"/>
           </a:xfrm>
           <a:prstGeom prst="rect">
             <a:avLst/>
@@ -11091,7 +11148,7 @@
         <p:spPr/>
         <p:txBody>
           <a:bodyPr>
-            <a:normAutofit/>
+            <a:normAutofit lnSpcReduction="10000"/>
           </a:bodyPr>
           <a:lstStyle/>
           <a:p>
@@ -11240,7 +11297,7 @@
           <a:p>
             <a:fld id="{D97E924C-66F2-4356-A8CE-66225EAB43F5}" type="datetime1">
               <a:rPr lang="en-US" smtClean="0"/>
-              <a:t>10/24/2017</a:t>
+              <a:t>10/25/2017</a:t>
             </a:fld>
             <a:endParaRPr lang="en-US"/>
           </a:p>

</xml_diff>

<commit_message>
Minor typos and grammar fixes.
</commit_message>
<xml_diff>
--- a/presentations/Method5.pptx
+++ b/presentations/Method5.pptx
@@ -215,7 +215,7 @@
           <a:p>
             <a:fld id="{E8184847-EC06-4734-8E30-343A2DA340C9}" type="datetimeFigureOut">
               <a:rPr lang="en-US" smtClean="0"/>
-              <a:t>10/28/2017</a:t>
+              <a:t>10/29/2017</a:t>
             </a:fld>
             <a:endParaRPr lang="en-US"/>
           </a:p>
@@ -380,7 +380,7 @@
           <a:p>
             <a:fld id="{DC284B00-8F05-4CB2-A4E6-4A642AFA915E}" type="datetimeFigureOut">
               <a:rPr lang="en-US" smtClean="0"/>
-              <a:t>10/28/2017</a:t>
+              <a:t>10/29/2017</a:t>
             </a:fld>
             <a:endParaRPr lang="en-US"/>
           </a:p>
@@ -697,7 +697,7 @@
           <a:bodyPr/>
           <a:lstStyle/>
           <a:p>
-            <a:endParaRPr lang="en-US"/>
+            <a:endParaRPr lang="en-US" dirty="0"/>
           </a:p>
         </p:txBody>
       </p:sp>
@@ -1012,7 +1012,15 @@
             </a:r>
             <a:r>
               <a:rPr lang="en-US" baseline="0" dirty="0" smtClean="0"/>
-              <a:t>Every night Method5 gathers some common data into tables such as M5_DBA_TABLES, M5_USER$, M5_DBA_ROLE_PRIVS, M5_DBA_SYS_PRIVS, and M5_DBA_TAB_PRIVS.  Having this data instantly available makes some tasks much simpler, such as finding out where a user exists, or where an object is granted.</a:t>
+              <a:t>Every night Method5 gathers some common data into tables such as M5_DBA_TABLES, </a:t>
+            </a:r>
+            <a:r>
+              <a:rPr lang="en-US" baseline="0" dirty="0" smtClean="0"/>
+              <a:t>M5_V$PARAMETER, M5_USER</a:t>
+            </a:r>
+            <a:r>
+              <a:rPr lang="en-US" baseline="0" dirty="0" smtClean="0"/>
+              <a:t>$, M5_DBA_ROLE_PRIVS, M5_DBA_SYS_PRIVS, and M5_DBA_TAB_PRIVS.  Having this data instantly available makes some tasks much simpler, such as finding out where a user exists, or where an object is granted.</a:t>
             </a:r>
           </a:p>
           <a:p>
@@ -1025,7 +1033,11 @@
             </a:r>
             <a:r>
               <a:rPr lang="en-US" b="0" baseline="0" dirty="0" smtClean="0"/>
-              <a:t>An email is sent to the administrator every day listing issues encountered by Method5.  These problems are often a blessing in disguise.  For example, if a job never finished and had to be manually killed that implies one of your databases is unavailable.  Method5 will often catch a problem that OEM missed. </a:t>
+              <a:t>An email is sent to the administrator every day listing issues encountered by Method5.  These problems are often a blessing in disguise.  For example, if a job never finished and had to be manually killed that implies one of your databases is unavailable.  Method5 will often catch a problem that OEM missed</a:t>
+            </a:r>
+            <a:r>
+              <a:rPr lang="en-US" b="0" baseline="0" dirty="0" smtClean="0"/>
+              <a:t>.</a:t>
             </a:r>
             <a:endParaRPr lang="en-US" b="1" baseline="0" dirty="0" smtClean="0"/>
           </a:p>
@@ -1146,14 +1158,35 @@
           <a:p>
             <a:r>
               <a:rPr lang="en-US" baseline="0" dirty="0" smtClean="0"/>
-              <a:t>2. Next the M5_METADATA table is queried.  Since jobs are still running in the background, IS_COMPLETE is still set to No, and the TARGETS_COMPLETED does not equal the TARGETS_EXPECTED yet.  You'll probably want to check this view a few times until all the results are in.  (Not shown on the screenshot are some other columns like TARGETS_WITH_ERRORS, NUM_ROWS, CODE, and TARGETS.)</a:t>
-            </a:r>
-          </a:p>
-          <a:p>
+              <a:t>2. Next the M5_METADATA table is queried.  Since jobs are still running in the background, IS_COMPLETE is still set to No, and the TARGETS_COMPLETED does not equal the TARGETS_EXPECTED yet.  You'll probably want to </a:t>
+            </a:r>
             <a:r>
               <a:rPr lang="en-US" baseline="0" dirty="0" smtClean="0"/>
-              <a:t>3. The current results can be queried in M5_RESULTS.</a:t>
-            </a:r>
+              <a:t>query this </a:t>
+            </a:r>
+            <a:r>
+              <a:rPr lang="en-US" baseline="0" dirty="0" smtClean="0"/>
+              <a:t>view a few times </a:t>
+            </a:r>
+            <a:r>
+              <a:rPr lang="en-US" baseline="0" dirty="0" smtClean="0"/>
+              <a:t>to watch the progress of the background jobs.  </a:t>
+            </a:r>
+            <a:r>
+              <a:rPr lang="en-US" baseline="0" dirty="0" smtClean="0"/>
+              <a:t>(Not shown on the screenshot are some other columns like TARGETS_WITH_ERRORS, NUM_ROWS, CODE, and TARGETS.)</a:t>
+            </a:r>
+          </a:p>
+          <a:p>
+            <a:r>
+              <a:rPr lang="en-US" baseline="0" dirty="0" smtClean="0"/>
+              <a:t>3. The current results can be queried in M5_RESULTS</a:t>
+            </a:r>
+            <a:r>
+              <a:rPr lang="en-US" baseline="0" dirty="0" smtClean="0"/>
+              <a:t>.  It returns the same columns as the input query, as well as a column for the DATABASE_NAME.</a:t>
+            </a:r>
+            <a:endParaRPr lang="en-US" baseline="0" dirty="0" smtClean="0"/>
           </a:p>
           <a:p>
             <a:r>
@@ -1167,9 +1200,309 @@
           <a:p>
             <a:r>
               <a:rPr lang="en-US" baseline="0" dirty="0" smtClean="0"/>
-              <a:t>(The screenshot does not show all the columns and values because it's hard to fit them on a screen.  The example uses SQL*Plus for its simple text formatting, but in practice you will probably want to use an IDE like PL/SQL Developer, Toad, Oracle SQL Developer, etc.  The exact same code will run on any IDE.)</a:t>
-            </a:r>
-            <a:endParaRPr lang="en-US" dirty="0"/>
+              <a:t>(The screenshot does not show all the columns and values because it's hard to fit them on a screen.  The example uses SQL*Plus for its simple text formatting, but in practice you will probably want to use an IDE like PL/SQL Developer, Toad, Oracle SQL Developer, etc.  The exact same code will run on any IDE</a:t>
+            </a:r>
+            <a:r>
+              <a:rPr lang="en-US" baseline="0" dirty="0" smtClean="0"/>
+              <a:t>.)</a:t>
+            </a:r>
+          </a:p>
+          <a:p>
+            <a:endParaRPr lang="en-US" baseline="0" dirty="0" smtClean="0"/>
+          </a:p>
+          <a:p>
+            <a:r>
+              <a:rPr lang="en-US" baseline="0" dirty="0" smtClean="0"/>
+              <a:t>If you want to reproduce this example yourself, here's the full code and SQL*Plus commands to format results:</a:t>
+            </a:r>
+          </a:p>
+          <a:p>
+            <a:endParaRPr lang="en-US" baseline="0" dirty="0" smtClean="0"/>
+          </a:p>
+          <a:p>
+            <a:r>
+              <a:rPr lang="en-US" sz="1000" i="1" baseline="0" dirty="0" smtClean="0">
+                <a:latin typeface="Courier New" panose="02070309020205020404" pitchFamily="49" charset="0"/>
+                <a:cs typeface="Courier New" panose="02070309020205020404" pitchFamily="49" charset="0"/>
+              </a:rPr>
+              <a:t>set </a:t>
+            </a:r>
+            <a:r>
+              <a:rPr lang="en-US" sz="1000" i="1" baseline="0" dirty="0" err="1" smtClean="0">
+                <a:latin typeface="Courier New" panose="02070309020205020404" pitchFamily="49" charset="0"/>
+                <a:cs typeface="Courier New" panose="02070309020205020404" pitchFamily="49" charset="0"/>
+              </a:rPr>
+              <a:t>sqlprompt</a:t>
+            </a:r>
+            <a:r>
+              <a:rPr lang="en-US" sz="1000" i="1" baseline="0" dirty="0" smtClean="0">
+                <a:latin typeface="Courier New" panose="02070309020205020404" pitchFamily="49" charset="0"/>
+                <a:cs typeface="Courier New" panose="02070309020205020404" pitchFamily="49" charset="0"/>
+              </a:rPr>
+              <a:t> "&gt; "</a:t>
+            </a:r>
+          </a:p>
+          <a:p>
+            <a:r>
+              <a:rPr lang="en-US" sz="1000" i="1" baseline="0" dirty="0" smtClean="0">
+                <a:latin typeface="Courier New" panose="02070309020205020404" pitchFamily="49" charset="0"/>
+                <a:cs typeface="Courier New" panose="02070309020205020404" pitchFamily="49" charset="0"/>
+              </a:rPr>
+              <a:t>column </a:t>
+            </a:r>
+            <a:r>
+              <a:rPr lang="en-US" sz="1000" i="1" baseline="0" dirty="0" err="1" smtClean="0">
+                <a:latin typeface="Courier New" panose="02070309020205020404" pitchFamily="49" charset="0"/>
+                <a:cs typeface="Courier New" panose="02070309020205020404" pitchFamily="49" charset="0"/>
+              </a:rPr>
+              <a:t>db_link_name</a:t>
+            </a:r>
+            <a:r>
+              <a:rPr lang="en-US" sz="1000" i="1" baseline="0" dirty="0" smtClean="0">
+                <a:latin typeface="Courier New" panose="02070309020205020404" pitchFamily="49" charset="0"/>
+                <a:cs typeface="Courier New" panose="02070309020205020404" pitchFamily="49" charset="0"/>
+              </a:rPr>
+              <a:t> format a12</a:t>
+            </a:r>
+          </a:p>
+          <a:p>
+            <a:r>
+              <a:rPr lang="en-US" sz="1000" i="1" baseline="0" dirty="0" smtClean="0">
+                <a:latin typeface="Courier New" panose="02070309020205020404" pitchFamily="49" charset="0"/>
+                <a:cs typeface="Courier New" panose="02070309020205020404" pitchFamily="49" charset="0"/>
+              </a:rPr>
+              <a:t>column </a:t>
+            </a:r>
+            <a:r>
+              <a:rPr lang="en-US" sz="1000" i="1" baseline="0" dirty="0" err="1" smtClean="0">
+                <a:latin typeface="Courier New" panose="02070309020205020404" pitchFamily="49" charset="0"/>
+                <a:cs typeface="Courier New" panose="02070309020205020404" pitchFamily="49" charset="0"/>
+              </a:rPr>
+              <a:t>database_name</a:t>
+            </a:r>
+            <a:r>
+              <a:rPr lang="en-US" sz="1000" i="1" baseline="0" dirty="0" smtClean="0">
+                <a:latin typeface="Courier New" panose="02070309020205020404" pitchFamily="49" charset="0"/>
+                <a:cs typeface="Courier New" panose="02070309020205020404" pitchFamily="49" charset="0"/>
+              </a:rPr>
+              <a:t> format a13</a:t>
+            </a:r>
+          </a:p>
+          <a:p>
+            <a:r>
+              <a:rPr lang="en-US" sz="1000" i="1" baseline="0" dirty="0" smtClean="0">
+                <a:latin typeface="Courier New" panose="02070309020205020404" pitchFamily="49" charset="0"/>
+                <a:cs typeface="Courier New" panose="02070309020205020404" pitchFamily="49" charset="0"/>
+              </a:rPr>
+              <a:t>column </a:t>
+            </a:r>
+            <a:r>
+              <a:rPr lang="en-US" sz="1000" i="1" baseline="0" dirty="0" err="1" smtClean="0">
+                <a:latin typeface="Courier New" panose="02070309020205020404" pitchFamily="49" charset="0"/>
+                <a:cs typeface="Courier New" panose="02070309020205020404" pitchFamily="49" charset="0"/>
+              </a:rPr>
+              <a:t>error_stack_and_backtrace</a:t>
+            </a:r>
+            <a:r>
+              <a:rPr lang="en-US" sz="1000" i="1" baseline="0" dirty="0" smtClean="0">
+                <a:latin typeface="Courier New" panose="02070309020205020404" pitchFamily="49" charset="0"/>
+                <a:cs typeface="Courier New" panose="02070309020205020404" pitchFamily="49" charset="0"/>
+              </a:rPr>
+              <a:t> format a100</a:t>
+            </a:r>
+          </a:p>
+          <a:p>
+            <a:r>
+              <a:rPr lang="en-US" sz="1000" i="1" baseline="0" dirty="0" smtClean="0">
+                <a:latin typeface="Courier New" panose="02070309020205020404" pitchFamily="49" charset="0"/>
+                <a:cs typeface="Courier New" panose="02070309020205020404" pitchFamily="49" charset="0"/>
+              </a:rPr>
+              <a:t>column username format a11</a:t>
+            </a:r>
+          </a:p>
+          <a:p>
+            <a:r>
+              <a:rPr lang="en-US" sz="1000" i="1" baseline="0" dirty="0" smtClean="0">
+                <a:latin typeface="Courier New" panose="02070309020205020404" pitchFamily="49" charset="0"/>
+                <a:cs typeface="Courier New" panose="02070309020205020404" pitchFamily="49" charset="0"/>
+              </a:rPr>
+              <a:t>column </a:t>
+            </a:r>
+            <a:r>
+              <a:rPr lang="en-US" sz="1000" i="1" baseline="0" dirty="0" err="1" smtClean="0">
+                <a:latin typeface="Courier New" panose="02070309020205020404" pitchFamily="49" charset="0"/>
+                <a:cs typeface="Courier New" panose="02070309020205020404" pitchFamily="49" charset="0"/>
+              </a:rPr>
+              <a:t>date_started</a:t>
+            </a:r>
+            <a:r>
+              <a:rPr lang="en-US" sz="1000" i="1" baseline="0" dirty="0" smtClean="0">
+                <a:latin typeface="Courier New" panose="02070309020205020404" pitchFamily="49" charset="0"/>
+                <a:cs typeface="Courier New" panose="02070309020205020404" pitchFamily="49" charset="0"/>
+              </a:rPr>
+              <a:t> format a12</a:t>
+            </a:r>
+          </a:p>
+          <a:p>
+            <a:r>
+              <a:rPr lang="en-US" sz="1000" i="1" baseline="0" dirty="0" smtClean="0">
+                <a:latin typeface="Courier New" panose="02070309020205020404" pitchFamily="49" charset="0"/>
+                <a:cs typeface="Courier New" panose="02070309020205020404" pitchFamily="49" charset="0"/>
+              </a:rPr>
+              <a:t>column </a:t>
+            </a:r>
+            <a:r>
+              <a:rPr lang="en-US" sz="1000" i="1" baseline="0" dirty="0" err="1" smtClean="0">
+                <a:latin typeface="Courier New" panose="02070309020205020404" pitchFamily="49" charset="0"/>
+                <a:cs typeface="Courier New" panose="02070309020205020404" pitchFamily="49" charset="0"/>
+              </a:rPr>
+              <a:t>date_updated</a:t>
+            </a:r>
+            <a:r>
+              <a:rPr lang="en-US" sz="1000" i="1" baseline="0" dirty="0" smtClean="0">
+                <a:latin typeface="Courier New" panose="02070309020205020404" pitchFamily="49" charset="0"/>
+                <a:cs typeface="Courier New" panose="02070309020205020404" pitchFamily="49" charset="0"/>
+              </a:rPr>
+              <a:t> format a12</a:t>
+            </a:r>
+          </a:p>
+          <a:p>
+            <a:r>
+              <a:rPr lang="en-US" sz="1000" i="1" baseline="0" dirty="0" smtClean="0">
+                <a:latin typeface="Courier New" panose="02070309020205020404" pitchFamily="49" charset="0"/>
+                <a:cs typeface="Courier New" panose="02070309020205020404" pitchFamily="49" charset="0"/>
+              </a:rPr>
+              <a:t>column </a:t>
+            </a:r>
+            <a:r>
+              <a:rPr lang="en-US" sz="1000" i="1" baseline="0" dirty="0" err="1" smtClean="0">
+                <a:latin typeface="Courier New" panose="02070309020205020404" pitchFamily="49" charset="0"/>
+                <a:cs typeface="Courier New" panose="02070309020205020404" pitchFamily="49" charset="0"/>
+              </a:rPr>
+              <a:t>is_complete</a:t>
+            </a:r>
+            <a:r>
+              <a:rPr lang="en-US" sz="1000" i="1" baseline="0" dirty="0" smtClean="0">
+                <a:latin typeface="Courier New" panose="02070309020205020404" pitchFamily="49" charset="0"/>
+                <a:cs typeface="Courier New" panose="02070309020205020404" pitchFamily="49" charset="0"/>
+              </a:rPr>
+              <a:t> format a11</a:t>
+            </a:r>
+          </a:p>
+          <a:p>
+            <a:r>
+              <a:rPr lang="en-US" sz="1000" i="1" baseline="0" dirty="0" smtClean="0">
+                <a:latin typeface="Courier New" panose="02070309020205020404" pitchFamily="49" charset="0"/>
+                <a:cs typeface="Courier New" panose="02070309020205020404" pitchFamily="49" charset="0"/>
+              </a:rPr>
+              <a:t>column dummy format a5</a:t>
+            </a:r>
+          </a:p>
+          <a:p>
+            <a:r>
+              <a:rPr lang="en-US" sz="1000" i="1" baseline="0" dirty="0" smtClean="0">
+                <a:latin typeface="Courier New" panose="02070309020205020404" pitchFamily="49" charset="0"/>
+                <a:cs typeface="Courier New" panose="02070309020205020404" pitchFamily="49" charset="0"/>
+              </a:rPr>
+              <a:t>set </a:t>
+            </a:r>
+            <a:r>
+              <a:rPr lang="en-US" sz="1000" i="1" baseline="0" dirty="0" err="1" smtClean="0">
+                <a:latin typeface="Courier New" panose="02070309020205020404" pitchFamily="49" charset="0"/>
+                <a:cs typeface="Courier New" panose="02070309020205020404" pitchFamily="49" charset="0"/>
+              </a:rPr>
+              <a:t>serveroutput</a:t>
+            </a:r>
+            <a:r>
+              <a:rPr lang="en-US" sz="1000" i="1" baseline="0" dirty="0" smtClean="0">
+                <a:latin typeface="Courier New" panose="02070309020205020404" pitchFamily="49" charset="0"/>
+                <a:cs typeface="Courier New" panose="02070309020205020404" pitchFamily="49" charset="0"/>
+              </a:rPr>
+              <a:t> off</a:t>
+            </a:r>
+          </a:p>
+          <a:p>
+            <a:endParaRPr lang="en-US" sz="1000" i="1" baseline="0" dirty="0" smtClean="0">
+              <a:latin typeface="Courier New" panose="02070309020205020404" pitchFamily="49" charset="0"/>
+              <a:cs typeface="Courier New" panose="02070309020205020404" pitchFamily="49" charset="0"/>
+            </a:endParaRPr>
+          </a:p>
+          <a:p>
+            <a:r>
+              <a:rPr lang="en-US" sz="1000" i="1" baseline="0" dirty="0" smtClean="0">
+                <a:latin typeface="Courier New" panose="02070309020205020404" pitchFamily="49" charset="0"/>
+                <a:cs typeface="Courier New" panose="02070309020205020404" pitchFamily="49" charset="0"/>
+              </a:rPr>
+              <a:t>begin</a:t>
+            </a:r>
+          </a:p>
+          <a:p>
+            <a:r>
+              <a:rPr lang="en-US" sz="1000" i="1" baseline="0" dirty="0" smtClean="0">
+                <a:latin typeface="Courier New" panose="02070309020205020404" pitchFamily="49" charset="0"/>
+                <a:cs typeface="Courier New" panose="02070309020205020404" pitchFamily="49" charset="0"/>
+              </a:rPr>
+              <a:t>  m5_proc('select * from dual');</a:t>
+            </a:r>
+          </a:p>
+          <a:p>
+            <a:r>
+              <a:rPr lang="en-US" sz="1000" i="1" baseline="0" dirty="0" smtClean="0">
+                <a:latin typeface="Courier New" panose="02070309020205020404" pitchFamily="49" charset="0"/>
+                <a:cs typeface="Courier New" panose="02070309020205020404" pitchFamily="49" charset="0"/>
+              </a:rPr>
+              <a:t>end;</a:t>
+            </a:r>
+          </a:p>
+          <a:p>
+            <a:r>
+              <a:rPr lang="en-US" sz="1000" i="1" baseline="0" dirty="0" smtClean="0">
+                <a:latin typeface="Courier New" panose="02070309020205020404" pitchFamily="49" charset="0"/>
+                <a:cs typeface="Courier New" panose="02070309020205020404" pitchFamily="49" charset="0"/>
+              </a:rPr>
+              <a:t>/</a:t>
+            </a:r>
+          </a:p>
+          <a:p>
+            <a:r>
+              <a:rPr lang="en-US" sz="1000" i="1" baseline="0" dirty="0" smtClean="0">
+                <a:latin typeface="Courier New" panose="02070309020205020404" pitchFamily="49" charset="0"/>
+                <a:cs typeface="Courier New" panose="02070309020205020404" pitchFamily="49" charset="0"/>
+              </a:rPr>
+              <a:t>select * from m5_metadata;</a:t>
+            </a:r>
+          </a:p>
+          <a:p>
+            <a:r>
+              <a:rPr lang="en-US" sz="1000" i="1" baseline="0" dirty="0" smtClean="0">
+                <a:latin typeface="Courier New" panose="02070309020205020404" pitchFamily="49" charset="0"/>
+                <a:cs typeface="Courier New" panose="02070309020205020404" pitchFamily="49" charset="0"/>
+              </a:rPr>
+              <a:t>select * from m5_results where </a:t>
+            </a:r>
+            <a:r>
+              <a:rPr lang="en-US" sz="1000" i="1" baseline="0" dirty="0" err="1" smtClean="0">
+                <a:latin typeface="Courier New" panose="02070309020205020404" pitchFamily="49" charset="0"/>
+                <a:cs typeface="Courier New" panose="02070309020205020404" pitchFamily="49" charset="0"/>
+              </a:rPr>
+              <a:t>rownum</a:t>
+            </a:r>
+            <a:r>
+              <a:rPr lang="en-US" sz="1000" i="1" baseline="0" dirty="0" smtClean="0">
+                <a:latin typeface="Courier New" panose="02070309020205020404" pitchFamily="49" charset="0"/>
+                <a:cs typeface="Courier New" panose="02070309020205020404" pitchFamily="49" charset="0"/>
+              </a:rPr>
+              <a:t> &lt;= 3;</a:t>
+            </a:r>
+          </a:p>
+          <a:p>
+            <a:r>
+              <a:rPr lang="en-US" sz="1000" i="1" baseline="0" dirty="0" smtClean="0">
+                <a:latin typeface="Courier New" panose="02070309020205020404" pitchFamily="49" charset="0"/>
+                <a:cs typeface="Courier New" panose="02070309020205020404" pitchFamily="49" charset="0"/>
+              </a:rPr>
+              <a:t>select * from m5_errors;</a:t>
+            </a:r>
           </a:p>
         </p:txBody>
       </p:sp>
@@ -1268,7 +1601,15 @@
             </a:r>
             <a:r>
               <a:rPr lang="en-US" baseline="0" dirty="0" smtClean="0"/>
-              <a:t> can help identify data files created in the wrong directory.  For example, we use ASM and have tens of thousands of data files.  Occasionally when someone forgets to use the plug sign the data file gets created on a local filesystem instead of ASM.  This query makes it easy to find those mistakes.</a:t>
+              <a:t> can help identify data files created in the wrong directory.  For example, we use ASM and have tens of thousands of data files.  Occasionally when someone forgets to use the </a:t>
+            </a:r>
+            <a:r>
+              <a:rPr lang="en-US" baseline="0" dirty="0" smtClean="0"/>
+              <a:t>plus </a:t>
+            </a:r>
+            <a:r>
+              <a:rPr lang="en-US" baseline="0" dirty="0" smtClean="0"/>
+              <a:t>sign the data file gets created on a local filesystem instead of ASM.  This query makes it easy to find those mistakes.</a:t>
             </a:r>
           </a:p>
           <a:p>
@@ -1282,7 +1623,11 @@
             </a:r>
             <a:r>
               <a:rPr lang="en-US" baseline="0" dirty="0" smtClean="0"/>
-              <a:t>.  Our /</a:t>
+              <a:t>.  </a:t>
+            </a:r>
+            <a:r>
+              <a:rPr lang="en-US" baseline="0" dirty="0" smtClean="0"/>
+              <a:t>Some /</a:t>
             </a:r>
             <a:r>
               <a:rPr lang="en-US" baseline="0" dirty="0" err="1" smtClean="0"/>
@@ -1290,7 +1635,11 @@
             </a:r>
             <a:r>
               <a:rPr lang="en-US" baseline="0" dirty="0" smtClean="0"/>
-              <a:t> filesystem is stored in memory so if someone stores a huge file in /</a:t>
+              <a:t> filesystems are </a:t>
+            </a:r>
+            <a:r>
+              <a:rPr lang="en-US" baseline="0" dirty="0" smtClean="0"/>
+              <a:t>stored in memory so if someone stores a huge file in /</a:t>
             </a:r>
             <a:r>
               <a:rPr lang="en-US" baseline="0" dirty="0" err="1" smtClean="0"/>
@@ -1304,7 +1653,15 @@
           <a:p>
             <a:r>
               <a:rPr lang="en-US" baseline="0" dirty="0" smtClean="0"/>
-              <a:t>3. Contractors often forget that infrastructure DBAs don't know where their schemas are located.  Instead of asking them, "what databases are you talking about", we can very easily look up the information ourselves in the global data dictionary.  This saves us time and makes us look better.</a:t>
+              <a:t>3. </a:t>
+            </a:r>
+            <a:r>
+              <a:rPr lang="en-US" baseline="0" dirty="0" smtClean="0"/>
+              <a:t>Users and consultants often </a:t>
+            </a:r>
+            <a:r>
+              <a:rPr lang="en-US" baseline="0" dirty="0" smtClean="0"/>
+              <a:t>forget that infrastructure DBAs don't know where their schemas are located.  Instead of asking them, "what databases are you talking about", we can very easily look up the information ourselves in the global data dictionary.  This saves us time and makes us look better.</a:t>
             </a:r>
           </a:p>
           <a:p>
@@ -1657,10 +2014,24 @@
           <a:p>
             <a:r>
               <a:rPr lang="en-US" baseline="0" dirty="0" smtClean="0"/>
-              <a:t>Using that data and forecasts, an email is sent every day.  The top servers are not the ones with the highest percent of storage.  The top servers are the ones forecasted to run out of space first.  The forecasts are generated as HTML requests to Google Charts, which returns static PNG images that can be rendered in an email client.</a:t>
-            </a:r>
-          </a:p>
-          <a:p>
+              <a:t>An email is generated using those data and forecasts.  The </a:t>
+            </a:r>
+            <a:r>
+              <a:rPr lang="en-US" baseline="0" dirty="0" smtClean="0"/>
+              <a:t>top servers are not the ones with the highest percent of storage.  The top servers are the ones forecasted to run out of space first.  The forecasts are generated as HTML </a:t>
+            </a:r>
+            <a:r>
+              <a:rPr lang="en-US" baseline="0" dirty="0" smtClean="0"/>
+              <a:t>with links to Google </a:t>
+            </a:r>
+            <a:r>
+              <a:rPr lang="en-US" baseline="0" dirty="0" smtClean="0"/>
+              <a:t>Charts, which returns static PNG images that can be rendered in an email client</a:t>
+            </a:r>
+            <a:r>
+              <a:rPr lang="en-US" baseline="0" dirty="0" smtClean="0"/>
+              <a:t>.</a:t>
+            </a:r>
             <a:endParaRPr lang="en-US" baseline="0" dirty="0" smtClean="0"/>
           </a:p>
           <a:p>
@@ -1799,7 +2170,19 @@
                 <a:latin typeface="Courier" pitchFamily="49" charset="0"/>
                 <a:cs typeface="Courier New" panose="02070309020205020404" pitchFamily="49" charset="0"/>
               </a:rPr>
-              <a:t> group by owner</a:t>
+              <a:t> group by </a:t>
+            </a:r>
+            <a:r>
+              <a:rPr lang="en-US" i="1" baseline="0" dirty="0" smtClean="0">
+                <a:solidFill>
+                  <a:schemeClr val="bg1">
+                    <a:lumMod val="50000"/>
+                  </a:schemeClr>
+                </a:solidFill>
+                <a:latin typeface="Courier" pitchFamily="49" charset="0"/>
+                <a:cs typeface="Courier New" panose="02070309020205020404" pitchFamily="49" charset="0"/>
+              </a:rPr>
+              <a:t>owner;</a:t>
             </a:r>
             <a:endParaRPr lang="en-US" baseline="0" dirty="0" smtClean="0"/>
           </a:p>
@@ -1829,7 +2212,15 @@
             </a:r>
             <a:r>
               <a:rPr lang="en-US" baseline="0" dirty="0" smtClean="0"/>
-              <a:t> is multiple levels deep, and you can click on each rectangle to zoom in.  The grouping order is configurable, so you can create different </a:t>
+              <a:t> is multiple levels deep, and you can click on each </a:t>
+            </a:r>
+            <a:r>
+              <a:rPr lang="en-US" baseline="0" dirty="0" smtClean="0"/>
+              <a:t>box to </a:t>
+            </a:r>
+            <a:r>
+              <a:rPr lang="en-US" baseline="0" dirty="0" smtClean="0"/>
+              <a:t>zoom in.  The grouping order is configurable, so you can create different </a:t>
             </a:r>
             <a:r>
               <a:rPr lang="en-US" baseline="0" dirty="0" err="1" smtClean="0"/>
@@ -1837,7 +2228,15 @@
             </a:r>
             <a:r>
               <a:rPr lang="en-US" baseline="0" dirty="0" smtClean="0"/>
-              <a:t> with different groupings.  For example, you may want to see the largest database first, then grouped by the largest owner.  Or maybe you want to see the largest owner, then grouped by database.</a:t>
+              <a:t> with different groupings.  For example, you may want to see the largest database first, then grouped by the largest owner.  Or </a:t>
+            </a:r>
+            <a:r>
+              <a:rPr lang="en-US" baseline="0" dirty="0" smtClean="0"/>
+              <a:t>you cam see </a:t>
+            </a:r>
+            <a:r>
+              <a:rPr lang="en-US" baseline="0" dirty="0" smtClean="0"/>
+              <a:t>the largest owner, then grouped by database.</a:t>
             </a:r>
             <a:endParaRPr lang="en-US" dirty="0"/>
           </a:p>
@@ -1946,7 +2345,15 @@
             </a:pPr>
             <a:r>
               <a:rPr lang="en-US" baseline="0" dirty="0" smtClean="0"/>
-              <a:t>2. Database links are what ties everything together.  Database links have gotten a bad reputation.  Yes, many people make horrible mistakes with them, but when used right it makes inter-database communication incredibly simple.</a:t>
+              <a:t>2. Database links </a:t>
+            </a:r>
+            <a:r>
+              <a:rPr lang="en-US" baseline="0" dirty="0" smtClean="0"/>
+              <a:t>tie </a:t>
+            </a:r>
+            <a:r>
+              <a:rPr lang="en-US" baseline="0" dirty="0" smtClean="0"/>
+              <a:t>everything together.  Database links have gotten a bad reputation.  Yes, many people make horrible mistakes with them, but when used right it makes inter-database communication incredibly simple.</a:t>
             </a:r>
           </a:p>
           <a:p>
@@ -1963,8 +2370,13 @@
             </a:r>
             <a:r>
               <a:rPr lang="en-US" baseline="0" dirty="0" smtClean="0"/>
-              <a:t> is a requirement to build a robust system that can handle any code.</a:t>
-            </a:r>
+              <a:t> is a requirement to build a robust system that can handle any </a:t>
+            </a:r>
+            <a:r>
+              <a:rPr lang="en-US" baseline="0" dirty="0" smtClean="0"/>
+              <a:t>code you throw at it.</a:t>
+            </a:r>
+            <a:endParaRPr lang="en-US" baseline="0" dirty="0" smtClean="0"/>
           </a:p>
           <a:p>
             <a:pPr marL="0" indent="0">
@@ -2474,7 +2886,15 @@
           <a:p>
             <a:r>
               <a:rPr lang="en-US" dirty="0" smtClean="0"/>
-              <a:t>5. You'll be surprised how often a single query today can save your organization hours of work tomorrow.</a:t>
+              <a:t>5. You'll be </a:t>
+            </a:r>
+            <a:r>
+              <a:rPr lang="en-US" dirty="0" smtClean="0"/>
+              <a:t>amazed how </a:t>
+            </a:r>
+            <a:r>
+              <a:rPr lang="en-US" dirty="0" smtClean="0"/>
+              <a:t>often a single query today can save your organization hours of work tomorrow.</a:t>
             </a:r>
             <a:endParaRPr lang="en-US" dirty="0"/>
           </a:p>
@@ -2656,7 +3076,23 @@
           <a:p>
             <a:r>
               <a:rPr lang="en-US" dirty="0" smtClean="0"/>
-              <a:t>1. DBAs spend too much time fixing the same problems again and again on different databases.  When you find a rare problem they won't spend the time</a:t>
+              <a:t>1. DBAs spend too much time fixing the same problems again and again on different databases.  When </a:t>
+            </a:r>
+            <a:r>
+              <a:rPr lang="en-US" dirty="0" smtClean="0"/>
+              <a:t>you find </a:t>
+            </a:r>
+            <a:r>
+              <a:rPr lang="en-US" dirty="0" smtClean="0"/>
+              <a:t>a rare problem </a:t>
+            </a:r>
+            <a:r>
+              <a:rPr lang="en-US" dirty="0" smtClean="0"/>
+              <a:t>you won't always spend </a:t>
+            </a:r>
+            <a:r>
+              <a:rPr lang="en-US" dirty="0" smtClean="0"/>
+              <a:t>the time</a:t>
             </a:r>
             <a:r>
               <a:rPr lang="en-US" baseline="0" dirty="0" smtClean="0"/>
@@ -2856,7 +3292,11 @@
           <a:p>
             <a:r>
               <a:rPr lang="en-US" dirty="0" smtClean="0"/>
-              <a:t>5. Most importantly, none of</a:t>
+              <a:t>6. </a:t>
+            </a:r>
+            <a:r>
+              <a:rPr lang="en-US" dirty="0" smtClean="0"/>
+              <a:t>Most importantly, none of</a:t>
             </a:r>
             <a:r>
               <a:rPr lang="en-US" baseline="0" dirty="0" smtClean="0"/>
@@ -3133,7 +3573,31 @@
           <a:p>
             <a:r>
               <a:rPr lang="en-US" dirty="0" smtClean="0"/>
-              <a:t>2. Method5 has been used in production for 3 years to help manage the largest healthcare data center in the world.</a:t>
+              <a:t>2. Method5 has been used in production </a:t>
+            </a:r>
+            <a:r>
+              <a:rPr lang="en-US" dirty="0" smtClean="0"/>
+              <a:t>since</a:t>
+            </a:r>
+            <a:r>
+              <a:rPr lang="en-US" baseline="0" dirty="0" smtClean="0"/>
+              <a:t> 2014 and helps manage one of </a:t>
+            </a:r>
+            <a:r>
+              <a:rPr lang="en-US" dirty="0" smtClean="0"/>
+              <a:t>the </a:t>
+            </a:r>
+            <a:r>
+              <a:rPr lang="en-US" dirty="0" smtClean="0"/>
+              <a:t>largest healthcare data </a:t>
+            </a:r>
+            <a:r>
+              <a:rPr lang="en-US" dirty="0" smtClean="0"/>
+              <a:t>centers </a:t>
+            </a:r>
+            <a:r>
+              <a:rPr lang="en-US" dirty="0" smtClean="0"/>
+              <a:t>in the world.</a:t>
             </a:r>
           </a:p>
           <a:p>
@@ -3153,8 +3617,17 @@
           <a:p>
             <a:r>
               <a:rPr lang="en-US" dirty="0" smtClean="0"/>
-              <a:t>4. It's ran over 10 million queries internally.  It contains 1800 automated tests.</a:t>
-            </a:r>
+              <a:t>4. It's ran over 10 million queries </a:t>
+            </a:r>
+            <a:r>
+              <a:rPr lang="en-US" dirty="0" smtClean="0"/>
+              <a:t>internally, contains over 1800 automated tests,</a:t>
+            </a:r>
+            <a:r>
+              <a:rPr lang="en-US" baseline="0" dirty="0" smtClean="0"/>
+              <a:t> and is open source.</a:t>
+            </a:r>
+            <a:endParaRPr lang="en-US" dirty="0" smtClean="0"/>
           </a:p>
           <a:p>
             <a:r>
@@ -3269,7 +3742,15 @@
             </a:r>
             <a:r>
               <a:rPr lang="en-US" b="0" baseline="0" dirty="0" smtClean="0"/>
-              <a:t> can be run as either a function or a procedure.  Both of them let you specify </a:t>
+              <a:t> can be run as either a function or a procedure.  </a:t>
+            </a:r>
+            <a:r>
+              <a:rPr lang="en-US" b="0" baseline="0" dirty="0" smtClean="0"/>
+              <a:t>They let </a:t>
+            </a:r>
+            <a:r>
+              <a:rPr lang="en-US" b="0" baseline="0" dirty="0" smtClean="0"/>
+              <a:t>you specify </a:t>
             </a:r>
             <a:r>
               <a:rPr lang="en-US" b="1" baseline="0" dirty="0" smtClean="0"/>
@@ -3285,7 +3766,15 @@
             </a:r>
             <a:r>
               <a:rPr lang="en-US" b="0" baseline="0" dirty="0" smtClean="0"/>
-              <a:t> to run it, and </a:t>
+              <a:t> to </a:t>
+            </a:r>
+            <a:r>
+              <a:rPr lang="en-US" b="0" baseline="0" dirty="0" smtClean="0"/>
+              <a:t>run, </a:t>
+            </a:r>
+            <a:r>
+              <a:rPr lang="en-US" b="0" baseline="0" dirty="0" smtClean="0"/>
+              <a:t>and </a:t>
             </a:r>
             <a:r>
               <a:rPr lang="en-US" b="1" baseline="0" dirty="0" smtClean="0"/>
@@ -3293,19 +3782,39 @@
             </a:r>
             <a:r>
               <a:rPr lang="en-US" b="0" baseline="0" dirty="0" smtClean="0"/>
-              <a:t> to run</a:t>
+              <a:t> to </a:t>
+            </a:r>
+            <a:r>
+              <a:rPr lang="en-US" b="0" baseline="0" dirty="0" smtClean="0"/>
+              <a:t>run</a:t>
             </a:r>
             <a:r>
               <a:rPr lang="en-US" b="0" dirty="0" smtClean="0"/>
-              <a:t> it.</a:t>
+              <a:t>.</a:t>
             </a:r>
             <a:r>
               <a:rPr lang="en-US" b="0" baseline="0" dirty="0" smtClean="0"/>
-              <a:t>  The function returns results immediately to the screen.  The procedure </a:t>
-            </a:r>
-            <a:r>
-              <a:rPr lang="en-US" dirty="0" smtClean="0"/>
-              <a:t>only saves the results in background tables, and it gives you more control over how the commands are run.</a:t>
+              <a:t>  </a:t>
+            </a:r>
+            <a:r>
+              <a:rPr lang="en-US" b="0" baseline="0" dirty="0" smtClean="0"/>
+              <a:t>The function returns results </a:t>
+            </a:r>
+            <a:r>
+              <a:rPr lang="en-US" b="0" baseline="0" dirty="0" smtClean="0"/>
+              <a:t>immediately.  </a:t>
+            </a:r>
+            <a:r>
+              <a:rPr lang="en-US" b="0" baseline="0" dirty="0" smtClean="0"/>
+              <a:t>The procedure </a:t>
+            </a:r>
+            <a:r>
+              <a:rPr lang="en-US" dirty="0" smtClean="0"/>
+              <a:t>saves </a:t>
+            </a:r>
+            <a:r>
+              <a:rPr lang="en-US" dirty="0" smtClean="0"/>
+              <a:t>the results in background tables, and it gives you more control over how the commands are run.</a:t>
             </a:r>
             <a:endParaRPr lang="en-US" b="0" dirty="0" smtClean="0"/>
           </a:p>
@@ -3315,11 +3824,35 @@
           <a:p>
             <a:r>
               <a:rPr lang="en-US" dirty="0" smtClean="0"/>
-              <a:t>Running as a function is simple and neat,</a:t>
+              <a:t>Running as a function </a:t>
+            </a:r>
+            <a:r>
+              <a:rPr lang="en-US" smtClean="0"/>
+              <a:t>is </a:t>
+            </a:r>
+            <a:r>
+              <a:rPr lang="en-US" smtClean="0"/>
+              <a:t>simple and neat,</a:t>
+            </a:r>
+            <a:r>
+              <a:rPr lang="en-US" baseline="0" smtClean="0"/>
+              <a:t> </a:t>
             </a:r>
             <a:r>
               <a:rPr lang="en-US" baseline="0" dirty="0" smtClean="0"/>
-              <a:t> but in practice advanced users will normally want to run things as a procedure.  Running as a procedure makes it asynchronous, which is good for large jobs you don't want to wait for.  It also makes it possible to schedule and chain tasks.</a:t>
+              <a:t>but in </a:t>
+            </a:r>
+            <a:r>
+              <a:rPr lang="en-US" baseline="0" smtClean="0"/>
+              <a:t>practice </a:t>
+            </a:r>
+            <a:r>
+              <a:rPr lang="en-US" baseline="0" smtClean="0"/>
+              <a:t>advanced users </a:t>
+            </a:r>
+            <a:r>
+              <a:rPr lang="en-US" baseline="0" dirty="0" smtClean="0"/>
+              <a:t>will normally want to run things as a procedure.  Running as a procedure makes it asynchronous, which is good for large jobs you don't want to wait for.  It also makes it possible to schedule and chain tasks.</a:t>
             </a:r>
             <a:endParaRPr lang="en-US" dirty="0"/>
           </a:p>
@@ -3706,7 +4239,7 @@
           <a:p>
             <a:fld id="{72057647-82FE-4F7C-83B4-53587791251A}" type="datetime1">
               <a:rPr lang="en-US" smtClean="0"/>
-              <a:t>10/28/2017</a:t>
+              <a:t>10/29/2017</a:t>
             </a:fld>
             <a:endParaRPr lang="en-US"/>
           </a:p>
@@ -3876,7 +4409,7 @@
           <a:p>
             <a:fld id="{8503FF21-708F-4C59-9505-D05A3791AC31}" type="datetime1">
               <a:rPr lang="en-US" smtClean="0"/>
-              <a:t>10/28/2017</a:t>
+              <a:t>10/29/2017</a:t>
             </a:fld>
             <a:endParaRPr lang="en-US"/>
           </a:p>
@@ -4056,7 +4589,7 @@
           <a:p>
             <a:fld id="{6EFC7DE3-7050-4999-ABCB-76E0E214913C}" type="datetime1">
               <a:rPr lang="en-US" smtClean="0"/>
-              <a:t>10/28/2017</a:t>
+              <a:t>10/29/2017</a:t>
             </a:fld>
             <a:endParaRPr lang="en-US"/>
           </a:p>
@@ -4226,7 +4759,7 @@
           <a:p>
             <a:fld id="{12698F6C-3B60-45A8-AA68-1C639B61BEFF}" type="datetime1">
               <a:rPr lang="en-US" smtClean="0"/>
-              <a:t>10/28/2017</a:t>
+              <a:t>10/29/2017</a:t>
             </a:fld>
             <a:endParaRPr lang="en-US" dirty="0"/>
           </a:p>
@@ -4509,7 +5042,7 @@
           <a:p>
             <a:fld id="{E05176C0-14DF-4768-8A16-43F22EF34937}" type="datetime1">
               <a:rPr lang="en-US" smtClean="0"/>
-              <a:t>10/28/2017</a:t>
+              <a:t>10/29/2017</a:t>
             </a:fld>
             <a:endParaRPr lang="en-US"/>
           </a:p>
@@ -4797,7 +5330,7 @@
           <a:p>
             <a:fld id="{EC27D113-D56C-4484-8E60-26B1BDDD2B7D}" type="datetime1">
               <a:rPr lang="en-US" smtClean="0"/>
-              <a:t>10/28/2017</a:t>
+              <a:t>10/29/2017</a:t>
             </a:fld>
             <a:endParaRPr lang="en-US"/>
           </a:p>
@@ -5219,7 +5752,7 @@
           <a:p>
             <a:fld id="{2346BE7D-CDCE-4B6B-92C3-A6060BB37F63}" type="datetime1">
               <a:rPr lang="en-US" smtClean="0"/>
-              <a:t>10/28/2017</a:t>
+              <a:t>10/29/2017</a:t>
             </a:fld>
             <a:endParaRPr lang="en-US"/>
           </a:p>
@@ -5337,7 +5870,7 @@
           <a:p>
             <a:fld id="{016112C5-3C0F-4913-A601-B7FE4F9C1F3A}" type="datetime1">
               <a:rPr lang="en-US" smtClean="0"/>
-              <a:t>10/28/2017</a:t>
+              <a:t>10/29/2017</a:t>
             </a:fld>
             <a:endParaRPr lang="en-US"/>
           </a:p>
@@ -5432,7 +5965,7 @@
           <a:p>
             <a:fld id="{8A5D4DBD-AFC0-4CD6-8B21-21C10C0D7EF6}" type="datetime1">
               <a:rPr lang="en-US" smtClean="0"/>
-              <a:t>10/28/2017</a:t>
+              <a:t>10/29/2017</a:t>
             </a:fld>
             <a:endParaRPr lang="en-US"/>
           </a:p>
@@ -5709,7 +6242,7 @@
           <a:p>
             <a:fld id="{3514C57E-D885-4B44-9FAF-8838A1BDE694}" type="datetime1">
               <a:rPr lang="en-US" smtClean="0"/>
-              <a:t>10/28/2017</a:t>
+              <a:t>10/29/2017</a:t>
             </a:fld>
             <a:endParaRPr lang="en-US"/>
           </a:p>
@@ -5962,7 +6495,7 @@
           <a:p>
             <a:fld id="{7BEDB21A-AE09-4B41-95A5-CA952A205099}" type="datetime1">
               <a:rPr lang="en-US" smtClean="0"/>
-              <a:t>10/28/2017</a:t>
+              <a:t>10/29/2017</a:t>
             </a:fld>
             <a:endParaRPr lang="en-US"/>
           </a:p>
@@ -6175,7 +6708,7 @@
           <a:p>
             <a:fld id="{2089B313-BB57-4BA5-B615-3D449DFED662}" type="datetime1">
               <a:rPr lang="en-US" smtClean="0"/>
-              <a:t>10/28/2017</a:t>
+              <a:t>10/29/2017</a:t>
             </a:fld>
             <a:endParaRPr lang="en-US" dirty="0"/>
           </a:p>
@@ -6617,7 +7150,7 @@
           <a:p>
             <a:fld id="{2E45DCD3-F6D5-47D1-A091-AE329ABC5543}" type="datetime1">
               <a:rPr lang="en-US" smtClean="0"/>
-              <a:t>10/28/2017</a:t>
+              <a:t>10/29/2017</a:t>
             </a:fld>
             <a:endParaRPr lang="en-US" dirty="0"/>
           </a:p>
@@ -6903,7 +7436,7 @@
           <a:p>
             <a:fld id="{73B3F948-1743-4F2D-B9D2-20F26DEE2D32}" type="datetime1">
               <a:rPr lang="en-US" smtClean="0"/>
-              <a:t>10/28/2017</a:t>
+              <a:t>10/29/2017</a:t>
             </a:fld>
             <a:endParaRPr lang="en-US"/>
           </a:p>
@@ -7014,11 +7547,11 @@
               <a:buAutoNum type="arabicPeriod"/>
             </a:pPr>
             <a:r>
-              <a:rPr lang="en-US" smtClean="0"/>
+              <a:rPr lang="en-US" dirty="0" smtClean="0"/>
               <a:t>Tables</a:t>
             </a:r>
             <a:r>
-              <a:rPr lang="en-US" smtClean="0">
+              <a:rPr lang="en-US" dirty="0" smtClean="0">
                 <a:solidFill>
                   <a:schemeClr val="bg1">
                     <a:lumMod val="50000"/>
@@ -7034,11 +7567,11 @@
               <a:buAutoNum type="arabicPeriod"/>
             </a:pPr>
             <a:r>
-              <a:rPr lang="en-US" smtClean="0"/>
+              <a:rPr lang="en-US" dirty="0" smtClean="0"/>
               <a:t>Views</a:t>
             </a:r>
             <a:r>
-              <a:rPr lang="en-US" smtClean="0">
+              <a:rPr lang="en-US" dirty="0" smtClean="0">
                 <a:solidFill>
                   <a:schemeClr val="bg1">
                     <a:lumMod val="50000"/>
@@ -7054,11 +7587,11 @@
               <a:buAutoNum type="arabicPeriod"/>
             </a:pPr>
             <a:r>
-              <a:rPr lang="en-US" smtClean="0"/>
+              <a:rPr lang="en-US" dirty="0" smtClean="0"/>
               <a:t>M5_ links</a:t>
             </a:r>
             <a:r>
-              <a:rPr lang="en-US" smtClean="0">
+              <a:rPr lang="en-US" dirty="0" smtClean="0">
                 <a:solidFill>
                   <a:schemeClr val="bg1">
                     <a:lumMod val="50000"/>
@@ -7074,11 +7607,11 @@
               <a:buAutoNum type="arabicPeriod"/>
             </a:pPr>
             <a:r>
-              <a:rPr lang="en-US" smtClean="0"/>
+              <a:rPr lang="en-US" dirty="0" smtClean="0"/>
               <a:t>Global Data Dictionary</a:t>
             </a:r>
             <a:r>
-              <a:rPr lang="en-US" smtClean="0">
+              <a:rPr lang="en-US" dirty="0" smtClean="0">
                 <a:solidFill>
                   <a:schemeClr val="bg1">
                     <a:lumMod val="50000"/>
@@ -7094,11 +7627,11 @@
               <a:buAutoNum type="arabicPeriod"/>
             </a:pPr>
             <a:r>
-              <a:rPr lang="en-US" smtClean="0"/>
+              <a:rPr lang="en-US" dirty="0" smtClean="0"/>
               <a:t>Admin Email</a:t>
             </a:r>
             <a:r>
-              <a:rPr lang="en-US" smtClean="0">
+              <a:rPr lang="en-US" dirty="0" smtClean="0">
                 <a:solidFill>
                   <a:schemeClr val="bg1">
                     <a:lumMod val="50000"/>
@@ -7114,26 +7647,39 @@
               <a:buAutoNum type="arabicPeriod"/>
             </a:pPr>
             <a:r>
-              <a:rPr lang="en-US" smtClean="0"/>
+              <a:rPr lang="en-US" dirty="0" smtClean="0"/>
               <a:t>Version Star -</a:t>
             </a:r>
             <a:r>
-              <a:rPr lang="en-US" smtClean="0">
+              <a:rPr lang="en-US" dirty="0" smtClean="0">
                 <a:solidFill>
                   <a:schemeClr val="bg1">
                     <a:lumMod val="50000"/>
                   </a:schemeClr>
                 </a:solidFill>
               </a:rPr>
-              <a:t> Use "**" for version differences</a:t>
-            </a:r>
-            <a:endParaRPr lang="en-US" dirty="0" smtClean="0">
-              <a:solidFill>
-                <a:schemeClr val="bg1">
-                  <a:lumMod val="50000"/>
-                </a:schemeClr>
-              </a:solidFill>
-            </a:endParaRPr>
+              <a:t> Use </a:t>
+            </a:r>
+            <a:r>
+              <a:rPr lang="en-US" dirty="0" smtClean="0">
+                <a:solidFill>
+                  <a:schemeClr val="bg1">
+                    <a:lumMod val="50000"/>
+                  </a:schemeClr>
+                </a:solidFill>
+              </a:rPr>
+              <a:t>"**" </a:t>
+            </a:r>
+            <a:r>
+              <a:rPr lang="en-US" dirty="0" smtClean="0">
+                <a:solidFill>
+                  <a:schemeClr val="bg1">
+                    <a:lumMod val="50000"/>
+                  </a:schemeClr>
+                </a:solidFill>
+              </a:rPr>
+              <a:t>for version differences</a:t>
+            </a:r>
           </a:p>
         </p:txBody>
       </p:sp>
@@ -7154,7 +7700,7 @@
           <a:p>
             <a:fld id="{8C6FBF27-FCE1-40A4-AD2E-EA28EB5C01F0}" type="datetime1">
               <a:rPr lang="en-US" smtClean="0"/>
-              <a:t>10/28/2017</a:t>
+              <a:t>10/29/2017</a:t>
             </a:fld>
             <a:endParaRPr lang="en-US"/>
           </a:p>
@@ -8913,7 +9459,7 @@
           <a:p>
             <a:fld id="{12698F6C-3B60-45A8-AA68-1C639B61BEFF}" type="datetime1">
               <a:rPr lang="en-US" smtClean="0"/>
-              <a:t>10/28/2017</a:t>
+              <a:t>10/29/2017</a:t>
             </a:fld>
             <a:endParaRPr lang="en-US" dirty="0"/>
           </a:p>
@@ -9025,7 +9571,7 @@
           <a:p>
             <a:fld id="{12698F6C-3B60-45A8-AA68-1C639B61BEFF}" type="datetime1">
               <a:rPr lang="en-US" smtClean="0"/>
-              <a:t>10/28/2017</a:t>
+              <a:t>10/29/2017</a:t>
             </a:fld>
             <a:endParaRPr lang="en-US" dirty="0"/>
           </a:p>
@@ -9174,7 +9720,7 @@
           <a:p>
             <a:fld id="{12698F6C-3B60-45A8-AA68-1C639B61BEFF}" type="datetime1">
               <a:rPr lang="en-US" smtClean="0"/>
-              <a:t>10/28/2017</a:t>
+              <a:t>10/29/2017</a:t>
             </a:fld>
             <a:endParaRPr lang="en-US" dirty="0"/>
           </a:p>
@@ -9325,7 +9871,7 @@
           <a:p>
             <a:fld id="{12698F6C-3B60-45A8-AA68-1C639B61BEFF}" type="datetime1">
               <a:rPr lang="en-US" smtClean="0"/>
-              <a:t>10/28/2017</a:t>
+              <a:t>10/29/2017</a:t>
             </a:fld>
             <a:endParaRPr lang="en-US" dirty="0"/>
           </a:p>
@@ -9471,7 +10017,7 @@
           <a:p>
             <a:fld id="{12698F6C-3B60-45A8-AA68-1C639B61BEFF}" type="datetime1">
               <a:rPr lang="en-US" smtClean="0"/>
-              <a:t>10/28/2017</a:t>
+              <a:t>10/29/2017</a:t>
             </a:fld>
             <a:endParaRPr lang="en-US" dirty="0"/>
           </a:p>
@@ -9714,7 +10260,7 @@
           <a:p>
             <a:fld id="{FC4CB26D-ED02-41C0-8C14-C61605713420}" type="datetime1">
               <a:rPr lang="en-US" smtClean="0"/>
-              <a:t>10/28/2017</a:t>
+              <a:t>10/29/2017</a:t>
             </a:fld>
             <a:endParaRPr lang="en-US"/>
           </a:p>
@@ -9982,7 +10528,11 @@
             </a:pPr>
             <a:r>
               <a:rPr lang="en-US" dirty="0" smtClean="0"/>
-              <a:t>Free download, follow install_method5.md and administer_method5.md</a:t>
+              <a:t>Download open source code, follow </a:t>
+            </a:r>
+            <a:r>
+              <a:rPr lang="en-US" dirty="0" smtClean="0"/>
+              <a:t>install_method5.md and administer_method5.md</a:t>
             </a:r>
           </a:p>
           <a:p>
@@ -10049,7 +10599,7 @@
           <a:p>
             <a:fld id="{8A97B252-A157-47EE-8D8D-B5B4DAA37260}" type="datetime1">
               <a:rPr lang="en-US" smtClean="0"/>
-              <a:t>10/28/2017</a:t>
+              <a:t>10/29/2017</a:t>
             </a:fld>
             <a:endParaRPr lang="en-US"/>
           </a:p>
@@ -10368,7 +10918,7 @@
           <a:p>
             <a:fld id="{04FA3B08-0866-4F48-BECB-8AEAA49887FE}" type="datetime1">
               <a:rPr lang="en-US" smtClean="0"/>
-              <a:t>10/28/2017</a:t>
+              <a:t>10/29/2017</a:t>
             </a:fld>
             <a:endParaRPr lang="en-US"/>
           </a:p>
@@ -10579,7 +11129,7 @@
           <a:p>
             <a:fld id="{E18E99D8-5B8F-468C-BBE7-526BD68FE572}" type="datetime1">
               <a:rPr lang="en-US" smtClean="0"/>
-              <a:t>10/28/2017</a:t>
+              <a:t>10/29/2017</a:t>
             </a:fld>
             <a:endParaRPr lang="en-US"/>
           </a:p>
@@ -10772,7 +11322,7 @@
           <a:p>
             <a:fld id="{4E667C21-B277-46CB-80E7-1C015420E7D1}" type="datetime1">
               <a:rPr lang="en-US" smtClean="0"/>
-              <a:t>10/28/2017</a:t>
+              <a:t>10/29/2017</a:t>
             </a:fld>
             <a:endParaRPr lang="en-US" dirty="0"/>
           </a:p>
@@ -10975,7 +11525,7 @@
           <a:p>
             <a:fld id="{E0B1ECC0-3D31-49BF-9732-FEB21E3BFE0B}" type="datetime1">
               <a:rPr lang="en-US" smtClean="0"/>
-              <a:t>10/28/2017</a:t>
+              <a:t>10/29/2017</a:t>
             </a:fld>
             <a:endParaRPr lang="en-US"/>
           </a:p>
@@ -11352,7 +11902,7 @@
           <a:p>
             <a:fld id="{59A89C50-A88C-43DA-A017-AA6F35F0B0C8}" type="datetime1">
               <a:rPr lang="en-US" smtClean="0"/>
-              <a:t>10/28/2017</a:t>
+              <a:t>10/29/2017</a:t>
             </a:fld>
             <a:endParaRPr lang="en-US"/>
           </a:p>
@@ -11489,7 +12039,7 @@
           <a:p>
             <a:fld id="{AA1E44A8-32B0-4E5A-A6DF-07DB1E700CAE}" type="datetime1">
               <a:rPr lang="en-US" smtClean="0"/>
-              <a:t>10/28/2017</a:t>
+              <a:t>10/29/2017</a:t>
             </a:fld>
             <a:endParaRPr lang="en-US"/>
           </a:p>
@@ -12298,7 +12848,7 @@
           <a:p>
             <a:fld id="{1AF7749E-7951-4D42-9C43-2FC8E80375B1}" type="datetime1">
               <a:rPr lang="en-US" smtClean="0"/>
-              <a:t>10/28/2017</a:t>
+              <a:t>10/29/2017</a:t>
             </a:fld>
             <a:endParaRPr lang="en-US"/>
           </a:p>
@@ -12426,7 +12976,23 @@
             </a:r>
             <a:r>
               <a:rPr lang="en-US" dirty="0"/>
-              <a:t>2014 for the largest healthcare data center in the </a:t>
+              <a:t>2014 for </a:t>
+            </a:r>
+            <a:r>
+              <a:rPr lang="en-US" dirty="0" smtClean="0"/>
+              <a:t>one of the </a:t>
+            </a:r>
+            <a:r>
+              <a:rPr lang="en-US" dirty="0"/>
+              <a:t>largest healthcare data </a:t>
+            </a:r>
+            <a:r>
+              <a:rPr lang="en-US" dirty="0" smtClean="0"/>
+              <a:t>centers </a:t>
+            </a:r>
+            <a:r>
+              <a:rPr lang="en-US" dirty="0"/>
+              <a:t>in the </a:t>
             </a:r>
             <a:r>
               <a:rPr lang="en-US" dirty="0" smtClean="0"/>
@@ -12482,7 +13048,7 @@
           <a:p>
             <a:fld id="{60D7856B-577C-489D-A2A8-2F221F81FEFA}" type="datetime1">
               <a:rPr lang="en-US" smtClean="0"/>
-              <a:t>10/28/2017</a:t>
+              <a:t>10/29/2017</a:t>
             </a:fld>
             <a:endParaRPr lang="en-US"/>
           </a:p>
@@ -12811,7 +13377,7 @@
               </a:rPr>
             </a:br>
             <a:r>
-              <a:rPr lang="en-US" sz="4000" b="1" dirty="0">
+              <a:rPr lang="en-US" sz="4000" b="1" dirty="0" smtClean="0">
                 <a:solidFill>
                   <a:srgbClr val="008080"/>
                 </a:solidFill>
@@ -13062,19 +13628,7 @@
                 </a:highlight>
                 <a:latin typeface="Courier New"/>
               </a:rPr>
-              <a:t>          </a:t>
-            </a:r>
-            <a:r>
-              <a:rPr lang="en-US" sz="4000" b="1" dirty="0" smtClean="0">
-                <a:solidFill>
-                  <a:srgbClr val="000080"/>
-                </a:solidFill>
-                <a:highlight>
-                  <a:srgbClr val="FFFFFF"/>
-                </a:highlight>
-                <a:latin typeface="Courier New"/>
-              </a:rPr>
-              <a:t>=&gt; </a:t>
+              <a:t>          =&gt; </a:t>
             </a:r>
             <a:r>
               <a:rPr lang="en-US" sz="4000" b="1" dirty="0">
@@ -13438,7 +13992,7 @@
           <a:p>
             <a:fld id="{12698F6C-3B60-45A8-AA68-1C639B61BEFF}" type="datetime1">
               <a:rPr lang="en-US" smtClean="0"/>
-              <a:t>10/28/2017</a:t>
+              <a:t>10/29/2017</a:t>
             </a:fld>
             <a:endParaRPr lang="en-US" dirty="0"/>
           </a:p>
@@ -13780,8 +14334,25 @@
                   </a:schemeClr>
                 </a:solidFill>
               </a:rPr>
-              <a:t> - fast, asynchronous</a:t>
-            </a:r>
+              <a:t> - fast, </a:t>
+            </a:r>
+            <a:r>
+              <a:rPr lang="en-US" dirty="0" smtClean="0">
+                <a:solidFill>
+                  <a:schemeClr val="bg1">
+                    <a:lumMod val="50000"/>
+                  </a:schemeClr>
+                </a:solidFill>
+              </a:rPr>
+              <a:t>parallel, asynchronous</a:t>
+            </a:r>
+            <a:endParaRPr lang="en-US" dirty="0" smtClean="0">
+              <a:solidFill>
+                <a:schemeClr val="bg1">
+                  <a:lumMod val="50000"/>
+                </a:schemeClr>
+              </a:solidFill>
+            </a:endParaRPr>
           </a:p>
           <a:p>
             <a:pPr marL="514350" indent="-514350">
@@ -13880,7 +14451,17 @@
                   </a:schemeClr>
                 </a:solidFill>
               </a:rPr>
-              <a:t>- handled</a:t>
+              <a:t>- </a:t>
+            </a:r>
+            <a:r>
+              <a:rPr lang="en-US" dirty="0" smtClean="0">
+                <a:solidFill>
+                  <a:schemeClr val="bg1">
+                    <a:lumMod val="50000"/>
+                  </a:schemeClr>
+                </a:solidFill>
+              </a:rPr>
+              <a:t>handled</a:t>
             </a:r>
             <a:endParaRPr lang="en-US" dirty="0">
               <a:solidFill>
@@ -13909,7 +14490,7 @@
           <a:p>
             <a:fld id="{D97E924C-66F2-4356-A8CE-66225EAB43F5}" type="datetime1">
               <a:rPr lang="en-US" smtClean="0"/>
-              <a:t>10/28/2017</a:t>
+              <a:t>10/29/2017</a:t>
             </a:fld>
             <a:endParaRPr lang="en-US"/>
           </a:p>

</xml_diff>

<commit_message>
Minor changes made right before RMOUG.
* Added word 'agentless' to Summary slide.
* Minor changes to Install slide.
* Advantages - Security - added hardened, configurable
</commit_message>
<xml_diff>
--- a/presentations/Method5.pptx
+++ b/presentations/Method5.pptx
@@ -219,7 +219,7 @@
           <a:p>
             <a:fld id="{E8184847-EC06-4734-8E30-343A2DA340C9}" type="datetimeFigureOut">
               <a:rPr lang="en-US" smtClean="0"/>
-              <a:t>2/13/2018</a:t>
+              <a:t>2/20/2018</a:t>
             </a:fld>
             <a:endParaRPr lang="en-US"/>
           </a:p>
@@ -384,7 +384,7 @@
           <a:p>
             <a:fld id="{DC284B00-8F05-4CB2-A4E6-4A642AFA915E}" type="datetimeFigureOut">
               <a:rPr lang="en-US" smtClean="0"/>
-              <a:t>2/13/2018</a:t>
+              <a:t>2/20/2018</a:t>
             </a:fld>
             <a:endParaRPr lang="en-US"/>
           </a:p>
@@ -2393,36 +2393,65 @@
           <a:lstStyle/>
           <a:p>
             <a:r>
-              <a:rPr lang="en-US" dirty="0" smtClean="0"/>
-              <a:t>1. Requirements - You must have a central</a:t>
+              <a:rPr lang="en-US" b="1" dirty="0" smtClean="0"/>
+              <a:t>1. </a:t>
+            </a:r>
+            <a:r>
+              <a:rPr lang="en-US" dirty="0" smtClean="0"/>
+              <a:t>You </a:t>
+            </a:r>
+            <a:r>
+              <a:rPr lang="en-US" dirty="0" smtClean="0"/>
+              <a:t>must have a central</a:t>
             </a:r>
             <a:r>
               <a:rPr lang="en-US" baseline="0" dirty="0" smtClean="0"/>
-              <a:t> management database that can communicate with all other database.  You must have SYSDBA to install, and DBA privileges to use.  Any currently-supported platform, version, or edition will work.  (And probably some unsupported ones also.)  For testing you only need a single database - the default installation will create some fake links that simulate a multi-database environment.</a:t>
-            </a:r>
-          </a:p>
-          <a:p>
-            <a:r>
-              <a:rPr lang="en-US" dirty="0" smtClean="0"/>
-              <a:t>2. Only one person needs to install and administer it.  The configuration is automatically applied to other users.</a:t>
-            </a:r>
-          </a:p>
-          <a:p>
-            <a:r>
-              <a:rPr lang="en-US" dirty="0" smtClean="0"/>
-              <a:t>3. Download the free, open source code from GitHub and follow the instructions.</a:t>
-            </a:r>
-          </a:p>
-          <a:p>
-            <a:r>
-              <a:rPr lang="en-US" dirty="0" smtClean="0"/>
-              <a:t>4. The code is 100% inside the database - there are no agents, plugins, websites, configuration files, etc.</a:t>
-            </a:r>
-          </a:p>
-          <a:p>
-            <a:r>
-              <a:rPr lang="en-US" dirty="0" smtClean="0"/>
-              <a:t>5. Getting started</a:t>
+              <a:t> management database that can communicate with all other database.  You must have SYSDBA to install, and DBA privileges to use.  Any currently-supported platform, version, or edition will work.  (And probably some unsupported ones also.)  For testing you only need a single database - the default installation will create some fake links that simulate a multi-database environment</a:t>
+            </a:r>
+            <a:r>
+              <a:rPr lang="en-US" baseline="0" dirty="0" smtClean="0"/>
+              <a:t>.</a:t>
+            </a:r>
+            <a:endParaRPr lang="en-US" baseline="0" dirty="0" smtClean="0"/>
+          </a:p>
+          <a:p>
+            <a:r>
+              <a:rPr lang="en-US" b="1" dirty="0" smtClean="0"/>
+              <a:t>2.</a:t>
+            </a:r>
+            <a:r>
+              <a:rPr lang="en-US" dirty="0" smtClean="0"/>
+              <a:t> Only one person needs to install and administer it.  The configuration is automatically applied to other users.</a:t>
+            </a:r>
+          </a:p>
+          <a:p>
+            <a:r>
+              <a:rPr lang="en-US" b="1" dirty="0" smtClean="0"/>
+              <a:t>3.</a:t>
+            </a:r>
+            <a:r>
+              <a:rPr lang="en-US" dirty="0" smtClean="0"/>
+              <a:t> Download the free, open source code from GitHub and follow the instructions.</a:t>
+            </a:r>
+          </a:p>
+          <a:p>
+            <a:r>
+              <a:rPr lang="en-US" b="1" dirty="0" smtClean="0"/>
+              <a:t>4.</a:t>
+            </a:r>
+            <a:r>
+              <a:rPr lang="en-US" dirty="0" smtClean="0"/>
+              <a:t> The code is 100% inside the database - there are no agents, plugins, websites, configuration files, etc.</a:t>
+            </a:r>
+          </a:p>
+          <a:p>
+            <a:r>
+              <a:rPr lang="en-US" b="1" dirty="0" smtClean="0"/>
+              <a:t>5.</a:t>
+            </a:r>
+            <a:r>
+              <a:rPr lang="en-US" dirty="0" smtClean="0"/>
+              <a:t> Getting started</a:t>
             </a:r>
             <a:r>
               <a:rPr lang="en-US" baseline="0" dirty="0" smtClean="0"/>
@@ -2431,8 +2460,12 @@
           </a:p>
           <a:p>
             <a:r>
+              <a:rPr lang="en-US" b="1" baseline="0" dirty="0" smtClean="0"/>
+              <a:t>6.</a:t>
+            </a:r>
+            <a:r>
               <a:rPr lang="en-US" baseline="0" dirty="0" smtClean="0"/>
-              <a:t>6. If you encounter any problems you can create a GitHub issue on the repository or you can email Jon Heller at either hjon@ventechsolutions.com or jon@jonheller.org.</a:t>
+              <a:t> If you encounter any problems you can create a GitHub issue on the repository or you can email Jon Heller at either hjon@ventechsolutions.com or jon@jonheller.org.</a:t>
             </a:r>
           </a:p>
           <a:p>
@@ -3237,28 +3270,11 @@
           <a:p>
             <a:r>
               <a:rPr lang="en-US" dirty="0" smtClean="0"/>
-              <a:t>**METHOD5.M5_USER_ROLE** grants a M5_ROLE to an M5_USER.</a:t>
-            </a:r>
-          </a:p>
-          <a:p>
-            <a:r>
-              <a:rPr lang="en-US" dirty="0" smtClean="0"/>
-              <a:t>  * ORACLE_USERNAME: Oracle username from METHOD5.M5_USER.ORACLE_USERNAME.</a:t>
-            </a:r>
-          </a:p>
-          <a:p>
-            <a:r>
-              <a:rPr lang="en-US" dirty="0" smtClean="0"/>
-              <a:t>  * ROLE_NAME: Role name from METHOD5.ROLE.ROLE_NAME.</a:t>
-            </a:r>
-          </a:p>
-          <a:p>
-            <a:endParaRPr lang="en-US" dirty="0" smtClean="0"/>
-          </a:p>
-          <a:p>
-            <a:r>
-              <a:rPr lang="en-US" dirty="0" smtClean="0"/>
-              <a:t>**METHOD5.M5_ROLE_PRIV** grants privileges to an M5_ROLE.</a:t>
+              <a:t>**</a:t>
+            </a:r>
+            <a:r>
+              <a:rPr lang="en-US" dirty="0" smtClean="0"/>
+              <a:t>METHOD5.M5_ROLE_PRIV** grants privileges to an M5_ROLE.</a:t>
             </a:r>
           </a:p>
           <a:p>
@@ -3282,7 +3298,25 @@
             </a:r>
           </a:p>
           <a:p>
-            <a:endParaRPr lang="en-US" dirty="0"/>
+            <a:endParaRPr lang="en-US" dirty="0" smtClean="0"/>
+          </a:p>
+          <a:p>
+            <a:r>
+              <a:rPr lang="en-US" dirty="0" smtClean="0"/>
+              <a:t>**METHOD5.M5_USER_ROLE** grants a M5_ROLE to an M5_USER.</a:t>
+            </a:r>
+          </a:p>
+          <a:p>
+            <a:r>
+              <a:rPr lang="en-US" dirty="0" smtClean="0"/>
+              <a:t>  * ORACLE_USERNAME: Oracle username from METHOD5.M5_USER.ORACLE_USERNAME.</a:t>
+            </a:r>
+          </a:p>
+          <a:p>
+            <a:r>
+              <a:rPr lang="en-US" dirty="0" smtClean="0"/>
+              <a:t>  * ROLE_NAME: Role name from METHOD5.ROLE.ROLE_NAME.</a:t>
+            </a:r>
           </a:p>
         </p:txBody>
       </p:sp>
@@ -4647,8 +4681,29 @@
             </a:r>
             <a:r>
               <a:rPr lang="en-US" dirty="0" smtClean="0"/>
-              <a:t> Method5 has been thoroughly hardened to avoid the typical security problems with multi-database tools. For example, there are no public database links or shared passwords. See the Security section in the user guide for details.</a:t>
-            </a:r>
+              <a:t> Method5 has been thoroughly hardened to avoid the typical security problems with multi-database tools. For example, there are no public database links or shared passwords. </a:t>
+            </a:r>
+            <a:r>
+              <a:rPr lang="en-US" dirty="0" smtClean="0"/>
+              <a:t>The</a:t>
+            </a:r>
+            <a:r>
+              <a:rPr lang="en-US" baseline="0" dirty="0" smtClean="0"/>
+              <a:t> program privileges are completely configurable.  </a:t>
+            </a:r>
+            <a:r>
+              <a:rPr lang="en-US" dirty="0" smtClean="0"/>
+              <a:t>See </a:t>
+            </a:r>
+            <a:r>
+              <a:rPr lang="en-US" dirty="0" smtClean="0"/>
+              <a:t>the </a:t>
+            </a:r>
+            <a:r>
+              <a:rPr lang="en-US" dirty="0" smtClean="0"/>
+              <a:t>file security.md for more details.</a:t>
+            </a:r>
+            <a:endParaRPr lang="en-US" dirty="0" smtClean="0"/>
           </a:p>
           <a:p>
             <a:r>
@@ -4879,7 +4934,7 @@
           <a:p>
             <a:r>
               <a:rPr lang="en-US" smtClean="0"/>
-              <a:t>2018-03-15</a:t>
+              <a:t>2018-03-21</a:t>
             </a:r>
             <a:endParaRPr lang="en-US"/>
           </a:p>
@@ -5056,7 +5111,7 @@
           <a:p>
             <a:r>
               <a:rPr lang="en-US" smtClean="0"/>
-              <a:t>2018-03-15</a:t>
+              <a:t>2018-03-21</a:t>
             </a:r>
             <a:endParaRPr lang="en-US"/>
           </a:p>
@@ -5236,7 +5291,7 @@
           <a:p>
             <a:r>
               <a:rPr lang="en-US" smtClean="0"/>
-              <a:t>2018-03-15</a:t>
+              <a:t>2018-03-21</a:t>
             </a:r>
             <a:endParaRPr lang="en-US"/>
           </a:p>
@@ -5406,7 +5461,7 @@
           <a:p>
             <a:r>
               <a:rPr lang="en-US" smtClean="0"/>
-              <a:t>2018-03-15</a:t>
+              <a:t>2018-03-21</a:t>
             </a:r>
             <a:endParaRPr lang="en-US" dirty="0"/>
           </a:p>
@@ -5689,7 +5744,7 @@
           <a:p>
             <a:r>
               <a:rPr lang="en-US" smtClean="0"/>
-              <a:t>2018-03-15</a:t>
+              <a:t>2018-03-21</a:t>
             </a:r>
             <a:endParaRPr lang="en-US"/>
           </a:p>
@@ -5984,7 +6039,7 @@
           <a:p>
             <a:r>
               <a:rPr lang="en-US" smtClean="0"/>
-              <a:t>2018-03-15</a:t>
+              <a:t>2018-03-21</a:t>
             </a:r>
             <a:endParaRPr lang="en-US"/>
           </a:p>
@@ -6413,7 +6468,7 @@
           <a:p>
             <a:r>
               <a:rPr lang="en-US" smtClean="0"/>
-              <a:t>2018-03-15</a:t>
+              <a:t>2018-03-21</a:t>
             </a:r>
             <a:endParaRPr lang="en-US"/>
           </a:p>
@@ -6538,7 +6593,7 @@
           <a:p>
             <a:r>
               <a:rPr lang="en-US" smtClean="0"/>
-              <a:t>2018-03-15</a:t>
+              <a:t>2018-03-21</a:t>
             </a:r>
             <a:endParaRPr lang="en-US"/>
           </a:p>
@@ -6640,7 +6695,7 @@
           <a:p>
             <a:r>
               <a:rPr lang="en-US" smtClean="0"/>
-              <a:t>2018-03-15</a:t>
+              <a:t>2018-03-21</a:t>
             </a:r>
             <a:endParaRPr lang="en-US"/>
           </a:p>
@@ -6917,7 +6972,7 @@
           <a:p>
             <a:r>
               <a:rPr lang="en-US" smtClean="0"/>
-              <a:t>2018-03-15</a:t>
+              <a:t>2018-03-21</a:t>
             </a:r>
             <a:endParaRPr lang="en-US"/>
           </a:p>
@@ -7170,7 +7225,7 @@
           <a:p>
             <a:r>
               <a:rPr lang="en-US" smtClean="0"/>
-              <a:t>2018-03-15</a:t>
+              <a:t>2018-03-21</a:t>
             </a:r>
             <a:endParaRPr lang="en-US"/>
           </a:p>
@@ -7383,7 +7438,7 @@
           <a:p>
             <a:r>
               <a:rPr lang="en-US" smtClean="0"/>
-              <a:t>2018-03-15</a:t>
+              <a:t>2018-03-21</a:t>
             </a:r>
             <a:endParaRPr lang="en-US" dirty="0"/>
           </a:p>
@@ -7825,7 +7880,7 @@
           <a:p>
             <a:r>
               <a:rPr lang="en-US" smtClean="0"/>
-              <a:t>2018-03-15</a:t>
+              <a:t>2018-03-21</a:t>
             </a:r>
             <a:endParaRPr lang="en-US" dirty="0"/>
           </a:p>
@@ -8111,7 +8166,7 @@
           <a:p>
             <a:r>
               <a:rPr lang="en-US" smtClean="0"/>
-              <a:t>2018-03-15</a:t>
+              <a:t>2018-03-21</a:t>
             </a:r>
             <a:endParaRPr lang="en-US"/>
           </a:p>
@@ -8382,7 +8437,7 @@
           <a:p>
             <a:r>
               <a:rPr lang="en-US" smtClean="0"/>
-              <a:t>2018-03-15</a:t>
+              <a:t>2018-03-21</a:t>
             </a:r>
             <a:endParaRPr lang="en-US"/>
           </a:p>
@@ -8488,7 +8543,7 @@
           <a:p>
             <a:r>
               <a:rPr lang="en-US" smtClean="0"/>
-              <a:t>2018-03-15</a:t>
+              <a:t>2018-03-21</a:t>
             </a:r>
             <a:endParaRPr lang="en-US" dirty="0"/>
           </a:p>
@@ -10141,7 +10196,7 @@
           <a:p>
             <a:r>
               <a:rPr lang="en-US" smtClean="0"/>
-              <a:t>2018-03-15</a:t>
+              <a:t>2018-03-21</a:t>
             </a:r>
             <a:endParaRPr lang="en-US" dirty="0"/>
           </a:p>
@@ -10253,7 +10308,7 @@
           <a:p>
             <a:r>
               <a:rPr lang="en-US" smtClean="0"/>
-              <a:t>2018-03-15</a:t>
+              <a:t>2018-03-21</a:t>
             </a:r>
             <a:endParaRPr lang="en-US" dirty="0"/>
           </a:p>
@@ -10402,7 +10457,7 @@
           <a:p>
             <a:r>
               <a:rPr lang="en-US" smtClean="0"/>
-              <a:t>2018-03-15</a:t>
+              <a:t>2018-03-21</a:t>
             </a:r>
             <a:endParaRPr lang="en-US" dirty="0"/>
           </a:p>
@@ -10553,7 +10608,7 @@
           <a:p>
             <a:r>
               <a:rPr lang="en-US" smtClean="0"/>
-              <a:t>2018-03-15</a:t>
+              <a:t>2018-03-21</a:t>
             </a:r>
             <a:endParaRPr lang="en-US" dirty="0"/>
           </a:p>
@@ -10706,7 +10761,7 @@
           <a:p>
             <a:r>
               <a:rPr lang="en-US" smtClean="0"/>
-              <a:t>2018-03-15</a:t>
+              <a:t>2018-03-21</a:t>
             </a:r>
             <a:endParaRPr lang="en-US" dirty="0"/>
           </a:p>
@@ -10956,7 +11011,7 @@
           <a:p>
             <a:r>
               <a:rPr lang="en-US" smtClean="0"/>
-              <a:t>2018-03-15</a:t>
+              <a:t>2018-03-21</a:t>
             </a:r>
             <a:endParaRPr lang="en-US"/>
           </a:p>
@@ -11291,7 +11346,7 @@
           <a:p>
             <a:r>
               <a:rPr lang="en-US" smtClean="0"/>
-              <a:t>2018-03-15</a:t>
+              <a:t>2018-03-21</a:t>
             </a:r>
             <a:endParaRPr lang="en-US"/>
           </a:p>
@@ -11554,7 +11609,15 @@
             </a:pPr>
             <a:r>
               <a:rPr lang="en-US" dirty="0" smtClean="0"/>
-              <a:t>Open-source, secure, robust implementation</a:t>
+              <a:t>Open-source, secure, </a:t>
+            </a:r>
+            <a:r>
+              <a:rPr lang="en-US" dirty="0" smtClean="0"/>
+              <a:t>agentless, robust </a:t>
+            </a:r>
+            <a:r>
+              <a:rPr lang="en-US" dirty="0" smtClean="0"/>
+              <a:t>implementation</a:t>
             </a:r>
           </a:p>
           <a:p>
@@ -11610,7 +11673,7 @@
           <a:p>
             <a:r>
               <a:rPr lang="en-US" smtClean="0"/>
-              <a:t>2018-03-15</a:t>
+              <a:t>2018-03-21</a:t>
             </a:r>
             <a:endParaRPr lang="en-US" dirty="0"/>
           </a:p>
@@ -11693,11 +11756,7 @@
           <a:p>
             <a:r>
               <a:rPr lang="en-US" dirty="0" smtClean="0"/>
-              <a:t>Why </a:t>
-            </a:r>
-            <a:r>
-              <a:rPr lang="en-US" dirty="0" smtClean="0"/>
-              <a:t>Method5 is Safe</a:t>
+              <a:t>Why Method5 is Safe</a:t>
             </a:r>
             <a:endParaRPr lang="en-US" dirty="0"/>
           </a:p>
@@ -11907,7 +11966,7 @@
           <a:p>
             <a:r>
               <a:rPr lang="en-US" smtClean="0"/>
-              <a:t>2018-03-15</a:t>
+              <a:t>2018-03-21</a:t>
             </a:r>
             <a:endParaRPr lang="en-US" dirty="0"/>
           </a:p>
@@ -12102,7 +12161,7 @@
           <a:p>
             <a:r>
               <a:rPr lang="en-US" smtClean="0"/>
-              <a:t>2018-03-15</a:t>
+              <a:t>2018-03-21</a:t>
             </a:r>
             <a:endParaRPr lang="en-US" dirty="0"/>
           </a:p>
@@ -12796,18 +12855,29 @@
             </a:pPr>
             <a:r>
               <a:rPr lang="en-US" dirty="0" smtClean="0"/>
-              <a:t>3. M5_USER_ROLE - </a:t>
-            </a:r>
-            <a:r>
-              <a:rPr lang="en-US" dirty="0" smtClean="0">
+              <a:t>3. </a:t>
+            </a:r>
+            <a:r>
+              <a:rPr lang="en-US" dirty="0"/>
+              <a:t>M5_USER_PRIV - </a:t>
+            </a:r>
+            <a:r>
+              <a:rPr lang="en-US" dirty="0">
                 <a:solidFill>
                   <a:schemeClr val="bg1">
                     <a:lumMod val="50000"/>
                   </a:schemeClr>
                 </a:solidFill>
               </a:rPr>
-              <a:t>username, role</a:t>
-            </a:r>
+              <a:t>role, privilege </a:t>
+            </a:r>
+            <a:endParaRPr lang="en-US" dirty="0" smtClean="0">
+              <a:solidFill>
+                <a:schemeClr val="bg1">
+                  <a:lumMod val="50000"/>
+                </a:schemeClr>
+              </a:solidFill>
+            </a:endParaRPr>
           </a:p>
           <a:p>
             <a:pPr marL="0" indent="0">
@@ -12815,7 +12885,11 @@
             </a:pPr>
             <a:r>
               <a:rPr lang="en-US" dirty="0" smtClean="0"/>
-              <a:t>4. M5_USER_PRIV - </a:t>
+              <a:t>4. </a:t>
+            </a:r>
+            <a:r>
+              <a:rPr lang="en-US" dirty="0" smtClean="0"/>
+              <a:t>M5_USER_ROLE - </a:t>
             </a:r>
             <a:r>
               <a:rPr lang="en-US" dirty="0" smtClean="0">
@@ -12825,8 +12899,13 @@
                   </a:schemeClr>
                 </a:solidFill>
               </a:rPr>
-              <a:t>role, privilege</a:t>
-            </a:r>
+              <a:t>username, role</a:t>
+            </a:r>
+          </a:p>
+          <a:p>
+            <a:pPr marL="0" indent="0">
+              <a:buNone/>
+            </a:pPr>
             <a:endParaRPr lang="en-US" dirty="0">
               <a:solidFill>
                 <a:schemeClr val="bg1">
@@ -12854,7 +12933,7 @@
           <a:p>
             <a:r>
               <a:rPr lang="en-US" smtClean="0"/>
-              <a:t>2018-03-15</a:t>
+              <a:t>2018-03-21</a:t>
             </a:r>
             <a:endParaRPr lang="en-US" dirty="0"/>
           </a:p>
@@ -14041,7 +14120,7 @@
           <a:p>
             <a:r>
               <a:rPr lang="en-US" smtClean="0"/>
-              <a:t>2018-03-15</a:t>
+              <a:t>2018-03-21</a:t>
             </a:r>
             <a:endParaRPr lang="en-US" dirty="0"/>
           </a:p>
@@ -14176,15 +14255,7 @@
             </a:pPr>
             <a:r>
               <a:rPr lang="en-US" dirty="0" smtClean="0"/>
-              <a:t>Email </a:t>
-            </a:r>
-            <a:r>
-              <a:rPr lang="en-US" dirty="0" smtClean="0"/>
-              <a:t>the creator:</a:t>
-            </a:r>
-            <a:r>
-              <a:rPr lang="en-US" dirty="0" smtClean="0"/>
-              <a:t/>
+              <a:t>Email the creator:</a:t>
             </a:r>
             <a:br>
               <a:rPr lang="en-US" dirty="0" smtClean="0"/>
@@ -14259,7 +14330,7 @@
           <a:p>
             <a:r>
               <a:rPr lang="en-US" smtClean="0"/>
-              <a:t>2018-03-15</a:t>
+              <a:t>2018-03-21</a:t>
             </a:r>
             <a:endParaRPr lang="en-US"/>
           </a:p>
@@ -14451,8 +14522,8 @@
           <a:lstStyle/>
           <a:p>
             <a:r>
-              <a:rPr lang="en-US" smtClean="0"/>
-              <a:t>2018-03-15</a:t>
+              <a:rPr lang="en-US" dirty="0" smtClean="0"/>
+              <a:t>2018-03-21</a:t>
             </a:r>
             <a:endParaRPr lang="en-US" dirty="0"/>
           </a:p>
@@ -14673,7 +14744,7 @@
               <a:rPr lang="en-US" sz="2800" dirty="0" smtClean="0">
                 <a:hlinkClick r:id="rId4"/>
               </a:rPr>
-              <a:t>hjon@ventechsolutions.com</a:t>
+              <a:t>jon@jonheller.org</a:t>
             </a:r>
             <a:endParaRPr lang="en-US" sz="2400" dirty="0" smtClean="0"/>
           </a:p>
@@ -14696,7 +14767,7 @@
           <a:p>
             <a:r>
               <a:rPr lang="en-US" smtClean="0"/>
-              <a:t>2018-03-15</a:t>
+              <a:t>2018-03-21</a:t>
             </a:r>
             <a:endParaRPr lang="en-US"/>
           </a:p>
@@ -15032,7 +15103,7 @@
           <a:p>
             <a:r>
               <a:rPr lang="en-US" smtClean="0"/>
-              <a:t>2018-03-15</a:t>
+              <a:t>2018-03-21</a:t>
             </a:r>
             <a:endParaRPr lang="en-US"/>
           </a:p>
@@ -15169,7 +15240,7 @@
           <a:p>
             <a:r>
               <a:rPr lang="en-US" smtClean="0"/>
-              <a:t>2018-03-15</a:t>
+              <a:t>2018-03-21</a:t>
             </a:r>
             <a:endParaRPr lang="en-US"/>
           </a:p>
@@ -15978,7 +16049,7 @@
           <a:p>
             <a:r>
               <a:rPr lang="en-US" smtClean="0"/>
-              <a:t>2018-03-15</a:t>
+              <a:t>2018-03-21</a:t>
             </a:r>
             <a:endParaRPr lang="en-US"/>
           </a:p>
@@ -16178,7 +16249,7 @@
           <a:p>
             <a:r>
               <a:rPr lang="en-US" smtClean="0"/>
-              <a:t>2018-03-15</a:t>
+              <a:t>2018-03-21</a:t>
             </a:r>
             <a:endParaRPr lang="en-US"/>
           </a:p>
@@ -17122,7 +17193,7 @@
           <a:p>
             <a:r>
               <a:rPr lang="en-US" smtClean="0"/>
-              <a:t>2018-03-15</a:t>
+              <a:t>2018-03-21</a:t>
             </a:r>
             <a:endParaRPr lang="en-US" dirty="0"/>
           </a:p>
@@ -17544,8 +17615,25 @@
                   </a:schemeClr>
                 </a:solidFill>
               </a:rPr>
-              <a:t>- nothing to worry about</a:t>
-            </a:r>
+              <a:t>- </a:t>
+            </a:r>
+            <a:r>
+              <a:rPr lang="en-US" dirty="0" smtClean="0">
+                <a:solidFill>
+                  <a:schemeClr val="bg1">
+                    <a:lumMod val="50000"/>
+                  </a:schemeClr>
+                </a:solidFill>
+              </a:rPr>
+              <a:t>hardened, configurable</a:t>
+            </a:r>
+            <a:endParaRPr lang="en-US" dirty="0" smtClean="0">
+              <a:solidFill>
+                <a:schemeClr val="bg1">
+                  <a:lumMod val="50000"/>
+                </a:schemeClr>
+              </a:solidFill>
+            </a:endParaRPr>
           </a:p>
           <a:p>
             <a:pPr marL="514350" indent="-514350">
@@ -17593,7 +17681,7 @@
           <a:p>
             <a:r>
               <a:rPr lang="en-US" smtClean="0"/>
-              <a:t>2018-03-15</a:t>
+              <a:t>2018-03-21</a:t>
             </a:r>
             <a:endParaRPr lang="en-US"/>
           </a:p>

</xml_diff>

<commit_message>
Updates and simplified wording
1. Updated experience from 15 to 17 years
2. Reworded "A Robust Solution" and updated some statistics.
3. Added "saved" to "Exceptions and Metadata" in "Advantages" slide.
4. Added space between function and procedure for "Interface" slide.
5. Simplified "Minimum Privileges" slide.
6. Added "database-by-database" line to "Oracle Automation Gap" slide.
7. Simplified last slide.
</commit_message>
<xml_diff>
--- a/presentations/Method5.pptx
+++ b/presentations/Method5.pptx
@@ -219,7 +219,7 @@
           <a:p>
             <a:fld id="{E8184847-EC06-4734-8E30-343A2DA340C9}" type="datetimeFigureOut">
               <a:rPr lang="en-US" smtClean="0"/>
-              <a:t>4/8/2018</a:t>
+              <a:t>5/7/2018</a:t>
             </a:fld>
             <a:endParaRPr lang="en-US"/>
           </a:p>
@@ -384,7 +384,7 @@
           <a:p>
             <a:fld id="{DC284B00-8F05-4CB2-A4E6-4A642AFA915E}" type="datetimeFigureOut">
               <a:rPr lang="en-US" smtClean="0"/>
-              <a:t>4/8/2018</a:t>
+              <a:t>5/7/2018</a:t>
             </a:fld>
             <a:endParaRPr lang="en-US"/>
           </a:p>
@@ -724,7 +724,7 @@
               <a:rPr lang="en-US" smtClean="0"/>
               <a:t>1</a:t>
             </a:fld>
-            <a:endParaRPr lang="en-US"/>
+            <a:endParaRPr lang="en-US" dirty="0"/>
           </a:p>
         </p:txBody>
       </p:sp>
@@ -2422,11 +2422,7 @@
             </a:r>
             <a:r>
               <a:rPr lang="en-US" dirty="0" smtClean="0"/>
-              <a:t> Download the free, open source code from GitHub and follow the instructions</a:t>
-            </a:r>
-            <a:r>
-              <a:rPr lang="en-US" dirty="0" smtClean="0"/>
-              <a:t>.  You don't need to purchase any additional</a:t>
+              <a:t> Download the free, open source code from GitHub and follow the instructions.  You don't need to purchase any additional</a:t>
             </a:r>
             <a:r>
               <a:rPr lang="en-US" baseline="0" dirty="0" smtClean="0"/>
@@ -2455,15 +2451,7 @@
             </a:r>
             <a:r>
               <a:rPr lang="en-US" baseline="0" dirty="0" smtClean="0"/>
-              <a:t> will </a:t>
-            </a:r>
-            <a:r>
-              <a:rPr lang="en-US" baseline="0" dirty="0" smtClean="0"/>
-              <a:t>only take a few hours. The </a:t>
-            </a:r>
-            <a:r>
-              <a:rPr lang="en-US" baseline="0" dirty="0" smtClean="0"/>
-              <a:t>time to setup all your connections will vary depending on how standardized your environment is.  1000 perfectly-standardized databases will be easier than 10 databases all with different platforms, versions, and configurations.  One of the nice side-effects of Method5 is that it really drives home how useful standardization can be.  You may want to work on one environment at a time; you don't need to get every database working in order to use this.</a:t>
+              <a:t> will only take a few hours. The time to setup all your connections will vary depending on how standardized your environment is.  1000 perfectly-standardized databases will be easier than 10 databases all with different platforms, versions, and configurations.  One of the nice side-effects of Method5 is that it really drives home how useful standardization can be.  You may want to work on one environment at a time; you don't need to get every database working in order to use this.</a:t>
             </a:r>
           </a:p>
           <a:p>
@@ -2473,15 +2461,7 @@
             </a:r>
             <a:r>
               <a:rPr lang="en-US" baseline="0" dirty="0" smtClean="0"/>
-              <a:t> If you encounter any problems you can create a GitHub issue on the repository or you can email Jon Heller at either </a:t>
-            </a:r>
-            <a:r>
-              <a:rPr lang="en-US" baseline="0" dirty="0" smtClean="0"/>
-              <a:t>jon.heller@ventechsolutions.com </a:t>
-            </a:r>
-            <a:r>
-              <a:rPr lang="en-US" baseline="0" dirty="0" smtClean="0"/>
-              <a:t>or jon@jonheller.org.</a:t>
+              <a:t> If you encounter any problems you can create a GitHub issue on the repository or you can email Jon Heller at either jon.heller@ventechsolutions.com or jon@jonheller.org.</a:t>
             </a:r>
           </a:p>
           <a:p>
@@ -2490,15 +2470,7 @@
           <a:p>
             <a:r>
               <a:rPr lang="en-US" dirty="0" smtClean="0"/>
-              <a:t>Most DBAs have everything they need to get started in </a:t>
-            </a:r>
-            <a:r>
-              <a:rPr lang="en-US" dirty="0" smtClean="0"/>
-              <a:t>a few hours.  You </a:t>
-            </a:r>
-            <a:r>
-              <a:rPr lang="en-US" dirty="0" smtClean="0"/>
-              <a:t>don't need to buy anything, sign up for anything, or install any operating system binaries.  The installation and</a:t>
+              <a:t>Most DBAs have everything they need to get started in a few hours.  You don't need to buy anything, sign up for anything, or install any operating system binaries.  The installation and</a:t>
             </a:r>
             <a:r>
               <a:rPr lang="en-US" baseline="0" dirty="0" smtClean="0"/>
@@ -2616,7 +2588,7 @@
               <a:rPr lang="en-US" smtClean="0"/>
               <a:t>2</a:t>
             </a:fld>
-            <a:endParaRPr lang="en-US"/>
+            <a:endParaRPr lang="en-US" dirty="0"/>
           </a:p>
         </p:txBody>
       </p:sp>
@@ -2730,15 +2702,7 @@
             </a:r>
             <a:r>
               <a:rPr lang="en-US" baseline="0" dirty="0" smtClean="0"/>
-              <a:t>  </a:t>
-            </a:r>
-            <a:r>
-              <a:rPr lang="en-US" baseline="0" dirty="0" smtClean="0"/>
-              <a:t>Users </a:t>
-            </a:r>
-            <a:r>
-              <a:rPr lang="en-US" baseline="0" dirty="0" smtClean="0"/>
-              <a:t>can only access Method5 from an expected operating system username.  This provides at least multi-step authentication, and it may provide multi-factor authentication if your operating system authentication requires a token.  (This feature can be disabled.)</a:t>
+              <a:t>  Users can only access Method5 from an expected operating system username.  This provides at least multi-step authentication, and it may provide multi-factor authentication if your operating system authentication requires a token.  (This feature can be disabled.)</a:t>
             </a:r>
           </a:p>
           <a:p>
@@ -3627,16 +3591,27 @@
           <a:p>
             <a:r>
               <a:rPr lang="en-US" dirty="0" smtClean="0"/>
-              <a:t>1. For every problem, spend a minute thinking if there's a way to find it, fix it, or prevent it on other databases.</a:t>
-            </a:r>
-          </a:p>
-          <a:p>
-            <a:r>
-              <a:rPr lang="en-US" dirty="0" smtClean="0"/>
-              <a:t>2. There's no more excuse to not check every database - it only takes one line of code.</a:t>
-            </a:r>
-          </a:p>
-          <a:p>
+              <a:t>2. For every problem, spend a minute thinking if there's a way to find it, fix it, and prevent it on other databases.  There's no more excuse to not check every database - it only takes one line of code.</a:t>
+            </a:r>
+          </a:p>
+          <a:p>
+            <a:pPr marL="0" marR="0" indent="0" algn="l" defTabSz="914400" rtl="0" eaLnBrk="1" fontAlgn="auto" latinLnBrk="0" hangingPunct="1">
+              <a:lnSpc>
+                <a:spcPct val="100000"/>
+              </a:lnSpc>
+              <a:spcBef>
+                <a:spcPts val="0"/>
+              </a:spcBef>
+              <a:spcAft>
+                <a:spcPts val="0"/>
+              </a:spcAft>
+              <a:buClrTx/>
+              <a:buSzTx/>
+              <a:buFontTx/>
+              <a:buNone/>
+              <a:tabLst/>
+              <a:defRPr/>
+            </a:pPr>
             <a:r>
               <a:rPr lang="en-US" dirty="0" smtClean="0"/>
               <a:t>3. Start being more proactive - no more Groundhog Day administration.</a:t>
@@ -3659,22 +3634,23 @@
             </a:r>
             <a:r>
               <a:rPr lang="en-US" baseline="0" dirty="0" smtClean="0"/>
-              <a:t> you find a problem and write a Method5 snippet for it, save that code.  After a while you can generate a preventive maintenance program that you can run periodically to fix things before they become a problem.</a:t>
+              <a:t> you find a problem and write a Method5 snippet for it, save that code.  After a while you can generate a preventive maintenance program that you can run periodically to fix things before they become a problem.  </a:t>
+            </a:r>
+            <a:r>
+              <a:rPr lang="en-US" dirty="0" smtClean="0"/>
+              <a:t>You'll be amazed how often a single query today can save your organization hours of work tomorrow.</a:t>
+            </a:r>
+          </a:p>
+          <a:p>
+            <a:r>
+              <a:rPr lang="en-US" dirty="0" smtClean="0"/>
+              <a:t>4. If we could wave a magic wand it would be great</a:t>
+            </a:r>
+            <a:r>
+              <a:rPr lang="en-US" baseline="0" dirty="0" smtClean="0"/>
+              <a:t> to put our entire data center into a single box, in a single database.  While that's not possible we can sometimes pretend that's the case.  With the right remote execution tools we only need to logon to one system, and we can treat all our databases as one logical database.</a:t>
             </a:r>
             <a:endParaRPr lang="en-US" dirty="0" smtClean="0"/>
-          </a:p>
-          <a:p>
-            <a:r>
-              <a:rPr lang="en-US" dirty="0" smtClean="0"/>
-              <a:t>4. Treat all your databases like one logical database.</a:t>
-            </a:r>
-          </a:p>
-          <a:p>
-            <a:r>
-              <a:rPr lang="en-US" dirty="0" smtClean="0"/>
-              <a:t>5. You'll be amazed how often a single query today can save your organization hours of work tomorrow.</a:t>
-            </a:r>
-            <a:endParaRPr lang="en-US" dirty="0"/>
           </a:p>
         </p:txBody>
       </p:sp>
@@ -3763,7 +3739,7 @@
           <a:bodyPr/>
           <a:lstStyle/>
           <a:p>
-            <a:endParaRPr lang="en-US"/>
+            <a:endParaRPr lang="en-US" dirty="0"/>
           </a:p>
         </p:txBody>
       </p:sp>
@@ -3786,7 +3762,7 @@
               <a:rPr lang="en-US" smtClean="0"/>
               <a:t>3</a:t>
             </a:fld>
-            <a:endParaRPr lang="en-US"/>
+            <a:endParaRPr lang="en-US" dirty="0"/>
           </a:p>
         </p:txBody>
       </p:sp>
@@ -3891,6 +3867,17 @@
               <a:t>5. SQL, PL/SQL, and the relational model help solve many of these problems, but they are stuck inside a single database.  Why can't you treat all of your databases as a single entity?</a:t>
             </a:r>
           </a:p>
+          <a:p>
+            <a:r>
+              <a:rPr lang="en-US" dirty="0" smtClean="0"/>
+              <a:t>6. Oracle developers know to avoid row-by-row processing; it's slower and more complicated than set-based processing.  Likewise</a:t>
+            </a:r>
+            <a:r>
+              <a:rPr lang="en-US" baseline="0" dirty="0" smtClean="0"/>
+              <a:t> we should avoid database-by-database administration.</a:t>
+            </a:r>
+            <a:endParaRPr lang="en-US" dirty="0" smtClean="0"/>
+          </a:p>
         </p:txBody>
       </p:sp>
       <p:sp>
@@ -3912,7 +3899,7 @@
               <a:rPr lang="en-US" smtClean="0"/>
               <a:t>4</a:t>
             </a:fld>
-            <a:endParaRPr lang="en-US"/>
+            <a:endParaRPr lang="en-US" dirty="0"/>
           </a:p>
         </p:txBody>
       </p:sp>
@@ -3994,15 +3981,7 @@
           <a:p>
             <a:r>
               <a:rPr lang="en-US" dirty="0" smtClean="0"/>
-              <a:t>1. Existing tools and processes are not nearly good enough to transform the way you work. If you don't use these automation tools multiple times a day then they have failed to significantly help your organization.  Programs like </a:t>
-            </a:r>
-            <a:r>
-              <a:rPr lang="en-US" dirty="0" err="1" smtClean="0"/>
-              <a:t>Ansible</a:t>
-            </a:r>
-            <a:r>
-              <a:rPr lang="en-US" dirty="0" smtClean="0"/>
-              <a:t>, Salt, and Fabric can</a:t>
+              <a:t>1. Existing tools and processes are not nearly good enough to transform the way you work. If you don't use these automation tools multiple times a day then they have failed to significantly help your organization.  Programs like Ansible, Salt, and Fabric can</a:t>
             </a:r>
             <a:r>
               <a:rPr lang="en-US" baseline="0" dirty="0" smtClean="0"/>
@@ -4091,7 +4070,7 @@
               <a:rPr lang="en-US" smtClean="0"/>
               <a:t>5</a:t>
             </a:fld>
-            <a:endParaRPr lang="en-US"/>
+            <a:endParaRPr lang="en-US" dirty="0"/>
           </a:p>
         </p:txBody>
       </p:sp>
@@ -4257,7 +4236,7 @@
               <a:rPr lang="en-US" smtClean="0"/>
               <a:t>6</a:t>
             </a:fld>
-            <a:endParaRPr lang="en-US"/>
+            <a:endParaRPr lang="en-US" dirty="0"/>
           </a:p>
         </p:txBody>
       </p:sp>
@@ -4323,68 +4302,66 @@
           <a:bodyPr/>
           <a:lstStyle/>
           <a:p>
-            <a:r>
-              <a:rPr lang="en-US" dirty="0" smtClean="0"/>
-              <a:t>1. You've probably seen this problem solved poorly many times before, you should be skeptical.  There are a lot of horrible ways to do this.</a:t>
-            </a:r>
-          </a:p>
-          <a:p>
-            <a:r>
-              <a:rPr lang="en-US" dirty="0" smtClean="0"/>
-              <a:t>2. Method5 has been used in production since</a:t>
+            <a:pPr marL="0" indent="0">
+              <a:buNone/>
+            </a:pPr>
+            <a:r>
+              <a:rPr lang="en-US" dirty="0" smtClean="0"/>
+              <a:t>1. You've probably seen this problem solved poorly many times before, you should be skeptical.  There are a lot of horrible ways to run</a:t>
             </a:r>
             <a:r>
               <a:rPr lang="en-US" baseline="0" dirty="0" smtClean="0"/>
-              <a:t> 2014 and helps manage one of </a:t>
-            </a:r>
-            <a:r>
-              <a:rPr lang="en-US" dirty="0" smtClean="0"/>
-              <a:t>the largest healthcare data centers in the world.</a:t>
-            </a:r>
-          </a:p>
-          <a:p>
-            <a:r>
-              <a:rPr lang="en-US" dirty="0" smtClean="0"/>
-              <a:t>3.</a:t>
+              <a:t> commands on multiple targets.</a:t>
+            </a:r>
+            <a:endParaRPr lang="en-US" dirty="0" smtClean="0"/>
+          </a:p>
+          <a:p>
+            <a:pPr marL="0" indent="0">
+              <a:buNone/>
+            </a:pPr>
+            <a:r>
+              <a:rPr lang="en-US" dirty="0" smtClean="0"/>
+              <a:t>2. Method5 was created at</a:t>
             </a:r>
             <a:r>
               <a:rPr lang="en-US" baseline="0" dirty="0" smtClean="0"/>
-              <a:t> </a:t>
-            </a:r>
-            <a:r>
-              <a:rPr lang="en-US" dirty="0" smtClean="0"/>
-              <a:t>We frequently run it against hundreds of databases with over a petabyte of SAN.</a:t>
-            </a:r>
-          </a:p>
-          <a:p>
-            <a:r>
-              <a:rPr lang="en-US" dirty="0" smtClean="0"/>
-              <a:t>4. It's ran over 10 million queries internally, contains over 1800 automated tests,</a:t>
+              <a:t> General Dynamics and </a:t>
+            </a:r>
+            <a:r>
+              <a:rPr lang="en-US" dirty="0" smtClean="0"/>
+              <a:t>Ventech Solutions to support the </a:t>
             </a:r>
             <a:r>
               <a:rPr lang="en-US" baseline="0" dirty="0" smtClean="0"/>
-              <a:t> and is open source.</a:t>
-            </a:r>
-            <a:endParaRPr lang="en-US" dirty="0" smtClean="0"/>
-          </a:p>
-          <a:p>
-            <a:r>
-              <a:rPr lang="en-US" dirty="0" smtClean="0"/>
-              <a:t>5. Security has always been a primary concern.  We've</a:t>
-            </a:r>
+              <a:t>Centers for Medicare &amp; Medicaid Services and many of their contractors.  It has been used in production since 2014 and was publically released in 2016.</a:t>
+            </a:r>
+          </a:p>
+          <a:p>
+            <a:pPr marL="0" indent="0">
+              <a:buNone/>
+            </a:pPr>
             <a:r>
               <a:rPr lang="en-US" baseline="0" dirty="0" smtClean="0"/>
-              <a:t> learned from the mistakes of other tools.  For example, there are no shared passwords or public database links.  </a:t>
-            </a:r>
-            <a:r>
-              <a:rPr lang="en-US" dirty="0" smtClean="0"/>
-              <a:t>All the code is online, you can look at it yourself.</a:t>
-            </a:r>
-          </a:p>
-          <a:p>
-            <a:endParaRPr lang="en-US" dirty="0" smtClean="0"/>
-          </a:p>
-          <a:p>
+              <a:t>3. At Ventech Solutions it's used to manage 400 databases with 1 petabyte of data.  It has run over 15 million commands.</a:t>
+            </a:r>
+          </a:p>
+          <a:p>
+            <a:r>
+              <a:rPr lang="en-US" dirty="0" smtClean="0"/>
+              <a:t>4.</a:t>
+            </a:r>
+            <a:r>
+              <a:rPr lang="en-US" baseline="0" dirty="0" smtClean="0"/>
+              <a:t> The program was built without taking any shortcuts.  1800 automated unit tests ensure the quality of each release.  The code is open source so anybody can easily use it, modify it, or review it.  </a:t>
+            </a:r>
+            <a:r>
+              <a:rPr lang="en-US" dirty="0" smtClean="0"/>
+              <a:t>Security has always been a primary concern and we've learned from the mistakes of other tools.  For example, </a:t>
+            </a:r>
+            <a:r>
+              <a:rPr lang="en-US" baseline="0" dirty="0" smtClean="0"/>
+              <a:t>there are no shared passwords or public database links.</a:t>
+            </a:r>
             <a:endParaRPr lang="en-US" dirty="0"/>
           </a:p>
         </p:txBody>
@@ -4408,7 +4385,7 @@
               <a:rPr lang="en-US" smtClean="0"/>
               <a:t>7</a:t>
             </a:fld>
-            <a:endParaRPr lang="en-US"/>
+            <a:endParaRPr lang="en-US" dirty="0"/>
           </a:p>
         </p:txBody>
       </p:sp>
@@ -4526,27 +4503,11 @@
           <a:p>
             <a:r>
               <a:rPr lang="en-US" dirty="0" smtClean="0"/>
-              <a:t>Running as a function </a:t>
-            </a:r>
-            <a:r>
-              <a:rPr lang="en-US" smtClean="0"/>
-              <a:t>is simple and neat,</a:t>
-            </a:r>
-            <a:r>
-              <a:rPr lang="en-US" baseline="0" smtClean="0"/>
-              <a:t> </a:t>
+              <a:t>Running as a function is simple and neat,</a:t>
             </a:r>
             <a:r>
               <a:rPr lang="en-US" baseline="0" dirty="0" smtClean="0"/>
-              <a:t>but in </a:t>
-            </a:r>
-            <a:r>
-              <a:rPr lang="en-US" baseline="0" smtClean="0"/>
-              <a:t>practice advanced users </a:t>
-            </a:r>
-            <a:r>
-              <a:rPr lang="en-US" baseline="0" dirty="0" smtClean="0"/>
-              <a:t>will normally want to run things as a procedure.  Running as a procedure makes it asynchronous, which is good for large jobs you don't want to wait for.  It also makes it possible to schedule and chain tasks.</a:t>
+              <a:t> but in practice advanced users will normally want to run things as a procedure.  Running as a procedure makes it asynchronous, which is good for large jobs you don't want to wait for.  It also makes it possible to schedule and chain tasks.</a:t>
             </a:r>
             <a:endParaRPr lang="en-US" dirty="0"/>
           </a:p>
@@ -4941,9 +4902,9 @@
           <a:p>
             <a:r>
               <a:rPr lang="en-US" smtClean="0"/>
-              <a:t>2018-03-21</a:t>
-            </a:r>
-            <a:endParaRPr lang="en-US"/>
+              <a:t>2018-05-07</a:t>
+            </a:r>
+            <a:endParaRPr lang="en-US" dirty="0"/>
           </a:p>
         </p:txBody>
       </p:sp>
@@ -5118,7 +5079,7 @@
           <a:p>
             <a:r>
               <a:rPr lang="en-US" smtClean="0"/>
-              <a:t>2018-03-21</a:t>
+              <a:t>2018-05-07</a:t>
             </a:r>
             <a:endParaRPr lang="en-US"/>
           </a:p>
@@ -5298,7 +5259,7 @@
           <a:p>
             <a:r>
               <a:rPr lang="en-US" smtClean="0"/>
-              <a:t>2018-03-21</a:t>
+              <a:t>2018-05-07</a:t>
             </a:r>
             <a:endParaRPr lang="en-US"/>
           </a:p>
@@ -5468,7 +5429,7 @@
           <a:p>
             <a:r>
               <a:rPr lang="en-US" smtClean="0"/>
-              <a:t>2018-03-21</a:t>
+              <a:t>2018-05-07</a:t>
             </a:r>
             <a:endParaRPr lang="en-US" dirty="0"/>
           </a:p>
@@ -5751,7 +5712,7 @@
           <a:p>
             <a:r>
               <a:rPr lang="en-US" smtClean="0"/>
-              <a:t>2018-03-21</a:t>
+              <a:t>2018-05-07</a:t>
             </a:r>
             <a:endParaRPr lang="en-US"/>
           </a:p>
@@ -6046,7 +6007,7 @@
           <a:p>
             <a:r>
               <a:rPr lang="en-US" smtClean="0"/>
-              <a:t>2018-03-21</a:t>
+              <a:t>2018-05-07</a:t>
             </a:r>
             <a:endParaRPr lang="en-US"/>
           </a:p>
@@ -6475,7 +6436,7 @@
           <a:p>
             <a:r>
               <a:rPr lang="en-US" smtClean="0"/>
-              <a:t>2018-03-21</a:t>
+              <a:t>2018-05-07</a:t>
             </a:r>
             <a:endParaRPr lang="en-US"/>
           </a:p>
@@ -6600,7 +6561,7 @@
           <a:p>
             <a:r>
               <a:rPr lang="en-US" smtClean="0"/>
-              <a:t>2018-03-21</a:t>
+              <a:t>2018-05-07</a:t>
             </a:r>
             <a:endParaRPr lang="en-US"/>
           </a:p>
@@ -6702,7 +6663,7 @@
           <a:p>
             <a:r>
               <a:rPr lang="en-US" smtClean="0"/>
-              <a:t>2018-03-21</a:t>
+              <a:t>2018-05-07</a:t>
             </a:r>
             <a:endParaRPr lang="en-US"/>
           </a:p>
@@ -6979,7 +6940,7 @@
           <a:p>
             <a:r>
               <a:rPr lang="en-US" smtClean="0"/>
-              <a:t>2018-03-21</a:t>
+              <a:t>2018-05-07</a:t>
             </a:r>
             <a:endParaRPr lang="en-US"/>
           </a:p>
@@ -7232,7 +7193,7 @@
           <a:p>
             <a:r>
               <a:rPr lang="en-US" smtClean="0"/>
-              <a:t>2018-03-21</a:t>
+              <a:t>2018-05-07</a:t>
             </a:r>
             <a:endParaRPr lang="en-US"/>
           </a:p>
@@ -7445,7 +7406,7 @@
           <a:p>
             <a:r>
               <a:rPr lang="en-US" smtClean="0"/>
-              <a:t>2018-03-21</a:t>
+              <a:t>2018-05-07</a:t>
             </a:r>
             <a:endParaRPr lang="en-US" dirty="0"/>
           </a:p>
@@ -7886,8 +7847,8 @@
           <a:lstStyle/>
           <a:p>
             <a:r>
-              <a:rPr lang="en-US" smtClean="0"/>
-              <a:t>2018-03-21</a:t>
+              <a:rPr lang="en-US" dirty="0" smtClean="0"/>
+              <a:t>2018-05-07</a:t>
             </a:r>
             <a:endParaRPr lang="en-US" dirty="0"/>
           </a:p>
@@ -7912,7 +7873,7 @@
               <a:rPr lang="en-US" smtClean="0"/>
               <a:t>1</a:t>
             </a:fld>
-            <a:endParaRPr lang="en-US"/>
+            <a:endParaRPr lang="en-US" dirty="0"/>
           </a:p>
         </p:txBody>
       </p:sp>
@@ -8173,7 +8134,7 @@
           <a:p>
             <a:r>
               <a:rPr lang="en-US" smtClean="0"/>
-              <a:t>2018-03-21</a:t>
+              <a:t>2018-05-07</a:t>
             </a:r>
             <a:endParaRPr lang="en-US"/>
           </a:p>
@@ -8444,7 +8405,7 @@
           <a:p>
             <a:r>
               <a:rPr lang="en-US" smtClean="0"/>
-              <a:t>2018-03-21</a:t>
+              <a:t>2018-05-07</a:t>
             </a:r>
             <a:endParaRPr lang="en-US"/>
           </a:p>
@@ -8550,7 +8511,7 @@
           <a:p>
             <a:r>
               <a:rPr lang="en-US" smtClean="0"/>
-              <a:t>2018-03-21</a:t>
+              <a:t>2018-05-07</a:t>
             </a:r>
             <a:endParaRPr lang="en-US" dirty="0"/>
           </a:p>
@@ -10203,7 +10164,7 @@
           <a:p>
             <a:r>
               <a:rPr lang="en-US" smtClean="0"/>
-              <a:t>2018-03-21</a:t>
+              <a:t>2018-05-07</a:t>
             </a:r>
             <a:endParaRPr lang="en-US" dirty="0"/>
           </a:p>
@@ -10315,7 +10276,7 @@
           <a:p>
             <a:r>
               <a:rPr lang="en-US" smtClean="0"/>
-              <a:t>2018-03-21</a:t>
+              <a:t>2018-05-07</a:t>
             </a:r>
             <a:endParaRPr lang="en-US" dirty="0"/>
           </a:p>
@@ -10464,7 +10425,7 @@
           <a:p>
             <a:r>
               <a:rPr lang="en-US" smtClean="0"/>
-              <a:t>2018-03-21</a:t>
+              <a:t>2018-05-07</a:t>
             </a:r>
             <a:endParaRPr lang="en-US" dirty="0"/>
           </a:p>
@@ -10615,7 +10576,7 @@
           <a:p>
             <a:r>
               <a:rPr lang="en-US" smtClean="0"/>
-              <a:t>2018-03-21</a:t>
+              <a:t>2018-05-07</a:t>
             </a:r>
             <a:endParaRPr lang="en-US" dirty="0"/>
           </a:p>
@@ -10768,7 +10729,7 @@
           <a:p>
             <a:r>
               <a:rPr lang="en-US" smtClean="0"/>
-              <a:t>2018-03-21</a:t>
+              <a:t>2018-05-07</a:t>
             </a:r>
             <a:endParaRPr lang="en-US" dirty="0"/>
           </a:p>
@@ -11018,7 +10979,7 @@
           <a:p>
             <a:r>
               <a:rPr lang="en-US" smtClean="0"/>
-              <a:t>2018-03-21</a:t>
+              <a:t>2018-05-07</a:t>
             </a:r>
             <a:endParaRPr lang="en-US"/>
           </a:p>
@@ -11330,11 +11291,7 @@
             </a:br>
             <a:r>
               <a:rPr lang="en-US" dirty="0" smtClean="0"/>
-              <a:t>Any DBA can try it out in </a:t>
-            </a:r>
-            <a:r>
-              <a:rPr lang="en-US" dirty="0" smtClean="0"/>
-              <a:t>a few hours</a:t>
+              <a:t>Any DBA can try it out in a few hours</a:t>
             </a:r>
             <a:endParaRPr lang="en-US" dirty="0"/>
           </a:p>
@@ -11357,7 +11314,7 @@
           <a:p>
             <a:r>
               <a:rPr lang="en-US" smtClean="0"/>
-              <a:t>2018-03-21</a:t>
+              <a:t>2018-05-07</a:t>
             </a:r>
             <a:endParaRPr lang="en-US"/>
           </a:p>
@@ -11675,8 +11632,8 @@
           <a:lstStyle/>
           <a:p>
             <a:r>
-              <a:rPr lang="en-US" smtClean="0"/>
-              <a:t>2018-03-21</a:t>
+              <a:rPr lang="en-US" dirty="0" smtClean="0"/>
+              <a:t>2018-05-07</a:t>
             </a:r>
             <a:endParaRPr lang="en-US" dirty="0"/>
           </a:p>
@@ -11701,7 +11658,7 @@
               <a:rPr lang="en-US" smtClean="0"/>
               <a:t>2</a:t>
             </a:fld>
-            <a:endParaRPr lang="en-US"/>
+            <a:endParaRPr lang="en-US" dirty="0"/>
           </a:p>
         </p:txBody>
       </p:sp>
@@ -11881,27 +11838,57 @@
                   </a:schemeClr>
                 </a:solidFill>
               </a:rPr>
-              <a:t>Invalid access or </a:t>
-            </a:r>
-            <a:r>
-              <a:rPr lang="en-US" dirty="0" err="1">
+              <a:t>Invalid access </a:t>
+            </a:r>
+            <a:r>
+              <a:rPr lang="en-US" dirty="0" smtClean="0">
                 <a:solidFill>
                   <a:schemeClr val="bg1">
                     <a:lumMod val="50000"/>
                   </a:schemeClr>
                 </a:solidFill>
               </a:rPr>
-              <a:t>config</a:t>
-            </a:r>
-            <a:r>
-              <a:rPr lang="en-US" dirty="0">
+              <a:t>or </a:t>
+            </a:r>
+            <a:r>
+              <a:rPr lang="en-US" dirty="0" err="1">
                 <a:solidFill>
                   <a:schemeClr val="bg1">
                     <a:lumMod val="50000"/>
                   </a:schemeClr>
                 </a:solidFill>
               </a:rPr>
-              <a:t> changes email admin</a:t>
+              <a:t>config</a:t>
+            </a:r>
+            <a:r>
+              <a:rPr lang="en-US" dirty="0">
+                <a:solidFill>
+                  <a:schemeClr val="bg1">
+                    <a:lumMod val="50000"/>
+                  </a:schemeClr>
+                </a:solidFill>
+              </a:rPr>
+              <a:t> changes </a:t>
+            </a:r>
+            <a:r>
+              <a:rPr lang="en-US" dirty="0" smtClean="0">
+                <a:solidFill>
+                  <a:schemeClr val="bg1">
+                    <a:lumMod val="50000"/>
+                  </a:schemeClr>
+                </a:solidFill>
+              </a:rPr>
+              <a:t>email </a:t>
+            </a:r>
+            <a:r>
+              <a:rPr lang="en-US" dirty="0">
+                <a:solidFill>
+                  <a:schemeClr val="bg1">
+                    <a:lumMod val="50000"/>
+                  </a:schemeClr>
+                </a:solidFill>
+              </a:rPr>
+              <a:t>admin</a:t>
             </a:r>
           </a:p>
           <a:p>
@@ -11969,7 +11956,7 @@
           <a:p>
             <a:r>
               <a:rPr lang="en-US" smtClean="0"/>
-              <a:t>2018-03-21</a:t>
+              <a:t>2018-05-07</a:t>
             </a:r>
             <a:endParaRPr lang="en-US" dirty="0"/>
           </a:p>
@@ -12098,53 +12085,6 @@
               <a:cs typeface="Courier New" panose="02070309020205020404" pitchFamily="49" charset="0"/>
             </a:endParaRPr>
           </a:p>
-          <a:p>
-            <a:pPr marL="0" indent="0">
-              <a:buNone/>
-            </a:pPr>
-            <a:r>
-              <a:rPr lang="en-US" sz="2700" dirty="0" smtClean="0">
-                <a:cs typeface="Courier New" panose="02070309020205020404" pitchFamily="49" charset="0"/>
-              </a:rPr>
-              <a:t>1 - Only slightly configurable (strongly not recommended)</a:t>
-            </a:r>
-            <a:br>
-              <a:rPr lang="en-US" sz="2700" dirty="0" smtClean="0">
-                <a:cs typeface="Courier New" panose="02070309020205020404" pitchFamily="49" charset="0"/>
-              </a:rPr>
-            </a:br>
-            <a:r>
-              <a:rPr lang="en-US" sz="2700" dirty="0" smtClean="0">
-                <a:cs typeface="Courier New" panose="02070309020205020404" pitchFamily="49" charset="0"/>
-              </a:rPr>
-              <a:t>2 - Only slightly configurable (not recommended)</a:t>
-            </a:r>
-            <a:br>
-              <a:rPr lang="en-US" sz="2700" dirty="0" smtClean="0">
-                <a:cs typeface="Courier New" panose="02070309020205020404" pitchFamily="49" charset="0"/>
-              </a:rPr>
-            </a:br>
-            <a:r>
-              <a:rPr lang="en-US" sz="2700" dirty="0" smtClean="0">
-                <a:cs typeface="Courier New" panose="02070309020205020404" pitchFamily="49" charset="0"/>
-              </a:rPr>
-              <a:t>3 - No need to worry about</a:t>
-            </a:r>
-            <a:br>
-              <a:rPr lang="en-US" sz="2700" dirty="0" smtClean="0">
-                <a:cs typeface="Courier New" panose="02070309020205020404" pitchFamily="49" charset="0"/>
-              </a:rPr>
-            </a:br>
-            <a:r>
-              <a:rPr lang="en-US" sz="2700" dirty="0" smtClean="0">
-                <a:cs typeface="Courier New" panose="02070309020205020404" pitchFamily="49" charset="0"/>
-              </a:rPr>
-              <a:t>4 - Highly configurable</a:t>
-            </a:r>
-            <a:endParaRPr lang="en-US" sz="2700" dirty="0">
-              <a:cs typeface="Courier New" panose="02070309020205020404" pitchFamily="49" charset="0"/>
-            </a:endParaRPr>
-          </a:p>
         </p:txBody>
       </p:sp>
       <p:sp>
@@ -12164,7 +12104,7 @@
           <a:p>
             <a:r>
               <a:rPr lang="en-US" smtClean="0"/>
-              <a:t>2018-03-21</a:t>
+              <a:t>2018-05-07</a:t>
             </a:r>
             <a:endParaRPr lang="en-US" dirty="0"/>
           </a:p>
@@ -12202,25 +12142,25 @@
           <p:nvPr>
             <p:extLst>
               <p:ext uri="{D42A27DB-BD31-4B8C-83A1-F6EECF244321}">
-                <p14:modId xmlns:p14="http://schemas.microsoft.com/office/powerpoint/2010/main" val="1505822581"/>
+                <p14:modId xmlns:p14="http://schemas.microsoft.com/office/powerpoint/2010/main" val="1726416965"/>
               </p:ext>
             </p:extLst>
           </p:nvPr>
         </p:nvGraphicFramePr>
         <p:xfrm>
-          <a:off x="304800" y="971550"/>
-          <a:ext cx="6934200" cy="1682496"/>
+          <a:off x="152400" y="1352550"/>
+          <a:ext cx="7543800" cy="2209800"/>
         </p:xfrm>
         <a:graphic>
           <a:graphicData uri="http://schemas.openxmlformats.org/drawingml/2006/table">
             <a:tbl>
               <a:tblPr firstRow="1" firstCol="1" bandRow="1"/>
               <a:tblGrid>
-                <a:gridCol w="1757082"/>
-                <a:gridCol w="3451412"/>
-                <a:gridCol w="1725706"/>
+                <a:gridCol w="1969477"/>
+                <a:gridCol w="3135923"/>
+                <a:gridCol w="2438400"/>
               </a:tblGrid>
-              <a:tr h="304800">
+              <a:tr h="736600">
                 <a:tc>
                   <a:txBody>
                     <a:bodyPr/>
@@ -12360,7 +12300,7 @@
                   </a:tcPr>
                 </a:tc>
               </a:tr>
-              <a:tr h="304800">
+              <a:tr h="736600">
                 <a:tc>
                   <a:txBody>
                     <a:bodyPr/>
@@ -12378,7 +12318,7 @@
                         </a:spcAft>
                       </a:pPr>
                       <a:r>
-                        <a:rPr lang="en-US" sz="3200" dirty="0">
+                        <a:rPr lang="en-US" sz="3600" dirty="0">
                           <a:effectLst/>
                           <a:latin typeface="+mj-lt"/>
                           <a:ea typeface="Calibri"/>
@@ -12414,7 +12354,7 @@
                     <a:bodyPr/>
                     <a:lstStyle/>
                     <a:p>
-                      <a:pPr marL="0" marR="0">
+                      <a:pPr marL="0" marR="0" algn="ctr">
                         <a:lnSpc>
                           <a:spcPct val="115000"/>
                         </a:lnSpc>
@@ -12426,13 +12366,22 @@
                         </a:spcAft>
                       </a:pPr>
                       <a:r>
-                        <a:rPr lang="en-US" sz="3200" dirty="0">
+                        <a:rPr lang="en-US" sz="3600" dirty="0" smtClean="0">
                           <a:effectLst/>
                           <a:latin typeface="+mj-lt"/>
                           <a:ea typeface="Calibri"/>
                           <a:cs typeface="Times New Roman"/>
                         </a:rPr>
-                        <a:t>1) High</a:t>
+                        <a:t> </a:t>
+                      </a:r>
+                      <a:r>
+                        <a:rPr lang="en-US" sz="3600" dirty="0">
+                          <a:effectLst/>
+                          <a:latin typeface="+mj-lt"/>
+                          <a:ea typeface="Calibri"/>
+                          <a:cs typeface="Times New Roman"/>
+                        </a:rPr>
+                        <a:t>High</a:t>
                       </a:r>
                     </a:p>
                   </a:txBody>
@@ -12483,7 +12432,7 @@
                     <a:bodyPr/>
                     <a:lstStyle/>
                     <a:p>
-                      <a:pPr marL="0" marR="0">
+                      <a:pPr marL="0" marR="0" algn="ctr">
                         <a:lnSpc>
                           <a:spcPct val="115000"/>
                         </a:lnSpc>
@@ -12495,13 +12444,22 @@
                         </a:spcAft>
                       </a:pPr>
                       <a:r>
-                        <a:rPr lang="en-US" sz="3200">
+                        <a:rPr lang="en-US" sz="3600" dirty="0" smtClean="0">
                           <a:effectLst/>
                           <a:latin typeface="+mj-lt"/>
                           <a:ea typeface="Calibri"/>
                           <a:cs typeface="Times New Roman"/>
                         </a:rPr>
-                        <a:t>3) Low</a:t>
+                        <a:t> </a:t>
+                      </a:r>
+                      <a:r>
+                        <a:rPr lang="en-US" sz="3600" dirty="0">
+                          <a:effectLst/>
+                          <a:latin typeface="+mj-lt"/>
+                          <a:ea typeface="Calibri"/>
+                          <a:cs typeface="Times New Roman"/>
+                        </a:rPr>
+                        <a:t>Low</a:t>
                       </a:r>
                     </a:p>
                   </a:txBody>
@@ -12548,7 +12506,7 @@
                   </a:tcPr>
                 </a:tc>
               </a:tr>
-              <a:tr h="304800">
+              <a:tr h="736600">
                 <a:tc>
                   <a:txBody>
                     <a:bodyPr/>
@@ -12566,7 +12524,7 @@
                         </a:spcAft>
                       </a:pPr>
                       <a:r>
-                        <a:rPr lang="en-US" sz="3200" dirty="0">
+                        <a:rPr lang="en-US" sz="3600" dirty="0">
                           <a:effectLst/>
                           <a:latin typeface="+mj-lt"/>
                           <a:ea typeface="Calibri"/>
@@ -12602,7 +12560,7 @@
                     <a:bodyPr/>
                     <a:lstStyle/>
                     <a:p>
-                      <a:pPr marL="0" marR="0">
+                      <a:pPr marL="0" marR="0" algn="ctr">
                         <a:lnSpc>
                           <a:spcPct val="115000"/>
                         </a:lnSpc>
@@ -12614,14 +12572,38 @@
                         </a:spcAft>
                       </a:pPr>
                       <a:r>
-                        <a:rPr lang="en-US" sz="3200" dirty="0">
+                        <a:rPr lang="en-US" sz="3600" dirty="0" smtClean="0">
                           <a:effectLst/>
                           <a:latin typeface="+mj-lt"/>
                           <a:ea typeface="Calibri"/>
                           <a:cs typeface="Times New Roman"/>
                         </a:rPr>
-                        <a:t>2) Medium to High</a:t>
+                        <a:t> </a:t>
                       </a:r>
+                      <a:r>
+                        <a:rPr lang="en-US" sz="3600" dirty="0">
+                          <a:effectLst/>
+                          <a:latin typeface="+mj-lt"/>
+                          <a:ea typeface="Calibri"/>
+                          <a:cs typeface="Times New Roman"/>
+                        </a:rPr>
+                        <a:t>Medium </a:t>
+                      </a:r>
+                      <a:r>
+                        <a:rPr lang="en-US" sz="3600" dirty="0" smtClean="0">
+                          <a:effectLst/>
+                          <a:latin typeface="+mj-lt"/>
+                          <a:ea typeface="Calibri"/>
+                          <a:cs typeface="Times New Roman"/>
+                        </a:rPr>
+                        <a:t>- High</a:t>
+                      </a:r>
+                      <a:endParaRPr lang="en-US" sz="3600" dirty="0">
+                        <a:effectLst/>
+                        <a:latin typeface="+mj-lt"/>
+                        <a:ea typeface="Calibri"/>
+                        <a:cs typeface="Times New Roman"/>
+                      </a:endParaRPr>
                     </a:p>
                   </a:txBody>
                   <a:tcPr marL="68580" marR="68580" marT="0" marB="0">
@@ -12671,7 +12653,7 @@
                     <a:bodyPr/>
                     <a:lstStyle/>
                     <a:p>
-                      <a:pPr marL="0" marR="0">
+                      <a:pPr marL="0" marR="0" algn="ctr">
                         <a:lnSpc>
                           <a:spcPct val="115000"/>
                         </a:lnSpc>
@@ -12683,13 +12665,22 @@
                         </a:spcAft>
                       </a:pPr>
                       <a:r>
-                        <a:rPr lang="en-US" sz="3200" dirty="0">
+                        <a:rPr lang="en-US" sz="3600" dirty="0" smtClean="0">
                           <a:effectLst/>
                           <a:latin typeface="+mj-lt"/>
                           <a:ea typeface="Calibri"/>
                           <a:cs typeface="Times New Roman"/>
                         </a:rPr>
-                        <a:t>4) None</a:t>
+                        <a:t> </a:t>
+                      </a:r>
+                      <a:r>
+                        <a:rPr lang="en-US" sz="3600" dirty="0">
+                          <a:effectLst/>
+                          <a:latin typeface="+mj-lt"/>
+                          <a:ea typeface="Calibri"/>
+                          <a:cs typeface="Times New Roman"/>
+                        </a:rPr>
+                        <a:t>None</a:t>
                       </a:r>
                     </a:p>
                   </a:txBody>
@@ -12932,7 +12923,7 @@
           <a:p>
             <a:r>
               <a:rPr lang="en-US" smtClean="0"/>
-              <a:t>2018-03-21</a:t>
+              <a:t>2018-05-07</a:t>
             </a:r>
             <a:endParaRPr lang="en-US" dirty="0"/>
           </a:p>
@@ -14119,7 +14110,7 @@
           <a:p>
             <a:r>
               <a:rPr lang="en-US" smtClean="0"/>
-              <a:t>2018-03-21</a:t>
+              <a:t>2018-05-07</a:t>
             </a:r>
             <a:endParaRPr lang="en-US" dirty="0"/>
           </a:p>
@@ -14287,26 +14278,16 @@
             </a:pPr>
             <a:r>
               <a:rPr lang="en-US" dirty="0" smtClean="0"/>
-              <a:t>Create an issue on the </a:t>
-            </a:r>
-            <a:r>
-              <a:rPr lang="en-US" dirty="0"/>
-              <a:t>GitHub repository:</a:t>
+              <a:t>Create an issue on the GitHub repository:</a:t>
             </a:r>
             <a:br>
-              <a:rPr lang="en-US" dirty="0"/>
+              <a:rPr lang="en-US" dirty="0" smtClean="0"/>
             </a:br>
-            <a:r>
-              <a:rPr lang="en-US" dirty="0">
-                <a:hlinkClick r:id="rId6"/>
-              </a:rPr>
-              <a:t>https://</a:t>
-            </a:r>
             <a:r>
               <a:rPr lang="en-US" dirty="0" smtClean="0">
                 <a:hlinkClick r:id="rId6"/>
               </a:rPr>
-              <a:t>github.com/method5/method5</a:t>
+              <a:t>https://github.com/method5/method5</a:t>
             </a:r>
             <a:endParaRPr lang="en-US" dirty="0" smtClean="0"/>
           </a:p>
@@ -14329,7 +14310,7 @@
           <a:p>
             <a:r>
               <a:rPr lang="en-US" smtClean="0"/>
-              <a:t>2018-03-21</a:t>
+              <a:t>2018-05-07</a:t>
             </a:r>
             <a:endParaRPr lang="en-US"/>
           </a:p>
@@ -14440,7 +14421,7 @@
         <p:spPr/>
         <p:txBody>
           <a:bodyPr>
-            <a:normAutofit lnSpcReduction="10000"/>
+            <a:normAutofit/>
           </a:bodyPr>
           <a:lstStyle/>
           <a:p>
@@ -14450,7 +14431,7 @@
             </a:pPr>
             <a:r>
               <a:rPr lang="en-US" dirty="0" smtClean="0"/>
-              <a:t>Not just faster</a:t>
+              <a:t>Remote execution is not just faster</a:t>
             </a:r>
           </a:p>
           <a:p>
@@ -14460,7 +14441,7 @@
             </a:pPr>
             <a:r>
               <a:rPr lang="en-US" dirty="0" smtClean="0"/>
-              <a:t>Find it, fix it, and prevent it everywhere</a:t>
+              <a:t>Find, fix, and prevent all problems on all databases</a:t>
             </a:r>
           </a:p>
           <a:p>
@@ -14470,7 +14451,7 @@
             </a:pPr>
             <a:r>
               <a:rPr lang="en-US" dirty="0" smtClean="0"/>
-              <a:t>Always check all databases</a:t>
+              <a:t>Be proactive (preventive maintenance)</a:t>
             </a:r>
           </a:p>
           <a:p>
@@ -14480,27 +14461,7 @@
             </a:pPr>
             <a:r>
               <a:rPr lang="en-US" dirty="0" smtClean="0"/>
-              <a:t>Be proactive (preventive maintenance)</a:t>
-            </a:r>
-          </a:p>
-          <a:p>
-            <a:pPr marL="514350" indent="-514350">
-              <a:buFont typeface="+mj-lt"/>
-              <a:buAutoNum type="arabicPeriod"/>
-            </a:pPr>
-            <a:r>
-              <a:rPr lang="en-US" dirty="0" smtClean="0"/>
-              <a:t>Treat the whole data center as one database</a:t>
-            </a:r>
-          </a:p>
-          <a:p>
-            <a:pPr marL="514350" indent="-514350">
-              <a:buFont typeface="+mj-lt"/>
-              <a:buAutoNum type="arabicPeriod"/>
-            </a:pPr>
-            <a:r>
-              <a:rPr lang="en-US" dirty="0" smtClean="0"/>
-              <a:t>Run a query today to save time tomorrow</a:t>
+              <a:t>Work on only ONE database</a:t>
             </a:r>
           </a:p>
         </p:txBody>
@@ -14521,8 +14482,8 @@
           <a:lstStyle/>
           <a:p>
             <a:r>
-              <a:rPr lang="en-US" dirty="0" smtClean="0"/>
-              <a:t>2018-03-21</a:t>
+              <a:rPr lang="en-US" smtClean="0"/>
+              <a:t>2018-05-07</a:t>
             </a:r>
             <a:endParaRPr lang="en-US" dirty="0"/>
           </a:p>
@@ -14680,7 +14641,7 @@
             </a:pPr>
             <a:r>
               <a:rPr lang="en-US" sz="2800" dirty="0" smtClean="0"/>
-              <a:t>Oracle developer or DBA for 15 years</a:t>
+              <a:t>Oracle developer or DBA for 17 years</a:t>
             </a:r>
           </a:p>
           <a:p>
@@ -14765,10 +14726,10 @@
           <a:lstStyle/>
           <a:p>
             <a:r>
-              <a:rPr lang="en-US" smtClean="0"/>
-              <a:t>2018-03-21</a:t>
-            </a:r>
-            <a:endParaRPr lang="en-US"/>
+              <a:rPr lang="en-US" dirty="0" smtClean="0"/>
+              <a:t>2018-05-07</a:t>
+            </a:r>
+            <a:endParaRPr lang="en-US" dirty="0"/>
           </a:p>
         </p:txBody>
       </p:sp>
@@ -14791,7 +14752,7 @@
               <a:rPr lang="en-US" smtClean="0"/>
               <a:t>3</a:t>
             </a:fld>
-            <a:endParaRPr lang="en-US"/>
+            <a:endParaRPr lang="en-US" dirty="0"/>
           </a:p>
         </p:txBody>
       </p:sp>
@@ -15030,7 +14991,7 @@
         <p:spPr/>
         <p:txBody>
           <a:bodyPr>
-            <a:normAutofit lnSpcReduction="10000"/>
+            <a:normAutofit fontScale="92500" lnSpcReduction="20000"/>
           </a:bodyPr>
           <a:lstStyle/>
           <a:p>
@@ -15083,6 +15044,16 @@
               <a:t>SQL and PL/SQL are great but per-database</a:t>
             </a:r>
           </a:p>
+          <a:p>
+            <a:pPr marL="514350" indent="-514350">
+              <a:buFont typeface="+mj-lt"/>
+              <a:buAutoNum type="arabicPeriod"/>
+            </a:pPr>
+            <a:r>
+              <a:rPr lang="en-US" dirty="0" smtClean="0"/>
+              <a:t>We avoid row-by-row processing, we should also avoid database-by-database administration</a:t>
+            </a:r>
+          </a:p>
         </p:txBody>
       </p:sp>
       <p:sp>
@@ -15101,10 +15072,10 @@
           <a:lstStyle/>
           <a:p>
             <a:r>
-              <a:rPr lang="en-US" smtClean="0"/>
-              <a:t>2018-03-21</a:t>
-            </a:r>
-            <a:endParaRPr lang="en-US"/>
+              <a:rPr lang="en-US" dirty="0" smtClean="0"/>
+              <a:t>2018-05-07</a:t>
+            </a:r>
+            <a:endParaRPr lang="en-US" dirty="0"/>
           </a:p>
         </p:txBody>
       </p:sp>
@@ -15127,7 +15098,7 @@
               <a:rPr lang="en-US" smtClean="0"/>
               <a:t>4</a:t>
             </a:fld>
-            <a:endParaRPr lang="en-US"/>
+            <a:endParaRPr lang="en-US" dirty="0"/>
           </a:p>
         </p:txBody>
       </p:sp>
@@ -15238,10 +15209,10 @@
           <a:lstStyle/>
           <a:p>
             <a:r>
-              <a:rPr lang="en-US" smtClean="0"/>
-              <a:t>2018-03-21</a:t>
-            </a:r>
-            <a:endParaRPr lang="en-US"/>
+              <a:rPr lang="en-US" dirty="0" smtClean="0"/>
+              <a:t>2018-05-07</a:t>
+            </a:r>
+            <a:endParaRPr lang="en-US" dirty="0"/>
           </a:p>
         </p:txBody>
       </p:sp>
@@ -15264,7 +15235,7 @@
               <a:rPr lang="en-US" smtClean="0"/>
               <a:t>5</a:t>
             </a:fld>
-            <a:endParaRPr lang="en-US"/>
+            <a:endParaRPr lang="en-US" dirty="0"/>
           </a:p>
         </p:txBody>
       </p:sp>
@@ -16047,10 +16018,10 @@
           <a:lstStyle/>
           <a:p>
             <a:r>
-              <a:rPr lang="en-US" smtClean="0"/>
-              <a:t>2018-03-21</a:t>
-            </a:r>
-            <a:endParaRPr lang="en-US"/>
+              <a:rPr lang="en-US" dirty="0" smtClean="0"/>
+              <a:t>2018-05-07</a:t>
+            </a:r>
+            <a:endParaRPr lang="en-US" dirty="0"/>
           </a:p>
         </p:txBody>
       </p:sp>
@@ -16073,7 +16044,7 @@
               <a:rPr lang="en-US" smtClean="0"/>
               <a:t>6</a:t>
             </a:fld>
-            <a:endParaRPr lang="en-US"/>
+            <a:endParaRPr lang="en-US" dirty="0"/>
           </a:p>
         </p:txBody>
       </p:sp>
@@ -16132,8 +16103,12 @@
           <a:lstStyle/>
           <a:p>
             <a:r>
-              <a:rPr lang="en-US" dirty="0" smtClean="0"/>
-              <a:t>A Robust Solution – Method5</a:t>
+              <a:rPr lang="en-US" dirty="0"/>
+              <a:t>A Robust </a:t>
+            </a:r>
+            <a:r>
+              <a:rPr lang="en-US" dirty="0" smtClean="0"/>
+              <a:t>Solution – Method5</a:t>
             </a:r>
             <a:endParaRPr lang="en-US" dirty="0"/>
           </a:p>
@@ -16152,7 +16127,7 @@
         <p:spPr/>
         <p:txBody>
           <a:bodyPr>
-            <a:normAutofit lnSpcReduction="10000"/>
+            <a:normAutofit/>
           </a:bodyPr>
           <a:lstStyle/>
           <a:p>
@@ -16161,7 +16136,7 @@
               <a:buAutoNum type="arabicPeriod"/>
             </a:pPr>
             <a:r>
-              <a:rPr lang="en-US" dirty="0" smtClean="0"/>
+              <a:rPr lang="en-US" dirty="0"/>
               <a:t>Not your typical home-made script</a:t>
             </a:r>
           </a:p>
@@ -16171,32 +16146,12 @@
               <a:buAutoNum type="arabicPeriod"/>
             </a:pPr>
             <a:r>
-              <a:rPr lang="en-US" dirty="0" smtClean="0"/>
+              <a:rPr lang="en-US" dirty="0"/>
               <a:t>In production since </a:t>
             </a:r>
             <a:r>
-              <a:rPr lang="en-US" dirty="0"/>
-              <a:t>2014 for </a:t>
-            </a:r>
-            <a:r>
-              <a:rPr lang="en-US" dirty="0" smtClean="0"/>
-              <a:t>one of the </a:t>
-            </a:r>
-            <a:r>
-              <a:rPr lang="en-US" dirty="0"/>
-              <a:t>largest healthcare data </a:t>
-            </a:r>
-            <a:r>
-              <a:rPr lang="en-US" dirty="0" smtClean="0"/>
-              <a:t>centers </a:t>
-            </a:r>
-            <a:r>
-              <a:rPr lang="en-US" dirty="0"/>
-              <a:t>in the </a:t>
-            </a:r>
-            <a:r>
-              <a:rPr lang="en-US" dirty="0" smtClean="0"/>
-              <a:t>world</a:t>
+              <a:rPr lang="en-US" dirty="0" smtClean="0"/>
+              <a:t>2014, public since 2016</a:t>
             </a:r>
           </a:p>
           <a:p>
@@ -16206,8 +16161,17 @@
             </a:pPr>
             <a:r>
               <a:rPr lang="en-US" dirty="0" smtClean="0"/>
-              <a:t>&gt;400 databases, &gt;1PB data</a:t>
-            </a:r>
+              <a:t>First user: 400 </a:t>
+            </a:r>
+            <a:r>
+              <a:rPr lang="en-US" dirty="0"/>
+              <a:t>databases, </a:t>
+            </a:r>
+            <a:r>
+              <a:rPr lang="en-US" dirty="0" smtClean="0"/>
+              <a:t>1 petabyte of data, 15 million runs</a:t>
+            </a:r>
+            <a:endParaRPr lang="en-US" dirty="0"/>
           </a:p>
           <a:p>
             <a:pPr marL="514350" indent="-514350">
@@ -16216,7 +16180,15 @@
             </a:pPr>
             <a:r>
               <a:rPr lang="en-US" dirty="0" smtClean="0"/>
-              <a:t>&gt;10 million runs, &gt;1800 tests, open source</a:t>
+              <a:t>1800 unit tests</a:t>
+            </a:r>
+            <a:r>
+              <a:rPr lang="en-US" dirty="0"/>
+              <a:t>, open </a:t>
+            </a:r>
+            <a:r>
+              <a:rPr lang="en-US" dirty="0" smtClean="0"/>
+              <a:t>source, focus on security</a:t>
             </a:r>
           </a:p>
           <a:p>
@@ -16224,10 +16196,7 @@
               <a:buFont typeface="+mj-lt"/>
               <a:buAutoNum type="arabicPeriod"/>
             </a:pPr>
-            <a:r>
-              <a:rPr lang="en-US" dirty="0" smtClean="0"/>
-              <a:t>Security has always been a priority</a:t>
-            </a:r>
+            <a:endParaRPr lang="en-US" dirty="0"/>
           </a:p>
         </p:txBody>
       </p:sp>
@@ -16247,10 +16216,10 @@
           <a:lstStyle/>
           <a:p>
             <a:r>
-              <a:rPr lang="en-US" smtClean="0"/>
-              <a:t>2018-03-21</a:t>
-            </a:r>
-            <a:endParaRPr lang="en-US"/>
+              <a:rPr lang="en-US" dirty="0" smtClean="0"/>
+              <a:t>2018-05-07</a:t>
+            </a:r>
+            <a:endParaRPr lang="en-US" dirty="0"/>
           </a:p>
         </p:txBody>
       </p:sp>
@@ -16273,7 +16242,7 @@
               <a:rPr lang="en-US" smtClean="0"/>
               <a:t>7</a:t>
             </a:fld>
-            <a:endParaRPr lang="en-US"/>
+            <a:endParaRPr lang="en-US" dirty="0"/>
           </a:p>
         </p:txBody>
       </p:sp>
@@ -16351,8 +16320,8 @@
         </p:nvSpPr>
         <p:spPr>
           <a:xfrm>
-            <a:off x="304800" y="1200150"/>
-            <a:ext cx="8458200" cy="3581400"/>
+            <a:off x="304800" y="1047750"/>
+            <a:ext cx="8458200" cy="3733800"/>
           </a:xfrm>
         </p:spPr>
         <p:txBody>
@@ -16553,6 +16522,20 @@
             <a:pPr marL="0" indent="0">
               <a:buNone/>
             </a:pPr>
+            <a:endParaRPr lang="en-US" sz="2000" b="1" dirty="0" smtClean="0">
+              <a:solidFill>
+                <a:srgbClr val="000080"/>
+              </a:solidFill>
+              <a:highlight>
+                <a:srgbClr val="FFFFFF"/>
+              </a:highlight>
+              <a:latin typeface="Courier New"/>
+            </a:endParaRPr>
+          </a:p>
+          <a:p>
+            <a:pPr marL="0" indent="0">
+              <a:buNone/>
+            </a:pPr>
             <a:r>
               <a:rPr lang="en-US" sz="2000" b="1" dirty="0" smtClean="0">
                 <a:solidFill>
@@ -17192,7 +17175,7 @@
           <a:p>
             <a:r>
               <a:rPr lang="en-US" smtClean="0"/>
-              <a:t>2018-03-21</a:t>
+              <a:t>2018-05-07</a:t>
             </a:r>
             <a:endParaRPr lang="en-US" dirty="0"/>
           </a:p>
@@ -17229,7 +17212,7 @@
         </p:nvSpPr>
         <p:spPr>
           <a:xfrm>
-            <a:off x="2590800" y="1809750"/>
+            <a:off x="2590800" y="1657350"/>
             <a:ext cx="2895600" cy="283388"/>
           </a:xfrm>
           <a:prstGeom prst="rect">
@@ -17273,7 +17256,7 @@
         </p:nvSpPr>
         <p:spPr>
           <a:xfrm>
-            <a:off x="5908966" y="1831162"/>
+            <a:off x="5908966" y="1657350"/>
             <a:ext cx="1177634" cy="283388"/>
           </a:xfrm>
           <a:prstGeom prst="rect">
@@ -17634,7 +17617,7 @@
                   </a:schemeClr>
                 </a:solidFill>
               </a:rPr>
-              <a:t>- handled</a:t>
+              <a:t>- handled, saved</a:t>
             </a:r>
             <a:endParaRPr lang="en-US" dirty="0">
               <a:solidFill>
@@ -17663,7 +17646,7 @@
           <a:p>
             <a:r>
               <a:rPr lang="en-US" smtClean="0"/>
-              <a:t>2018-03-21</a:t>
+              <a:t>2018-05-07</a:t>
             </a:r>
             <a:endParaRPr lang="en-US"/>
           </a:p>

</xml_diff>

<commit_message>
Added book, re-arranged some slides.
</commit_message>
<xml_diff>
--- a/presentations/Method5.pptx
+++ b/presentations/Method5.pptx
@@ -16,9 +16,9 @@
     <p:sldId id="269" r:id="rId4"/>
     <p:sldId id="288" r:id="rId5"/>
     <p:sldId id="259" r:id="rId6"/>
-    <p:sldId id="271" r:id="rId7"/>
-    <p:sldId id="287" r:id="rId8"/>
-    <p:sldId id="281" r:id="rId9"/>
+    <p:sldId id="287" r:id="rId7"/>
+    <p:sldId id="281" r:id="rId8"/>
+    <p:sldId id="271" r:id="rId9"/>
     <p:sldId id="261" r:id="rId10"/>
     <p:sldId id="270" r:id="rId11"/>
     <p:sldId id="280" r:id="rId12"/>
@@ -220,7 +220,7 @@
           <a:p>
             <a:fld id="{E8184847-EC06-4734-8E30-343A2DA340C9}" type="datetimeFigureOut">
               <a:rPr lang="en-US" smtClean="0"/>
-              <a:t>6/8/2018</a:t>
+              <a:t>2/20/2019</a:t>
             </a:fld>
             <a:endParaRPr lang="en-US"/>
           </a:p>
@@ -385,7 +385,7 @@
           <a:p>
             <a:fld id="{DC284B00-8F05-4CB2-A4E6-4A642AFA915E}" type="datetimeFigureOut">
               <a:rPr lang="en-US" smtClean="0"/>
-              <a:t>6/8/2018</a:t>
+              <a:t>2/20/2019</a:t>
             </a:fld>
             <a:endParaRPr lang="en-US"/>
           </a:p>
@@ -1924,19 +1924,11 @@
             </a:pPr>
             <a:r>
               <a:rPr lang="en-US" dirty="0" smtClean="0"/>
-              <a:t>You've </a:t>
-            </a:r>
-            <a:r>
-              <a:rPr lang="en-US" dirty="0" smtClean="0"/>
-              <a:t>probably seen this problem solved poorly many times before, you should be skeptical.  There are a lot of horrible ways to run</a:t>
+              <a:t>You've probably seen this problem solved poorly many times before, you should be skeptical.  There are a lot of horrible ways to run</a:t>
             </a:r>
             <a:r>
               <a:rPr lang="en-US" baseline="0" dirty="0" smtClean="0"/>
-              <a:t> commands on multiple targets</a:t>
-            </a:r>
-            <a:r>
-              <a:rPr lang="en-US" baseline="0" dirty="0" smtClean="0"/>
-              <a:t>.  Creating a good solution took a lot of time and a lot of missteps.</a:t>
+              <a:t> commands on multiple targets.  Creating a good solution took a lot of time and a lot of missteps.</a:t>
             </a:r>
           </a:p>
           <a:p>
@@ -1992,15 +1984,7 @@
             </a:r>
             <a:r>
               <a:rPr lang="en-US" baseline="0" dirty="0" smtClean="0"/>
-              <a:t>At </a:t>
-            </a:r>
-            <a:r>
-              <a:rPr lang="en-US" baseline="0" dirty="0" smtClean="0"/>
-              <a:t>Ventech Solutions it's </a:t>
-            </a:r>
-            <a:r>
-              <a:rPr lang="en-US" baseline="0" dirty="0" smtClean="0"/>
-              <a:t>been used to manage over 400 databases.  The program has run more than 15 million commands, and helps manage 1 petabyte of data.  Dozens of people, from several different teams, have used the program.</a:t>
+              <a:t>At Ventech Solutions it's been used to manage over 400 databases.  The program has run more than 15 million commands, and helps manage 1 petabyte of data.  Dozens of people, from several different teams, have used the program.</a:t>
             </a:r>
             <a:endParaRPr lang="en-US" dirty="0"/>
           </a:p>
@@ -2158,11 +2142,7 @@
             </a:pPr>
             <a:r>
               <a:rPr lang="en-US" baseline="0" dirty="0" smtClean="0"/>
-              <a:t>6. Oracle Data Cartridge is the magic (or at least cryptic) piece that allows Method5 to extend Oracle SQL.  It provides the ability to return "anything", dynamically, in a SQL context.  Running dynamic SQL in SQL is much harder than it sounds</a:t>
-            </a:r>
-            <a:r>
-              <a:rPr lang="en-US" baseline="0" dirty="0" smtClean="0"/>
-              <a:t>.</a:t>
+              <a:t>6. Oracle Data Cartridge is the magic (or at least cryptic) piece that allows Method5 to extend Oracle SQL.  It provides the ability to return "anything", dynamically, in a SQL context.  Running dynamic SQL in SQL is much harder than it sounds.</a:t>
             </a:r>
           </a:p>
           <a:p>
@@ -2361,15 +2341,7 @@
             </a:r>
             <a:r>
               <a:rPr lang="en-US" baseline="0" dirty="0" smtClean="0"/>
-              <a:t> management database that can communicate with all other database.  </a:t>
-            </a:r>
-            <a:r>
-              <a:rPr lang="en-US" baseline="0" dirty="0" smtClean="0"/>
-              <a:t>(If you don't have that, take a look at Oracle Connection Manager.  It's a free program that you can use as a proxy for database connections.)  You </a:t>
-            </a:r>
-            <a:r>
-              <a:rPr lang="en-US" baseline="0" dirty="0" smtClean="0"/>
-              <a:t>must have SYSDBA to install, and DBA privileges to use.  Any currently-supported platform, version, or edition will work.  (And probably some unsupported ones also.)  For testing you only need a single database - the default installation will create some fake links that simulate a multi-database environment.</a:t>
+              <a:t> management database that can communicate with all other database.  (If you don't have that, take a look at Oracle Connection Manager.  It's a free program that you can use as a proxy for database connections.)  You must have SYSDBA to install, and DBA privileges to use.  Any currently-supported platform, version, or edition will work.  (And probably some unsupported ones also.)  For testing you only need a single database - the default installation will create some fake links that simulate a multi-database environment.</a:t>
             </a:r>
           </a:p>
           <a:p>
@@ -4071,12 +4043,7 @@
             <p:ph type="sldImg"/>
           </p:nvPr>
         </p:nvSpPr>
-        <p:spPr>
-          <a:xfrm>
-            <a:off x="381000" y="685800"/>
-            <a:ext cx="6096000" cy="3429000"/>
-          </a:xfrm>
-        </p:spPr>
+        <p:spPr/>
       </p:sp>
       <p:sp>
         <p:nvSpPr>
@@ -4094,62 +4061,21 @@
           <a:lstStyle/>
           <a:p>
             <a:r>
-              <a:rPr lang="en-US" b="0" dirty="0" smtClean="0"/>
-              <a:t>Method5</a:t>
-            </a:r>
-            <a:r>
-              <a:rPr lang="en-US" b="0" baseline="0" dirty="0" smtClean="0"/>
-              <a:t> can be run as either a function or a procedure.  They let you specify </a:t>
-            </a:r>
-            <a:r>
-              <a:rPr lang="en-US" b="1" baseline="0" dirty="0" smtClean="0"/>
-              <a:t>what</a:t>
-            </a:r>
-            <a:r>
-              <a:rPr lang="en-US" b="0" baseline="0" dirty="0" smtClean="0"/>
-              <a:t> to run, </a:t>
-            </a:r>
-            <a:r>
-              <a:rPr lang="en-US" b="1" baseline="0" dirty="0" smtClean="0"/>
-              <a:t>where</a:t>
-            </a:r>
-            <a:r>
-              <a:rPr lang="en-US" b="0" baseline="0" dirty="0" smtClean="0"/>
-              <a:t> to run, and </a:t>
-            </a:r>
-            <a:r>
-              <a:rPr lang="en-US" b="1" baseline="0" dirty="0" smtClean="0"/>
-              <a:t>how</a:t>
-            </a:r>
-            <a:r>
-              <a:rPr lang="en-US" b="0" baseline="0" dirty="0" smtClean="0"/>
-              <a:t> to run</a:t>
-            </a:r>
-            <a:r>
-              <a:rPr lang="en-US" b="0" dirty="0" smtClean="0"/>
-              <a:t>.</a:t>
-            </a:r>
-            <a:r>
-              <a:rPr lang="en-US" b="0" baseline="0" dirty="0" smtClean="0"/>
-              <a:t>  The function returns results immediately.  The procedure </a:t>
-            </a:r>
-            <a:r>
-              <a:rPr lang="en-US" dirty="0" smtClean="0"/>
-              <a:t>saves the results in background tables, and it gives you more control over how the commands are run.</a:t>
-            </a:r>
-            <a:endParaRPr lang="en-US" b="0" dirty="0" smtClean="0"/>
-          </a:p>
-          <a:p>
-            <a:endParaRPr lang="en-US" b="1" dirty="0" smtClean="0"/>
-          </a:p>
-          <a:p>
-            <a:r>
-              <a:rPr lang="en-US" dirty="0" smtClean="0"/>
-              <a:t>Running as a function is simple and neat,</a:t>
+              <a:rPr lang="en-US" dirty="0" smtClean="0"/>
+              <a:t>This screenshot shows a full example of</a:t>
             </a:r>
             <a:r>
               <a:rPr lang="en-US" baseline="0" dirty="0" smtClean="0"/>
-              <a:t> but in practice advanced users will normally want to run things as a procedure.  Running as a procedure makes it asynchronous, which is good for large jobs you don't want to wait for.  It also makes it possible to schedule and chain tasks.</a:t>
+              <a:t> the function interface.  The function interface looks cooler, but in practice you'll most likely want to use the procedure interface.</a:t>
+            </a:r>
+          </a:p>
+          <a:p>
+            <a:endParaRPr lang="en-US" baseline="0" dirty="0" smtClean="0"/>
+          </a:p>
+          <a:p>
+            <a:r>
+              <a:rPr lang="en-US" baseline="0" dirty="0" smtClean="0"/>
+              <a:t>All the rows are returned to the SQL client, in this case SQL Developer.  The results look just like a normal table.</a:t>
             </a:r>
             <a:endParaRPr lang="en-US" dirty="0"/>
           </a:p>
@@ -4181,7 +4107,7 @@
     </p:spTree>
     <p:extLst>
       <p:ext uri="{BB962C8B-B14F-4D97-AF65-F5344CB8AC3E}">
-        <p14:creationId xmlns:p14="http://schemas.microsoft.com/office/powerpoint/2010/main" val="3520608180"/>
+        <p14:creationId xmlns:p14="http://schemas.microsoft.com/office/powerpoint/2010/main" val="3846567511"/>
       </p:ext>
     </p:extLst>
   </p:cSld>
@@ -4237,27 +4163,345 @@
           <a:p>
             <a:r>
               <a:rPr lang="en-US" dirty="0" smtClean="0"/>
-              <a:t>This screenshot shows a full example of</a:t>
+              <a:t>This screenshot is a complete example</a:t>
             </a:r>
             <a:r>
               <a:rPr lang="en-US" baseline="0" dirty="0" smtClean="0"/>
-              <a:t> the function interface</a:t>
-            </a:r>
+              <a:t> of a simple query that can be used to show what databases are responding.</a:t>
+            </a:r>
+          </a:p>
+          <a:p>
+            <a:endParaRPr lang="en-US" baseline="0" dirty="0" smtClean="0"/>
+          </a:p>
+          <a:p>
             <a:r>
               <a:rPr lang="en-US" baseline="0" dirty="0" smtClean="0"/>
-              <a:t>.  The function interface looks cooler, but in practice you'll most likely want to use the procedure interface.</a:t>
-            </a:r>
+              <a:t>1. First the simple SELECT statement is run through the asynchronous procedure M5_PROC.</a:t>
+            </a:r>
+          </a:p>
+          <a:p>
+            <a:r>
+              <a:rPr lang="en-US" baseline="0" dirty="0" smtClean="0"/>
+              <a:t>2. Next the M5_METADATA table is queried.  Since jobs are still running in the background, IS_COMPLETE is still set to No, and the TARGETS_COMPLETED does not equal the TARGETS_EXPECTED yet.  You'll probably want to query this view a few times to watch the progress of the background jobs.  (Not shown on the screenshot are some other columns like TARGETS_WITH_ERRORS, NUM_ROWS, CODE, and TARGETS.)</a:t>
+            </a:r>
+          </a:p>
+          <a:p>
+            <a:r>
+              <a:rPr lang="en-US" baseline="0" dirty="0" smtClean="0"/>
+              <a:t>3. The current results can be queried in M5_RESULTS.  It returns the same columns as the input query, as well as a column for the DATABASE_NAME.</a:t>
+            </a:r>
+          </a:p>
+          <a:p>
+            <a:r>
+              <a:rPr lang="en-US" baseline="0" dirty="0" smtClean="0"/>
+              <a:t>4. M5_ERRORS shows any errors generated while trying to run the query. With a large number of databases it's common for some of them to be unavailable due to maintenance or unexpected errors.  A few databases with errors don't stop the other databases from returning results.</a:t>
+            </a:r>
+          </a:p>
+          <a:p>
             <a:endParaRPr lang="en-US" baseline="0" dirty="0" smtClean="0"/>
           </a:p>
           <a:p>
+            <a:r>
+              <a:rPr lang="en-US" baseline="0" dirty="0" smtClean="0"/>
+              <a:t>(The screenshot does not show all the columns and values because it's hard to fit them on a screen.  The example uses SQL*Plus for its simple text formatting, but in practice you will probably want to use an IDE like PL/SQL Developer, Toad, Oracle SQL Developer, etc.  The exact same code will run on any IDE.)</a:t>
+            </a:r>
+          </a:p>
+          <a:p>
             <a:endParaRPr lang="en-US" baseline="0" dirty="0" smtClean="0"/>
           </a:p>
           <a:p>
             <a:r>
               <a:rPr lang="en-US" baseline="0" dirty="0" smtClean="0"/>
-              <a:t>All the rows are returned to the SQL client, in this case SQL Developer.  The results look just like a normal table.</a:t>
-            </a:r>
-            <a:endParaRPr lang="en-US" dirty="0"/>
+              <a:t>If you want to reproduce this example yourself, here's the full code and SQL*Plus commands to format results:</a:t>
+            </a:r>
+          </a:p>
+          <a:p>
+            <a:endParaRPr lang="en-US" baseline="0" dirty="0" smtClean="0"/>
+          </a:p>
+          <a:p>
+            <a:r>
+              <a:rPr lang="en-US" sz="1000" i="1" baseline="0" dirty="0" smtClean="0">
+                <a:latin typeface="Courier New" panose="02070309020205020404" pitchFamily="49" charset="0"/>
+                <a:cs typeface="Courier New" panose="02070309020205020404" pitchFamily="49" charset="0"/>
+              </a:rPr>
+              <a:t>set </a:t>
+            </a:r>
+            <a:r>
+              <a:rPr lang="en-US" sz="1000" i="1" baseline="0" dirty="0" err="1" smtClean="0">
+                <a:latin typeface="Courier New" panose="02070309020205020404" pitchFamily="49" charset="0"/>
+                <a:cs typeface="Courier New" panose="02070309020205020404" pitchFamily="49" charset="0"/>
+              </a:rPr>
+              <a:t>sqlprompt</a:t>
+            </a:r>
+            <a:r>
+              <a:rPr lang="en-US" sz="1000" i="1" baseline="0" dirty="0" smtClean="0">
+                <a:latin typeface="Courier New" panose="02070309020205020404" pitchFamily="49" charset="0"/>
+                <a:cs typeface="Courier New" panose="02070309020205020404" pitchFamily="49" charset="0"/>
+              </a:rPr>
+              <a:t> "&gt; "</a:t>
+            </a:r>
+          </a:p>
+          <a:p>
+            <a:r>
+              <a:rPr lang="en-US" sz="1000" i="1" baseline="0" dirty="0" smtClean="0">
+                <a:latin typeface="Courier New" panose="02070309020205020404" pitchFamily="49" charset="0"/>
+                <a:cs typeface="Courier New" panose="02070309020205020404" pitchFamily="49" charset="0"/>
+              </a:rPr>
+              <a:t>column </a:t>
+            </a:r>
+            <a:r>
+              <a:rPr lang="en-US" sz="1000" i="1" baseline="0" dirty="0" err="1" smtClean="0">
+                <a:latin typeface="Courier New" panose="02070309020205020404" pitchFamily="49" charset="0"/>
+                <a:cs typeface="Courier New" panose="02070309020205020404" pitchFamily="49" charset="0"/>
+              </a:rPr>
+              <a:t>db_link_name</a:t>
+            </a:r>
+            <a:r>
+              <a:rPr lang="en-US" sz="1000" i="1" baseline="0" dirty="0" smtClean="0">
+                <a:latin typeface="Courier New" panose="02070309020205020404" pitchFamily="49" charset="0"/>
+                <a:cs typeface="Courier New" panose="02070309020205020404" pitchFamily="49" charset="0"/>
+              </a:rPr>
+              <a:t> format a12</a:t>
+            </a:r>
+          </a:p>
+          <a:p>
+            <a:r>
+              <a:rPr lang="en-US" sz="1000" i="1" baseline="0" dirty="0" smtClean="0">
+                <a:latin typeface="Courier New" panose="02070309020205020404" pitchFamily="49" charset="0"/>
+                <a:cs typeface="Courier New" panose="02070309020205020404" pitchFamily="49" charset="0"/>
+              </a:rPr>
+              <a:t>column </a:t>
+            </a:r>
+            <a:r>
+              <a:rPr lang="en-US" sz="1000" i="1" baseline="0" dirty="0" err="1" smtClean="0">
+                <a:latin typeface="Courier New" panose="02070309020205020404" pitchFamily="49" charset="0"/>
+                <a:cs typeface="Courier New" panose="02070309020205020404" pitchFamily="49" charset="0"/>
+              </a:rPr>
+              <a:t>database_name</a:t>
+            </a:r>
+            <a:r>
+              <a:rPr lang="en-US" sz="1000" i="1" baseline="0" dirty="0" smtClean="0">
+                <a:latin typeface="Courier New" panose="02070309020205020404" pitchFamily="49" charset="0"/>
+                <a:cs typeface="Courier New" panose="02070309020205020404" pitchFamily="49" charset="0"/>
+              </a:rPr>
+              <a:t> format a13</a:t>
+            </a:r>
+          </a:p>
+          <a:p>
+            <a:r>
+              <a:rPr lang="en-US" sz="1000" i="1" baseline="0" dirty="0" smtClean="0">
+                <a:latin typeface="Courier New" panose="02070309020205020404" pitchFamily="49" charset="0"/>
+                <a:cs typeface="Courier New" panose="02070309020205020404" pitchFamily="49" charset="0"/>
+              </a:rPr>
+              <a:t>column </a:t>
+            </a:r>
+            <a:r>
+              <a:rPr lang="en-US" sz="1000" i="1" baseline="0" dirty="0" err="1" smtClean="0">
+                <a:latin typeface="Courier New" panose="02070309020205020404" pitchFamily="49" charset="0"/>
+                <a:cs typeface="Courier New" panose="02070309020205020404" pitchFamily="49" charset="0"/>
+              </a:rPr>
+              <a:t>error_stack_and_backtrace</a:t>
+            </a:r>
+            <a:r>
+              <a:rPr lang="en-US" sz="1000" i="1" baseline="0" dirty="0" smtClean="0">
+                <a:latin typeface="Courier New" panose="02070309020205020404" pitchFamily="49" charset="0"/>
+                <a:cs typeface="Courier New" panose="02070309020205020404" pitchFamily="49" charset="0"/>
+              </a:rPr>
+              <a:t> format a100</a:t>
+            </a:r>
+          </a:p>
+          <a:p>
+            <a:r>
+              <a:rPr lang="en-US" sz="1000" i="1" baseline="0" dirty="0" smtClean="0">
+                <a:latin typeface="Courier New" panose="02070309020205020404" pitchFamily="49" charset="0"/>
+                <a:cs typeface="Courier New" panose="02070309020205020404" pitchFamily="49" charset="0"/>
+              </a:rPr>
+              <a:t>column username format a11</a:t>
+            </a:r>
+          </a:p>
+          <a:p>
+            <a:r>
+              <a:rPr lang="en-US" sz="1000" i="1" baseline="0" dirty="0" smtClean="0">
+                <a:latin typeface="Courier New" panose="02070309020205020404" pitchFamily="49" charset="0"/>
+                <a:cs typeface="Courier New" panose="02070309020205020404" pitchFamily="49" charset="0"/>
+              </a:rPr>
+              <a:t>column </a:t>
+            </a:r>
+            <a:r>
+              <a:rPr lang="en-US" sz="1000" i="1" baseline="0" dirty="0" err="1" smtClean="0">
+                <a:latin typeface="Courier New" panose="02070309020205020404" pitchFamily="49" charset="0"/>
+                <a:cs typeface="Courier New" panose="02070309020205020404" pitchFamily="49" charset="0"/>
+              </a:rPr>
+              <a:t>date_started</a:t>
+            </a:r>
+            <a:r>
+              <a:rPr lang="en-US" sz="1000" i="1" baseline="0" dirty="0" smtClean="0">
+                <a:latin typeface="Courier New" panose="02070309020205020404" pitchFamily="49" charset="0"/>
+                <a:cs typeface="Courier New" panose="02070309020205020404" pitchFamily="49" charset="0"/>
+              </a:rPr>
+              <a:t> format a12</a:t>
+            </a:r>
+          </a:p>
+          <a:p>
+            <a:r>
+              <a:rPr lang="en-US" sz="1000" i="1" baseline="0" dirty="0" smtClean="0">
+                <a:latin typeface="Courier New" panose="02070309020205020404" pitchFamily="49" charset="0"/>
+                <a:cs typeface="Courier New" panose="02070309020205020404" pitchFamily="49" charset="0"/>
+              </a:rPr>
+              <a:t>column </a:t>
+            </a:r>
+            <a:r>
+              <a:rPr lang="en-US" sz="1000" i="1" baseline="0" dirty="0" err="1" smtClean="0">
+                <a:latin typeface="Courier New" panose="02070309020205020404" pitchFamily="49" charset="0"/>
+                <a:cs typeface="Courier New" panose="02070309020205020404" pitchFamily="49" charset="0"/>
+              </a:rPr>
+              <a:t>date_updated</a:t>
+            </a:r>
+            <a:r>
+              <a:rPr lang="en-US" sz="1000" i="1" baseline="0" dirty="0" smtClean="0">
+                <a:latin typeface="Courier New" panose="02070309020205020404" pitchFamily="49" charset="0"/>
+                <a:cs typeface="Courier New" panose="02070309020205020404" pitchFamily="49" charset="0"/>
+              </a:rPr>
+              <a:t> format a12</a:t>
+            </a:r>
+          </a:p>
+          <a:p>
+            <a:r>
+              <a:rPr lang="en-US" sz="1000" i="1" baseline="0" dirty="0" smtClean="0">
+                <a:latin typeface="Courier New" panose="02070309020205020404" pitchFamily="49" charset="0"/>
+                <a:cs typeface="Courier New" panose="02070309020205020404" pitchFamily="49" charset="0"/>
+              </a:rPr>
+              <a:t>column </a:t>
+            </a:r>
+            <a:r>
+              <a:rPr lang="en-US" sz="1000" i="1" baseline="0" dirty="0" err="1" smtClean="0">
+                <a:latin typeface="Courier New" panose="02070309020205020404" pitchFamily="49" charset="0"/>
+                <a:cs typeface="Courier New" panose="02070309020205020404" pitchFamily="49" charset="0"/>
+              </a:rPr>
+              <a:t>is_complete</a:t>
+            </a:r>
+            <a:r>
+              <a:rPr lang="en-US" sz="1000" i="1" baseline="0" dirty="0" smtClean="0">
+                <a:latin typeface="Courier New" panose="02070309020205020404" pitchFamily="49" charset="0"/>
+                <a:cs typeface="Courier New" panose="02070309020205020404" pitchFamily="49" charset="0"/>
+              </a:rPr>
+              <a:t> format a11</a:t>
+            </a:r>
+          </a:p>
+          <a:p>
+            <a:r>
+              <a:rPr lang="en-US" sz="1000" i="1" baseline="0" dirty="0" smtClean="0">
+                <a:latin typeface="Courier New" panose="02070309020205020404" pitchFamily="49" charset="0"/>
+                <a:cs typeface="Courier New" panose="02070309020205020404" pitchFamily="49" charset="0"/>
+              </a:rPr>
+              <a:t>column dummy format a5</a:t>
+            </a:r>
+          </a:p>
+          <a:p>
+            <a:r>
+              <a:rPr lang="en-US" sz="1000" i="1" baseline="0" dirty="0" smtClean="0">
+                <a:latin typeface="Courier New" panose="02070309020205020404" pitchFamily="49" charset="0"/>
+                <a:cs typeface="Courier New" panose="02070309020205020404" pitchFamily="49" charset="0"/>
+              </a:rPr>
+              <a:t>set </a:t>
+            </a:r>
+            <a:r>
+              <a:rPr lang="en-US" sz="1000" i="1" baseline="0" dirty="0" err="1" smtClean="0">
+                <a:latin typeface="Courier New" panose="02070309020205020404" pitchFamily="49" charset="0"/>
+                <a:cs typeface="Courier New" panose="02070309020205020404" pitchFamily="49" charset="0"/>
+              </a:rPr>
+              <a:t>serveroutput</a:t>
+            </a:r>
+            <a:r>
+              <a:rPr lang="en-US" sz="1000" i="1" baseline="0" dirty="0" smtClean="0">
+                <a:latin typeface="Courier New" panose="02070309020205020404" pitchFamily="49" charset="0"/>
+                <a:cs typeface="Courier New" panose="02070309020205020404" pitchFamily="49" charset="0"/>
+              </a:rPr>
+              <a:t> off</a:t>
+            </a:r>
+          </a:p>
+          <a:p>
+            <a:endParaRPr lang="en-US" sz="1000" i="1" baseline="0" dirty="0" smtClean="0">
+              <a:latin typeface="Courier New" panose="02070309020205020404" pitchFamily="49" charset="0"/>
+              <a:cs typeface="Courier New" panose="02070309020205020404" pitchFamily="49" charset="0"/>
+            </a:endParaRPr>
+          </a:p>
+          <a:p>
+            <a:r>
+              <a:rPr lang="en-US" sz="1000" i="1" baseline="0" dirty="0" smtClean="0">
+                <a:latin typeface="Courier New" panose="02070309020205020404" pitchFamily="49" charset="0"/>
+                <a:cs typeface="Courier New" panose="02070309020205020404" pitchFamily="49" charset="0"/>
+              </a:rPr>
+              <a:t>begin</a:t>
+            </a:r>
+          </a:p>
+          <a:p>
+            <a:r>
+              <a:rPr lang="en-US" sz="1000" i="1" baseline="0" dirty="0" smtClean="0">
+                <a:latin typeface="Courier New" panose="02070309020205020404" pitchFamily="49" charset="0"/>
+                <a:cs typeface="Courier New" panose="02070309020205020404" pitchFamily="49" charset="0"/>
+              </a:rPr>
+              <a:t>  m5_proc('select * from dual');</a:t>
+            </a:r>
+          </a:p>
+          <a:p>
+            <a:r>
+              <a:rPr lang="en-US" sz="1000" i="1" baseline="0" dirty="0" smtClean="0">
+                <a:latin typeface="Courier New" panose="02070309020205020404" pitchFamily="49" charset="0"/>
+                <a:cs typeface="Courier New" panose="02070309020205020404" pitchFamily="49" charset="0"/>
+              </a:rPr>
+              <a:t>end;</a:t>
+            </a:r>
+          </a:p>
+          <a:p>
+            <a:r>
+              <a:rPr lang="en-US" sz="1000" i="1" baseline="0" dirty="0" smtClean="0">
+                <a:latin typeface="Courier New" panose="02070309020205020404" pitchFamily="49" charset="0"/>
+                <a:cs typeface="Courier New" panose="02070309020205020404" pitchFamily="49" charset="0"/>
+              </a:rPr>
+              <a:t>/</a:t>
+            </a:r>
+          </a:p>
+          <a:p>
+            <a:r>
+              <a:rPr lang="en-US" sz="1000" i="1" baseline="0" dirty="0" smtClean="0">
+                <a:latin typeface="Courier New" panose="02070309020205020404" pitchFamily="49" charset="0"/>
+                <a:cs typeface="Courier New" panose="02070309020205020404" pitchFamily="49" charset="0"/>
+              </a:rPr>
+              <a:t>select * from m5_metadata;</a:t>
+            </a:r>
+          </a:p>
+          <a:p>
+            <a:r>
+              <a:rPr lang="en-US" sz="1000" i="1" baseline="0" dirty="0" smtClean="0">
+                <a:latin typeface="Courier New" panose="02070309020205020404" pitchFamily="49" charset="0"/>
+                <a:cs typeface="Courier New" panose="02070309020205020404" pitchFamily="49" charset="0"/>
+              </a:rPr>
+              <a:t>select * from m5_results where </a:t>
+            </a:r>
+            <a:r>
+              <a:rPr lang="en-US" sz="1000" i="1" baseline="0" dirty="0" err="1" smtClean="0">
+                <a:latin typeface="Courier New" panose="02070309020205020404" pitchFamily="49" charset="0"/>
+                <a:cs typeface="Courier New" panose="02070309020205020404" pitchFamily="49" charset="0"/>
+              </a:rPr>
+              <a:t>rownum</a:t>
+            </a:r>
+            <a:r>
+              <a:rPr lang="en-US" sz="1000" i="1" baseline="0" dirty="0" smtClean="0">
+                <a:latin typeface="Courier New" panose="02070309020205020404" pitchFamily="49" charset="0"/>
+                <a:cs typeface="Courier New" panose="02070309020205020404" pitchFamily="49" charset="0"/>
+              </a:rPr>
+              <a:t> &lt;= 3;</a:t>
+            </a:r>
+          </a:p>
+          <a:p>
+            <a:r>
+              <a:rPr lang="en-US" sz="1000" i="1" baseline="0" dirty="0" smtClean="0">
+                <a:latin typeface="Courier New" panose="02070309020205020404" pitchFamily="49" charset="0"/>
+                <a:cs typeface="Courier New" panose="02070309020205020404" pitchFamily="49" charset="0"/>
+              </a:rPr>
+              <a:t>select * from m5_errors;</a:t>
+            </a:r>
           </a:p>
         </p:txBody>
       </p:sp>
@@ -4287,7 +4531,7 @@
     </p:spTree>
     <p:extLst>
       <p:ext uri="{BB962C8B-B14F-4D97-AF65-F5344CB8AC3E}">
-        <p14:creationId xmlns:p14="http://schemas.microsoft.com/office/powerpoint/2010/main" val="3846567511"/>
+        <p14:creationId xmlns:p14="http://schemas.microsoft.com/office/powerpoint/2010/main" val="158452863"/>
       </p:ext>
     </p:extLst>
   </p:cSld>
@@ -4324,364 +4568,87 @@
             <p:ph type="sldImg"/>
           </p:nvPr>
         </p:nvSpPr>
+        <p:spPr>
+          <a:xfrm>
+            <a:off x="381000" y="685800"/>
+            <a:ext cx="6096000" cy="3429000"/>
+          </a:xfrm>
+        </p:spPr>
+      </p:sp>
+      <p:sp>
+        <p:nvSpPr>
+          <p:cNvPr id="3" name="Notes Placeholder 2"/>
+          <p:cNvSpPr>
+            <a:spLocks noGrp="1"/>
+          </p:cNvSpPr>
+          <p:nvPr>
+            <p:ph type="body" idx="1"/>
+          </p:nvPr>
+        </p:nvSpPr>
         <p:spPr/>
-      </p:sp>
-      <p:sp>
-        <p:nvSpPr>
-          <p:cNvPr id="3" name="Notes Placeholder 2"/>
-          <p:cNvSpPr>
-            <a:spLocks noGrp="1"/>
-          </p:cNvSpPr>
-          <p:nvPr>
-            <p:ph type="body" idx="1"/>
-          </p:nvPr>
-        </p:nvSpPr>
-        <p:spPr/>
         <p:txBody>
           <a:bodyPr/>
           <a:lstStyle/>
           <a:p>
             <a:r>
-              <a:rPr lang="en-US" dirty="0" smtClean="0"/>
-              <a:t>This screenshot is a complete example</a:t>
+              <a:rPr lang="en-US" b="0" dirty="0" smtClean="0"/>
+              <a:t>Method5</a:t>
+            </a:r>
+            <a:r>
+              <a:rPr lang="en-US" b="0" baseline="0" dirty="0" smtClean="0"/>
+              <a:t> can be run as either a function or a procedure.  They let you specify </a:t>
+            </a:r>
+            <a:r>
+              <a:rPr lang="en-US" b="1" baseline="0" dirty="0" smtClean="0"/>
+              <a:t>what</a:t>
+            </a:r>
+            <a:r>
+              <a:rPr lang="en-US" b="0" baseline="0" dirty="0" smtClean="0"/>
+              <a:t> to run, </a:t>
+            </a:r>
+            <a:r>
+              <a:rPr lang="en-US" b="1" baseline="0" dirty="0" smtClean="0"/>
+              <a:t>where</a:t>
+            </a:r>
+            <a:r>
+              <a:rPr lang="en-US" b="0" baseline="0" dirty="0" smtClean="0"/>
+              <a:t> to run, and </a:t>
+            </a:r>
+            <a:r>
+              <a:rPr lang="en-US" b="1" baseline="0" dirty="0" smtClean="0"/>
+              <a:t>how</a:t>
+            </a:r>
+            <a:r>
+              <a:rPr lang="en-US" b="0" baseline="0" dirty="0" smtClean="0"/>
+              <a:t> to run</a:t>
+            </a:r>
+            <a:r>
+              <a:rPr lang="en-US" b="0" dirty="0" smtClean="0"/>
+              <a:t>.</a:t>
+            </a:r>
+            <a:r>
+              <a:rPr lang="en-US" b="0" baseline="0" dirty="0" smtClean="0"/>
+              <a:t>  The function returns results immediately.  The procedure </a:t>
+            </a:r>
+            <a:r>
+              <a:rPr lang="en-US" dirty="0" smtClean="0"/>
+              <a:t>saves the results in background tables, and it gives you more control over how the commands are run.</a:t>
+            </a:r>
+            <a:endParaRPr lang="en-US" b="0" dirty="0" smtClean="0"/>
+          </a:p>
+          <a:p>
+            <a:endParaRPr lang="en-US" b="1" dirty="0" smtClean="0"/>
+          </a:p>
+          <a:p>
+            <a:r>
+              <a:rPr lang="en-US" dirty="0" smtClean="0"/>
+              <a:t>Running as a function is simple and neat,</a:t>
             </a:r>
             <a:r>
               <a:rPr lang="en-US" baseline="0" dirty="0" smtClean="0"/>
-              <a:t> of a simple query that can be used to show what databases are responding.</a:t>
-            </a:r>
-          </a:p>
-          <a:p>
-            <a:endParaRPr lang="en-US" baseline="0" dirty="0" smtClean="0"/>
-          </a:p>
-          <a:p>
-            <a:r>
-              <a:rPr lang="en-US" baseline="0" dirty="0" smtClean="0"/>
-              <a:t>1. First the simple SELECT statement is run through the asynchronous procedure M5_PROC.</a:t>
-            </a:r>
-          </a:p>
-          <a:p>
-            <a:r>
-              <a:rPr lang="en-US" baseline="0" dirty="0" smtClean="0"/>
-              <a:t>2. Next the M5_METADATA table is queried.  Since jobs are still running in the background, IS_COMPLETE is still set to No, and the TARGETS_COMPLETED does not equal the TARGETS_EXPECTED yet.  You'll probably want to query this view a few times to watch the progress of the background jobs.  (Not shown on the screenshot are some other columns like TARGETS_WITH_ERRORS, NUM_ROWS, CODE, and TARGETS.)</a:t>
-            </a:r>
-          </a:p>
-          <a:p>
-            <a:r>
-              <a:rPr lang="en-US" baseline="0" dirty="0" smtClean="0"/>
-              <a:t>3. The current results can be queried in M5_RESULTS.  It returns the same columns as the input query, as well as a column for the DATABASE_NAME.</a:t>
-            </a:r>
-          </a:p>
-          <a:p>
-            <a:r>
-              <a:rPr lang="en-US" baseline="0" dirty="0" smtClean="0"/>
-              <a:t>4. M5_ERRORS shows any errors generated while trying to run the query. With a large number of databases it's common for some of them to be unavailable due to maintenance or unexpected errors.  A few databases with errors don't stop the other databases from returning results.</a:t>
-            </a:r>
-          </a:p>
-          <a:p>
-            <a:endParaRPr lang="en-US" baseline="0" dirty="0" smtClean="0"/>
-          </a:p>
-          <a:p>
-            <a:r>
-              <a:rPr lang="en-US" baseline="0" dirty="0" smtClean="0"/>
-              <a:t>(The screenshot does not show all the columns and values because it's hard to fit them on a screen.  The example uses SQL*Plus for its simple text formatting, but in practice you will probably want to use an IDE like PL/SQL Developer, Toad, Oracle SQL Developer, etc.  The exact same code will run on any IDE.)</a:t>
-            </a:r>
-          </a:p>
-          <a:p>
-            <a:endParaRPr lang="en-US" baseline="0" dirty="0" smtClean="0"/>
-          </a:p>
-          <a:p>
-            <a:r>
-              <a:rPr lang="en-US" baseline="0" dirty="0" smtClean="0"/>
-              <a:t>If you want to reproduce this example yourself, here's the full code and SQL*Plus commands to format results:</a:t>
-            </a:r>
-          </a:p>
-          <a:p>
-            <a:endParaRPr lang="en-US" baseline="0" dirty="0" smtClean="0"/>
-          </a:p>
-          <a:p>
-            <a:r>
-              <a:rPr lang="en-US" sz="1000" i="1" baseline="0" dirty="0" smtClean="0">
-                <a:latin typeface="Courier New" panose="02070309020205020404" pitchFamily="49" charset="0"/>
-                <a:cs typeface="Courier New" panose="02070309020205020404" pitchFamily="49" charset="0"/>
-              </a:rPr>
-              <a:t>set </a:t>
-            </a:r>
-            <a:r>
-              <a:rPr lang="en-US" sz="1000" i="1" baseline="0" dirty="0" err="1" smtClean="0">
-                <a:latin typeface="Courier New" panose="02070309020205020404" pitchFamily="49" charset="0"/>
-                <a:cs typeface="Courier New" panose="02070309020205020404" pitchFamily="49" charset="0"/>
-              </a:rPr>
-              <a:t>sqlprompt</a:t>
-            </a:r>
-            <a:r>
-              <a:rPr lang="en-US" sz="1000" i="1" baseline="0" dirty="0" smtClean="0">
-                <a:latin typeface="Courier New" panose="02070309020205020404" pitchFamily="49" charset="0"/>
-                <a:cs typeface="Courier New" panose="02070309020205020404" pitchFamily="49" charset="0"/>
-              </a:rPr>
-              <a:t> "&gt; "</a:t>
-            </a:r>
-          </a:p>
-          <a:p>
-            <a:r>
-              <a:rPr lang="en-US" sz="1000" i="1" baseline="0" dirty="0" smtClean="0">
-                <a:latin typeface="Courier New" panose="02070309020205020404" pitchFamily="49" charset="0"/>
-                <a:cs typeface="Courier New" panose="02070309020205020404" pitchFamily="49" charset="0"/>
-              </a:rPr>
-              <a:t>column </a:t>
-            </a:r>
-            <a:r>
-              <a:rPr lang="en-US" sz="1000" i="1" baseline="0" dirty="0" err="1" smtClean="0">
-                <a:latin typeface="Courier New" panose="02070309020205020404" pitchFamily="49" charset="0"/>
-                <a:cs typeface="Courier New" panose="02070309020205020404" pitchFamily="49" charset="0"/>
-              </a:rPr>
-              <a:t>db_link_name</a:t>
-            </a:r>
-            <a:r>
-              <a:rPr lang="en-US" sz="1000" i="1" baseline="0" dirty="0" smtClean="0">
-                <a:latin typeface="Courier New" panose="02070309020205020404" pitchFamily="49" charset="0"/>
-                <a:cs typeface="Courier New" panose="02070309020205020404" pitchFamily="49" charset="0"/>
-              </a:rPr>
-              <a:t> format a12</a:t>
-            </a:r>
-          </a:p>
-          <a:p>
-            <a:r>
-              <a:rPr lang="en-US" sz="1000" i="1" baseline="0" dirty="0" smtClean="0">
-                <a:latin typeface="Courier New" panose="02070309020205020404" pitchFamily="49" charset="0"/>
-                <a:cs typeface="Courier New" panose="02070309020205020404" pitchFamily="49" charset="0"/>
-              </a:rPr>
-              <a:t>column </a:t>
-            </a:r>
-            <a:r>
-              <a:rPr lang="en-US" sz="1000" i="1" baseline="0" dirty="0" err="1" smtClean="0">
-                <a:latin typeface="Courier New" panose="02070309020205020404" pitchFamily="49" charset="0"/>
-                <a:cs typeface="Courier New" panose="02070309020205020404" pitchFamily="49" charset="0"/>
-              </a:rPr>
-              <a:t>database_name</a:t>
-            </a:r>
-            <a:r>
-              <a:rPr lang="en-US" sz="1000" i="1" baseline="0" dirty="0" smtClean="0">
-                <a:latin typeface="Courier New" panose="02070309020205020404" pitchFamily="49" charset="0"/>
-                <a:cs typeface="Courier New" panose="02070309020205020404" pitchFamily="49" charset="0"/>
-              </a:rPr>
-              <a:t> format a13</a:t>
-            </a:r>
-          </a:p>
-          <a:p>
-            <a:r>
-              <a:rPr lang="en-US" sz="1000" i="1" baseline="0" dirty="0" smtClean="0">
-                <a:latin typeface="Courier New" panose="02070309020205020404" pitchFamily="49" charset="0"/>
-                <a:cs typeface="Courier New" panose="02070309020205020404" pitchFamily="49" charset="0"/>
-              </a:rPr>
-              <a:t>column </a:t>
-            </a:r>
-            <a:r>
-              <a:rPr lang="en-US" sz="1000" i="1" baseline="0" dirty="0" err="1" smtClean="0">
-                <a:latin typeface="Courier New" panose="02070309020205020404" pitchFamily="49" charset="0"/>
-                <a:cs typeface="Courier New" panose="02070309020205020404" pitchFamily="49" charset="0"/>
-              </a:rPr>
-              <a:t>error_stack_and_backtrace</a:t>
-            </a:r>
-            <a:r>
-              <a:rPr lang="en-US" sz="1000" i="1" baseline="0" dirty="0" smtClean="0">
-                <a:latin typeface="Courier New" panose="02070309020205020404" pitchFamily="49" charset="0"/>
-                <a:cs typeface="Courier New" panose="02070309020205020404" pitchFamily="49" charset="0"/>
-              </a:rPr>
-              <a:t> format a100</a:t>
-            </a:r>
-          </a:p>
-          <a:p>
-            <a:r>
-              <a:rPr lang="en-US" sz="1000" i="1" baseline="0" dirty="0" smtClean="0">
-                <a:latin typeface="Courier New" panose="02070309020205020404" pitchFamily="49" charset="0"/>
-                <a:cs typeface="Courier New" panose="02070309020205020404" pitchFamily="49" charset="0"/>
-              </a:rPr>
-              <a:t>column username format a11</a:t>
-            </a:r>
-          </a:p>
-          <a:p>
-            <a:r>
-              <a:rPr lang="en-US" sz="1000" i="1" baseline="0" dirty="0" smtClean="0">
-                <a:latin typeface="Courier New" panose="02070309020205020404" pitchFamily="49" charset="0"/>
-                <a:cs typeface="Courier New" panose="02070309020205020404" pitchFamily="49" charset="0"/>
-              </a:rPr>
-              <a:t>column </a:t>
-            </a:r>
-            <a:r>
-              <a:rPr lang="en-US" sz="1000" i="1" baseline="0" dirty="0" err="1" smtClean="0">
-                <a:latin typeface="Courier New" panose="02070309020205020404" pitchFamily="49" charset="0"/>
-                <a:cs typeface="Courier New" panose="02070309020205020404" pitchFamily="49" charset="0"/>
-              </a:rPr>
-              <a:t>date_started</a:t>
-            </a:r>
-            <a:r>
-              <a:rPr lang="en-US" sz="1000" i="1" baseline="0" dirty="0" smtClean="0">
-                <a:latin typeface="Courier New" panose="02070309020205020404" pitchFamily="49" charset="0"/>
-                <a:cs typeface="Courier New" panose="02070309020205020404" pitchFamily="49" charset="0"/>
-              </a:rPr>
-              <a:t> format a12</a:t>
-            </a:r>
-          </a:p>
-          <a:p>
-            <a:r>
-              <a:rPr lang="en-US" sz="1000" i="1" baseline="0" dirty="0" smtClean="0">
-                <a:latin typeface="Courier New" panose="02070309020205020404" pitchFamily="49" charset="0"/>
-                <a:cs typeface="Courier New" panose="02070309020205020404" pitchFamily="49" charset="0"/>
-              </a:rPr>
-              <a:t>column </a:t>
-            </a:r>
-            <a:r>
-              <a:rPr lang="en-US" sz="1000" i="1" baseline="0" dirty="0" err="1" smtClean="0">
-                <a:latin typeface="Courier New" panose="02070309020205020404" pitchFamily="49" charset="0"/>
-                <a:cs typeface="Courier New" panose="02070309020205020404" pitchFamily="49" charset="0"/>
-              </a:rPr>
-              <a:t>date_updated</a:t>
-            </a:r>
-            <a:r>
-              <a:rPr lang="en-US" sz="1000" i="1" baseline="0" dirty="0" smtClean="0">
-                <a:latin typeface="Courier New" panose="02070309020205020404" pitchFamily="49" charset="0"/>
-                <a:cs typeface="Courier New" panose="02070309020205020404" pitchFamily="49" charset="0"/>
-              </a:rPr>
-              <a:t> format a12</a:t>
-            </a:r>
-          </a:p>
-          <a:p>
-            <a:r>
-              <a:rPr lang="en-US" sz="1000" i="1" baseline="0" dirty="0" smtClean="0">
-                <a:latin typeface="Courier New" panose="02070309020205020404" pitchFamily="49" charset="0"/>
-                <a:cs typeface="Courier New" panose="02070309020205020404" pitchFamily="49" charset="0"/>
-              </a:rPr>
-              <a:t>column </a:t>
-            </a:r>
-            <a:r>
-              <a:rPr lang="en-US" sz="1000" i="1" baseline="0" dirty="0" err="1" smtClean="0">
-                <a:latin typeface="Courier New" panose="02070309020205020404" pitchFamily="49" charset="0"/>
-                <a:cs typeface="Courier New" panose="02070309020205020404" pitchFamily="49" charset="0"/>
-              </a:rPr>
-              <a:t>is_complete</a:t>
-            </a:r>
-            <a:r>
-              <a:rPr lang="en-US" sz="1000" i="1" baseline="0" dirty="0" smtClean="0">
-                <a:latin typeface="Courier New" panose="02070309020205020404" pitchFamily="49" charset="0"/>
-                <a:cs typeface="Courier New" panose="02070309020205020404" pitchFamily="49" charset="0"/>
-              </a:rPr>
-              <a:t> format a11</a:t>
-            </a:r>
-          </a:p>
-          <a:p>
-            <a:r>
-              <a:rPr lang="en-US" sz="1000" i="1" baseline="0" dirty="0" smtClean="0">
-                <a:latin typeface="Courier New" panose="02070309020205020404" pitchFamily="49" charset="0"/>
-                <a:cs typeface="Courier New" panose="02070309020205020404" pitchFamily="49" charset="0"/>
-              </a:rPr>
-              <a:t>column dummy format a5</a:t>
-            </a:r>
-          </a:p>
-          <a:p>
-            <a:r>
-              <a:rPr lang="en-US" sz="1000" i="1" baseline="0" dirty="0" smtClean="0">
-                <a:latin typeface="Courier New" panose="02070309020205020404" pitchFamily="49" charset="0"/>
-                <a:cs typeface="Courier New" panose="02070309020205020404" pitchFamily="49" charset="0"/>
-              </a:rPr>
-              <a:t>set </a:t>
-            </a:r>
-            <a:r>
-              <a:rPr lang="en-US" sz="1000" i="1" baseline="0" dirty="0" err="1" smtClean="0">
-                <a:latin typeface="Courier New" panose="02070309020205020404" pitchFamily="49" charset="0"/>
-                <a:cs typeface="Courier New" panose="02070309020205020404" pitchFamily="49" charset="0"/>
-              </a:rPr>
-              <a:t>serveroutput</a:t>
-            </a:r>
-            <a:r>
-              <a:rPr lang="en-US" sz="1000" i="1" baseline="0" dirty="0" smtClean="0">
-                <a:latin typeface="Courier New" panose="02070309020205020404" pitchFamily="49" charset="0"/>
-                <a:cs typeface="Courier New" panose="02070309020205020404" pitchFamily="49" charset="0"/>
-              </a:rPr>
-              <a:t> off</a:t>
-            </a:r>
-          </a:p>
-          <a:p>
-            <a:endParaRPr lang="en-US" sz="1000" i="1" baseline="0" dirty="0" smtClean="0">
-              <a:latin typeface="Courier New" panose="02070309020205020404" pitchFamily="49" charset="0"/>
-              <a:cs typeface="Courier New" panose="02070309020205020404" pitchFamily="49" charset="0"/>
-            </a:endParaRPr>
-          </a:p>
-          <a:p>
-            <a:r>
-              <a:rPr lang="en-US" sz="1000" i="1" baseline="0" dirty="0" smtClean="0">
-                <a:latin typeface="Courier New" panose="02070309020205020404" pitchFamily="49" charset="0"/>
-                <a:cs typeface="Courier New" panose="02070309020205020404" pitchFamily="49" charset="0"/>
-              </a:rPr>
-              <a:t>begin</a:t>
-            </a:r>
-          </a:p>
-          <a:p>
-            <a:r>
-              <a:rPr lang="en-US" sz="1000" i="1" baseline="0" dirty="0" smtClean="0">
-                <a:latin typeface="Courier New" panose="02070309020205020404" pitchFamily="49" charset="0"/>
-                <a:cs typeface="Courier New" panose="02070309020205020404" pitchFamily="49" charset="0"/>
-              </a:rPr>
-              <a:t>  m5_proc('select * from dual');</a:t>
-            </a:r>
-          </a:p>
-          <a:p>
-            <a:r>
-              <a:rPr lang="en-US" sz="1000" i="1" baseline="0" dirty="0" smtClean="0">
-                <a:latin typeface="Courier New" panose="02070309020205020404" pitchFamily="49" charset="0"/>
-                <a:cs typeface="Courier New" panose="02070309020205020404" pitchFamily="49" charset="0"/>
-              </a:rPr>
-              <a:t>end;</a:t>
-            </a:r>
-          </a:p>
-          <a:p>
-            <a:r>
-              <a:rPr lang="en-US" sz="1000" i="1" baseline="0" dirty="0" smtClean="0">
-                <a:latin typeface="Courier New" panose="02070309020205020404" pitchFamily="49" charset="0"/>
-                <a:cs typeface="Courier New" panose="02070309020205020404" pitchFamily="49" charset="0"/>
-              </a:rPr>
-              <a:t>/</a:t>
-            </a:r>
-          </a:p>
-          <a:p>
-            <a:r>
-              <a:rPr lang="en-US" sz="1000" i="1" baseline="0" dirty="0" smtClean="0">
-                <a:latin typeface="Courier New" panose="02070309020205020404" pitchFamily="49" charset="0"/>
-                <a:cs typeface="Courier New" panose="02070309020205020404" pitchFamily="49" charset="0"/>
-              </a:rPr>
-              <a:t>select * from m5_metadata;</a:t>
-            </a:r>
-          </a:p>
-          <a:p>
-            <a:r>
-              <a:rPr lang="en-US" sz="1000" i="1" baseline="0" dirty="0" smtClean="0">
-                <a:latin typeface="Courier New" panose="02070309020205020404" pitchFamily="49" charset="0"/>
-                <a:cs typeface="Courier New" panose="02070309020205020404" pitchFamily="49" charset="0"/>
-              </a:rPr>
-              <a:t>select * from m5_results where </a:t>
-            </a:r>
-            <a:r>
-              <a:rPr lang="en-US" sz="1000" i="1" baseline="0" dirty="0" err="1" smtClean="0">
-                <a:latin typeface="Courier New" panose="02070309020205020404" pitchFamily="49" charset="0"/>
-                <a:cs typeface="Courier New" panose="02070309020205020404" pitchFamily="49" charset="0"/>
-              </a:rPr>
-              <a:t>rownum</a:t>
-            </a:r>
-            <a:r>
-              <a:rPr lang="en-US" sz="1000" i="1" baseline="0" dirty="0" smtClean="0">
-                <a:latin typeface="Courier New" panose="02070309020205020404" pitchFamily="49" charset="0"/>
-                <a:cs typeface="Courier New" panose="02070309020205020404" pitchFamily="49" charset="0"/>
-              </a:rPr>
-              <a:t> &lt;= 3;</a:t>
-            </a:r>
-          </a:p>
-          <a:p>
-            <a:r>
-              <a:rPr lang="en-US" sz="1000" i="1" baseline="0" dirty="0" smtClean="0">
-                <a:latin typeface="Courier New" panose="02070309020205020404" pitchFamily="49" charset="0"/>
-                <a:cs typeface="Courier New" panose="02070309020205020404" pitchFamily="49" charset="0"/>
-              </a:rPr>
-              <a:t>select * from m5_errors;</a:t>
-            </a:r>
+              <a:t> but in practice advanced users will normally want to run things as a procedure.  Running as a procedure makes it asynchronous, which is good for large jobs you don't want to wait for.  It also makes it possible to schedule and chain tasks.</a:t>
+            </a:r>
+            <a:endParaRPr lang="en-US" dirty="0"/>
           </a:p>
         </p:txBody>
       </p:sp>
@@ -4711,7 +4678,7 @@
     </p:spTree>
     <p:extLst>
       <p:ext uri="{BB962C8B-B14F-4D97-AF65-F5344CB8AC3E}">
-        <p14:creationId xmlns:p14="http://schemas.microsoft.com/office/powerpoint/2010/main" val="158452863"/>
+        <p14:creationId xmlns:p14="http://schemas.microsoft.com/office/powerpoint/2010/main" val="3520608180"/>
       </p:ext>
     </p:extLst>
   </p:cSld>
@@ -5066,7 +5033,7 @@
           <a:p>
             <a:r>
               <a:rPr lang="en-US" smtClean="0"/>
-              <a:t>2018-06-09</a:t>
+              <a:t>2019-02-19</a:t>
             </a:r>
             <a:endParaRPr lang="en-US" dirty="0"/>
           </a:p>
@@ -5243,7 +5210,7 @@
           <a:p>
             <a:r>
               <a:rPr lang="en-US" smtClean="0"/>
-              <a:t>2018-06-09</a:t>
+              <a:t>2019-02-19</a:t>
             </a:r>
             <a:endParaRPr lang="en-US"/>
           </a:p>
@@ -5423,7 +5390,7 @@
           <a:p>
             <a:r>
               <a:rPr lang="en-US" smtClean="0"/>
-              <a:t>2018-06-09</a:t>
+              <a:t>2019-02-19</a:t>
             </a:r>
             <a:endParaRPr lang="en-US"/>
           </a:p>
@@ -5593,7 +5560,7 @@
           <a:p>
             <a:r>
               <a:rPr lang="en-US" smtClean="0"/>
-              <a:t>2018-06-09</a:t>
+              <a:t>2019-02-19</a:t>
             </a:r>
             <a:endParaRPr lang="en-US" dirty="0"/>
           </a:p>
@@ -5876,7 +5843,7 @@
           <a:p>
             <a:r>
               <a:rPr lang="en-US" smtClean="0"/>
-              <a:t>2018-06-09</a:t>
+              <a:t>2019-02-19</a:t>
             </a:r>
             <a:endParaRPr lang="en-US"/>
           </a:p>
@@ -6171,7 +6138,7 @@
           <a:p>
             <a:r>
               <a:rPr lang="en-US" smtClean="0"/>
-              <a:t>2018-06-09</a:t>
+              <a:t>2019-02-19</a:t>
             </a:r>
             <a:endParaRPr lang="en-US"/>
           </a:p>
@@ -6600,7 +6567,7 @@
           <a:p>
             <a:r>
               <a:rPr lang="en-US" smtClean="0"/>
-              <a:t>2018-06-09</a:t>
+              <a:t>2019-02-19</a:t>
             </a:r>
             <a:endParaRPr lang="en-US"/>
           </a:p>
@@ -6725,7 +6692,7 @@
           <a:p>
             <a:r>
               <a:rPr lang="en-US" smtClean="0"/>
-              <a:t>2018-06-09</a:t>
+              <a:t>2019-02-19</a:t>
             </a:r>
             <a:endParaRPr lang="en-US"/>
           </a:p>
@@ -6827,7 +6794,7 @@
           <a:p>
             <a:r>
               <a:rPr lang="en-US" smtClean="0"/>
-              <a:t>2018-06-09</a:t>
+              <a:t>2019-02-19</a:t>
             </a:r>
             <a:endParaRPr lang="en-US"/>
           </a:p>
@@ -7104,7 +7071,7 @@
           <a:p>
             <a:r>
               <a:rPr lang="en-US" smtClean="0"/>
-              <a:t>2018-06-09</a:t>
+              <a:t>2019-02-19</a:t>
             </a:r>
             <a:endParaRPr lang="en-US"/>
           </a:p>
@@ -7357,7 +7324,7 @@
           <a:p>
             <a:r>
               <a:rPr lang="en-US" smtClean="0"/>
-              <a:t>2018-06-09</a:t>
+              <a:t>2019-02-19</a:t>
             </a:r>
             <a:endParaRPr lang="en-US"/>
           </a:p>
@@ -7570,7 +7537,7 @@
           <a:p>
             <a:r>
               <a:rPr lang="en-US" smtClean="0"/>
-              <a:t>2018-06-09</a:t>
+              <a:t>2019-02-19</a:t>
             </a:r>
             <a:endParaRPr lang="en-US" dirty="0"/>
           </a:p>
@@ -8012,7 +7979,7 @@
           <a:p>
             <a:r>
               <a:rPr lang="en-US" smtClean="0"/>
-              <a:t>2018-06-09</a:t>
+              <a:t>2019-02-19</a:t>
             </a:r>
             <a:endParaRPr lang="en-US" dirty="0"/>
           </a:p>
@@ -8324,7 +8291,7 @@
           <a:p>
             <a:r>
               <a:rPr lang="en-US" smtClean="0"/>
-              <a:t>2018-06-09</a:t>
+              <a:t>2019-02-19</a:t>
             </a:r>
             <a:endParaRPr lang="en-US"/>
           </a:p>
@@ -9837,7 +9804,7 @@
           <a:p>
             <a:r>
               <a:rPr lang="en-US" smtClean="0"/>
-              <a:t>2018-06-09</a:t>
+              <a:t>2019-02-19</a:t>
             </a:r>
             <a:endParaRPr lang="en-US" dirty="0"/>
           </a:p>
@@ -10088,9 +10055,9 @@
           <a:p>
             <a:r>
               <a:rPr lang="en-US" smtClean="0"/>
-              <a:t>2018-06-09</a:t>
-            </a:r>
-            <a:endParaRPr lang="en-US"/>
+              <a:t>2019-02-19</a:t>
+            </a:r>
+            <a:endParaRPr lang="en-US" dirty="0"/>
           </a:p>
         </p:txBody>
       </p:sp>
@@ -10200,7 +10167,7 @@
           <a:p>
             <a:r>
               <a:rPr lang="en-US" smtClean="0"/>
-              <a:t>2018-06-09</a:t>
+              <a:t>2019-02-19</a:t>
             </a:r>
             <a:endParaRPr lang="en-US" dirty="0"/>
           </a:p>
@@ -10349,7 +10316,7 @@
           <a:p>
             <a:r>
               <a:rPr lang="en-US" smtClean="0"/>
-              <a:t>2018-06-09</a:t>
+              <a:t>2019-02-19</a:t>
             </a:r>
             <a:endParaRPr lang="en-US" dirty="0"/>
           </a:p>
@@ -10500,7 +10467,7 @@
           <a:p>
             <a:r>
               <a:rPr lang="en-US" smtClean="0"/>
-              <a:t>2018-06-09</a:t>
+              <a:t>2019-02-19</a:t>
             </a:r>
             <a:endParaRPr lang="en-US" dirty="0"/>
           </a:p>
@@ -10653,7 +10620,7 @@
           <a:p>
             <a:r>
               <a:rPr lang="en-US" smtClean="0"/>
-              <a:t>2018-06-09</a:t>
+              <a:t>2019-02-19</a:t>
             </a:r>
             <a:endParaRPr lang="en-US" dirty="0"/>
           </a:p>
@@ -11594,7 +11561,7 @@
           <a:p>
             <a:r>
               <a:rPr lang="en-US" smtClean="0"/>
-              <a:t>2018-06-09</a:t>
+              <a:t>2019-02-19</a:t>
             </a:r>
             <a:endParaRPr lang="en-US" dirty="0"/>
           </a:p>
@@ -11778,7 +11745,6 @@
               <a:rPr lang="en-US" dirty="0" smtClean="0"/>
               <a:t>	dozens of users</a:t>
             </a:r>
-            <a:endParaRPr lang="en-US" dirty="0" smtClean="0"/>
           </a:p>
           <a:p>
             <a:pPr marL="514350" indent="-514350">
@@ -11806,7 +11772,7 @@
           <a:p>
             <a:r>
               <a:rPr lang="en-US" smtClean="0"/>
-              <a:t>2018-06-09</a:t>
+              <a:t>2019-02-19</a:t>
             </a:r>
             <a:endParaRPr lang="en-US" dirty="0"/>
           </a:p>
@@ -11991,11 +11957,7 @@
             </a:pPr>
             <a:r>
               <a:rPr lang="en-US" dirty="0" smtClean="0"/>
-              <a:t>Oracle Data </a:t>
-            </a:r>
-            <a:r>
-              <a:rPr lang="en-US" dirty="0" smtClean="0"/>
-              <a:t>Cartridge</a:t>
+              <a:t>Oracle Data Cartridge</a:t>
             </a:r>
           </a:p>
           <a:p>
@@ -12007,7 +11969,6 @@
               <a:rPr lang="en-US" dirty="0" smtClean="0"/>
               <a:t>1800 automated tests</a:t>
             </a:r>
-            <a:endParaRPr lang="en-US" dirty="0" smtClean="0"/>
           </a:p>
         </p:txBody>
       </p:sp>
@@ -12028,7 +11989,7 @@
           <a:p>
             <a:r>
               <a:rPr lang="en-US" smtClean="0"/>
-              <a:t>2018-06-09</a:t>
+              <a:t>2019-02-19</a:t>
             </a:r>
             <a:endParaRPr lang="en-US"/>
           </a:p>
@@ -12487,7 +12448,7 @@
           <a:p>
             <a:r>
               <a:rPr lang="en-US" smtClean="0"/>
-              <a:t>2018-06-09</a:t>
+              <a:t>2019-02-19</a:t>
             </a:r>
             <a:endParaRPr lang="en-US" dirty="0"/>
           </a:p>
@@ -12601,7 +12562,6 @@
               <a:rPr lang="en-US" dirty="0" smtClean="0"/>
               <a:t>Requirements</a:t>
             </a:r>
-            <a:endParaRPr lang="en-US" dirty="0" smtClean="0"/>
           </a:p>
           <a:p>
             <a:pPr marL="514350" indent="-514350">
@@ -12687,7 +12647,7 @@
           <a:p>
             <a:r>
               <a:rPr lang="en-US" smtClean="0"/>
-              <a:t>2018-06-09</a:t>
+              <a:t>2019-02-19</a:t>
             </a:r>
             <a:endParaRPr lang="en-US"/>
           </a:p>
@@ -13010,7 +12970,7 @@
           <a:p>
             <a:r>
               <a:rPr lang="en-US" smtClean="0"/>
-              <a:t>2018-06-09</a:t>
+              <a:t>2019-02-19</a:t>
             </a:r>
             <a:endParaRPr lang="en-US" dirty="0"/>
           </a:p>
@@ -13158,7 +13118,7 @@
           <a:p>
             <a:r>
               <a:rPr lang="en-US" smtClean="0"/>
-              <a:t>2018-06-09</a:t>
+              <a:t>2019-02-19</a:t>
             </a:r>
             <a:endParaRPr lang="en-US" dirty="0"/>
           </a:p>
@@ -13903,11 +13863,7 @@
             </a:pPr>
             <a:r>
               <a:rPr lang="en-US" dirty="0" smtClean="0"/>
-              <a:t>3. </a:t>
-            </a:r>
-            <a:r>
-              <a:rPr lang="en-US" dirty="0" smtClean="0"/>
-              <a:t>M5_ROLE_PRIV </a:t>
+              <a:t>3. M5_ROLE_PRIV </a:t>
             </a:r>
             <a:r>
               <a:rPr lang="en-US" dirty="0"/>
@@ -13981,7 +13937,7 @@
           <a:p>
             <a:r>
               <a:rPr lang="en-US" smtClean="0"/>
-              <a:t>2018-06-09</a:t>
+              <a:t>2019-02-19</a:t>
             </a:r>
             <a:endParaRPr lang="en-US" dirty="0"/>
           </a:p>
@@ -15168,7 +15124,7 @@
           <a:p>
             <a:r>
               <a:rPr lang="en-US" smtClean="0"/>
-              <a:t>2018-06-09</a:t>
+              <a:t>2019-02-19</a:t>
             </a:r>
             <a:endParaRPr lang="en-US" dirty="0"/>
           </a:p>
@@ -15341,7 +15297,7 @@
           <a:p>
             <a:r>
               <a:rPr lang="en-US" smtClean="0"/>
-              <a:t>2018-06-09</a:t>
+              <a:t>2019-02-19</a:t>
             </a:r>
             <a:endParaRPr lang="en-US" dirty="0"/>
           </a:p>
@@ -15550,7 +15506,7 @@
           <a:p>
             <a:r>
               <a:rPr lang="en-US" smtClean="0"/>
-              <a:t>2018-06-09</a:t>
+              <a:t>2019-02-19</a:t>
             </a:r>
             <a:endParaRPr lang="en-US"/>
           </a:p>
@@ -15639,7 +15595,7 @@
         </p:blipFill>
         <p:spPr bwMode="auto">
           <a:xfrm>
-            <a:off x="6934199" y="3714750"/>
+            <a:off x="7162800" y="2574828"/>
             <a:ext cx="1825943" cy="1221581"/>
           </a:xfrm>
           <a:prstGeom prst="rect">
@@ -15693,7 +15649,7 @@
         <p:spPr>
           <a:xfrm>
             <a:off x="457200" y="1200151"/>
-            <a:ext cx="8229600" cy="2871981"/>
+            <a:ext cx="8229600" cy="3352799"/>
           </a:xfrm>
         </p:spPr>
         <p:txBody>
@@ -15759,7 +15715,7 @@
             </a:pPr>
             <a:r>
               <a:rPr lang="en-US" sz="2800" dirty="0" smtClean="0"/>
-              <a:t>Certifications: PL/SQL, DBA, SQL Expert, SQL Tuning</a:t>
+              <a:t>Certs: PL/SQL, DBA, SQL Expert, SQL Tuning</a:t>
             </a:r>
           </a:p>
           <a:p>
@@ -15768,6 +15724,16 @@
               <a:buAutoNum type="arabicPeriod"/>
             </a:pPr>
             <a:r>
+              <a:rPr lang="en-US" sz="2800" dirty="0" smtClean="0"/>
+              <a:t>Author of Pro Oracle SQL Development</a:t>
+            </a:r>
+          </a:p>
+          <a:p>
+            <a:pPr marL="514350" indent="-514350">
+              <a:buFont typeface="+mj-lt"/>
+              <a:buAutoNum type="arabicPeriod"/>
+            </a:pPr>
+            <a:r>
               <a:rPr lang="en-US" sz="2800" dirty="0" smtClean="0">
                 <a:hlinkClick r:id="rId4"/>
               </a:rPr>
@@ -15794,7 +15760,7 @@
           <a:p>
             <a:r>
               <a:rPr lang="en-US" smtClean="0"/>
-              <a:t>2018-06-09</a:t>
+              <a:t>2019-02-19</a:t>
             </a:r>
             <a:endParaRPr lang="en-US" dirty="0"/>
           </a:p>
@@ -15844,7 +15810,7 @@
         </p:blipFill>
         <p:spPr bwMode="auto">
           <a:xfrm>
-            <a:off x="533400" y="4117017"/>
+            <a:off x="7240343" y="361950"/>
             <a:ext cx="1670857" cy="417046"/>
           </a:xfrm>
           <a:prstGeom prst="rect">
@@ -15885,7 +15851,7 @@
         </p:blipFill>
         <p:spPr bwMode="auto">
           <a:xfrm>
-            <a:off x="5141213" y="4130581"/>
+            <a:off x="7278370" y="2111790"/>
             <a:ext cx="1594803" cy="389918"/>
           </a:xfrm>
           <a:prstGeom prst="rect">
@@ -15926,7 +15892,7 @@
         </p:blipFill>
         <p:spPr bwMode="auto">
           <a:xfrm>
-            <a:off x="4356291" y="4032170"/>
+            <a:off x="7782401" y="1451930"/>
             <a:ext cx="586740" cy="586740"/>
           </a:xfrm>
           <a:prstGeom prst="rect">
@@ -15965,7 +15931,7 @@
         </p:blipFill>
         <p:spPr bwMode="auto">
           <a:xfrm>
-            <a:off x="2402439" y="4062193"/>
+            <a:off x="7197936" y="852116"/>
             <a:ext cx="1755670" cy="526694"/>
           </a:xfrm>
           <a:prstGeom prst="rect">
@@ -15979,6 +15945,60 @@
                   <a:srgbClr val="FFFFFF"/>
                 </a:solidFill>
               </a14:hiddenFill>
+            </a:ext>
+          </a:extLst>
+        </p:spPr>
+      </p:pic>
+      <p:pic>
+        <p:nvPicPr>
+          <p:cNvPr id="1027" name="Picture 3"/>
+          <p:cNvPicPr>
+            <a:picLocks noChangeAspect="1" noChangeArrowheads="1"/>
+          </p:cNvPicPr>
+          <p:nvPr/>
+        </p:nvPicPr>
+        <p:blipFill>
+          <a:blip r:embed="rId9" cstate="print">
+            <a:extLst>
+              <a:ext uri="{28A0092B-C50C-407E-A947-70E740481C1C}">
+                <a14:useLocalDpi xmlns:a14="http://schemas.microsoft.com/office/drawing/2010/main" val="0"/>
+              </a:ext>
+            </a:extLst>
+          </a:blip>
+          <a:srcRect/>
+          <a:stretch>
+            <a:fillRect/>
+          </a:stretch>
+        </p:blipFill>
+        <p:spPr bwMode="auto">
+          <a:xfrm>
+            <a:off x="7452836" y="3854528"/>
+            <a:ext cx="1245870" cy="865823"/>
+          </a:xfrm>
+          <a:prstGeom prst="rect">
+            <a:avLst/>
+          </a:prstGeom>
+          <a:noFill/>
+          <a:ln>
+            <a:noFill/>
+          </a:ln>
+          <a:extLst>
+            <a:ext uri="{909E8E84-426E-40DD-AFC4-6F175D3DCCD1}">
+              <a14:hiddenFill xmlns:a14="http://schemas.microsoft.com/office/drawing/2010/main">
+                <a:solidFill>
+                  <a:schemeClr val="accent1"/>
+                </a:solidFill>
+              </a14:hiddenFill>
+            </a:ext>
+            <a:ext uri="{91240B29-F687-4F45-9708-019B960494DF}">
+              <a14:hiddenLine xmlns:a14="http://schemas.microsoft.com/office/drawing/2010/main" w="9525">
+                <a:solidFill>
+                  <a:schemeClr val="tx1"/>
+                </a:solidFill>
+                <a:miter lim="800000"/>
+                <a:headEnd/>
+                <a:tailEnd/>
+              </a14:hiddenLine>
             </a:ext>
           </a:extLst>
         </p:spPr>
@@ -16091,7 +16111,7 @@
           <a:p>
             <a:r>
               <a:rPr lang="en-US" smtClean="0"/>
-              <a:t>2018-06-09</a:t>
+              <a:t>2019-02-19</a:t>
             </a:r>
             <a:endParaRPr lang="en-US" dirty="0"/>
           </a:p>
@@ -16920,7 +16940,7 @@
           <a:p>
             <a:r>
               <a:rPr lang="en-US" smtClean="0"/>
-              <a:t>2018-06-09</a:t>
+              <a:t>2019-02-19</a:t>
             </a:r>
             <a:endParaRPr lang="en-US" dirty="0"/>
           </a:p>
@@ -16998,14 +17018,12 @@
         </p:nvSpPr>
         <p:spPr/>
         <p:txBody>
-          <a:bodyPr>
-            <a:normAutofit/>
-          </a:bodyPr>
-          <a:lstStyle/>
-          <a:p>
-            <a:r>
-              <a:rPr lang="en-US" dirty="0" smtClean="0"/>
-              <a:t>Interface - Function or Procedure</a:t>
+          <a:bodyPr/>
+          <a:lstStyle/>
+          <a:p>
+            <a:r>
+              <a:rPr lang="en-US" dirty="0" smtClean="0"/>
+              <a:t>Simple Example - Function</a:t>
             </a:r>
             <a:endParaRPr lang="en-US" dirty="0"/>
           </a:p>
@@ -17013,856 +17031,6 @@
       </p:sp>
       <p:sp>
         <p:nvSpPr>
-          <p:cNvPr id="3" name="Content Placeholder 2"/>
-          <p:cNvSpPr>
-            <a:spLocks noGrp="1"/>
-          </p:cNvSpPr>
-          <p:nvPr>
-            <p:ph idx="1"/>
-          </p:nvPr>
-        </p:nvSpPr>
-        <p:spPr>
-          <a:xfrm>
-            <a:off x="304800" y="1047750"/>
-            <a:ext cx="8458200" cy="3733800"/>
-          </a:xfrm>
-        </p:spPr>
-        <p:txBody>
-          <a:bodyPr>
-            <a:normAutofit fontScale="40000" lnSpcReduction="20000"/>
-          </a:bodyPr>
-          <a:lstStyle/>
-          <a:p>
-            <a:pPr marL="0" indent="0">
-              <a:buNone/>
-            </a:pPr>
-            <a:r>
-              <a:rPr lang="en-US" sz="5000" b="1" dirty="0" smtClean="0">
-                <a:solidFill>
-                  <a:srgbClr val="008080"/>
-                </a:solidFill>
-                <a:highlight>
-                  <a:srgbClr val="FFFFFF"/>
-                </a:highlight>
-                <a:latin typeface="Courier New"/>
-              </a:rPr>
-              <a:t>select</a:t>
-            </a:r>
-            <a:r>
-              <a:rPr lang="en-US" sz="5000" b="1" dirty="0" smtClean="0">
-                <a:solidFill>
-                  <a:srgbClr val="000080"/>
-                </a:solidFill>
-                <a:highlight>
-                  <a:srgbClr val="FFFFFF"/>
-                </a:highlight>
-                <a:latin typeface="Courier New"/>
-              </a:rPr>
-              <a:t> *</a:t>
-            </a:r>
-          </a:p>
-          <a:p>
-            <a:pPr marL="0" indent="0">
-              <a:buNone/>
-            </a:pPr>
-            <a:r>
-              <a:rPr lang="en-US" sz="5000" b="1" dirty="0" smtClean="0">
-                <a:solidFill>
-                  <a:srgbClr val="008080"/>
-                </a:solidFill>
-                <a:highlight>
-                  <a:srgbClr val="FFFFFF"/>
-                </a:highlight>
-                <a:latin typeface="Courier New"/>
-              </a:rPr>
-              <a:t>from</a:t>
-            </a:r>
-            <a:r>
-              <a:rPr lang="en-US" sz="5000" b="1" dirty="0" smtClean="0">
-                <a:solidFill>
-                  <a:srgbClr val="000080"/>
-                </a:solidFill>
-                <a:highlight>
-                  <a:srgbClr val="FFFFFF"/>
-                </a:highlight>
-                <a:latin typeface="Courier New"/>
-              </a:rPr>
-              <a:t> </a:t>
-            </a:r>
-            <a:r>
-              <a:rPr lang="en-US" sz="5000" b="1" dirty="0" smtClean="0">
-                <a:solidFill>
-                  <a:srgbClr val="008080"/>
-                </a:solidFill>
-                <a:highlight>
-                  <a:srgbClr val="FFFFFF"/>
-                </a:highlight>
-                <a:latin typeface="Courier New"/>
-              </a:rPr>
-              <a:t>table</a:t>
-            </a:r>
-            <a:r>
-              <a:rPr lang="en-US" sz="5000" b="1" dirty="0" smtClean="0">
-                <a:solidFill>
-                  <a:srgbClr val="000080"/>
-                </a:solidFill>
-                <a:highlight>
-                  <a:srgbClr val="FFFFFF"/>
-                </a:highlight>
-                <a:latin typeface="Courier New"/>
-              </a:rPr>
-              <a:t>(m5(</a:t>
-            </a:r>
-            <a:r>
-              <a:rPr lang="en-US" sz="5000" b="1" dirty="0" smtClean="0">
-                <a:solidFill>
-                  <a:srgbClr val="0000FF"/>
-                </a:solidFill>
-                <a:highlight>
-                  <a:srgbClr val="FFFFFF"/>
-                </a:highlight>
-                <a:latin typeface="Courier New"/>
-              </a:rPr>
-              <a:t>'select </a:t>
-            </a:r>
-            <a:r>
-              <a:rPr lang="en-US" sz="5000" b="1" dirty="0">
-                <a:solidFill>
-                  <a:srgbClr val="0000FF"/>
-                </a:solidFill>
-                <a:highlight>
-                  <a:srgbClr val="FFFFFF"/>
-                </a:highlight>
-                <a:latin typeface="Courier New"/>
-              </a:rPr>
-              <a:t>* from dual'</a:t>
-            </a:r>
-            <a:r>
-              <a:rPr lang="en-US" sz="5000" b="1" dirty="0">
-                <a:solidFill>
-                  <a:srgbClr val="000080"/>
-                </a:solidFill>
-                <a:highlight>
-                  <a:srgbClr val="FFFFFF"/>
-                </a:highlight>
-                <a:latin typeface="Courier New"/>
-              </a:rPr>
-              <a:t>, </a:t>
-            </a:r>
-            <a:r>
-              <a:rPr lang="en-US" sz="5000" b="1" dirty="0">
-                <a:solidFill>
-                  <a:srgbClr val="0000FF"/>
-                </a:solidFill>
-                <a:highlight>
-                  <a:srgbClr val="FFFFFF"/>
-                </a:highlight>
-                <a:latin typeface="Courier New"/>
-              </a:rPr>
-              <a:t>'</a:t>
-            </a:r>
-            <a:r>
-              <a:rPr lang="en-US" sz="5000" b="1" dirty="0" err="1">
-                <a:solidFill>
-                  <a:srgbClr val="0000FF"/>
-                </a:solidFill>
-                <a:highlight>
-                  <a:srgbClr val="FFFFFF"/>
-                </a:highlight>
-                <a:latin typeface="Courier New"/>
-              </a:rPr>
-              <a:t>dev,qa</a:t>
-            </a:r>
-            <a:r>
-              <a:rPr lang="en-US" sz="5000" b="1" dirty="0" smtClean="0">
-                <a:solidFill>
-                  <a:srgbClr val="0000FF"/>
-                </a:solidFill>
-                <a:highlight>
-                  <a:srgbClr val="FFFFFF"/>
-                </a:highlight>
-                <a:latin typeface="Courier New"/>
-              </a:rPr>
-              <a:t>'</a:t>
-            </a:r>
-            <a:r>
-              <a:rPr lang="en-US" sz="5000" b="1" dirty="0" smtClean="0">
-                <a:solidFill>
-                  <a:srgbClr val="000080"/>
-                </a:solidFill>
-                <a:highlight>
-                  <a:srgbClr val="FFFFFF"/>
-                </a:highlight>
-                <a:latin typeface="Courier New"/>
-              </a:rPr>
-              <a:t>));</a:t>
-            </a:r>
-            <a:endParaRPr lang="en-US" sz="2600" b="1" dirty="0" smtClean="0">
-              <a:solidFill>
-                <a:srgbClr val="000080"/>
-              </a:solidFill>
-              <a:highlight>
-                <a:srgbClr val="FFFFFF"/>
-              </a:highlight>
-              <a:latin typeface="Courier New"/>
-            </a:endParaRPr>
-          </a:p>
-          <a:p>
-            <a:pPr marL="0" indent="0">
-              <a:buNone/>
-            </a:pPr>
-            <a:endParaRPr lang="en-US" sz="2000" b="1" dirty="0" smtClean="0">
-              <a:solidFill>
-                <a:srgbClr val="000080"/>
-              </a:solidFill>
-              <a:highlight>
-                <a:srgbClr val="FFFFFF"/>
-              </a:highlight>
-              <a:latin typeface="Courier New"/>
-            </a:endParaRPr>
-          </a:p>
-          <a:p>
-            <a:pPr marL="0" indent="0">
-              <a:buNone/>
-            </a:pPr>
-            <a:endParaRPr lang="en-US" sz="2000" b="1" dirty="0" smtClean="0">
-              <a:solidFill>
-                <a:srgbClr val="000080"/>
-              </a:solidFill>
-              <a:highlight>
-                <a:srgbClr val="FFFFFF"/>
-              </a:highlight>
-              <a:latin typeface="Courier New"/>
-            </a:endParaRPr>
-          </a:p>
-          <a:p>
-            <a:pPr marL="0" indent="0">
-              <a:buNone/>
-            </a:pPr>
-            <a:r>
-              <a:rPr lang="en-US" sz="2000" b="1" dirty="0" smtClean="0">
-                <a:solidFill>
-                  <a:srgbClr val="000080"/>
-                </a:solidFill>
-                <a:highlight>
-                  <a:srgbClr val="FFFFFF"/>
-                </a:highlight>
-                <a:latin typeface="Courier New"/>
-              </a:rPr>
-              <a:t/>
-            </a:r>
-            <a:br>
-              <a:rPr lang="en-US" sz="2000" b="1" dirty="0" smtClean="0">
-                <a:solidFill>
-                  <a:srgbClr val="000080"/>
-                </a:solidFill>
-                <a:highlight>
-                  <a:srgbClr val="FFFFFF"/>
-                </a:highlight>
-                <a:latin typeface="Courier New"/>
-              </a:rPr>
-            </a:br>
-            <a:r>
-              <a:rPr lang="en-US" sz="4000" b="1" dirty="0" smtClean="0">
-                <a:solidFill>
-                  <a:srgbClr val="008080"/>
-                </a:solidFill>
-                <a:highlight>
-                  <a:srgbClr val="FFFFFF"/>
-                </a:highlight>
-                <a:latin typeface="Courier New"/>
-              </a:rPr>
-              <a:t>begin</a:t>
-            </a:r>
-            <a:endParaRPr lang="en-US" sz="4000" b="1" dirty="0">
-              <a:solidFill>
-                <a:srgbClr val="000080"/>
-              </a:solidFill>
-              <a:highlight>
-                <a:srgbClr val="FFFFFF"/>
-              </a:highlight>
-              <a:latin typeface="Courier New"/>
-            </a:endParaRPr>
-          </a:p>
-          <a:p>
-            <a:pPr marL="0" indent="0">
-              <a:buNone/>
-            </a:pPr>
-            <a:r>
-              <a:rPr lang="en-US" sz="4000" b="1" dirty="0" smtClean="0">
-                <a:solidFill>
-                  <a:srgbClr val="000080"/>
-                </a:solidFill>
-                <a:highlight>
-                  <a:srgbClr val="FFFFFF"/>
-                </a:highlight>
-                <a:latin typeface="Courier New"/>
-              </a:rPr>
-              <a:t>  m5_proc</a:t>
-            </a:r>
-            <a:r>
-              <a:rPr lang="en-US" sz="4000" b="1" dirty="0">
-                <a:solidFill>
-                  <a:srgbClr val="000080"/>
-                </a:solidFill>
-                <a:highlight>
-                  <a:srgbClr val="FFFFFF"/>
-                </a:highlight>
-                <a:latin typeface="Courier New"/>
-              </a:rPr>
-              <a:t>(</a:t>
-            </a:r>
-          </a:p>
-          <a:p>
-            <a:pPr marL="0" indent="0">
-              <a:buNone/>
-            </a:pPr>
-            <a:r>
-              <a:rPr lang="en-US" sz="4000" b="1" dirty="0" smtClean="0">
-                <a:solidFill>
-                  <a:srgbClr val="000080"/>
-                </a:solidFill>
-                <a:highlight>
-                  <a:srgbClr val="FFFFFF"/>
-                </a:highlight>
-                <a:latin typeface="Courier New"/>
-              </a:rPr>
-              <a:t>    </a:t>
-            </a:r>
-            <a:r>
-              <a:rPr lang="en-US" sz="4000" b="1" dirty="0" err="1" smtClean="0">
-                <a:solidFill>
-                  <a:srgbClr val="000080"/>
-                </a:solidFill>
-                <a:highlight>
-                  <a:srgbClr val="FFFFFF"/>
-                </a:highlight>
-                <a:latin typeface="Courier New"/>
-              </a:rPr>
-              <a:t>p_code</a:t>
-            </a:r>
-            <a:r>
-              <a:rPr lang="en-US" sz="4000" b="1" dirty="0" smtClean="0">
-                <a:solidFill>
-                  <a:srgbClr val="000080"/>
-                </a:solidFill>
-                <a:highlight>
-                  <a:srgbClr val="FFFFFF"/>
-                </a:highlight>
-                <a:latin typeface="Courier New"/>
-              </a:rPr>
-              <a:t>                =&gt; </a:t>
-            </a:r>
-            <a:r>
-              <a:rPr lang="en-US" sz="4000" b="1" dirty="0" smtClean="0">
-                <a:solidFill>
-                  <a:srgbClr val="0000FF"/>
-                </a:solidFill>
-                <a:highlight>
-                  <a:srgbClr val="FFFFFF"/>
-                </a:highlight>
-                <a:latin typeface="Courier New"/>
-              </a:rPr>
-              <a:t>'begin null; end;'</a:t>
-            </a:r>
-            <a:r>
-              <a:rPr lang="en-US" sz="4000" b="1" dirty="0" smtClean="0">
-                <a:solidFill>
-                  <a:srgbClr val="000080"/>
-                </a:solidFill>
-                <a:highlight>
-                  <a:srgbClr val="FFFFFF"/>
-                </a:highlight>
-                <a:latin typeface="Courier New"/>
-              </a:rPr>
-              <a:t>,</a:t>
-            </a:r>
-            <a:endParaRPr lang="en-US" sz="4000" b="1" dirty="0">
-              <a:solidFill>
-                <a:srgbClr val="000080"/>
-              </a:solidFill>
-              <a:highlight>
-                <a:srgbClr val="FFFFFF"/>
-              </a:highlight>
-              <a:latin typeface="Courier New"/>
-            </a:endParaRPr>
-          </a:p>
-          <a:p>
-            <a:pPr marL="0" indent="0">
-              <a:buNone/>
-            </a:pPr>
-            <a:r>
-              <a:rPr lang="en-US" sz="4000" b="1" dirty="0" smtClean="0">
-                <a:solidFill>
-                  <a:srgbClr val="000080"/>
-                </a:solidFill>
-                <a:highlight>
-                  <a:srgbClr val="FFFFFF"/>
-                </a:highlight>
-                <a:latin typeface="Courier New"/>
-              </a:rPr>
-              <a:t>    </a:t>
-            </a:r>
-            <a:r>
-              <a:rPr lang="en-US" sz="4000" b="1" dirty="0" err="1" smtClean="0">
-                <a:solidFill>
-                  <a:srgbClr val="000080"/>
-                </a:solidFill>
-                <a:highlight>
-                  <a:srgbClr val="FFFFFF"/>
-                </a:highlight>
-                <a:latin typeface="Courier New"/>
-              </a:rPr>
-              <a:t>p_targets</a:t>
-            </a:r>
-            <a:r>
-              <a:rPr lang="en-US" sz="4000" b="1" dirty="0" smtClean="0">
-                <a:solidFill>
-                  <a:srgbClr val="000080"/>
-                </a:solidFill>
-                <a:highlight>
-                  <a:srgbClr val="FFFFFF"/>
-                </a:highlight>
-                <a:latin typeface="Courier New"/>
-              </a:rPr>
-              <a:t>             =&gt; </a:t>
-            </a:r>
-            <a:r>
-              <a:rPr lang="en-US" sz="4000" b="1" dirty="0" smtClean="0">
-                <a:solidFill>
-                  <a:srgbClr val="0000FF"/>
-                </a:solidFill>
-                <a:highlight>
-                  <a:srgbClr val="FFFFFF"/>
-                </a:highlight>
-                <a:latin typeface="Courier New"/>
-              </a:rPr>
-              <a:t>'</a:t>
-            </a:r>
-            <a:r>
-              <a:rPr lang="en-US" sz="4000" b="1" dirty="0" err="1" smtClean="0">
-                <a:solidFill>
-                  <a:srgbClr val="0000FF"/>
-                </a:solidFill>
-                <a:highlight>
-                  <a:srgbClr val="FFFFFF"/>
-                </a:highlight>
-                <a:latin typeface="Courier New"/>
-              </a:rPr>
-              <a:t>dev,qa</a:t>
-            </a:r>
-            <a:r>
-              <a:rPr lang="en-US" sz="4000" b="1" dirty="0">
-                <a:solidFill>
-                  <a:srgbClr val="0000FF"/>
-                </a:solidFill>
-                <a:highlight>
-                  <a:srgbClr val="FFFFFF"/>
-                </a:highlight>
-                <a:latin typeface="Courier New"/>
-              </a:rPr>
-              <a:t>'</a:t>
-            </a:r>
-            <a:r>
-              <a:rPr lang="en-US" sz="4000" b="1" dirty="0">
-                <a:solidFill>
-                  <a:srgbClr val="000080"/>
-                </a:solidFill>
-                <a:highlight>
-                  <a:srgbClr val="FFFFFF"/>
-                </a:highlight>
-                <a:latin typeface="Courier New"/>
-              </a:rPr>
-              <a:t>,</a:t>
-            </a:r>
-          </a:p>
-          <a:p>
-            <a:pPr marL="0" indent="0">
-              <a:buNone/>
-            </a:pPr>
-            <a:r>
-              <a:rPr lang="en-US" sz="4000" b="1" dirty="0" smtClean="0">
-                <a:solidFill>
-                  <a:srgbClr val="000080"/>
-                </a:solidFill>
-                <a:highlight>
-                  <a:srgbClr val="FFFFFF"/>
-                </a:highlight>
-                <a:latin typeface="Courier New"/>
-              </a:rPr>
-              <a:t>    </a:t>
-            </a:r>
-            <a:r>
-              <a:rPr lang="en-US" sz="4000" b="1" dirty="0" err="1" smtClean="0">
-                <a:solidFill>
-                  <a:srgbClr val="000080"/>
-                </a:solidFill>
-                <a:highlight>
-                  <a:srgbClr val="FFFFFF"/>
-                </a:highlight>
-                <a:latin typeface="Courier New"/>
-              </a:rPr>
-              <a:t>p_table_name</a:t>
-            </a:r>
-            <a:r>
-              <a:rPr lang="en-US" sz="4000" b="1" dirty="0" smtClean="0">
-                <a:solidFill>
-                  <a:srgbClr val="000080"/>
-                </a:solidFill>
-                <a:highlight>
-                  <a:srgbClr val="FFFFFF"/>
-                </a:highlight>
-                <a:latin typeface="Courier New"/>
-              </a:rPr>
-              <a:t>          =&gt; </a:t>
-            </a:r>
-            <a:r>
-              <a:rPr lang="en-US" sz="4000" b="1" dirty="0">
-                <a:solidFill>
-                  <a:srgbClr val="0000FF"/>
-                </a:solidFill>
-                <a:highlight>
-                  <a:srgbClr val="FFFFFF"/>
-                </a:highlight>
-                <a:latin typeface="Courier New"/>
-              </a:rPr>
-              <a:t>'</a:t>
-            </a:r>
-            <a:r>
-              <a:rPr lang="en-US" sz="4000" b="1" dirty="0" err="1">
-                <a:solidFill>
-                  <a:srgbClr val="0000FF"/>
-                </a:solidFill>
-                <a:highlight>
-                  <a:srgbClr val="FFFFFF"/>
-                </a:highlight>
-                <a:latin typeface="Courier New"/>
-              </a:rPr>
-              <a:t>test_data</a:t>
-            </a:r>
-            <a:r>
-              <a:rPr lang="en-US" sz="4000" b="1" dirty="0">
-                <a:solidFill>
-                  <a:srgbClr val="0000FF"/>
-                </a:solidFill>
-                <a:highlight>
-                  <a:srgbClr val="FFFFFF"/>
-                </a:highlight>
-                <a:latin typeface="Courier New"/>
-              </a:rPr>
-              <a:t>'</a:t>
-            </a:r>
-            <a:r>
-              <a:rPr lang="en-US" sz="4000" b="1" dirty="0">
-                <a:solidFill>
-                  <a:srgbClr val="000080"/>
-                </a:solidFill>
-                <a:highlight>
-                  <a:srgbClr val="FFFFFF"/>
-                </a:highlight>
-                <a:latin typeface="Courier New"/>
-              </a:rPr>
-              <a:t>,</a:t>
-            </a:r>
-          </a:p>
-          <a:p>
-            <a:pPr marL="0" indent="0">
-              <a:buNone/>
-            </a:pPr>
-            <a:r>
-              <a:rPr lang="en-US" sz="4000" b="1" dirty="0" smtClean="0">
-                <a:solidFill>
-                  <a:srgbClr val="000080"/>
-                </a:solidFill>
-                <a:highlight>
-                  <a:srgbClr val="FFFFFF"/>
-                </a:highlight>
-                <a:latin typeface="Courier New"/>
-              </a:rPr>
-              <a:t>    </a:t>
-            </a:r>
-            <a:r>
-              <a:rPr lang="en-US" sz="4000" b="1" dirty="0" err="1" smtClean="0">
-                <a:solidFill>
-                  <a:srgbClr val="000080"/>
-                </a:solidFill>
-                <a:highlight>
-                  <a:srgbClr val="FFFFFF"/>
-                </a:highlight>
-                <a:latin typeface="Courier New"/>
-              </a:rPr>
-              <a:t>p_table_exists_action</a:t>
-            </a:r>
-            <a:r>
-              <a:rPr lang="en-US" sz="4000" b="1" dirty="0" smtClean="0">
-                <a:solidFill>
-                  <a:srgbClr val="000080"/>
-                </a:solidFill>
-                <a:highlight>
-                  <a:srgbClr val="FFFFFF"/>
-                </a:highlight>
-                <a:latin typeface="Courier New"/>
-              </a:rPr>
-              <a:t> </a:t>
-            </a:r>
-            <a:r>
-              <a:rPr lang="en-US" sz="4000" b="1" dirty="0">
-                <a:solidFill>
-                  <a:srgbClr val="000080"/>
-                </a:solidFill>
-                <a:highlight>
-                  <a:srgbClr val="FFFFFF"/>
-                </a:highlight>
-                <a:latin typeface="Courier New"/>
-              </a:rPr>
-              <a:t>=&gt; </a:t>
-            </a:r>
-            <a:r>
-              <a:rPr lang="en-US" sz="4000" b="1" dirty="0">
-                <a:solidFill>
-                  <a:srgbClr val="0000FF"/>
-                </a:solidFill>
-                <a:highlight>
-                  <a:srgbClr val="FFFFFF"/>
-                </a:highlight>
-                <a:latin typeface="Courier New"/>
-              </a:rPr>
-              <a:t>'drop'</a:t>
-            </a:r>
-            <a:r>
-              <a:rPr lang="en-US" sz="4000" b="1" dirty="0">
-                <a:solidFill>
-                  <a:srgbClr val="000080"/>
-                </a:solidFill>
-                <a:highlight>
-                  <a:srgbClr val="FFFFFF"/>
-                </a:highlight>
-                <a:latin typeface="Courier New"/>
-              </a:rPr>
-              <a:t>,</a:t>
-            </a:r>
-          </a:p>
-          <a:p>
-            <a:pPr marL="0" indent="0">
-              <a:buNone/>
-            </a:pPr>
-            <a:r>
-              <a:rPr lang="en-US" sz="4000" b="1" dirty="0" smtClean="0">
-                <a:solidFill>
-                  <a:srgbClr val="000080"/>
-                </a:solidFill>
-                <a:highlight>
-                  <a:srgbClr val="FFFFFF"/>
-                </a:highlight>
-                <a:latin typeface="Courier New"/>
-              </a:rPr>
-              <a:t>    </a:t>
-            </a:r>
-            <a:r>
-              <a:rPr lang="en-US" sz="4000" b="1" dirty="0" err="1" smtClean="0">
-                <a:solidFill>
-                  <a:srgbClr val="000080"/>
-                </a:solidFill>
-                <a:highlight>
-                  <a:srgbClr val="FFFFFF"/>
-                </a:highlight>
-                <a:latin typeface="Courier New"/>
-              </a:rPr>
-              <a:t>p_asynchronous</a:t>
-            </a:r>
-            <a:r>
-              <a:rPr lang="en-US" sz="4000" b="1" dirty="0" smtClean="0">
-                <a:solidFill>
-                  <a:srgbClr val="000080"/>
-                </a:solidFill>
-                <a:highlight>
-                  <a:srgbClr val="FFFFFF"/>
-                </a:highlight>
-                <a:latin typeface="Courier New"/>
-              </a:rPr>
-              <a:t>        =&gt; </a:t>
-            </a:r>
-            <a:r>
-              <a:rPr lang="en-US" sz="4000" b="1" dirty="0" smtClean="0">
-                <a:solidFill>
-                  <a:srgbClr val="008080"/>
-                </a:solidFill>
-                <a:highlight>
-                  <a:srgbClr val="FFFFFF"/>
-                </a:highlight>
-                <a:latin typeface="Courier New"/>
-              </a:rPr>
-              <a:t>true</a:t>
-            </a:r>
-            <a:r>
-              <a:rPr lang="en-US" sz="4000" b="1" dirty="0">
-                <a:solidFill>
-                  <a:srgbClr val="000080"/>
-                </a:solidFill>
-                <a:highlight>
-                  <a:srgbClr val="FFFFFF"/>
-                </a:highlight>
-                <a:latin typeface="Courier New"/>
-              </a:rPr>
-              <a:t>,</a:t>
-            </a:r>
-            <a:endParaRPr lang="en-US" sz="4000" b="1" dirty="0" smtClean="0">
-              <a:solidFill>
-                <a:srgbClr val="000080"/>
-              </a:solidFill>
-              <a:highlight>
-                <a:srgbClr val="FFFFFF"/>
-              </a:highlight>
-              <a:latin typeface="Courier New"/>
-            </a:endParaRPr>
-          </a:p>
-          <a:p>
-            <a:pPr marL="0" indent="0">
-              <a:buNone/>
-            </a:pPr>
-            <a:r>
-              <a:rPr lang="en-US" sz="4000" b="1" dirty="0" smtClean="0">
-                <a:solidFill>
-                  <a:srgbClr val="000080"/>
-                </a:solidFill>
-                <a:highlight>
-                  <a:srgbClr val="FFFFFF"/>
-                </a:highlight>
-                <a:latin typeface="Courier New"/>
-              </a:rPr>
-              <a:t>    </a:t>
-            </a:r>
-            <a:r>
-              <a:rPr lang="en-US" sz="4000" b="1" dirty="0" err="1">
-                <a:solidFill>
-                  <a:srgbClr val="000080"/>
-                </a:solidFill>
-                <a:highlight>
-                  <a:srgbClr val="FFFFFF"/>
-                </a:highlight>
-                <a:latin typeface="Courier New"/>
-              </a:rPr>
-              <a:t>p_run_as_sys</a:t>
-            </a:r>
-            <a:r>
-              <a:rPr lang="en-US" sz="4000" b="1" dirty="0">
-                <a:solidFill>
-                  <a:srgbClr val="000080"/>
-                </a:solidFill>
-                <a:highlight>
-                  <a:srgbClr val="FFFFFF"/>
-                </a:highlight>
-                <a:latin typeface="Courier New"/>
-              </a:rPr>
-              <a:t>          =&gt; </a:t>
-            </a:r>
-            <a:r>
-              <a:rPr lang="en-US" sz="4000" b="1" dirty="0">
-                <a:solidFill>
-                  <a:srgbClr val="008080"/>
-                </a:solidFill>
-                <a:highlight>
-                  <a:srgbClr val="FFFFFF"/>
-                </a:highlight>
-                <a:latin typeface="Courier New"/>
-              </a:rPr>
-              <a:t>false</a:t>
-            </a:r>
-            <a:endParaRPr lang="en-US" sz="4000" b="1" dirty="0" smtClean="0">
-              <a:solidFill>
-                <a:srgbClr val="000080"/>
-              </a:solidFill>
-              <a:highlight>
-                <a:srgbClr val="FFFFFF"/>
-              </a:highlight>
-              <a:latin typeface="Courier New"/>
-            </a:endParaRPr>
-          </a:p>
-          <a:p>
-            <a:pPr marL="0" indent="0">
-              <a:buNone/>
-            </a:pPr>
-            <a:r>
-              <a:rPr lang="en-US" sz="4000" b="1" dirty="0" smtClean="0">
-                <a:solidFill>
-                  <a:srgbClr val="000080"/>
-                </a:solidFill>
-                <a:highlight>
-                  <a:srgbClr val="FFFFFF"/>
-                </a:highlight>
-                <a:latin typeface="Courier New"/>
-              </a:rPr>
-              <a:t>  );</a:t>
-            </a:r>
-            <a:endParaRPr lang="en-US" sz="4000" b="1" dirty="0">
-              <a:solidFill>
-                <a:srgbClr val="000080"/>
-              </a:solidFill>
-              <a:highlight>
-                <a:srgbClr val="FFFFFF"/>
-              </a:highlight>
-              <a:latin typeface="Courier New"/>
-            </a:endParaRPr>
-          </a:p>
-          <a:p>
-            <a:pPr marL="0" indent="0">
-              <a:buNone/>
-            </a:pPr>
-            <a:r>
-              <a:rPr lang="en-US" sz="4000" b="1" dirty="0" smtClean="0">
-                <a:solidFill>
-                  <a:srgbClr val="008080"/>
-                </a:solidFill>
-                <a:highlight>
-                  <a:srgbClr val="FFFFFF"/>
-                </a:highlight>
-                <a:latin typeface="Courier New"/>
-              </a:rPr>
-              <a:t>end</a:t>
-            </a:r>
-            <a:r>
-              <a:rPr lang="en-US" sz="4000" b="1" dirty="0">
-                <a:solidFill>
-                  <a:srgbClr val="000080"/>
-                </a:solidFill>
-                <a:highlight>
-                  <a:srgbClr val="FFFFFF"/>
-                </a:highlight>
-                <a:latin typeface="Courier New"/>
-              </a:rPr>
-              <a:t>;</a:t>
-            </a:r>
-          </a:p>
-          <a:p>
-            <a:pPr marL="0" indent="0">
-              <a:buNone/>
-            </a:pPr>
-            <a:r>
-              <a:rPr lang="en-US" sz="4000" b="1" dirty="0" smtClean="0">
-                <a:solidFill>
-                  <a:srgbClr val="000080"/>
-                </a:solidFill>
-                <a:highlight>
-                  <a:srgbClr val="FFFFFF"/>
-                </a:highlight>
-                <a:latin typeface="Courier New"/>
-              </a:rPr>
-              <a:t>/</a:t>
-            </a:r>
-            <a:endParaRPr lang="en-US" sz="2600" b="1" dirty="0" smtClean="0">
-              <a:solidFill>
-                <a:srgbClr val="000080"/>
-              </a:solidFill>
-              <a:highlight>
-                <a:srgbClr val="FFFFFF"/>
-              </a:highlight>
-              <a:latin typeface="Courier New"/>
-            </a:endParaRPr>
-          </a:p>
-        </p:txBody>
-      </p:sp>
-      <p:sp>
-        <p:nvSpPr>
           <p:cNvPr id="4" name="Date Placeholder 3"/>
           <p:cNvSpPr>
             <a:spLocks noGrp="1"/>
@@ -17878,7 +17046,7 @@
           <a:p>
             <a:r>
               <a:rPr lang="en-US" smtClean="0"/>
-              <a:t>2018-06-09</a:t>
+              <a:t>2019-02-19</a:t>
             </a:r>
             <a:endParaRPr lang="en-US" dirty="0"/>
           </a:p>
@@ -17902,332 +17070,6 @@
             <a:fld id="{05869706-863E-4BD1-B682-3CD80F60367B}" type="slidenum">
               <a:rPr lang="en-US" smtClean="0"/>
               <a:t>6</a:t>
-            </a:fld>
-            <a:endParaRPr lang="en-US"/>
-          </a:p>
-        </p:txBody>
-      </p:sp>
-      <p:sp>
-        <p:nvSpPr>
-          <p:cNvPr id="6" name="Rectangle 5"/>
-          <p:cNvSpPr/>
-          <p:nvPr/>
-        </p:nvSpPr>
-        <p:spPr>
-          <a:xfrm>
-            <a:off x="2590800" y="1657350"/>
-            <a:ext cx="2895600" cy="283388"/>
-          </a:xfrm>
-          <a:prstGeom prst="rect">
-            <a:avLst/>
-          </a:prstGeom>
-        </p:spPr>
-        <p:style>
-          <a:lnRef idx="2">
-            <a:schemeClr val="accent1">
-              <a:shade val="50000"/>
-            </a:schemeClr>
-          </a:lnRef>
-          <a:fillRef idx="1">
-            <a:schemeClr val="accent1"/>
-          </a:fillRef>
-          <a:effectRef idx="0">
-            <a:schemeClr val="accent1"/>
-          </a:effectRef>
-          <a:fontRef idx="minor">
-            <a:schemeClr val="lt1"/>
-          </a:fontRef>
-        </p:style>
-        <p:txBody>
-          <a:bodyPr rtlCol="0" anchor="ctr"/>
-          <a:lstStyle/>
-          <a:p>
-            <a:pPr algn="ctr"/>
-            <a:r>
-              <a:rPr lang="en-US" sz="2800" dirty="0" smtClean="0"/>
-              <a:t>WHAT</a:t>
-            </a:r>
-            <a:endParaRPr lang="en-US" sz="2800" dirty="0"/>
-          </a:p>
-        </p:txBody>
-      </p:sp>
-      <p:sp>
-        <p:nvSpPr>
-          <p:cNvPr id="7" name="Rectangle 6"/>
-          <p:cNvSpPr/>
-          <p:nvPr/>
-        </p:nvSpPr>
-        <p:spPr>
-          <a:xfrm>
-            <a:off x="5908966" y="1657350"/>
-            <a:ext cx="1177634" cy="283388"/>
-          </a:xfrm>
-          <a:prstGeom prst="rect">
-            <a:avLst/>
-          </a:prstGeom>
-        </p:spPr>
-        <p:style>
-          <a:lnRef idx="2">
-            <a:schemeClr val="accent1">
-              <a:shade val="50000"/>
-            </a:schemeClr>
-          </a:lnRef>
-          <a:fillRef idx="1">
-            <a:schemeClr val="accent1"/>
-          </a:fillRef>
-          <a:effectRef idx="0">
-            <a:schemeClr val="accent1"/>
-          </a:effectRef>
-          <a:fontRef idx="minor">
-            <a:schemeClr val="lt1"/>
-          </a:fontRef>
-        </p:style>
-        <p:txBody>
-          <a:bodyPr lIns="0" rIns="0" rtlCol="0" anchor="ctr"/>
-          <a:lstStyle/>
-          <a:p>
-            <a:pPr algn="ctr"/>
-            <a:r>
-              <a:rPr lang="en-US" sz="2800" dirty="0" smtClean="0"/>
-              <a:t>WHERE</a:t>
-            </a:r>
-            <a:endParaRPr lang="en-US" sz="2800" dirty="0"/>
-          </a:p>
-        </p:txBody>
-      </p:sp>
-      <p:sp>
-        <p:nvSpPr>
-          <p:cNvPr id="8" name="Rectangle 7"/>
-          <p:cNvSpPr/>
-          <p:nvPr/>
-        </p:nvSpPr>
-        <p:spPr>
-          <a:xfrm>
-            <a:off x="6553200" y="2495550"/>
-            <a:ext cx="1295400" cy="228600"/>
-          </a:xfrm>
-          <a:prstGeom prst="rect">
-            <a:avLst/>
-          </a:prstGeom>
-        </p:spPr>
-        <p:style>
-          <a:lnRef idx="2">
-            <a:schemeClr val="accent1">
-              <a:shade val="50000"/>
-            </a:schemeClr>
-          </a:lnRef>
-          <a:fillRef idx="1">
-            <a:schemeClr val="accent1"/>
-          </a:fillRef>
-          <a:effectRef idx="0">
-            <a:schemeClr val="accent1"/>
-          </a:effectRef>
-          <a:fontRef idx="minor">
-            <a:schemeClr val="lt1"/>
-          </a:fontRef>
-        </p:style>
-        <p:txBody>
-          <a:bodyPr rtlCol="0" anchor="ctr"/>
-          <a:lstStyle/>
-          <a:p>
-            <a:pPr algn="ctr"/>
-            <a:r>
-              <a:rPr lang="en-US" sz="2800" dirty="0" smtClean="0"/>
-              <a:t>WHAT</a:t>
-            </a:r>
-            <a:endParaRPr lang="en-US" sz="2400" dirty="0"/>
-          </a:p>
-        </p:txBody>
-      </p:sp>
-      <p:sp>
-        <p:nvSpPr>
-          <p:cNvPr id="9" name="Rectangle 8"/>
-          <p:cNvSpPr/>
-          <p:nvPr/>
-        </p:nvSpPr>
-        <p:spPr>
-          <a:xfrm>
-            <a:off x="6553200" y="2767350"/>
-            <a:ext cx="1295400" cy="251460"/>
-          </a:xfrm>
-          <a:prstGeom prst="rect">
-            <a:avLst/>
-          </a:prstGeom>
-        </p:spPr>
-        <p:style>
-          <a:lnRef idx="2">
-            <a:schemeClr val="accent1">
-              <a:shade val="50000"/>
-            </a:schemeClr>
-          </a:lnRef>
-          <a:fillRef idx="1">
-            <a:schemeClr val="accent1"/>
-          </a:fillRef>
-          <a:effectRef idx="0">
-            <a:schemeClr val="accent1"/>
-          </a:effectRef>
-          <a:fontRef idx="minor">
-            <a:schemeClr val="lt1"/>
-          </a:fontRef>
-        </p:style>
-        <p:txBody>
-          <a:bodyPr rtlCol="0" anchor="ctr"/>
-          <a:lstStyle/>
-          <a:p>
-            <a:pPr algn="ctr"/>
-            <a:r>
-              <a:rPr lang="en-US" sz="2800" dirty="0" smtClean="0"/>
-              <a:t>WHERE</a:t>
-            </a:r>
-            <a:endParaRPr lang="en-US" sz="2800" dirty="0"/>
-          </a:p>
-        </p:txBody>
-      </p:sp>
-      <p:sp>
-        <p:nvSpPr>
-          <p:cNvPr id="10" name="Rectangle 9"/>
-          <p:cNvSpPr/>
-          <p:nvPr/>
-        </p:nvSpPr>
-        <p:spPr>
-          <a:xfrm>
-            <a:off x="6553200" y="3065004"/>
-            <a:ext cx="1295400" cy="827946"/>
-          </a:xfrm>
-          <a:prstGeom prst="rect">
-            <a:avLst/>
-          </a:prstGeom>
-        </p:spPr>
-        <p:style>
-          <a:lnRef idx="2">
-            <a:schemeClr val="accent1">
-              <a:shade val="50000"/>
-            </a:schemeClr>
-          </a:lnRef>
-          <a:fillRef idx="1">
-            <a:schemeClr val="accent1"/>
-          </a:fillRef>
-          <a:effectRef idx="0">
-            <a:schemeClr val="accent1"/>
-          </a:effectRef>
-          <a:fontRef idx="minor">
-            <a:schemeClr val="lt1"/>
-          </a:fontRef>
-        </p:style>
-        <p:txBody>
-          <a:bodyPr rtlCol="0" anchor="ctr"/>
-          <a:lstStyle/>
-          <a:p>
-            <a:pPr algn="ctr"/>
-            <a:r>
-              <a:rPr lang="en-US" sz="2800" dirty="0" smtClean="0"/>
-              <a:t>HOW</a:t>
-            </a:r>
-            <a:endParaRPr lang="en-US" sz="2800" dirty="0"/>
-          </a:p>
-        </p:txBody>
-      </p:sp>
-    </p:spTree>
-    <p:extLst>
-      <p:ext uri="{BB962C8B-B14F-4D97-AF65-F5344CB8AC3E}">
-        <p14:creationId xmlns:p14="http://schemas.microsoft.com/office/powerpoint/2010/main" val="2705181770"/>
-      </p:ext>
-    </p:extLst>
-  </p:cSld>
-  <p:clrMapOvr>
-    <a:masterClrMapping/>
-  </p:clrMapOvr>
-  <p:timing>
-    <p:tnLst>
-      <p:par>
-        <p:cTn id="1" dur="indefinite" restart="never" nodeType="tmRoot"/>
-      </p:par>
-    </p:tnLst>
-  </p:timing>
-</p:sld>
-</file>
-
-<file path=ppt/slides/slide7.xml><?xml version="1.0" encoding="utf-8"?>
-<p:sld xmlns:a="http://schemas.openxmlformats.org/drawingml/2006/main" xmlns:r="http://schemas.openxmlformats.org/officeDocument/2006/relationships" xmlns:p="http://schemas.openxmlformats.org/presentationml/2006/main">
-  <p:cSld>
-    <p:spTree>
-      <p:nvGrpSpPr>
-        <p:cNvPr id="1" name=""/>
-        <p:cNvGrpSpPr/>
-        <p:nvPr/>
-      </p:nvGrpSpPr>
-      <p:grpSpPr>
-        <a:xfrm>
-          <a:off x="0" y="0"/>
-          <a:ext cx="0" cy="0"/>
-          <a:chOff x="0" y="0"/>
-          <a:chExt cx="0" cy="0"/>
-        </a:xfrm>
-      </p:grpSpPr>
-      <p:sp>
-        <p:nvSpPr>
-          <p:cNvPr id="2" name="Title 1"/>
-          <p:cNvSpPr>
-            <a:spLocks noGrp="1"/>
-          </p:cNvSpPr>
-          <p:nvPr>
-            <p:ph type="title"/>
-          </p:nvPr>
-        </p:nvSpPr>
-        <p:spPr/>
-        <p:txBody>
-          <a:bodyPr/>
-          <a:lstStyle/>
-          <a:p>
-            <a:r>
-              <a:rPr lang="en-US" dirty="0" smtClean="0"/>
-              <a:t>Simple Example - Function</a:t>
-            </a:r>
-            <a:endParaRPr lang="en-US" dirty="0"/>
-          </a:p>
-        </p:txBody>
-      </p:sp>
-      <p:sp>
-        <p:nvSpPr>
-          <p:cNvPr id="4" name="Date Placeholder 3"/>
-          <p:cNvSpPr>
-            <a:spLocks noGrp="1"/>
-          </p:cNvSpPr>
-          <p:nvPr>
-            <p:ph type="dt" sz="half" idx="10"/>
-          </p:nvPr>
-        </p:nvSpPr>
-        <p:spPr/>
-        <p:txBody>
-          <a:bodyPr/>
-          <a:lstStyle/>
-          <a:p>
-            <a:r>
-              <a:rPr lang="en-US" smtClean="0"/>
-              <a:t>2018-06-09</a:t>
-            </a:r>
-            <a:endParaRPr lang="en-US" dirty="0"/>
-          </a:p>
-        </p:txBody>
-      </p:sp>
-      <p:sp>
-        <p:nvSpPr>
-          <p:cNvPr id="5" name="Slide Number Placeholder 4"/>
-          <p:cNvSpPr>
-            <a:spLocks noGrp="1"/>
-          </p:cNvSpPr>
-          <p:nvPr>
-            <p:ph type="sldNum" sz="quarter" idx="12"/>
-          </p:nvPr>
-        </p:nvSpPr>
-        <p:spPr/>
-        <p:txBody>
-          <a:bodyPr/>
-          <a:lstStyle/>
-          <a:p>
-            <a:fld id="{05869706-863E-4BD1-B682-3CD80F60367B}" type="slidenum">
-              <a:rPr lang="en-US" smtClean="0"/>
-              <a:t>7</a:t>
             </a:fld>
             <a:endParaRPr lang="en-US"/>
           </a:p>
@@ -18307,7 +17149,7 @@
 </p:sld>
 </file>
 
-<file path=ppt/slides/slide8.xml><?xml version="1.0" encoding="utf-8"?>
+<file path=ppt/slides/slide7.xml><?xml version="1.0" encoding="utf-8"?>
 <p:sld xmlns:a="http://schemas.openxmlformats.org/drawingml/2006/main" xmlns:r="http://schemas.openxmlformats.org/officeDocument/2006/relationships" xmlns:p="http://schemas.openxmlformats.org/presentationml/2006/main">
   <p:cSld>
     <p:spTree>
@@ -18364,7 +17206,7 @@
           <a:p>
             <a:r>
               <a:rPr lang="en-US" smtClean="0"/>
-              <a:t>2018-06-09</a:t>
+              <a:t>2019-02-19</a:t>
             </a:r>
             <a:endParaRPr lang="en-US" dirty="0"/>
           </a:p>
@@ -18387,7 +17229,7 @@
           <a:p>
             <a:fld id="{05869706-863E-4BD1-B682-3CD80F60367B}" type="slidenum">
               <a:rPr lang="en-US" smtClean="0"/>
-              <a:t>8</a:t>
+              <a:t>7</a:t>
             </a:fld>
             <a:endParaRPr lang="en-US"/>
           </a:p>
@@ -18453,6 +17295,1184 @@
     <p:extLst>
       <p:ext uri="{BB962C8B-B14F-4D97-AF65-F5344CB8AC3E}">
         <p14:creationId xmlns:p14="http://schemas.microsoft.com/office/powerpoint/2010/main" val="1089531153"/>
+      </p:ext>
+    </p:extLst>
+  </p:cSld>
+  <p:clrMapOvr>
+    <a:masterClrMapping/>
+  </p:clrMapOvr>
+  <p:timing>
+    <p:tnLst>
+      <p:par>
+        <p:cTn id="1" dur="indefinite" restart="never" nodeType="tmRoot"/>
+      </p:par>
+    </p:tnLst>
+  </p:timing>
+</p:sld>
+</file>
+
+<file path=ppt/slides/slide8.xml><?xml version="1.0" encoding="utf-8"?>
+<p:sld xmlns:a="http://schemas.openxmlformats.org/drawingml/2006/main" xmlns:r="http://schemas.openxmlformats.org/officeDocument/2006/relationships" xmlns:p="http://schemas.openxmlformats.org/presentationml/2006/main">
+  <p:cSld>
+    <p:spTree>
+      <p:nvGrpSpPr>
+        <p:cNvPr id="1" name=""/>
+        <p:cNvGrpSpPr/>
+        <p:nvPr/>
+      </p:nvGrpSpPr>
+      <p:grpSpPr>
+        <a:xfrm>
+          <a:off x="0" y="0"/>
+          <a:ext cx="0" cy="0"/>
+          <a:chOff x="0" y="0"/>
+          <a:chExt cx="0" cy="0"/>
+        </a:xfrm>
+      </p:grpSpPr>
+      <p:sp>
+        <p:nvSpPr>
+          <p:cNvPr id="2" name="Title 1"/>
+          <p:cNvSpPr>
+            <a:spLocks noGrp="1"/>
+          </p:cNvSpPr>
+          <p:nvPr>
+            <p:ph type="title"/>
+          </p:nvPr>
+        </p:nvSpPr>
+        <p:spPr/>
+        <p:txBody>
+          <a:bodyPr>
+            <a:normAutofit/>
+          </a:bodyPr>
+          <a:lstStyle/>
+          <a:p>
+            <a:r>
+              <a:rPr lang="en-US" dirty="0" smtClean="0"/>
+              <a:t>Interface - Function or Procedure</a:t>
+            </a:r>
+            <a:endParaRPr lang="en-US" dirty="0"/>
+          </a:p>
+        </p:txBody>
+      </p:sp>
+      <p:sp>
+        <p:nvSpPr>
+          <p:cNvPr id="3" name="Content Placeholder 2"/>
+          <p:cNvSpPr>
+            <a:spLocks noGrp="1"/>
+          </p:cNvSpPr>
+          <p:nvPr>
+            <p:ph idx="1"/>
+          </p:nvPr>
+        </p:nvSpPr>
+        <p:spPr>
+          <a:xfrm>
+            <a:off x="304800" y="1047750"/>
+            <a:ext cx="8458200" cy="3733800"/>
+          </a:xfrm>
+        </p:spPr>
+        <p:txBody>
+          <a:bodyPr>
+            <a:normAutofit fontScale="40000" lnSpcReduction="20000"/>
+          </a:bodyPr>
+          <a:lstStyle/>
+          <a:p>
+            <a:pPr marL="0" indent="0">
+              <a:buNone/>
+            </a:pPr>
+            <a:r>
+              <a:rPr lang="en-US" sz="5000" b="1" dirty="0" smtClean="0">
+                <a:solidFill>
+                  <a:srgbClr val="008080"/>
+                </a:solidFill>
+                <a:highlight>
+                  <a:srgbClr val="FFFFFF"/>
+                </a:highlight>
+                <a:latin typeface="Courier New"/>
+              </a:rPr>
+              <a:t>select</a:t>
+            </a:r>
+            <a:r>
+              <a:rPr lang="en-US" sz="5000" b="1" dirty="0" smtClean="0">
+                <a:solidFill>
+                  <a:srgbClr val="000080"/>
+                </a:solidFill>
+                <a:highlight>
+                  <a:srgbClr val="FFFFFF"/>
+                </a:highlight>
+                <a:latin typeface="Courier New"/>
+              </a:rPr>
+              <a:t> *</a:t>
+            </a:r>
+          </a:p>
+          <a:p>
+            <a:pPr marL="0" indent="0">
+              <a:buNone/>
+            </a:pPr>
+            <a:r>
+              <a:rPr lang="en-US" sz="5000" b="1" dirty="0" smtClean="0">
+                <a:solidFill>
+                  <a:srgbClr val="008080"/>
+                </a:solidFill>
+                <a:highlight>
+                  <a:srgbClr val="FFFFFF"/>
+                </a:highlight>
+                <a:latin typeface="Courier New"/>
+              </a:rPr>
+              <a:t>from</a:t>
+            </a:r>
+            <a:r>
+              <a:rPr lang="en-US" sz="5000" b="1" dirty="0" smtClean="0">
+                <a:solidFill>
+                  <a:srgbClr val="000080"/>
+                </a:solidFill>
+                <a:highlight>
+                  <a:srgbClr val="FFFFFF"/>
+                </a:highlight>
+                <a:latin typeface="Courier New"/>
+              </a:rPr>
+              <a:t> </a:t>
+            </a:r>
+            <a:r>
+              <a:rPr lang="en-US" sz="5000" b="1" dirty="0" smtClean="0">
+                <a:solidFill>
+                  <a:srgbClr val="008080"/>
+                </a:solidFill>
+                <a:highlight>
+                  <a:srgbClr val="FFFFFF"/>
+                </a:highlight>
+                <a:latin typeface="Courier New"/>
+              </a:rPr>
+              <a:t>table</a:t>
+            </a:r>
+            <a:r>
+              <a:rPr lang="en-US" sz="5000" b="1" dirty="0" smtClean="0">
+                <a:solidFill>
+                  <a:srgbClr val="000080"/>
+                </a:solidFill>
+                <a:highlight>
+                  <a:srgbClr val="FFFFFF"/>
+                </a:highlight>
+                <a:latin typeface="Courier New"/>
+              </a:rPr>
+              <a:t>(m5(</a:t>
+            </a:r>
+            <a:r>
+              <a:rPr lang="en-US" sz="5000" b="1" dirty="0" smtClean="0">
+                <a:solidFill>
+                  <a:srgbClr val="0000FF"/>
+                </a:solidFill>
+                <a:highlight>
+                  <a:srgbClr val="FFFFFF"/>
+                </a:highlight>
+                <a:latin typeface="Courier New"/>
+              </a:rPr>
+              <a:t>'select </a:t>
+            </a:r>
+            <a:r>
+              <a:rPr lang="en-US" sz="5000" b="1" dirty="0">
+                <a:solidFill>
+                  <a:srgbClr val="0000FF"/>
+                </a:solidFill>
+                <a:highlight>
+                  <a:srgbClr val="FFFFFF"/>
+                </a:highlight>
+                <a:latin typeface="Courier New"/>
+              </a:rPr>
+              <a:t>* from dual'</a:t>
+            </a:r>
+            <a:r>
+              <a:rPr lang="en-US" sz="5000" b="1" dirty="0">
+                <a:solidFill>
+                  <a:srgbClr val="000080"/>
+                </a:solidFill>
+                <a:highlight>
+                  <a:srgbClr val="FFFFFF"/>
+                </a:highlight>
+                <a:latin typeface="Courier New"/>
+              </a:rPr>
+              <a:t>, </a:t>
+            </a:r>
+            <a:r>
+              <a:rPr lang="en-US" sz="5000" b="1" dirty="0">
+                <a:solidFill>
+                  <a:srgbClr val="0000FF"/>
+                </a:solidFill>
+                <a:highlight>
+                  <a:srgbClr val="FFFFFF"/>
+                </a:highlight>
+                <a:latin typeface="Courier New"/>
+              </a:rPr>
+              <a:t>'</a:t>
+            </a:r>
+            <a:r>
+              <a:rPr lang="en-US" sz="5000" b="1" dirty="0" err="1">
+                <a:solidFill>
+                  <a:srgbClr val="0000FF"/>
+                </a:solidFill>
+                <a:highlight>
+                  <a:srgbClr val="FFFFFF"/>
+                </a:highlight>
+                <a:latin typeface="Courier New"/>
+              </a:rPr>
+              <a:t>dev,qa</a:t>
+            </a:r>
+            <a:r>
+              <a:rPr lang="en-US" sz="5000" b="1" dirty="0" smtClean="0">
+                <a:solidFill>
+                  <a:srgbClr val="0000FF"/>
+                </a:solidFill>
+                <a:highlight>
+                  <a:srgbClr val="FFFFFF"/>
+                </a:highlight>
+                <a:latin typeface="Courier New"/>
+              </a:rPr>
+              <a:t>'</a:t>
+            </a:r>
+            <a:r>
+              <a:rPr lang="en-US" sz="5000" b="1" dirty="0" smtClean="0">
+                <a:solidFill>
+                  <a:srgbClr val="000080"/>
+                </a:solidFill>
+                <a:highlight>
+                  <a:srgbClr val="FFFFFF"/>
+                </a:highlight>
+                <a:latin typeface="Courier New"/>
+              </a:rPr>
+              <a:t>));</a:t>
+            </a:r>
+            <a:endParaRPr lang="en-US" sz="2600" b="1" dirty="0" smtClean="0">
+              <a:solidFill>
+                <a:srgbClr val="000080"/>
+              </a:solidFill>
+              <a:highlight>
+                <a:srgbClr val="FFFFFF"/>
+              </a:highlight>
+              <a:latin typeface="Courier New"/>
+            </a:endParaRPr>
+          </a:p>
+          <a:p>
+            <a:pPr marL="0" indent="0">
+              <a:buNone/>
+            </a:pPr>
+            <a:endParaRPr lang="en-US" sz="2000" b="1" dirty="0" smtClean="0">
+              <a:solidFill>
+                <a:srgbClr val="000080"/>
+              </a:solidFill>
+              <a:highlight>
+                <a:srgbClr val="FFFFFF"/>
+              </a:highlight>
+              <a:latin typeface="Courier New"/>
+            </a:endParaRPr>
+          </a:p>
+          <a:p>
+            <a:pPr marL="0" indent="0">
+              <a:buNone/>
+            </a:pPr>
+            <a:endParaRPr lang="en-US" sz="2000" b="1" dirty="0" smtClean="0">
+              <a:solidFill>
+                <a:srgbClr val="000080"/>
+              </a:solidFill>
+              <a:highlight>
+                <a:srgbClr val="FFFFFF"/>
+              </a:highlight>
+              <a:latin typeface="Courier New"/>
+            </a:endParaRPr>
+          </a:p>
+          <a:p>
+            <a:pPr marL="0" indent="0">
+              <a:buNone/>
+            </a:pPr>
+            <a:r>
+              <a:rPr lang="en-US" sz="2000" b="1" dirty="0" smtClean="0">
+                <a:solidFill>
+                  <a:srgbClr val="000080"/>
+                </a:solidFill>
+                <a:highlight>
+                  <a:srgbClr val="FFFFFF"/>
+                </a:highlight>
+                <a:latin typeface="Courier New"/>
+              </a:rPr>
+              <a:t/>
+            </a:r>
+            <a:br>
+              <a:rPr lang="en-US" sz="2000" b="1" dirty="0" smtClean="0">
+                <a:solidFill>
+                  <a:srgbClr val="000080"/>
+                </a:solidFill>
+                <a:highlight>
+                  <a:srgbClr val="FFFFFF"/>
+                </a:highlight>
+                <a:latin typeface="Courier New"/>
+              </a:rPr>
+            </a:br>
+            <a:r>
+              <a:rPr lang="en-US" sz="4000" b="1" dirty="0" smtClean="0">
+                <a:solidFill>
+                  <a:srgbClr val="008080"/>
+                </a:solidFill>
+                <a:highlight>
+                  <a:srgbClr val="FFFFFF"/>
+                </a:highlight>
+                <a:latin typeface="Courier New"/>
+              </a:rPr>
+              <a:t>begin</a:t>
+            </a:r>
+            <a:endParaRPr lang="en-US" sz="4000" b="1" dirty="0">
+              <a:solidFill>
+                <a:srgbClr val="000080"/>
+              </a:solidFill>
+              <a:highlight>
+                <a:srgbClr val="FFFFFF"/>
+              </a:highlight>
+              <a:latin typeface="Courier New"/>
+            </a:endParaRPr>
+          </a:p>
+          <a:p>
+            <a:pPr marL="0" indent="0">
+              <a:buNone/>
+            </a:pPr>
+            <a:r>
+              <a:rPr lang="en-US" sz="4000" b="1" dirty="0" smtClean="0">
+                <a:solidFill>
+                  <a:srgbClr val="000080"/>
+                </a:solidFill>
+                <a:highlight>
+                  <a:srgbClr val="FFFFFF"/>
+                </a:highlight>
+                <a:latin typeface="Courier New"/>
+              </a:rPr>
+              <a:t>  m5_proc</a:t>
+            </a:r>
+            <a:r>
+              <a:rPr lang="en-US" sz="4000" b="1" dirty="0">
+                <a:solidFill>
+                  <a:srgbClr val="000080"/>
+                </a:solidFill>
+                <a:highlight>
+                  <a:srgbClr val="FFFFFF"/>
+                </a:highlight>
+                <a:latin typeface="Courier New"/>
+              </a:rPr>
+              <a:t>(</a:t>
+            </a:r>
+          </a:p>
+          <a:p>
+            <a:pPr marL="0" indent="0">
+              <a:buNone/>
+            </a:pPr>
+            <a:r>
+              <a:rPr lang="en-US" sz="4000" b="1" dirty="0" smtClean="0">
+                <a:solidFill>
+                  <a:srgbClr val="000080"/>
+                </a:solidFill>
+                <a:highlight>
+                  <a:srgbClr val="FFFFFF"/>
+                </a:highlight>
+                <a:latin typeface="Courier New"/>
+              </a:rPr>
+              <a:t>    </a:t>
+            </a:r>
+            <a:r>
+              <a:rPr lang="en-US" sz="4000" b="1" dirty="0" err="1" smtClean="0">
+                <a:solidFill>
+                  <a:srgbClr val="000080"/>
+                </a:solidFill>
+                <a:highlight>
+                  <a:srgbClr val="FFFFFF"/>
+                </a:highlight>
+                <a:latin typeface="Courier New"/>
+              </a:rPr>
+              <a:t>p_code</a:t>
+            </a:r>
+            <a:r>
+              <a:rPr lang="en-US" sz="4000" b="1" dirty="0" smtClean="0">
+                <a:solidFill>
+                  <a:srgbClr val="000080"/>
+                </a:solidFill>
+                <a:highlight>
+                  <a:srgbClr val="FFFFFF"/>
+                </a:highlight>
+                <a:latin typeface="Courier New"/>
+              </a:rPr>
+              <a:t>                =&gt; </a:t>
+            </a:r>
+            <a:r>
+              <a:rPr lang="en-US" sz="4000" b="1" dirty="0" smtClean="0">
+                <a:solidFill>
+                  <a:srgbClr val="0000FF"/>
+                </a:solidFill>
+                <a:highlight>
+                  <a:srgbClr val="FFFFFF"/>
+                </a:highlight>
+                <a:latin typeface="Courier New"/>
+              </a:rPr>
+              <a:t>'begin null; end;'</a:t>
+            </a:r>
+            <a:r>
+              <a:rPr lang="en-US" sz="4000" b="1" dirty="0" smtClean="0">
+                <a:solidFill>
+                  <a:srgbClr val="000080"/>
+                </a:solidFill>
+                <a:highlight>
+                  <a:srgbClr val="FFFFFF"/>
+                </a:highlight>
+                <a:latin typeface="Courier New"/>
+              </a:rPr>
+              <a:t>,</a:t>
+            </a:r>
+            <a:endParaRPr lang="en-US" sz="4000" b="1" dirty="0">
+              <a:solidFill>
+                <a:srgbClr val="000080"/>
+              </a:solidFill>
+              <a:highlight>
+                <a:srgbClr val="FFFFFF"/>
+              </a:highlight>
+              <a:latin typeface="Courier New"/>
+            </a:endParaRPr>
+          </a:p>
+          <a:p>
+            <a:pPr marL="0" indent="0">
+              <a:buNone/>
+            </a:pPr>
+            <a:r>
+              <a:rPr lang="en-US" sz="4000" b="1" dirty="0" smtClean="0">
+                <a:solidFill>
+                  <a:srgbClr val="000080"/>
+                </a:solidFill>
+                <a:highlight>
+                  <a:srgbClr val="FFFFFF"/>
+                </a:highlight>
+                <a:latin typeface="Courier New"/>
+              </a:rPr>
+              <a:t>    </a:t>
+            </a:r>
+            <a:r>
+              <a:rPr lang="en-US" sz="4000" b="1" dirty="0" err="1" smtClean="0">
+                <a:solidFill>
+                  <a:srgbClr val="000080"/>
+                </a:solidFill>
+                <a:highlight>
+                  <a:srgbClr val="FFFFFF"/>
+                </a:highlight>
+                <a:latin typeface="Courier New"/>
+              </a:rPr>
+              <a:t>p_targets</a:t>
+            </a:r>
+            <a:r>
+              <a:rPr lang="en-US" sz="4000" b="1" dirty="0" smtClean="0">
+                <a:solidFill>
+                  <a:srgbClr val="000080"/>
+                </a:solidFill>
+                <a:highlight>
+                  <a:srgbClr val="FFFFFF"/>
+                </a:highlight>
+                <a:latin typeface="Courier New"/>
+              </a:rPr>
+              <a:t>             =&gt; </a:t>
+            </a:r>
+            <a:r>
+              <a:rPr lang="en-US" sz="4000" b="1" dirty="0" smtClean="0">
+                <a:solidFill>
+                  <a:srgbClr val="0000FF"/>
+                </a:solidFill>
+                <a:highlight>
+                  <a:srgbClr val="FFFFFF"/>
+                </a:highlight>
+                <a:latin typeface="Courier New"/>
+              </a:rPr>
+              <a:t>'</a:t>
+            </a:r>
+            <a:r>
+              <a:rPr lang="en-US" sz="4000" b="1" dirty="0" err="1" smtClean="0">
+                <a:solidFill>
+                  <a:srgbClr val="0000FF"/>
+                </a:solidFill>
+                <a:highlight>
+                  <a:srgbClr val="FFFFFF"/>
+                </a:highlight>
+                <a:latin typeface="Courier New"/>
+              </a:rPr>
+              <a:t>dev,qa</a:t>
+            </a:r>
+            <a:r>
+              <a:rPr lang="en-US" sz="4000" b="1" dirty="0">
+                <a:solidFill>
+                  <a:srgbClr val="0000FF"/>
+                </a:solidFill>
+                <a:highlight>
+                  <a:srgbClr val="FFFFFF"/>
+                </a:highlight>
+                <a:latin typeface="Courier New"/>
+              </a:rPr>
+              <a:t>'</a:t>
+            </a:r>
+            <a:r>
+              <a:rPr lang="en-US" sz="4000" b="1" dirty="0">
+                <a:solidFill>
+                  <a:srgbClr val="000080"/>
+                </a:solidFill>
+                <a:highlight>
+                  <a:srgbClr val="FFFFFF"/>
+                </a:highlight>
+                <a:latin typeface="Courier New"/>
+              </a:rPr>
+              <a:t>,</a:t>
+            </a:r>
+          </a:p>
+          <a:p>
+            <a:pPr marL="0" indent="0">
+              <a:buNone/>
+            </a:pPr>
+            <a:r>
+              <a:rPr lang="en-US" sz="4000" b="1" dirty="0" smtClean="0">
+                <a:solidFill>
+                  <a:srgbClr val="000080"/>
+                </a:solidFill>
+                <a:highlight>
+                  <a:srgbClr val="FFFFFF"/>
+                </a:highlight>
+                <a:latin typeface="Courier New"/>
+              </a:rPr>
+              <a:t>    </a:t>
+            </a:r>
+            <a:r>
+              <a:rPr lang="en-US" sz="4000" b="1" dirty="0" err="1" smtClean="0">
+                <a:solidFill>
+                  <a:srgbClr val="000080"/>
+                </a:solidFill>
+                <a:highlight>
+                  <a:srgbClr val="FFFFFF"/>
+                </a:highlight>
+                <a:latin typeface="Courier New"/>
+              </a:rPr>
+              <a:t>p_table_name</a:t>
+            </a:r>
+            <a:r>
+              <a:rPr lang="en-US" sz="4000" b="1" dirty="0" smtClean="0">
+                <a:solidFill>
+                  <a:srgbClr val="000080"/>
+                </a:solidFill>
+                <a:highlight>
+                  <a:srgbClr val="FFFFFF"/>
+                </a:highlight>
+                <a:latin typeface="Courier New"/>
+              </a:rPr>
+              <a:t>          =&gt; </a:t>
+            </a:r>
+            <a:r>
+              <a:rPr lang="en-US" sz="4000" b="1" dirty="0">
+                <a:solidFill>
+                  <a:srgbClr val="0000FF"/>
+                </a:solidFill>
+                <a:highlight>
+                  <a:srgbClr val="FFFFFF"/>
+                </a:highlight>
+                <a:latin typeface="Courier New"/>
+              </a:rPr>
+              <a:t>'</a:t>
+            </a:r>
+            <a:r>
+              <a:rPr lang="en-US" sz="4000" b="1" dirty="0" err="1">
+                <a:solidFill>
+                  <a:srgbClr val="0000FF"/>
+                </a:solidFill>
+                <a:highlight>
+                  <a:srgbClr val="FFFFFF"/>
+                </a:highlight>
+                <a:latin typeface="Courier New"/>
+              </a:rPr>
+              <a:t>test_data</a:t>
+            </a:r>
+            <a:r>
+              <a:rPr lang="en-US" sz="4000" b="1" dirty="0">
+                <a:solidFill>
+                  <a:srgbClr val="0000FF"/>
+                </a:solidFill>
+                <a:highlight>
+                  <a:srgbClr val="FFFFFF"/>
+                </a:highlight>
+                <a:latin typeface="Courier New"/>
+              </a:rPr>
+              <a:t>'</a:t>
+            </a:r>
+            <a:r>
+              <a:rPr lang="en-US" sz="4000" b="1" dirty="0">
+                <a:solidFill>
+                  <a:srgbClr val="000080"/>
+                </a:solidFill>
+                <a:highlight>
+                  <a:srgbClr val="FFFFFF"/>
+                </a:highlight>
+                <a:latin typeface="Courier New"/>
+              </a:rPr>
+              <a:t>,</a:t>
+            </a:r>
+          </a:p>
+          <a:p>
+            <a:pPr marL="0" indent="0">
+              <a:buNone/>
+            </a:pPr>
+            <a:r>
+              <a:rPr lang="en-US" sz="4000" b="1" dirty="0" smtClean="0">
+                <a:solidFill>
+                  <a:srgbClr val="000080"/>
+                </a:solidFill>
+                <a:highlight>
+                  <a:srgbClr val="FFFFFF"/>
+                </a:highlight>
+                <a:latin typeface="Courier New"/>
+              </a:rPr>
+              <a:t>    </a:t>
+            </a:r>
+            <a:r>
+              <a:rPr lang="en-US" sz="4000" b="1" dirty="0" err="1" smtClean="0">
+                <a:solidFill>
+                  <a:srgbClr val="000080"/>
+                </a:solidFill>
+                <a:highlight>
+                  <a:srgbClr val="FFFFFF"/>
+                </a:highlight>
+                <a:latin typeface="Courier New"/>
+              </a:rPr>
+              <a:t>p_table_exists_action</a:t>
+            </a:r>
+            <a:r>
+              <a:rPr lang="en-US" sz="4000" b="1" dirty="0" smtClean="0">
+                <a:solidFill>
+                  <a:srgbClr val="000080"/>
+                </a:solidFill>
+                <a:highlight>
+                  <a:srgbClr val="FFFFFF"/>
+                </a:highlight>
+                <a:latin typeface="Courier New"/>
+              </a:rPr>
+              <a:t> </a:t>
+            </a:r>
+            <a:r>
+              <a:rPr lang="en-US" sz="4000" b="1" dirty="0">
+                <a:solidFill>
+                  <a:srgbClr val="000080"/>
+                </a:solidFill>
+                <a:highlight>
+                  <a:srgbClr val="FFFFFF"/>
+                </a:highlight>
+                <a:latin typeface="Courier New"/>
+              </a:rPr>
+              <a:t>=&gt; </a:t>
+            </a:r>
+            <a:r>
+              <a:rPr lang="en-US" sz="4000" b="1" dirty="0">
+                <a:solidFill>
+                  <a:srgbClr val="0000FF"/>
+                </a:solidFill>
+                <a:highlight>
+                  <a:srgbClr val="FFFFFF"/>
+                </a:highlight>
+                <a:latin typeface="Courier New"/>
+              </a:rPr>
+              <a:t>'drop'</a:t>
+            </a:r>
+            <a:r>
+              <a:rPr lang="en-US" sz="4000" b="1" dirty="0">
+                <a:solidFill>
+                  <a:srgbClr val="000080"/>
+                </a:solidFill>
+                <a:highlight>
+                  <a:srgbClr val="FFFFFF"/>
+                </a:highlight>
+                <a:latin typeface="Courier New"/>
+              </a:rPr>
+              <a:t>,</a:t>
+            </a:r>
+          </a:p>
+          <a:p>
+            <a:pPr marL="0" indent="0">
+              <a:buNone/>
+            </a:pPr>
+            <a:r>
+              <a:rPr lang="en-US" sz="4000" b="1" dirty="0" smtClean="0">
+                <a:solidFill>
+                  <a:srgbClr val="000080"/>
+                </a:solidFill>
+                <a:highlight>
+                  <a:srgbClr val="FFFFFF"/>
+                </a:highlight>
+                <a:latin typeface="Courier New"/>
+              </a:rPr>
+              <a:t>    </a:t>
+            </a:r>
+            <a:r>
+              <a:rPr lang="en-US" sz="4000" b="1" dirty="0" err="1" smtClean="0">
+                <a:solidFill>
+                  <a:srgbClr val="000080"/>
+                </a:solidFill>
+                <a:highlight>
+                  <a:srgbClr val="FFFFFF"/>
+                </a:highlight>
+                <a:latin typeface="Courier New"/>
+              </a:rPr>
+              <a:t>p_asynchronous</a:t>
+            </a:r>
+            <a:r>
+              <a:rPr lang="en-US" sz="4000" b="1" dirty="0" smtClean="0">
+                <a:solidFill>
+                  <a:srgbClr val="000080"/>
+                </a:solidFill>
+                <a:highlight>
+                  <a:srgbClr val="FFFFFF"/>
+                </a:highlight>
+                <a:latin typeface="Courier New"/>
+              </a:rPr>
+              <a:t>        =&gt; </a:t>
+            </a:r>
+            <a:r>
+              <a:rPr lang="en-US" sz="4000" b="1" dirty="0" smtClean="0">
+                <a:solidFill>
+                  <a:srgbClr val="008080"/>
+                </a:solidFill>
+                <a:highlight>
+                  <a:srgbClr val="FFFFFF"/>
+                </a:highlight>
+                <a:latin typeface="Courier New"/>
+              </a:rPr>
+              <a:t>true</a:t>
+            </a:r>
+            <a:r>
+              <a:rPr lang="en-US" sz="4000" b="1" dirty="0">
+                <a:solidFill>
+                  <a:srgbClr val="000080"/>
+                </a:solidFill>
+                <a:highlight>
+                  <a:srgbClr val="FFFFFF"/>
+                </a:highlight>
+                <a:latin typeface="Courier New"/>
+              </a:rPr>
+              <a:t>,</a:t>
+            </a:r>
+            <a:endParaRPr lang="en-US" sz="4000" b="1" dirty="0" smtClean="0">
+              <a:solidFill>
+                <a:srgbClr val="000080"/>
+              </a:solidFill>
+              <a:highlight>
+                <a:srgbClr val="FFFFFF"/>
+              </a:highlight>
+              <a:latin typeface="Courier New"/>
+            </a:endParaRPr>
+          </a:p>
+          <a:p>
+            <a:pPr marL="0" indent="0">
+              <a:buNone/>
+            </a:pPr>
+            <a:r>
+              <a:rPr lang="en-US" sz="4000" b="1" dirty="0" smtClean="0">
+                <a:solidFill>
+                  <a:srgbClr val="000080"/>
+                </a:solidFill>
+                <a:highlight>
+                  <a:srgbClr val="FFFFFF"/>
+                </a:highlight>
+                <a:latin typeface="Courier New"/>
+              </a:rPr>
+              <a:t>    </a:t>
+            </a:r>
+            <a:r>
+              <a:rPr lang="en-US" sz="4000" b="1" dirty="0" err="1">
+                <a:solidFill>
+                  <a:srgbClr val="000080"/>
+                </a:solidFill>
+                <a:highlight>
+                  <a:srgbClr val="FFFFFF"/>
+                </a:highlight>
+                <a:latin typeface="Courier New"/>
+              </a:rPr>
+              <a:t>p_run_as_sys</a:t>
+            </a:r>
+            <a:r>
+              <a:rPr lang="en-US" sz="4000" b="1" dirty="0">
+                <a:solidFill>
+                  <a:srgbClr val="000080"/>
+                </a:solidFill>
+                <a:highlight>
+                  <a:srgbClr val="FFFFFF"/>
+                </a:highlight>
+                <a:latin typeface="Courier New"/>
+              </a:rPr>
+              <a:t>          =&gt; </a:t>
+            </a:r>
+            <a:r>
+              <a:rPr lang="en-US" sz="4000" b="1" dirty="0">
+                <a:solidFill>
+                  <a:srgbClr val="008080"/>
+                </a:solidFill>
+                <a:highlight>
+                  <a:srgbClr val="FFFFFF"/>
+                </a:highlight>
+                <a:latin typeface="Courier New"/>
+              </a:rPr>
+              <a:t>false</a:t>
+            </a:r>
+            <a:endParaRPr lang="en-US" sz="4000" b="1" dirty="0" smtClean="0">
+              <a:solidFill>
+                <a:srgbClr val="000080"/>
+              </a:solidFill>
+              <a:highlight>
+                <a:srgbClr val="FFFFFF"/>
+              </a:highlight>
+              <a:latin typeface="Courier New"/>
+            </a:endParaRPr>
+          </a:p>
+          <a:p>
+            <a:pPr marL="0" indent="0">
+              <a:buNone/>
+            </a:pPr>
+            <a:r>
+              <a:rPr lang="en-US" sz="4000" b="1" dirty="0" smtClean="0">
+                <a:solidFill>
+                  <a:srgbClr val="000080"/>
+                </a:solidFill>
+                <a:highlight>
+                  <a:srgbClr val="FFFFFF"/>
+                </a:highlight>
+                <a:latin typeface="Courier New"/>
+              </a:rPr>
+              <a:t>  );</a:t>
+            </a:r>
+            <a:endParaRPr lang="en-US" sz="4000" b="1" dirty="0">
+              <a:solidFill>
+                <a:srgbClr val="000080"/>
+              </a:solidFill>
+              <a:highlight>
+                <a:srgbClr val="FFFFFF"/>
+              </a:highlight>
+              <a:latin typeface="Courier New"/>
+            </a:endParaRPr>
+          </a:p>
+          <a:p>
+            <a:pPr marL="0" indent="0">
+              <a:buNone/>
+            </a:pPr>
+            <a:r>
+              <a:rPr lang="en-US" sz="4000" b="1" dirty="0" smtClean="0">
+                <a:solidFill>
+                  <a:srgbClr val="008080"/>
+                </a:solidFill>
+                <a:highlight>
+                  <a:srgbClr val="FFFFFF"/>
+                </a:highlight>
+                <a:latin typeface="Courier New"/>
+              </a:rPr>
+              <a:t>end</a:t>
+            </a:r>
+            <a:r>
+              <a:rPr lang="en-US" sz="4000" b="1" dirty="0">
+                <a:solidFill>
+                  <a:srgbClr val="000080"/>
+                </a:solidFill>
+                <a:highlight>
+                  <a:srgbClr val="FFFFFF"/>
+                </a:highlight>
+                <a:latin typeface="Courier New"/>
+              </a:rPr>
+              <a:t>;</a:t>
+            </a:r>
+          </a:p>
+          <a:p>
+            <a:pPr marL="0" indent="0">
+              <a:buNone/>
+            </a:pPr>
+            <a:r>
+              <a:rPr lang="en-US" sz="4000" b="1" dirty="0" smtClean="0">
+                <a:solidFill>
+                  <a:srgbClr val="000080"/>
+                </a:solidFill>
+                <a:highlight>
+                  <a:srgbClr val="FFFFFF"/>
+                </a:highlight>
+                <a:latin typeface="Courier New"/>
+              </a:rPr>
+              <a:t>/</a:t>
+            </a:r>
+            <a:endParaRPr lang="en-US" sz="2600" b="1" dirty="0" smtClean="0">
+              <a:solidFill>
+                <a:srgbClr val="000080"/>
+              </a:solidFill>
+              <a:highlight>
+                <a:srgbClr val="FFFFFF"/>
+              </a:highlight>
+              <a:latin typeface="Courier New"/>
+            </a:endParaRPr>
+          </a:p>
+        </p:txBody>
+      </p:sp>
+      <p:sp>
+        <p:nvSpPr>
+          <p:cNvPr id="4" name="Date Placeholder 3"/>
+          <p:cNvSpPr>
+            <a:spLocks noGrp="1"/>
+          </p:cNvSpPr>
+          <p:nvPr>
+            <p:ph type="dt" sz="half" idx="10"/>
+          </p:nvPr>
+        </p:nvSpPr>
+        <p:spPr/>
+        <p:txBody>
+          <a:bodyPr/>
+          <a:lstStyle/>
+          <a:p>
+            <a:r>
+              <a:rPr lang="en-US" smtClean="0"/>
+              <a:t>2019-02-19</a:t>
+            </a:r>
+            <a:endParaRPr lang="en-US" dirty="0"/>
+          </a:p>
+        </p:txBody>
+      </p:sp>
+      <p:sp>
+        <p:nvSpPr>
+          <p:cNvPr id="5" name="Slide Number Placeholder 4"/>
+          <p:cNvSpPr>
+            <a:spLocks noGrp="1"/>
+          </p:cNvSpPr>
+          <p:nvPr>
+            <p:ph type="sldNum" sz="quarter" idx="12"/>
+          </p:nvPr>
+        </p:nvSpPr>
+        <p:spPr/>
+        <p:txBody>
+          <a:bodyPr/>
+          <a:lstStyle/>
+          <a:p>
+            <a:fld id="{05869706-863E-4BD1-B682-3CD80F60367B}" type="slidenum">
+              <a:rPr lang="en-US" smtClean="0"/>
+              <a:t>8</a:t>
+            </a:fld>
+            <a:endParaRPr lang="en-US"/>
+          </a:p>
+        </p:txBody>
+      </p:sp>
+      <p:sp>
+        <p:nvSpPr>
+          <p:cNvPr id="6" name="Rectangle 5"/>
+          <p:cNvSpPr/>
+          <p:nvPr/>
+        </p:nvSpPr>
+        <p:spPr>
+          <a:xfrm>
+            <a:off x="2590800" y="1657350"/>
+            <a:ext cx="2895600" cy="283388"/>
+          </a:xfrm>
+          <a:prstGeom prst="rect">
+            <a:avLst/>
+          </a:prstGeom>
+        </p:spPr>
+        <p:style>
+          <a:lnRef idx="2">
+            <a:schemeClr val="accent1">
+              <a:shade val="50000"/>
+            </a:schemeClr>
+          </a:lnRef>
+          <a:fillRef idx="1">
+            <a:schemeClr val="accent1"/>
+          </a:fillRef>
+          <a:effectRef idx="0">
+            <a:schemeClr val="accent1"/>
+          </a:effectRef>
+          <a:fontRef idx="minor">
+            <a:schemeClr val="lt1"/>
+          </a:fontRef>
+        </p:style>
+        <p:txBody>
+          <a:bodyPr rtlCol="0" anchor="ctr"/>
+          <a:lstStyle/>
+          <a:p>
+            <a:pPr algn="ctr"/>
+            <a:r>
+              <a:rPr lang="en-US" sz="2800" dirty="0" smtClean="0"/>
+              <a:t>WHAT</a:t>
+            </a:r>
+            <a:endParaRPr lang="en-US" sz="2800" dirty="0"/>
+          </a:p>
+        </p:txBody>
+      </p:sp>
+      <p:sp>
+        <p:nvSpPr>
+          <p:cNvPr id="7" name="Rectangle 6"/>
+          <p:cNvSpPr/>
+          <p:nvPr/>
+        </p:nvSpPr>
+        <p:spPr>
+          <a:xfrm>
+            <a:off x="5908966" y="1657350"/>
+            <a:ext cx="1177634" cy="283388"/>
+          </a:xfrm>
+          <a:prstGeom prst="rect">
+            <a:avLst/>
+          </a:prstGeom>
+        </p:spPr>
+        <p:style>
+          <a:lnRef idx="2">
+            <a:schemeClr val="accent1">
+              <a:shade val="50000"/>
+            </a:schemeClr>
+          </a:lnRef>
+          <a:fillRef idx="1">
+            <a:schemeClr val="accent1"/>
+          </a:fillRef>
+          <a:effectRef idx="0">
+            <a:schemeClr val="accent1"/>
+          </a:effectRef>
+          <a:fontRef idx="minor">
+            <a:schemeClr val="lt1"/>
+          </a:fontRef>
+        </p:style>
+        <p:txBody>
+          <a:bodyPr lIns="0" rIns="0" rtlCol="0" anchor="ctr"/>
+          <a:lstStyle/>
+          <a:p>
+            <a:pPr algn="ctr"/>
+            <a:r>
+              <a:rPr lang="en-US" sz="2800" dirty="0" smtClean="0"/>
+              <a:t>WHERE</a:t>
+            </a:r>
+            <a:endParaRPr lang="en-US" sz="2800" dirty="0"/>
+          </a:p>
+        </p:txBody>
+      </p:sp>
+      <p:sp>
+        <p:nvSpPr>
+          <p:cNvPr id="8" name="Rectangle 7"/>
+          <p:cNvSpPr/>
+          <p:nvPr/>
+        </p:nvSpPr>
+        <p:spPr>
+          <a:xfrm>
+            <a:off x="6553200" y="2495550"/>
+            <a:ext cx="1295400" cy="228600"/>
+          </a:xfrm>
+          <a:prstGeom prst="rect">
+            <a:avLst/>
+          </a:prstGeom>
+        </p:spPr>
+        <p:style>
+          <a:lnRef idx="2">
+            <a:schemeClr val="accent1">
+              <a:shade val="50000"/>
+            </a:schemeClr>
+          </a:lnRef>
+          <a:fillRef idx="1">
+            <a:schemeClr val="accent1"/>
+          </a:fillRef>
+          <a:effectRef idx="0">
+            <a:schemeClr val="accent1"/>
+          </a:effectRef>
+          <a:fontRef idx="minor">
+            <a:schemeClr val="lt1"/>
+          </a:fontRef>
+        </p:style>
+        <p:txBody>
+          <a:bodyPr rtlCol="0" anchor="ctr"/>
+          <a:lstStyle/>
+          <a:p>
+            <a:pPr algn="ctr"/>
+            <a:r>
+              <a:rPr lang="en-US" sz="2800" dirty="0" smtClean="0"/>
+              <a:t>WHAT</a:t>
+            </a:r>
+            <a:endParaRPr lang="en-US" sz="2400" dirty="0"/>
+          </a:p>
+        </p:txBody>
+      </p:sp>
+      <p:sp>
+        <p:nvSpPr>
+          <p:cNvPr id="9" name="Rectangle 8"/>
+          <p:cNvSpPr/>
+          <p:nvPr/>
+        </p:nvSpPr>
+        <p:spPr>
+          <a:xfrm>
+            <a:off x="6553200" y="2767350"/>
+            <a:ext cx="1295400" cy="251460"/>
+          </a:xfrm>
+          <a:prstGeom prst="rect">
+            <a:avLst/>
+          </a:prstGeom>
+        </p:spPr>
+        <p:style>
+          <a:lnRef idx="2">
+            <a:schemeClr val="accent1">
+              <a:shade val="50000"/>
+            </a:schemeClr>
+          </a:lnRef>
+          <a:fillRef idx="1">
+            <a:schemeClr val="accent1"/>
+          </a:fillRef>
+          <a:effectRef idx="0">
+            <a:schemeClr val="accent1"/>
+          </a:effectRef>
+          <a:fontRef idx="minor">
+            <a:schemeClr val="lt1"/>
+          </a:fontRef>
+        </p:style>
+        <p:txBody>
+          <a:bodyPr rtlCol="0" anchor="ctr"/>
+          <a:lstStyle/>
+          <a:p>
+            <a:pPr algn="ctr"/>
+            <a:r>
+              <a:rPr lang="en-US" sz="2800" dirty="0" smtClean="0"/>
+              <a:t>WHERE</a:t>
+            </a:r>
+            <a:endParaRPr lang="en-US" sz="2800" dirty="0"/>
+          </a:p>
+        </p:txBody>
+      </p:sp>
+      <p:sp>
+        <p:nvSpPr>
+          <p:cNvPr id="10" name="Rectangle 9"/>
+          <p:cNvSpPr/>
+          <p:nvPr/>
+        </p:nvSpPr>
+        <p:spPr>
+          <a:xfrm>
+            <a:off x="6553200" y="3065004"/>
+            <a:ext cx="1295400" cy="827946"/>
+          </a:xfrm>
+          <a:prstGeom prst="rect">
+            <a:avLst/>
+          </a:prstGeom>
+        </p:spPr>
+        <p:style>
+          <a:lnRef idx="2">
+            <a:schemeClr val="accent1">
+              <a:shade val="50000"/>
+            </a:schemeClr>
+          </a:lnRef>
+          <a:fillRef idx="1">
+            <a:schemeClr val="accent1"/>
+          </a:fillRef>
+          <a:effectRef idx="0">
+            <a:schemeClr val="accent1"/>
+          </a:effectRef>
+          <a:fontRef idx="minor">
+            <a:schemeClr val="lt1"/>
+          </a:fontRef>
+        </p:style>
+        <p:txBody>
+          <a:bodyPr rtlCol="0" anchor="ctr"/>
+          <a:lstStyle/>
+          <a:p>
+            <a:pPr algn="ctr"/>
+            <a:r>
+              <a:rPr lang="en-US" sz="2800" dirty="0" smtClean="0"/>
+              <a:t>HOW</a:t>
+            </a:r>
+            <a:endParaRPr lang="en-US" sz="2800" dirty="0"/>
+          </a:p>
+        </p:txBody>
+      </p:sp>
+    </p:spTree>
+    <p:extLst>
+      <p:ext uri="{BB962C8B-B14F-4D97-AF65-F5344CB8AC3E}">
+        <p14:creationId xmlns:p14="http://schemas.microsoft.com/office/powerpoint/2010/main" val="2705181770"/>
       </p:ext>
     </p:extLst>
   </p:cSld>
@@ -18665,7 +18685,7 @@
           <a:p>
             <a:r>
               <a:rPr lang="en-US" smtClean="0"/>
-              <a:t>2018-06-09</a:t>
+              <a:t>2019-02-19</a:t>
             </a:r>
             <a:endParaRPr lang="en-US"/>
           </a:p>

</xml_diff>